<commit_message>
Update to conversion of eigenvalue review
</commit_message>
<xml_diff>
--- a/LectureSlides/10a_ModelsInHighDimensions.pptx
+++ b/LectureSlides/10a_ModelsInHighDimensions.pptx
@@ -4,6 +4,9 @@
   <p:sldMasterIdLst>
     <p:sldMasterId id="2147483648" r:id="rId1"/>
   </p:sldMasterIdLst>
+  <p:notesMasterIdLst>
+    <p:notesMasterId r:id="rId39"/>
+  </p:notesMasterIdLst>
   <p:sldIdLst>
     <p:sldId id="299" r:id="rId2"/>
     <p:sldId id="339" r:id="rId3"/>
@@ -159,6 +162,439 @@
 </p:presentation>
 </file>
 
+<file path=ppt/notesMasters/notesMaster1.xml><?xml version="1.0" encoding="utf-8"?>
+<p:notesMaster xmlns:a="http://schemas.openxmlformats.org/drawingml/2006/main" xmlns:r="http://schemas.openxmlformats.org/officeDocument/2006/relationships" xmlns:p="http://schemas.openxmlformats.org/presentationml/2006/main">
+  <p:cSld>
+    <p:bg>
+      <p:bgRef idx="1001">
+        <a:schemeClr val="bg1"/>
+      </p:bgRef>
+    </p:bg>
+    <p:spTree>
+      <p:nvGrpSpPr>
+        <p:cNvPr id="1" name=""/>
+        <p:cNvGrpSpPr/>
+        <p:nvPr/>
+      </p:nvGrpSpPr>
+      <p:grpSpPr>
+        <a:xfrm>
+          <a:off x="0" y="0"/>
+          <a:ext cx="0" cy="0"/>
+          <a:chOff x="0" y="0"/>
+          <a:chExt cx="0" cy="0"/>
+        </a:xfrm>
+      </p:grpSpPr>
+      <p:sp>
+        <p:nvSpPr>
+          <p:cNvPr id="2" name="Header Placeholder 1"/>
+          <p:cNvSpPr>
+            <a:spLocks noGrp="1"/>
+          </p:cNvSpPr>
+          <p:nvPr>
+            <p:ph type="hdr" sz="quarter"/>
+          </p:nvPr>
+        </p:nvSpPr>
+        <p:spPr>
+          <a:xfrm>
+            <a:off x="0" y="0"/>
+            <a:ext cx="2971800" cy="458788"/>
+          </a:xfrm>
+          <a:prstGeom prst="rect">
+            <a:avLst/>
+          </a:prstGeom>
+        </p:spPr>
+        <p:txBody>
+          <a:bodyPr vert="horz" lIns="91440" tIns="45720" rIns="91440" bIns="45720" rtlCol="0"/>
+          <a:lstStyle>
+            <a:lvl1pPr algn="l">
+              <a:defRPr sz="1200"/>
+            </a:lvl1pPr>
+          </a:lstStyle>
+          <a:p>
+            <a:endParaRPr lang="en-US"/>
+          </a:p>
+        </p:txBody>
+      </p:sp>
+      <p:sp>
+        <p:nvSpPr>
+          <p:cNvPr id="3" name="Date Placeholder 2"/>
+          <p:cNvSpPr>
+            <a:spLocks noGrp="1"/>
+          </p:cNvSpPr>
+          <p:nvPr>
+            <p:ph type="dt" idx="1"/>
+          </p:nvPr>
+        </p:nvSpPr>
+        <p:spPr>
+          <a:xfrm>
+            <a:off x="3884613" y="0"/>
+            <a:ext cx="2971800" cy="458788"/>
+          </a:xfrm>
+          <a:prstGeom prst="rect">
+            <a:avLst/>
+          </a:prstGeom>
+        </p:spPr>
+        <p:txBody>
+          <a:bodyPr vert="horz" lIns="91440" tIns="45720" rIns="91440" bIns="45720" rtlCol="0"/>
+          <a:lstStyle>
+            <a:lvl1pPr algn="r">
+              <a:defRPr sz="1200"/>
+            </a:lvl1pPr>
+          </a:lstStyle>
+          <a:p>
+            <a:fld id="{BE0C07B0-B271-4EE5-BA4D-B7A9BA86B818}" type="datetimeFigureOut">
+              <a:rPr lang="en-US" smtClean="0"/>
+              <a:t>10/17/2024</a:t>
+            </a:fld>
+            <a:endParaRPr lang="en-US"/>
+          </a:p>
+        </p:txBody>
+      </p:sp>
+      <p:sp>
+        <p:nvSpPr>
+          <p:cNvPr id="4" name="Slide Image Placeholder 3"/>
+          <p:cNvSpPr>
+            <a:spLocks noGrp="1" noRot="1" noChangeAspect="1"/>
+          </p:cNvSpPr>
+          <p:nvPr>
+            <p:ph type="sldImg" idx="2"/>
+          </p:nvPr>
+        </p:nvSpPr>
+        <p:spPr>
+          <a:xfrm>
+            <a:off x="685800" y="1143000"/>
+            <a:ext cx="5486400" cy="3086100"/>
+          </a:xfrm>
+          <a:prstGeom prst="rect">
+            <a:avLst/>
+          </a:prstGeom>
+          <a:noFill/>
+          <a:ln w="12700">
+            <a:solidFill>
+              <a:prstClr val="black"/>
+            </a:solidFill>
+          </a:ln>
+        </p:spPr>
+        <p:txBody>
+          <a:bodyPr vert="horz" lIns="91440" tIns="45720" rIns="91440" bIns="45720" rtlCol="0" anchor="ctr"/>
+          <a:lstStyle/>
+          <a:p>
+            <a:endParaRPr lang="en-US"/>
+          </a:p>
+        </p:txBody>
+      </p:sp>
+      <p:sp>
+        <p:nvSpPr>
+          <p:cNvPr id="5" name="Notes Placeholder 4"/>
+          <p:cNvSpPr>
+            <a:spLocks noGrp="1"/>
+          </p:cNvSpPr>
+          <p:nvPr>
+            <p:ph type="body" sz="quarter" idx="3"/>
+          </p:nvPr>
+        </p:nvSpPr>
+        <p:spPr>
+          <a:xfrm>
+            <a:off x="685800" y="4400550"/>
+            <a:ext cx="5486400" cy="3600450"/>
+          </a:xfrm>
+          <a:prstGeom prst="rect">
+            <a:avLst/>
+          </a:prstGeom>
+        </p:spPr>
+        <p:txBody>
+          <a:bodyPr vert="horz" lIns="91440" tIns="45720" rIns="91440" bIns="45720" rtlCol="0"/>
+          <a:lstStyle/>
+          <a:p>
+            <a:pPr lvl="0"/>
+            <a:r>
+              <a:rPr lang="en-US"/>
+              <a:t>Click to edit Master text styles</a:t>
+            </a:r>
+          </a:p>
+          <a:p>
+            <a:pPr lvl="1"/>
+            <a:r>
+              <a:rPr lang="en-US"/>
+              <a:t>Second level</a:t>
+            </a:r>
+          </a:p>
+          <a:p>
+            <a:pPr lvl="2"/>
+            <a:r>
+              <a:rPr lang="en-US"/>
+              <a:t>Third level</a:t>
+            </a:r>
+          </a:p>
+          <a:p>
+            <a:pPr lvl="3"/>
+            <a:r>
+              <a:rPr lang="en-US"/>
+              <a:t>Fourth level</a:t>
+            </a:r>
+          </a:p>
+          <a:p>
+            <a:pPr lvl="4"/>
+            <a:r>
+              <a:rPr lang="en-US"/>
+              <a:t>Fifth level</a:t>
+            </a:r>
+          </a:p>
+        </p:txBody>
+      </p:sp>
+      <p:sp>
+        <p:nvSpPr>
+          <p:cNvPr id="6" name="Footer Placeholder 5"/>
+          <p:cNvSpPr>
+            <a:spLocks noGrp="1"/>
+          </p:cNvSpPr>
+          <p:nvPr>
+            <p:ph type="ftr" sz="quarter" idx="4"/>
+          </p:nvPr>
+        </p:nvSpPr>
+        <p:spPr>
+          <a:xfrm>
+            <a:off x="0" y="8685213"/>
+            <a:ext cx="2971800" cy="458787"/>
+          </a:xfrm>
+          <a:prstGeom prst="rect">
+            <a:avLst/>
+          </a:prstGeom>
+        </p:spPr>
+        <p:txBody>
+          <a:bodyPr vert="horz" lIns="91440" tIns="45720" rIns="91440" bIns="45720" rtlCol="0" anchor="b"/>
+          <a:lstStyle>
+            <a:lvl1pPr algn="l">
+              <a:defRPr sz="1200"/>
+            </a:lvl1pPr>
+          </a:lstStyle>
+          <a:p>
+            <a:endParaRPr lang="en-US"/>
+          </a:p>
+        </p:txBody>
+      </p:sp>
+      <p:sp>
+        <p:nvSpPr>
+          <p:cNvPr id="7" name="Slide Number Placeholder 6"/>
+          <p:cNvSpPr>
+            <a:spLocks noGrp="1"/>
+          </p:cNvSpPr>
+          <p:nvPr>
+            <p:ph type="sldNum" sz="quarter" idx="5"/>
+          </p:nvPr>
+        </p:nvSpPr>
+        <p:spPr>
+          <a:xfrm>
+            <a:off x="3884613" y="8685213"/>
+            <a:ext cx="2971800" cy="458787"/>
+          </a:xfrm>
+          <a:prstGeom prst="rect">
+            <a:avLst/>
+          </a:prstGeom>
+        </p:spPr>
+        <p:txBody>
+          <a:bodyPr vert="horz" lIns="91440" tIns="45720" rIns="91440" bIns="45720" rtlCol="0" anchor="b"/>
+          <a:lstStyle>
+            <a:lvl1pPr algn="r">
+              <a:defRPr sz="1200"/>
+            </a:lvl1pPr>
+          </a:lstStyle>
+          <a:p>
+            <a:fld id="{6F609307-CA8F-4289-A7CE-F587EC42BD0D}" type="slidenum">
+              <a:rPr lang="en-US" smtClean="0"/>
+              <a:t>‹#›</a:t>
+            </a:fld>
+            <a:endParaRPr lang="en-US"/>
+          </a:p>
+        </p:txBody>
+      </p:sp>
+    </p:spTree>
+    <p:extLst>
+      <p:ext uri="{BB962C8B-B14F-4D97-AF65-F5344CB8AC3E}">
+        <p14:creationId xmlns:p14="http://schemas.microsoft.com/office/powerpoint/2010/main" val="2060294533"/>
+      </p:ext>
+    </p:extLst>
+  </p:cSld>
+  <p:clrMap bg1="lt1" tx1="dk1" bg2="lt2" tx2="dk2" accent1="accent1" accent2="accent2" accent3="accent3" accent4="accent4" accent5="accent5" accent6="accent6" hlink="hlink" folHlink="folHlink"/>
+  <p:notesStyle>
+    <a:lvl1pPr marL="0" algn="l" defTabSz="914400" rtl="0" eaLnBrk="1" latinLnBrk="0" hangingPunct="1">
+      <a:defRPr sz="1200" kern="1200">
+        <a:solidFill>
+          <a:schemeClr val="tx1"/>
+        </a:solidFill>
+        <a:latin typeface="+mn-lt"/>
+        <a:ea typeface="+mn-ea"/>
+        <a:cs typeface="+mn-cs"/>
+      </a:defRPr>
+    </a:lvl1pPr>
+    <a:lvl2pPr marL="457200" algn="l" defTabSz="914400" rtl="0" eaLnBrk="1" latinLnBrk="0" hangingPunct="1">
+      <a:defRPr sz="1200" kern="1200">
+        <a:solidFill>
+          <a:schemeClr val="tx1"/>
+        </a:solidFill>
+        <a:latin typeface="+mn-lt"/>
+        <a:ea typeface="+mn-ea"/>
+        <a:cs typeface="+mn-cs"/>
+      </a:defRPr>
+    </a:lvl2pPr>
+    <a:lvl3pPr marL="914400" algn="l" defTabSz="914400" rtl="0" eaLnBrk="1" latinLnBrk="0" hangingPunct="1">
+      <a:defRPr sz="1200" kern="1200">
+        <a:solidFill>
+          <a:schemeClr val="tx1"/>
+        </a:solidFill>
+        <a:latin typeface="+mn-lt"/>
+        <a:ea typeface="+mn-ea"/>
+        <a:cs typeface="+mn-cs"/>
+      </a:defRPr>
+    </a:lvl3pPr>
+    <a:lvl4pPr marL="1371600" algn="l" defTabSz="914400" rtl="0" eaLnBrk="1" latinLnBrk="0" hangingPunct="1">
+      <a:defRPr sz="1200" kern="1200">
+        <a:solidFill>
+          <a:schemeClr val="tx1"/>
+        </a:solidFill>
+        <a:latin typeface="+mn-lt"/>
+        <a:ea typeface="+mn-ea"/>
+        <a:cs typeface="+mn-cs"/>
+      </a:defRPr>
+    </a:lvl4pPr>
+    <a:lvl5pPr marL="1828800" algn="l" defTabSz="914400" rtl="0" eaLnBrk="1" latinLnBrk="0" hangingPunct="1">
+      <a:defRPr sz="1200" kern="1200">
+        <a:solidFill>
+          <a:schemeClr val="tx1"/>
+        </a:solidFill>
+        <a:latin typeface="+mn-lt"/>
+        <a:ea typeface="+mn-ea"/>
+        <a:cs typeface="+mn-cs"/>
+      </a:defRPr>
+    </a:lvl5pPr>
+    <a:lvl6pPr marL="2286000" algn="l" defTabSz="914400" rtl="0" eaLnBrk="1" latinLnBrk="0" hangingPunct="1">
+      <a:defRPr sz="1200" kern="1200">
+        <a:solidFill>
+          <a:schemeClr val="tx1"/>
+        </a:solidFill>
+        <a:latin typeface="+mn-lt"/>
+        <a:ea typeface="+mn-ea"/>
+        <a:cs typeface="+mn-cs"/>
+      </a:defRPr>
+    </a:lvl6pPr>
+    <a:lvl7pPr marL="2743200" algn="l" defTabSz="914400" rtl="0" eaLnBrk="1" latinLnBrk="0" hangingPunct="1">
+      <a:defRPr sz="1200" kern="1200">
+        <a:solidFill>
+          <a:schemeClr val="tx1"/>
+        </a:solidFill>
+        <a:latin typeface="+mn-lt"/>
+        <a:ea typeface="+mn-ea"/>
+        <a:cs typeface="+mn-cs"/>
+      </a:defRPr>
+    </a:lvl7pPr>
+    <a:lvl8pPr marL="3200400" algn="l" defTabSz="914400" rtl="0" eaLnBrk="1" latinLnBrk="0" hangingPunct="1">
+      <a:defRPr sz="1200" kern="1200">
+        <a:solidFill>
+          <a:schemeClr val="tx1"/>
+        </a:solidFill>
+        <a:latin typeface="+mn-lt"/>
+        <a:ea typeface="+mn-ea"/>
+        <a:cs typeface="+mn-cs"/>
+      </a:defRPr>
+    </a:lvl8pPr>
+    <a:lvl9pPr marL="3657600" algn="l" defTabSz="914400" rtl="0" eaLnBrk="1" latinLnBrk="0" hangingPunct="1">
+      <a:defRPr sz="1200" kern="1200">
+        <a:solidFill>
+          <a:schemeClr val="tx1"/>
+        </a:solidFill>
+        <a:latin typeface="+mn-lt"/>
+        <a:ea typeface="+mn-ea"/>
+        <a:cs typeface="+mn-cs"/>
+      </a:defRPr>
+    </a:lvl9pPr>
+  </p:notesStyle>
+</p:notesMaster>
+</file>
+
+<file path=ppt/notesSlides/notesSlide1.xml><?xml version="1.0" encoding="utf-8"?>
+<p:notes xmlns:a="http://schemas.openxmlformats.org/drawingml/2006/main" xmlns:r="http://schemas.openxmlformats.org/officeDocument/2006/relationships" xmlns:p="http://schemas.openxmlformats.org/presentationml/2006/main">
+  <p:cSld>
+    <p:spTree>
+      <p:nvGrpSpPr>
+        <p:cNvPr id="1" name=""/>
+        <p:cNvGrpSpPr/>
+        <p:nvPr/>
+      </p:nvGrpSpPr>
+      <p:grpSpPr>
+        <a:xfrm>
+          <a:off x="0" y="0"/>
+          <a:ext cx="0" cy="0"/>
+          <a:chOff x="0" y="0"/>
+          <a:chExt cx="0" cy="0"/>
+        </a:xfrm>
+      </p:grpSpPr>
+      <p:sp>
+        <p:nvSpPr>
+          <p:cNvPr id="2" name="Slide Image Placeholder 1"/>
+          <p:cNvSpPr>
+            <a:spLocks noGrp="1" noRot="1" noChangeAspect="1"/>
+          </p:cNvSpPr>
+          <p:nvPr>
+            <p:ph type="sldImg"/>
+          </p:nvPr>
+        </p:nvSpPr>
+        <p:spPr/>
+      </p:sp>
+      <p:sp>
+        <p:nvSpPr>
+          <p:cNvPr id="3" name="Notes Placeholder 2"/>
+          <p:cNvSpPr>
+            <a:spLocks noGrp="1"/>
+          </p:cNvSpPr>
+          <p:nvPr>
+            <p:ph type="body" idx="1"/>
+          </p:nvPr>
+        </p:nvSpPr>
+        <p:spPr/>
+        <p:txBody>
+          <a:bodyPr/>
+          <a:lstStyle/>
+          <a:p>
+            <a:endParaRPr lang="en-US" dirty="0"/>
+          </a:p>
+        </p:txBody>
+      </p:sp>
+      <p:sp>
+        <p:nvSpPr>
+          <p:cNvPr id="4" name="Slide Number Placeholder 3"/>
+          <p:cNvSpPr>
+            <a:spLocks noGrp="1"/>
+          </p:cNvSpPr>
+          <p:nvPr>
+            <p:ph type="sldNum" sz="quarter" idx="5"/>
+          </p:nvPr>
+        </p:nvSpPr>
+        <p:spPr/>
+        <p:txBody>
+          <a:bodyPr/>
+          <a:lstStyle/>
+          <a:p>
+            <a:fld id="{6F609307-CA8F-4289-A7CE-F587EC42BD0D}" type="slidenum">
+              <a:rPr lang="en-US" smtClean="0"/>
+              <a:t>2</a:t>
+            </a:fld>
+            <a:endParaRPr lang="en-US"/>
+          </a:p>
+        </p:txBody>
+      </p:sp>
+    </p:spTree>
+    <p:extLst>
+      <p:ext uri="{BB962C8B-B14F-4D97-AF65-F5344CB8AC3E}">
+        <p14:creationId xmlns:p14="http://schemas.microsoft.com/office/powerpoint/2010/main" val="463207666"/>
+      </p:ext>
+    </p:extLst>
+  </p:cSld>
+  <p:clrMapOvr>
+    <a:masterClrMapping/>
+  </p:clrMapOvr>
+</p:notes>
+</file>
+
 <file path=ppt/slideLayouts/slideLayout1.xml><?xml version="1.0" encoding="utf-8"?>
 <p:sldLayout xmlns:a="http://schemas.openxmlformats.org/drawingml/2006/main" xmlns:r="http://schemas.openxmlformats.org/officeDocument/2006/relationships" xmlns:p="http://schemas.openxmlformats.org/presentationml/2006/main" type="title" preserve="1">
   <p:cSld name="Title Slide">
@@ -338,7 +774,7 @@
           <a:p>
             <a:fld id="{241EB5C9-1307-BA42-ABA2-0BC069CD8E7F}" type="datetimeFigureOut">
               <a:rPr lang="en-US" smtClean="0"/>
-              <a:t>10/3/2024</a:t>
+              <a:t>10/17/2024</a:t>
             </a:fld>
             <a:endParaRPr lang="en-US"/>
           </a:p>
@@ -506,7 +942,7 @@
           <a:p>
             <a:fld id="{241EB5C9-1307-BA42-ABA2-0BC069CD8E7F}" type="datetimeFigureOut">
               <a:rPr lang="en-US" smtClean="0"/>
-              <a:t>10/3/2024</a:t>
+              <a:t>10/17/2024</a:t>
             </a:fld>
             <a:endParaRPr lang="en-US"/>
           </a:p>
@@ -684,7 +1120,7 @@
           <a:p>
             <a:fld id="{241EB5C9-1307-BA42-ABA2-0BC069CD8E7F}" type="datetimeFigureOut">
               <a:rPr lang="en-US" smtClean="0"/>
-              <a:t>10/3/2024</a:t>
+              <a:t>10/17/2024</a:t>
             </a:fld>
             <a:endParaRPr lang="en-US"/>
           </a:p>
@@ -852,7 +1288,7 @@
           <a:p>
             <a:fld id="{241EB5C9-1307-BA42-ABA2-0BC069CD8E7F}" type="datetimeFigureOut">
               <a:rPr lang="en-US" smtClean="0"/>
-              <a:t>10/3/2024</a:t>
+              <a:t>10/17/2024</a:t>
             </a:fld>
             <a:endParaRPr lang="en-US"/>
           </a:p>
@@ -1097,7 +1533,7 @@
           <a:p>
             <a:fld id="{241EB5C9-1307-BA42-ABA2-0BC069CD8E7F}" type="datetimeFigureOut">
               <a:rPr lang="en-US" smtClean="0"/>
-              <a:t>10/3/2024</a:t>
+              <a:t>10/17/2024</a:t>
             </a:fld>
             <a:endParaRPr lang="en-US"/>
           </a:p>
@@ -1382,7 +1818,7 @@
           <a:p>
             <a:fld id="{241EB5C9-1307-BA42-ABA2-0BC069CD8E7F}" type="datetimeFigureOut">
               <a:rPr lang="en-US" smtClean="0"/>
-              <a:t>10/3/2024</a:t>
+              <a:t>10/17/2024</a:t>
             </a:fld>
             <a:endParaRPr lang="en-US"/>
           </a:p>
@@ -1801,7 +2237,7 @@
           <a:p>
             <a:fld id="{241EB5C9-1307-BA42-ABA2-0BC069CD8E7F}" type="datetimeFigureOut">
               <a:rPr lang="en-US" smtClean="0"/>
-              <a:t>10/3/2024</a:t>
+              <a:t>10/17/2024</a:t>
             </a:fld>
             <a:endParaRPr lang="en-US"/>
           </a:p>
@@ -1918,7 +2354,7 @@
           <a:p>
             <a:fld id="{241EB5C9-1307-BA42-ABA2-0BC069CD8E7F}" type="datetimeFigureOut">
               <a:rPr lang="en-US" smtClean="0"/>
-              <a:t>10/3/2024</a:t>
+              <a:t>10/17/2024</a:t>
             </a:fld>
             <a:endParaRPr lang="en-US"/>
           </a:p>
@@ -2013,7 +2449,7 @@
           <a:p>
             <a:fld id="{241EB5C9-1307-BA42-ABA2-0BC069CD8E7F}" type="datetimeFigureOut">
               <a:rPr lang="en-US" smtClean="0"/>
-              <a:t>10/3/2024</a:t>
+              <a:t>10/17/2024</a:t>
             </a:fld>
             <a:endParaRPr lang="en-US"/>
           </a:p>
@@ -2288,7 +2724,7 @@
           <a:p>
             <a:fld id="{241EB5C9-1307-BA42-ABA2-0BC069CD8E7F}" type="datetimeFigureOut">
               <a:rPr lang="en-US" smtClean="0"/>
-              <a:t>10/3/2024</a:t>
+              <a:t>10/17/2024</a:t>
             </a:fld>
             <a:endParaRPr lang="en-US"/>
           </a:p>
@@ -2540,7 +2976,7 @@
           <a:p>
             <a:fld id="{241EB5C9-1307-BA42-ABA2-0BC069CD8E7F}" type="datetimeFigureOut">
               <a:rPr lang="en-US" smtClean="0"/>
-              <a:t>10/3/2024</a:t>
+              <a:t>10/17/2024</a:t>
             </a:fld>
             <a:endParaRPr lang="en-US"/>
           </a:p>
@@ -2751,7 +3187,7 @@
           <a:p>
             <a:fld id="{241EB5C9-1307-BA42-ABA2-0BC069CD8E7F}" type="datetimeFigureOut">
               <a:rPr lang="en-US" smtClean="0"/>
-              <a:t>10/3/2024</a:t>
+              <a:t>10/17/2024</a:t>
             </a:fld>
             <a:endParaRPr lang="en-US"/>
           </a:p>
@@ -3355,8 +3791,8 @@
           </a:p>
         </p:txBody>
       </p:sp>
-      <mc:AlternateContent xmlns:mc="http://schemas.openxmlformats.org/markup-compatibility/2006">
-        <mc:Choice xmlns:a14="http://schemas.microsoft.com/office/drawing/2010/main" Requires="a14">
+      <mc:AlternateContent xmlns:mc="http://schemas.openxmlformats.org/markup-compatibility/2006" xmlns:a14="http://schemas.microsoft.com/office/drawing/2010/main">
+        <mc:Choice Requires="a14">
           <p:sp>
             <p:nvSpPr>
               <p:cNvPr id="3" name="Content Placeholder 2"/>
@@ -3606,7 +4042,7 @@
             </p:txBody>
           </p:sp>
         </mc:Choice>
-        <mc:Fallback>
+        <mc:Fallback xmlns="">
           <p:sp>
             <p:nvSpPr>
               <p:cNvPr id="3" name="Content Placeholder 2"/>
@@ -4102,7 +4538,7 @@
             <p:spPr/>
             <p:txBody>
               <a:bodyPr>
-                <a:normAutofit fontScale="77500" lnSpcReduction="20000"/>
+                <a:normAutofit fontScale="85000" lnSpcReduction="20000"/>
               </a:bodyPr>
               <a:lstStyle/>
               <a:p>
@@ -4110,10 +4546,9 @@
                   <a:buNone/>
                 </a:pPr>
                 <a:r>
+                  <a:rPr dirty="0"/>
                   <a:t>How do we interpret the bias-variance trade-off relationship:</a:t>
                 </a:r>
-                <a:br/>
-                <a:endParaRPr/>
               </a:p>
               <a:p>
                 <a:pPr marL="0" lvl="0" indent="0">
@@ -4467,13 +4902,14 @@
                     </m:oMath>
                   </m:oMathPara>
                 </a14:m>
-                <a:endParaRPr/>
+                <a:endParaRPr dirty="0"/>
               </a:p>
               <a:p>
                 <a:pPr marL="0" lvl="0" indent="0">
                   <a:buNone/>
                 </a:pPr>
                 <a:r>
+                  <a:rPr dirty="0"/>
                   <a:t>- </a:t>
                 </a:r>
                 <a14:m>
@@ -4626,17 +5062,22 @@
                   </m:oMath>
                 </a14:m>
                 <a:r>
+                  <a:rPr dirty="0"/>
                   <a:t>, the expected squared difference between the model output and the expected model output is the </a:t>
                 </a:r>
                 <a:r>
-                  <a:rPr b="1"/>
+                  <a:rPr b="1" dirty="0"/>
                   <a:t>variance</a:t>
                 </a:r>
                 <a:r>
+                  <a:rPr dirty="0"/>
                   <a:t> of the model</a:t>
                 </a:r>
-                <a:br/>
-                <a:r>
+                <a:br>
+                  <a:rPr dirty="0"/>
+                </a:br>
+                <a:r>
+                  <a:rPr dirty="0"/>
                   <a:t>- For low variance model, </a:t>
                 </a:r>
                 <a14:m>
@@ -4794,15 +5235,19 @@
                     </m:r>
                   </m:oMath>
                 </a14:m>
-                <a:br/>
-                <a:r>
+                <a:br>
+                  <a:rPr dirty="0"/>
+                </a:br>
+                <a:r>
+                  <a:rPr dirty="0"/>
                   <a:t>- Model </a:t>
                 </a:r>
                 <a:r>
-                  <a:rPr b="1"/>
+                  <a:rPr b="1" dirty="0"/>
                   <a:t>generalizes</a:t>
                 </a:r>
                 <a:r>
+                  <a:rPr dirty="0"/>
                   <a:t> since variance is low for each prediction, </a:t>
                 </a:r>
                 <a14:m>
@@ -4844,7 +5289,7 @@
                     </m:d>
                   </m:oMath>
                 </a14:m>
-                <a:endParaRPr/>
+                <a:endParaRPr dirty="0"/>
               </a:p>
               <a:p>
                 <a:pPr lvl="0"/>
@@ -4979,26 +5424,30 @@
                   </m:oMath>
                 </a14:m>
                 <a:r>
+                  <a:rPr dirty="0"/>
                   <a:t>, the expected value of the difference between the model output and the expected model output is the </a:t>
                 </a:r>
                 <a:r>
-                  <a:rPr b="1"/>
+                  <a:rPr b="1" dirty="0"/>
                   <a:t>bias</a:t>
                 </a:r>
                 <a:r>
+                  <a:rPr dirty="0"/>
                   <a:t> of the model</a:t>
                 </a:r>
               </a:p>
               <a:p>
                 <a:pPr lvl="1"/>
                 <a:r>
+                  <a:rPr dirty="0"/>
                   <a:t>For </a:t>
                 </a:r>
                 <a:r>
-                  <a:rPr b="1"/>
+                  <a:rPr b="1" dirty="0"/>
                   <a:t>unbiased model</a:t>
                 </a:r>
                 <a:r>
+                  <a:rPr dirty="0"/>
                   <a:t>, </a:t>
                 </a:r>
                 <a14:m>
@@ -5106,11 +5555,12 @@
                     </m:r>
                   </m:oMath>
                 </a14:m>
-                <a:endParaRPr/>
+                <a:endParaRPr dirty="0"/>
               </a:p>
               <a:p>
                 <a:pPr lvl="1"/>
                 <a:r>
+                  <a:rPr dirty="0"/>
                   <a:t>Example: OLS model with </a:t>
                 </a:r>
                 <a14:m>
@@ -5178,10 +5628,11 @@
                   </m:oMath>
                 </a14:m>
                 <a:r>
+                  <a:rPr dirty="0"/>
                   <a:t> is </a:t>
                 </a:r>
                 <a:r>
-                  <a:rPr b="1"/>
+                  <a:rPr b="1" dirty="0"/>
                   <a:t>unbiased</a:t>
                 </a:r>
               </a:p>
@@ -5217,7 +5668,16 @@
                   </m:oMath>
                 </a14:m>
                 <a:r>
-                  <a:t> is inherent or irreducable error in data</a:t>
+                  <a:rPr dirty="0"/>
+                  <a:t> is inherent or </a:t>
+                </a:r>
+                <a:r>
+                  <a:rPr dirty="0" err="1"/>
+                  <a:t>irreducable</a:t>
+                </a:r>
+                <a:r>
+                  <a:rPr dirty="0"/>
+                  <a:t> error in data</a:t>
                 </a:r>
               </a:p>
             </p:txBody>
@@ -5238,7 +5698,7 @@
               <a:blipFill>
                 <a:blip r:embed="rId2"/>
                 <a:stretch>
-                  <a:fillRect l="-667" t="-2334" b="-2154"/>
+                  <a:fillRect l="-741" t="-2693" b="-1257"/>
                 </a:stretch>
               </a:blipFill>
             </p:spPr>
@@ -5316,21 +5776,57 @@
             <p:ph idx="1"/>
           </p:nvPr>
         </p:nvSpPr>
-        <p:spPr/>
+        <p:spPr>
+          <a:xfrm>
+            <a:off x="457200" y="1200151"/>
+            <a:ext cx="3842512" cy="3394472"/>
+          </a:xfrm>
+        </p:spPr>
         <p:txBody>
-          <a:bodyPr/>
+          <a:bodyPr>
+            <a:normAutofit lnSpcReduction="10000"/>
+          </a:bodyPr>
           <a:lstStyle/>
           <a:p>
             <a:pPr marL="0" lvl="0" indent="0">
               <a:buNone/>
             </a:pPr>
             <a:r>
+              <a:rPr dirty="0"/>
               <a:t>There is a trade-off between bias and variance</a:t>
             </a:r>
           </a:p>
           <a:p>
             <a:pPr lvl="0"/>
             <a:r>
+              <a:rPr lang="en-US" dirty="0"/>
+              <a:t>Low bias models fits training data   </a:t>
+            </a:r>
+          </a:p>
+          <a:p>
+            <a:pPr lvl="0"/>
+            <a:r>
+              <a:rPr lang="en-US" dirty="0"/>
+              <a:t>Low variance model </a:t>
+            </a:r>
+            <a:r>
+              <a:rPr lang="en-US" dirty="0" err="1"/>
+              <a:t>model</a:t>
+            </a:r>
+            <a:r>
+              <a:rPr lang="en-US" dirty="0"/>
+              <a:t> generalizes well to </a:t>
+            </a:r>
+            <a:r>
+              <a:rPr lang="en-US"/>
+              <a:t>new cases </a:t>
+            </a:r>
+            <a:endParaRPr lang="en-US" dirty="0"/>
+          </a:p>
+          <a:p>
+            <a:pPr lvl="0"/>
+            <a:r>
+              <a:rPr dirty="0"/>
               <a:t>Need to find the optimal trade-off point</a:t>
             </a:r>
           </a:p>
@@ -5352,8 +5848,8 @@
         </p:blipFill>
         <p:spPr bwMode="auto">
           <a:xfrm>
-            <a:off x="2489200" y="1193800"/>
-            <a:ext cx="4152900" cy="2882900"/>
+            <a:off x="4480560" y="1333237"/>
+            <a:ext cx="4500880" cy="3124464"/>
           </a:xfrm>
           <a:prstGeom prst="rect">
             <a:avLst/>
@@ -5374,8 +5870,8 @@
         </p:nvSpPr>
         <p:spPr>
           <a:xfrm>
-            <a:off x="457200" y="4076700"/>
-            <a:ext cx="8229600" cy="508000"/>
+            <a:off x="4742688" y="4541791"/>
+            <a:ext cx="4313936" cy="508000"/>
           </a:xfrm>
           <a:prstGeom prst="rect">
             <a:avLst/>
@@ -5390,6 +5886,7 @@
               <a:buNone/>
             </a:pPr>
             <a:r>
+              <a:rPr dirty="0"/>
               <a:t>The trade-off between bias and variance</a:t>
             </a:r>
           </a:p>
@@ -5529,13 +6026,7 @@
                           <a:rPr>
                             <a:latin typeface="Cambria Math" panose="02040503050406030204" pitchFamily="18" charset="0"/>
                           </a:rPr>
-                          <m:t>−</m:t>
-                        </m:r>
-                        <m:r>
-                          <a:rPr>
-                            <a:latin typeface="Cambria Math" panose="02040503050406030204" pitchFamily="18" charset="0"/>
-                          </a:rPr>
-                          <m:t>1</m:t>
+                          <m:t>−1</m:t>
                         </m:r>
                       </m:sup>
                     </m:sSup>
@@ -5589,13 +6080,7 @@
                           <a:rPr>
                             <a:latin typeface="Cambria Math" panose="02040503050406030204" pitchFamily="18" charset="0"/>
                           </a:rPr>
-                          <m:t>−</m:t>
-                        </m:r>
-                        <m:r>
-                          <a:rPr>
-                            <a:latin typeface="Cambria Math" panose="02040503050406030204" pitchFamily="18" charset="0"/>
-                          </a:rPr>
-                          <m:t>1</m:t>
+                          <m:t>−1</m:t>
                         </m:r>
                       </m:sup>
                     </m:sSup>
@@ -5856,13 +6341,7 @@
                             <a:rPr>
                               <a:latin typeface="Cambria Math" panose="02040503050406030204" pitchFamily="18" charset="0"/>
                             </a:rPr>
-                            <m:t>−</m:t>
-                          </m:r>
-                          <m:r>
-                            <a:rPr>
-                              <a:latin typeface="Cambria Math" panose="02040503050406030204" pitchFamily="18" charset="0"/>
-                            </a:rPr>
-                            <m:t>1</m:t>
+                            <m:t>−1</m:t>
                           </m:r>
                         </m:sup>
                       </m:sSup>
@@ -6009,13 +6488,7 @@
                             <a:rPr>
                               <a:latin typeface="Cambria Math" panose="02040503050406030204" pitchFamily="18" charset="0"/>
                             </a:rPr>
-                            <m:t>−</m:t>
-                          </m:r>
-                          <m:r>
-                            <a:rPr>
-                              <a:latin typeface="Cambria Math" panose="02040503050406030204" pitchFamily="18" charset="0"/>
-                            </a:rPr>
-                            <m:t>1</m:t>
+                            <m:t>−1</m:t>
                           </m:r>
                         </m:sup>
                       </m:sSup>
@@ -6685,8 +7158,14 @@
                   <a:buNone/>
                 </a:pPr>
                 <a:r>
-                  <a:t>The inverse of the covariance can be computed from its eigendecomposition</a:t>
-                </a:r>
+                  <a:rPr dirty="0"/>
+                  <a:t>The inverse of the covariance can be computed from its </a:t>
+                </a:r>
+                <a:r>
+                  <a:rPr dirty="0" err="1"/>
+                  <a:t>eigendecomposition</a:t>
+                </a:r>
+                <a:endParaRPr dirty="0"/>
               </a:p>
               <a:p>
                 <a:pPr marL="0" lvl="0" indent="0">
@@ -6805,13 +7284,14 @@
                     </m:oMath>
                   </m:oMathPara>
                 </a14:m>
-                <a:endParaRPr/>
+                <a:endParaRPr dirty="0"/>
               </a:p>
               <a:p>
                 <a:pPr marL="0" lvl="0" indent="0">
                   <a:buNone/>
                 </a:pPr>
                 <a:r>
+                  <a:rPr dirty="0"/>
                   <a:t>Where </a:t>
                 </a:r>
                 <a14:m>
@@ -6844,6 +7324,7 @@
                   </m:oMath>
                 </a14:m>
                 <a:r>
+                  <a:rPr dirty="0"/>
                   <a:t> is:</a:t>
                 </a:r>
               </a:p>
@@ -7099,7 +7580,7 @@
                     </m:oMath>
                   </m:oMathPara>
                 </a14:m>
-                <a:endParaRPr/>
+                <a:endParaRPr dirty="0"/>
               </a:p>
             </p:txBody>
           </p:sp>
@@ -8420,6 +8901,7 @@
               <a:buNone/>
             </a:pPr>
             <a:r>
+              <a:rPr dirty="0"/>
               <a:t>Welcome to the Second Half of CSCI E-83!</a:t>
             </a:r>
           </a:p>
@@ -8438,7 +8920,7 @@
         <p:spPr/>
         <p:txBody>
           <a:bodyPr>
-            <a:normAutofit fontScale="70000" lnSpcReduction="20000"/>
+            <a:normAutofit fontScale="92500" lnSpcReduction="20000"/>
           </a:bodyPr>
           <a:lstStyle/>
           <a:p>
@@ -8454,71 +8936,162 @@
             <a:pPr lvl="0"/>
             <a:r>
               <a:rPr dirty="0"/>
-              <a:t>Week 8, Oct 24: Introduction to Linear Models</a:t>
-            </a:r>
+              <a:t>Week </a:t>
+            </a:r>
+            <a:r>
+              <a:rPr lang="en-US" dirty="0"/>
+              <a:t>8</a:t>
+            </a:r>
+            <a:r>
+              <a:rPr dirty="0"/>
+              <a:t>, </a:t>
+            </a:r>
+            <a:r>
+              <a:rPr lang="en-US" dirty="0"/>
+              <a:t>Oct 23</a:t>
+            </a:r>
+            <a:r>
+              <a:rPr dirty="0"/>
+              <a:t>: Regularization and sparse models</a:t>
+            </a:r>
+            <a:endParaRPr lang="en-US" dirty="0"/>
           </a:p>
           <a:p>
             <a:pPr lvl="0"/>
             <a:r>
+              <a:rPr lang="en-US" dirty="0"/>
+              <a:t>Week 9, Oct 30: Models for messy data</a:t>
+            </a:r>
+            <a:endParaRPr dirty="0"/>
+          </a:p>
+          <a:p>
+            <a:pPr lvl="0"/>
+            <a:r>
               <a:rPr dirty="0"/>
-              <a:t>Week 9, Oct 31: Linear Models Part 2 - Categorical data and nonlinear response models</a:t>
-            </a:r>
+              <a:t>Week 1</a:t>
+            </a:r>
+            <a:r>
+              <a:rPr lang="en-US" dirty="0"/>
+              <a:t>0</a:t>
+            </a:r>
+            <a:r>
+              <a:rPr dirty="0"/>
+              <a:t>, Nov</a:t>
+            </a:r>
+            <a:r>
+              <a:rPr lang="en-US" dirty="0"/>
+              <a:t> 6</a:t>
+            </a:r>
+            <a:r>
+              <a:rPr dirty="0"/>
+              <a:t>: Time </a:t>
+            </a:r>
+            <a:r>
+              <a:rPr lang="en-US" dirty="0"/>
+              <a:t>s</a:t>
+            </a:r>
+            <a:r>
+              <a:rPr dirty="0"/>
+              <a:t>eries </a:t>
+            </a:r>
+            <a:r>
+              <a:rPr lang="en-US" dirty="0"/>
+              <a:t>m</a:t>
+            </a:r>
+            <a:r>
+              <a:rPr dirty="0"/>
+              <a:t>odels</a:t>
+            </a:r>
+            <a:r>
+              <a:rPr lang="en-US" dirty="0"/>
+              <a:t> and forecasting</a:t>
+            </a:r>
+            <a:endParaRPr dirty="0"/>
           </a:p>
           <a:p>
             <a:pPr lvl="0"/>
             <a:r>
+              <a:rPr lang="en-US" dirty="0"/>
+              <a:t>Week 11, </a:t>
+            </a:r>
+            <a:r>
               <a:rPr dirty="0"/>
-              <a:t>Week 10, Nov 7: Linear Models Part 3 - Regularization and sparse models</a:t>
-            </a:r>
+              <a:t>Nov 1</a:t>
+            </a:r>
+            <a:r>
+              <a:rPr lang="en-US" dirty="0"/>
+              <a:t>3</a:t>
+            </a:r>
+            <a:r>
+              <a:rPr dirty="0"/>
+              <a:t>: </a:t>
+            </a:r>
+            <a:r>
+              <a:rPr lang="en-US" dirty="0"/>
+              <a:t>Advanced time series models</a:t>
+            </a:r>
+            <a:endParaRPr dirty="0"/>
           </a:p>
           <a:p>
             <a:pPr lvl="0"/>
             <a:r>
               <a:rPr dirty="0"/>
-              <a:t>Week 11, Nov14: Time Series Models</a:t>
-            </a:r>
+              <a:t>Week</a:t>
+            </a:r>
+            <a:r>
+              <a:rPr lang="en-US" dirty="0"/>
+              <a:t> </a:t>
+            </a:r>
+            <a:r>
+              <a:rPr dirty="0"/>
+              <a:t>12, Nov 2</a:t>
+            </a:r>
+            <a:r>
+              <a:rPr lang="en-US" dirty="0"/>
+              <a:t>0</a:t>
+            </a:r>
+            <a:r>
+              <a:rPr dirty="0"/>
+              <a:t>: Bayes MCMC methods</a:t>
+            </a:r>
+            <a:endParaRPr lang="en-US" dirty="0"/>
           </a:p>
           <a:p>
             <a:pPr lvl="0"/>
             <a:r>
+              <a:rPr lang="en-US" dirty="0"/>
+              <a:t>Nov 21: Project proposals due</a:t>
+            </a:r>
+            <a:endParaRPr dirty="0"/>
+          </a:p>
+          <a:p>
+            <a:pPr lvl="0"/>
+            <a:r>
               <a:rPr dirty="0"/>
-              <a:t>Nov 18: Project proposal due</a:t>
+              <a:t>Week 13, </a:t>
+            </a:r>
+            <a:r>
+              <a:rPr lang="en-US" dirty="0"/>
+              <a:t>Dec 4</a:t>
+            </a:r>
+            <a:r>
+              <a:rPr dirty="0"/>
+              <a:t>: Hierarchical Bayesian models</a:t>
             </a:r>
           </a:p>
           <a:p>
             <a:pPr lvl="0"/>
             <a:r>
               <a:rPr dirty="0"/>
-              <a:t>Week12, Nov 23: Bayes MCMC methods</a:t>
-            </a:r>
-          </a:p>
-          <a:p>
-            <a:pPr lvl="0"/>
+              <a:t>Dec </a:t>
+            </a:r>
+            <a:r>
+              <a:rPr lang="en-US" dirty="0"/>
+              <a:t>19</a:t>
+            </a:r>
             <a:r>
               <a:rPr dirty="0"/>
-              <a:t>Week 13, Nov 28: Hierarchical </a:t>
-            </a:r>
-            <a:r>
-              <a:t>Bayesian models</a:t>
-            </a:r>
-            <a:endParaRPr dirty="0"/>
-          </a:p>
-          <a:p>
-            <a:pPr lvl="0"/>
-            <a:r>
-              <a:rPr dirty="0"/>
-              <a:t>Week 14, Dec 5: - More on time series? - No assignment</a:t>
-            </a:r>
-            <a:br>
-              <a:rPr dirty="0"/>
-            </a:br>
-            <a:endParaRPr dirty="0"/>
-          </a:p>
-          <a:p>
-            <a:pPr lvl="0"/>
-            <a:r>
-              <a:rPr dirty="0"/>
-              <a:t>Dec 21: Submit Graduate Independent Projects</a:t>
+              <a:t>: Submit Graduate Independent Projects</a:t>
             </a:r>
           </a:p>
           <a:p>
@@ -9786,25 +10359,7 @@
                                   <a:rPr>
                                     <a:latin typeface="Cambria Math" panose="02040503050406030204" pitchFamily="18" charset="0"/>
                                   </a:rPr>
-                                  <m:t>,</m:t>
-                                </m:r>
-                                <m:r>
-                                  <a:rPr>
-                                    <a:latin typeface="Cambria Math" panose="02040503050406030204" pitchFamily="18" charset="0"/>
-                                  </a:rPr>
-                                  <m:t>0</m:t>
-                                </m:r>
-                                <m:r>
-                                  <a:rPr>
-                                    <a:latin typeface="Cambria Math" panose="02040503050406030204" pitchFamily="18" charset="0"/>
-                                  </a:rPr>
-                                  <m:t>,…,</m:t>
-                                </m:r>
-                                <m:r>
-                                  <a:rPr>
-                                    <a:latin typeface="Cambria Math" panose="02040503050406030204" pitchFamily="18" charset="0"/>
-                                  </a:rPr>
-                                  <m:t>0</m:t>
+                                  <m:t>,0,…,0</m:t>
                                 </m:r>
                               </m:e>
                             </m:mr>
@@ -9814,13 +10369,7 @@
                                   <a:rPr>
                                     <a:latin typeface="Cambria Math" panose="02040503050406030204" pitchFamily="18" charset="0"/>
                                   </a:rPr>
-                                  <m:t>0</m:t>
-                                </m:r>
-                                <m:r>
-                                  <a:rPr>
-                                    <a:latin typeface="Cambria Math" panose="02040503050406030204" pitchFamily="18" charset="0"/>
-                                  </a:rPr>
-                                  <m:t>,</m:t>
+                                  <m:t>0,</m:t>
                                 </m:r>
                                 <m:sSub>
                                   <m:sSubPr>
@@ -9882,13 +10431,7 @@
                                   <a:rPr>
                                     <a:latin typeface="Cambria Math" panose="02040503050406030204" pitchFamily="18" charset="0"/>
                                   </a:rPr>
-                                  <m:t>,…,</m:t>
-                                </m:r>
-                                <m:r>
-                                  <a:rPr>
-                                    <a:latin typeface="Cambria Math" panose="02040503050406030204" pitchFamily="18" charset="0"/>
-                                  </a:rPr>
-                                  <m:t>0</m:t>
+                                  <m:t>,…,0</m:t>
                                 </m:r>
                               </m:e>
                             </m:mr>
@@ -9908,25 +10451,7 @@
                                   <a:rPr>
                                     <a:latin typeface="Cambria Math" panose="02040503050406030204" pitchFamily="18" charset="0"/>
                                   </a:rPr>
-                                  <m:t>0</m:t>
-                                </m:r>
-                                <m:r>
-                                  <a:rPr>
-                                    <a:latin typeface="Cambria Math" panose="02040503050406030204" pitchFamily="18" charset="0"/>
-                                  </a:rPr>
-                                  <m:t>,</m:t>
-                                </m:r>
-                                <m:r>
-                                  <a:rPr>
-                                    <a:latin typeface="Cambria Math" panose="02040503050406030204" pitchFamily="18" charset="0"/>
-                                  </a:rPr>
-                                  <m:t>0</m:t>
-                                </m:r>
-                                <m:r>
-                                  <a:rPr>
-                                    <a:latin typeface="Cambria Math" panose="02040503050406030204" pitchFamily="18" charset="0"/>
-                                  </a:rPr>
-                                  <m:t>,…,</m:t>
+                                  <m:t>0,0,…,</m:t>
                                 </m:r>
                                 <m:sSub>
                                   <m:sSubPr>
@@ -15961,6 +16486,36 @@
           <a:chExt cx="0" cy="0"/>
         </a:xfrm>
       </p:grpSpPr>
+      <p:pic>
+        <p:nvPicPr>
+          <p:cNvPr id="4" name="Picture 3">
+            <a:extLst>
+              <a:ext uri="{FF2B5EF4-FFF2-40B4-BE49-F238E27FC236}">
+                <a16:creationId xmlns:a16="http://schemas.microsoft.com/office/drawing/2014/main" id="{B3AC3D74-C5C3-1208-B638-79668D278794}"/>
+              </a:ext>
+            </a:extLst>
+          </p:cNvPr>
+          <p:cNvPicPr>
+            <a:picLocks noChangeAspect="1"/>
+          </p:cNvPicPr>
+          <p:nvPr/>
+        </p:nvPicPr>
+        <p:blipFill>
+          <a:blip r:embed="rId2"/>
+          <a:stretch>
+            <a:fillRect/>
+          </a:stretch>
+        </p:blipFill>
+        <p:spPr>
+          <a:xfrm>
+            <a:off x="4320638" y="1406145"/>
+            <a:ext cx="4774594" cy="3515734"/>
+          </a:xfrm>
+          <a:prstGeom prst="rect">
+            <a:avLst/>
+          </a:prstGeom>
+        </p:spPr>
+      </p:pic>
       <p:sp>
         <p:nvSpPr>
           <p:cNvPr id="2" name="Title 1"/>
@@ -15986,8 +16541,8 @@
           </a:p>
         </p:txBody>
       </p:sp>
-      <mc:AlternateContent xmlns:mc="http://schemas.openxmlformats.org/markup-compatibility/2006">
-        <mc:Choice xmlns:a14="http://schemas.microsoft.com/office/drawing/2010/main" Requires="a14">
+      <mc:AlternateContent xmlns:mc="http://schemas.openxmlformats.org/markup-compatibility/2006" xmlns:a14="http://schemas.microsoft.com/office/drawing/2010/main">
+        <mc:Choice Requires="a14">
           <p:sp>
             <p:nvSpPr>
               <p:cNvPr id="8" name="Content Placeholder 2">
@@ -16380,7 +16935,7 @@
             </p:txBody>
           </p:sp>
         </mc:Choice>
-        <mc:Fallback>
+        <mc:Fallback xmlns="">
           <p:sp>
             <p:nvSpPr>
               <p:cNvPr id="8" name="Content Placeholder 2">
@@ -16404,7 +16959,7 @@
                 <a:avLst/>
               </a:prstGeom>
               <a:blipFill>
-                <a:blip r:embed="rId2"/>
+                <a:blip r:embed="rId3"/>
                 <a:stretch>
                   <a:fillRect l="-1506" t="-773" r="-602"/>
                 </a:stretch>
@@ -16425,36 +16980,6 @@
           </p:sp>
         </mc:Fallback>
       </mc:AlternateContent>
-      <p:pic>
-        <p:nvPicPr>
-          <p:cNvPr id="12" name="Picture 11">
-            <a:extLst>
-              <a:ext uri="{FF2B5EF4-FFF2-40B4-BE49-F238E27FC236}">
-                <a16:creationId xmlns:a16="http://schemas.microsoft.com/office/drawing/2014/main" id="{013E6A3A-AD28-466A-363B-7E206189A860}"/>
-              </a:ext>
-            </a:extLst>
-          </p:cNvPr>
-          <p:cNvPicPr>
-            <a:picLocks noChangeAspect="1"/>
-          </p:cNvPicPr>
-          <p:nvPr/>
-        </p:nvPicPr>
-        <p:blipFill>
-          <a:blip r:embed="rId3"/>
-          <a:stretch>
-            <a:fillRect/>
-          </a:stretch>
-        </p:blipFill>
-        <p:spPr>
-          <a:xfrm>
-            <a:off x="4507649" y="1441061"/>
-            <a:ext cx="4559135" cy="3118627"/>
-          </a:xfrm>
-          <a:prstGeom prst="rect">
-            <a:avLst/>
-          </a:prstGeom>
-        </p:spPr>
-      </p:pic>
       <p:cxnSp>
         <p:nvCxnSpPr>
           <p:cNvPr id="13" name="Straight Arrow Connector 12">
@@ -16472,7 +16997,7 @@
         <p:spPr>
           <a:xfrm flipV="1">
             <a:off x="3970528" y="1845056"/>
-            <a:ext cx="4596384" cy="459232"/>
+            <a:ext cx="4050449" cy="459232"/>
           </a:xfrm>
           <a:prstGeom prst="straightConnector1">
             <a:avLst/>
@@ -16515,8 +17040,8 @@
         </p:nvCxnSpPr>
         <p:spPr>
           <a:xfrm>
-            <a:off x="3970528" y="2755392"/>
-            <a:ext cx="2824480" cy="0"/>
+            <a:off x="3970528" y="2743199"/>
+            <a:ext cx="3490976" cy="134113"/>
           </a:xfrm>
           <a:prstGeom prst="straightConnector1">
             <a:avLst/>
@@ -16568,6 +17093,36 @@
           <a:chExt cx="0" cy="0"/>
         </a:xfrm>
       </p:grpSpPr>
+      <p:pic>
+        <p:nvPicPr>
+          <p:cNvPr id="7" name="Picture 6">
+            <a:extLst>
+              <a:ext uri="{FF2B5EF4-FFF2-40B4-BE49-F238E27FC236}">
+                <a16:creationId xmlns:a16="http://schemas.microsoft.com/office/drawing/2014/main" id="{E75C4108-589C-FD48-1E57-F128163670D8}"/>
+              </a:ext>
+            </a:extLst>
+          </p:cNvPr>
+          <p:cNvPicPr>
+            <a:picLocks noChangeAspect="1"/>
+          </p:cNvPicPr>
+          <p:nvPr/>
+        </p:nvPicPr>
+        <p:blipFill>
+          <a:blip r:embed="rId2"/>
+          <a:stretch>
+            <a:fillRect/>
+          </a:stretch>
+        </p:blipFill>
+        <p:spPr>
+          <a:xfrm>
+            <a:off x="4572000" y="1430528"/>
+            <a:ext cx="4501782" cy="3371596"/>
+          </a:xfrm>
+          <a:prstGeom prst="rect">
+            <a:avLst/>
+          </a:prstGeom>
+        </p:spPr>
+      </p:pic>
       <p:sp>
         <p:nvSpPr>
           <p:cNvPr id="2" name="Title 1"/>
@@ -16593,8 +17148,8 @@
           </a:p>
         </p:txBody>
       </p:sp>
-      <mc:AlternateContent xmlns:mc="http://schemas.openxmlformats.org/markup-compatibility/2006">
-        <mc:Choice xmlns:a14="http://schemas.microsoft.com/office/drawing/2010/main" Requires="a14">
+      <mc:AlternateContent xmlns:mc="http://schemas.openxmlformats.org/markup-compatibility/2006" xmlns:a14="http://schemas.microsoft.com/office/drawing/2010/main">
+        <mc:Choice Requires="a14">
           <p:sp>
             <p:nvSpPr>
               <p:cNvPr id="8" name="Content Placeholder 2">
@@ -16799,7 +17354,7 @@
                           <a:latin typeface="Cambria Math" panose="02040503050406030204" pitchFamily="18" charset="0"/>
                           <a:ea typeface="Cambria Math" panose="02040503050406030204" pitchFamily="18" charset="0"/>
                         </a:rPr>
-                        <m:t>~</m:t>
+                        <m:t>~−1+ </m:t>
                       </m:r>
                       <m:r>
                         <a:rPr lang="en-US" b="0" i="1" smtClean="0">
@@ -16940,7 +17495,7 @@
             </p:txBody>
           </p:sp>
         </mc:Choice>
-        <mc:Fallback>
+        <mc:Fallback xmlns="">
           <p:sp>
             <p:nvSpPr>
               <p:cNvPr id="8" name="Content Placeholder 2">
@@ -16964,7 +17519,7 @@
                 <a:avLst/>
               </a:prstGeom>
               <a:blipFill>
-                <a:blip r:embed="rId2"/>
+                <a:blip r:embed="rId3"/>
                 <a:stretch>
                   <a:fillRect l="-2259" t="-1236"/>
                 </a:stretch>
@@ -16985,36 +17540,6 @@
           </p:sp>
         </mc:Fallback>
       </mc:AlternateContent>
-      <p:pic>
-        <p:nvPicPr>
-          <p:cNvPr id="4" name="Picture 3">
-            <a:extLst>
-              <a:ext uri="{FF2B5EF4-FFF2-40B4-BE49-F238E27FC236}">
-                <a16:creationId xmlns:a16="http://schemas.microsoft.com/office/drawing/2014/main" id="{0A02462F-358A-7FA8-DE1C-FCB75FDC20B7}"/>
-              </a:ext>
-            </a:extLst>
-          </p:cNvPr>
-          <p:cNvPicPr>
-            <a:picLocks noChangeAspect="1"/>
-          </p:cNvPicPr>
-          <p:nvPr/>
-        </p:nvPicPr>
-        <p:blipFill>
-          <a:blip r:embed="rId3"/>
-          <a:stretch>
-            <a:fillRect/>
-          </a:stretch>
-        </p:blipFill>
-        <p:spPr>
-          <a:xfrm>
-            <a:off x="4543551" y="1442954"/>
-            <a:ext cx="4510109" cy="2840502"/>
-          </a:xfrm>
-          <a:prstGeom prst="rect">
-            <a:avLst/>
-          </a:prstGeom>
-        </p:spPr>
-      </p:pic>
       <p:cxnSp>
         <p:nvCxnSpPr>
           <p:cNvPr id="5" name="Straight Arrow Connector 4">
@@ -17031,52 +17556,8 @@
         </p:nvCxnSpPr>
         <p:spPr>
           <a:xfrm flipV="1">
-            <a:off x="4141216" y="1816608"/>
-            <a:ext cx="4035552" cy="784352"/>
-          </a:xfrm>
-          <a:prstGeom prst="straightConnector1">
-            <a:avLst/>
-          </a:prstGeom>
-          <a:ln>
-            <a:solidFill>
-              <a:schemeClr val="tx1"/>
-            </a:solidFill>
-            <a:tailEnd type="triangle"/>
-          </a:ln>
-        </p:spPr>
-        <p:style>
-          <a:lnRef idx="2">
-            <a:schemeClr val="accent1"/>
-          </a:lnRef>
-          <a:fillRef idx="0">
-            <a:schemeClr val="accent1"/>
-          </a:fillRef>
-          <a:effectRef idx="1">
-            <a:schemeClr val="accent1"/>
-          </a:effectRef>
-          <a:fontRef idx="minor">
-            <a:schemeClr val="tx1"/>
-          </a:fontRef>
-        </p:style>
-      </p:cxnSp>
-      <p:cxnSp>
-        <p:nvCxnSpPr>
-          <p:cNvPr id="6" name="Straight Arrow Connector 5">
-            <a:extLst>
-              <a:ext uri="{FF2B5EF4-FFF2-40B4-BE49-F238E27FC236}">
-                <a16:creationId xmlns:a16="http://schemas.microsoft.com/office/drawing/2014/main" id="{81D40B54-E6B0-7CB1-A9AD-D733C6D64577}"/>
-              </a:ext>
-            </a:extLst>
-          </p:cNvPr>
-          <p:cNvCxnSpPr>
-            <a:cxnSpLocks/>
-          </p:cNvCxnSpPr>
-          <p:nvPr/>
-        </p:nvCxnSpPr>
-        <p:spPr>
-          <a:xfrm flipV="1">
-            <a:off x="4072128" y="2698496"/>
-            <a:ext cx="2369312" cy="487680"/>
+            <a:off x="4320032" y="1727200"/>
+            <a:ext cx="3885184" cy="1109472"/>
           </a:xfrm>
           <a:prstGeom prst="straightConnector1">
             <a:avLst/>
@@ -17119,8 +17600,8 @@
         </p:nvCxnSpPr>
         <p:spPr>
           <a:xfrm flipV="1">
-            <a:off x="4072128" y="2698496"/>
-            <a:ext cx="3527552" cy="487680"/>
+            <a:off x="4023360" y="2836672"/>
+            <a:ext cx="3446272" cy="747776"/>
           </a:xfrm>
           <a:prstGeom prst="straightConnector1">
             <a:avLst/>
@@ -17820,4 +18301,299 @@
   </a:objectDefaults>
   <a:extraClrSchemeLst/>
 </a:theme>
+</file>
+
+<file path=ppt/theme/theme2.xml><?xml version="1.0" encoding="utf-8"?>
+<a:theme xmlns:a="http://schemas.openxmlformats.org/drawingml/2006/main" name="Office Theme">
+  <a:themeElements>
+    <a:clrScheme name="Office">
+      <a:dk1>
+        <a:sysClr val="windowText" lastClr="000000"/>
+      </a:dk1>
+      <a:lt1>
+        <a:sysClr val="window" lastClr="FFFFFF"/>
+      </a:lt1>
+      <a:dk2>
+        <a:srgbClr val="44546A"/>
+      </a:dk2>
+      <a:lt2>
+        <a:srgbClr val="E7E6E6"/>
+      </a:lt2>
+      <a:accent1>
+        <a:srgbClr val="4472C4"/>
+      </a:accent1>
+      <a:accent2>
+        <a:srgbClr val="ED7D31"/>
+      </a:accent2>
+      <a:accent3>
+        <a:srgbClr val="A5A5A5"/>
+      </a:accent3>
+      <a:accent4>
+        <a:srgbClr val="FFC000"/>
+      </a:accent4>
+      <a:accent5>
+        <a:srgbClr val="5B9BD5"/>
+      </a:accent5>
+      <a:accent6>
+        <a:srgbClr val="70AD47"/>
+      </a:accent6>
+      <a:hlink>
+        <a:srgbClr val="0563C1"/>
+      </a:hlink>
+      <a:folHlink>
+        <a:srgbClr val="954F72"/>
+      </a:folHlink>
+    </a:clrScheme>
+    <a:fontScheme name="Office">
+      <a:majorFont>
+        <a:latin typeface="Calibri Light" panose="020F0302020204030204"/>
+        <a:ea typeface=""/>
+        <a:cs typeface=""/>
+        <a:font script="Jpan" typeface="游ゴシック Light"/>
+        <a:font script="Hang" typeface="맑은 고딕"/>
+        <a:font script="Hans" typeface="等线 Light"/>
+        <a:font script="Hant" typeface="新細明體"/>
+        <a:font script="Arab" typeface="Times New Roman"/>
+        <a:font script="Hebr" typeface="Times New Roman"/>
+        <a:font script="Thai" typeface="Angsana New"/>
+        <a:font script="Ethi" typeface="Nyala"/>
+        <a:font script="Beng" typeface="Vrinda"/>
+        <a:font script="Gujr" typeface="Shruti"/>
+        <a:font script="Khmr" typeface="MoolBoran"/>
+        <a:font script="Knda" typeface="Tunga"/>
+        <a:font script="Guru" typeface="Raavi"/>
+        <a:font script="Cans" typeface="Euphemia"/>
+        <a:font script="Cher" typeface="Plantagenet Cherokee"/>
+        <a:font script="Yiii" typeface="Microsoft Yi Baiti"/>
+        <a:font script="Tibt" typeface="Microsoft Himalaya"/>
+        <a:font script="Thaa" typeface="MV Boli"/>
+        <a:font script="Deva" typeface="Mangal"/>
+        <a:font script="Telu" typeface="Gautami"/>
+        <a:font script="Taml" typeface="Latha"/>
+        <a:font script="Syrc" typeface="Estrangelo Edessa"/>
+        <a:font script="Orya" typeface="Kalinga"/>
+        <a:font script="Mlym" typeface="Kartika"/>
+        <a:font script="Laoo" typeface="DokChampa"/>
+        <a:font script="Sinh" typeface="Iskoola Pota"/>
+        <a:font script="Mong" typeface="Mongolian Baiti"/>
+        <a:font script="Viet" typeface="Times New Roman"/>
+        <a:font script="Uigh" typeface="Microsoft Uighur"/>
+        <a:font script="Geor" typeface="Sylfaen"/>
+        <a:font script="Armn" typeface="Arial"/>
+        <a:font script="Bugi" typeface="Leelawadee UI"/>
+        <a:font script="Bopo" typeface="Microsoft JhengHei"/>
+        <a:font script="Java" typeface="Javanese Text"/>
+        <a:font script="Lisu" typeface="Segoe UI"/>
+        <a:font script="Mymr" typeface="Myanmar Text"/>
+        <a:font script="Nkoo" typeface="Ebrima"/>
+        <a:font script="Olck" typeface="Nirmala UI"/>
+        <a:font script="Osma" typeface="Ebrima"/>
+        <a:font script="Phag" typeface="Phagspa"/>
+        <a:font script="Syrn" typeface="Estrangelo Edessa"/>
+        <a:font script="Syrj" typeface="Estrangelo Edessa"/>
+        <a:font script="Syre" typeface="Estrangelo Edessa"/>
+        <a:font script="Sora" typeface="Nirmala UI"/>
+        <a:font script="Tale" typeface="Microsoft Tai Le"/>
+        <a:font script="Talu" typeface="Microsoft New Tai Lue"/>
+        <a:font script="Tfng" typeface="Ebrima"/>
+      </a:majorFont>
+      <a:minorFont>
+        <a:latin typeface="Calibri" panose="020F0502020204030204"/>
+        <a:ea typeface=""/>
+        <a:cs typeface=""/>
+        <a:font script="Jpan" typeface="游ゴシック"/>
+        <a:font script="Hang" typeface="맑은 고딕"/>
+        <a:font script="Hans" typeface="等线"/>
+        <a:font script="Hant" typeface="新細明體"/>
+        <a:font script="Arab" typeface="Arial"/>
+        <a:font script="Hebr" typeface="Arial"/>
+        <a:font script="Thai" typeface="Cordia New"/>
+        <a:font script="Ethi" typeface="Nyala"/>
+        <a:font script="Beng" typeface="Vrinda"/>
+        <a:font script="Gujr" typeface="Shruti"/>
+        <a:font script="Khmr" typeface="DaunPenh"/>
+        <a:font script="Knda" typeface="Tunga"/>
+        <a:font script="Guru" typeface="Raavi"/>
+        <a:font script="Cans" typeface="Euphemia"/>
+        <a:font script="Cher" typeface="Plantagenet Cherokee"/>
+        <a:font script="Yiii" typeface="Microsoft Yi Baiti"/>
+        <a:font script="Tibt" typeface="Microsoft Himalaya"/>
+        <a:font script="Thaa" typeface="MV Boli"/>
+        <a:font script="Deva" typeface="Mangal"/>
+        <a:font script="Telu" typeface="Gautami"/>
+        <a:font script="Taml" typeface="Latha"/>
+        <a:font script="Syrc" typeface="Estrangelo Edessa"/>
+        <a:font script="Orya" typeface="Kalinga"/>
+        <a:font script="Mlym" typeface="Kartika"/>
+        <a:font script="Laoo" typeface="DokChampa"/>
+        <a:font script="Sinh" typeface="Iskoola Pota"/>
+        <a:font script="Mong" typeface="Mongolian Baiti"/>
+        <a:font script="Viet" typeface="Arial"/>
+        <a:font script="Uigh" typeface="Microsoft Uighur"/>
+        <a:font script="Geor" typeface="Sylfaen"/>
+        <a:font script="Armn" typeface="Arial"/>
+        <a:font script="Bugi" typeface="Leelawadee UI"/>
+        <a:font script="Bopo" typeface="Microsoft JhengHei"/>
+        <a:font script="Java" typeface="Javanese Text"/>
+        <a:font script="Lisu" typeface="Segoe UI"/>
+        <a:font script="Mymr" typeface="Myanmar Text"/>
+        <a:font script="Nkoo" typeface="Ebrima"/>
+        <a:font script="Olck" typeface="Nirmala UI"/>
+        <a:font script="Osma" typeface="Ebrima"/>
+        <a:font script="Phag" typeface="Phagspa"/>
+        <a:font script="Syrn" typeface="Estrangelo Edessa"/>
+        <a:font script="Syrj" typeface="Estrangelo Edessa"/>
+        <a:font script="Syre" typeface="Estrangelo Edessa"/>
+        <a:font script="Sora" typeface="Nirmala UI"/>
+        <a:font script="Tale" typeface="Microsoft Tai Le"/>
+        <a:font script="Talu" typeface="Microsoft New Tai Lue"/>
+        <a:font script="Tfng" typeface="Ebrima"/>
+      </a:minorFont>
+    </a:fontScheme>
+    <a:fmtScheme name="Office">
+      <a:fillStyleLst>
+        <a:solidFill>
+          <a:schemeClr val="phClr"/>
+        </a:solidFill>
+        <a:gradFill rotWithShape="1">
+          <a:gsLst>
+            <a:gs pos="0">
+              <a:schemeClr val="phClr">
+                <a:lumMod val="110000"/>
+                <a:satMod val="105000"/>
+                <a:tint val="67000"/>
+              </a:schemeClr>
+            </a:gs>
+            <a:gs pos="50000">
+              <a:schemeClr val="phClr">
+                <a:lumMod val="105000"/>
+                <a:satMod val="103000"/>
+                <a:tint val="73000"/>
+              </a:schemeClr>
+            </a:gs>
+            <a:gs pos="100000">
+              <a:schemeClr val="phClr">
+                <a:lumMod val="105000"/>
+                <a:satMod val="109000"/>
+                <a:tint val="81000"/>
+              </a:schemeClr>
+            </a:gs>
+          </a:gsLst>
+          <a:lin ang="5400000" scaled="0"/>
+        </a:gradFill>
+        <a:gradFill rotWithShape="1">
+          <a:gsLst>
+            <a:gs pos="0">
+              <a:schemeClr val="phClr">
+                <a:satMod val="103000"/>
+                <a:lumMod val="102000"/>
+                <a:tint val="94000"/>
+              </a:schemeClr>
+            </a:gs>
+            <a:gs pos="50000">
+              <a:schemeClr val="phClr">
+                <a:satMod val="110000"/>
+                <a:lumMod val="100000"/>
+                <a:shade val="100000"/>
+              </a:schemeClr>
+            </a:gs>
+            <a:gs pos="100000">
+              <a:schemeClr val="phClr">
+                <a:lumMod val="99000"/>
+                <a:satMod val="120000"/>
+                <a:shade val="78000"/>
+              </a:schemeClr>
+            </a:gs>
+          </a:gsLst>
+          <a:lin ang="5400000" scaled="0"/>
+        </a:gradFill>
+      </a:fillStyleLst>
+      <a:lnStyleLst>
+        <a:ln w="6350" cap="flat" cmpd="sng" algn="ctr">
+          <a:solidFill>
+            <a:schemeClr val="phClr"/>
+          </a:solidFill>
+          <a:prstDash val="solid"/>
+          <a:miter lim="800000"/>
+        </a:ln>
+        <a:ln w="12700" cap="flat" cmpd="sng" algn="ctr">
+          <a:solidFill>
+            <a:schemeClr val="phClr"/>
+          </a:solidFill>
+          <a:prstDash val="solid"/>
+          <a:miter lim="800000"/>
+        </a:ln>
+        <a:ln w="19050" cap="flat" cmpd="sng" algn="ctr">
+          <a:solidFill>
+            <a:schemeClr val="phClr"/>
+          </a:solidFill>
+          <a:prstDash val="solid"/>
+          <a:miter lim="800000"/>
+        </a:ln>
+      </a:lnStyleLst>
+      <a:effectStyleLst>
+        <a:effectStyle>
+          <a:effectLst/>
+        </a:effectStyle>
+        <a:effectStyle>
+          <a:effectLst/>
+        </a:effectStyle>
+        <a:effectStyle>
+          <a:effectLst>
+            <a:outerShdw blurRad="57150" dist="19050" dir="5400000" algn="ctr" rotWithShape="0">
+              <a:srgbClr val="000000">
+                <a:alpha val="63000"/>
+              </a:srgbClr>
+            </a:outerShdw>
+          </a:effectLst>
+        </a:effectStyle>
+      </a:effectStyleLst>
+      <a:bgFillStyleLst>
+        <a:solidFill>
+          <a:schemeClr val="phClr"/>
+        </a:solidFill>
+        <a:solidFill>
+          <a:schemeClr val="phClr">
+            <a:tint val="95000"/>
+            <a:satMod val="170000"/>
+          </a:schemeClr>
+        </a:solidFill>
+        <a:gradFill rotWithShape="1">
+          <a:gsLst>
+            <a:gs pos="0">
+              <a:schemeClr val="phClr">
+                <a:tint val="93000"/>
+                <a:satMod val="150000"/>
+                <a:shade val="98000"/>
+                <a:lumMod val="102000"/>
+              </a:schemeClr>
+            </a:gs>
+            <a:gs pos="50000">
+              <a:schemeClr val="phClr">
+                <a:tint val="98000"/>
+                <a:satMod val="130000"/>
+                <a:shade val="90000"/>
+                <a:lumMod val="103000"/>
+              </a:schemeClr>
+            </a:gs>
+            <a:gs pos="100000">
+              <a:schemeClr val="phClr">
+                <a:shade val="63000"/>
+                <a:satMod val="120000"/>
+              </a:schemeClr>
+            </a:gs>
+          </a:gsLst>
+          <a:lin ang="5400000" scaled="0"/>
+        </a:gradFill>
+      </a:bgFillStyleLst>
+    </a:fmtScheme>
+  </a:themeElements>
+  <a:objectDefaults/>
+  <a:extraClrSchemeLst/>
+  <a:extLst>
+    <a:ext uri="{05A4C25C-085E-4340-85A3-A5531E510DB2}">
+      <thm15:themeFamily xmlns:thm15="http://schemas.microsoft.com/office/thememl/2012/main" name="Office Theme" id="{62F939B6-93AF-4DB8-9C6B-D6C7DFDC589F}" vid="{4A3C46E8-61CC-4603-A589-7422A47A8E4A}"/>
+    </a:ext>
+  </a:extLst>
+</a:theme>
 </file>
</xml_diff>

<commit_message>
Small typo correction from lecture
</commit_message>
<xml_diff>
--- a/LectureSlides/10a_ModelsInHighDimensions.pptx
+++ b/LectureSlides/10a_ModelsInHighDimensions.pptx
@@ -5,7 +5,7 @@
     <p:sldMasterId id="2147483648" r:id="rId1"/>
   </p:sldMasterIdLst>
   <p:notesMasterIdLst>
-    <p:notesMasterId r:id="rId48"/>
+    <p:notesMasterId r:id="rId47"/>
   </p:notesMasterIdLst>
   <p:sldIdLst>
     <p:sldId id="299" r:id="rId2"/>
@@ -44,16 +44,15 @@
     <p:sldId id="282" r:id="rId35"/>
     <p:sldId id="283" r:id="rId36"/>
     <p:sldId id="284" r:id="rId37"/>
-    <p:sldId id="285" r:id="rId38"/>
-    <p:sldId id="286" r:id="rId39"/>
-    <p:sldId id="287" r:id="rId40"/>
-    <p:sldId id="288" r:id="rId41"/>
-    <p:sldId id="289" r:id="rId42"/>
-    <p:sldId id="290" r:id="rId43"/>
-    <p:sldId id="705" r:id="rId44"/>
-    <p:sldId id="701" r:id="rId45"/>
-    <p:sldId id="700" r:id="rId46"/>
-    <p:sldId id="291" r:id="rId47"/>
+    <p:sldId id="286" r:id="rId38"/>
+    <p:sldId id="287" r:id="rId39"/>
+    <p:sldId id="288" r:id="rId40"/>
+    <p:sldId id="289" r:id="rId41"/>
+    <p:sldId id="290" r:id="rId42"/>
+    <p:sldId id="705" r:id="rId43"/>
+    <p:sldId id="701" r:id="rId44"/>
+    <p:sldId id="700" r:id="rId45"/>
+    <p:sldId id="291" r:id="rId46"/>
   </p:sldIdLst>
   <p:sldSz cx="9144000" cy="5143500" type="screen16x9"/>
   <p:notesSz cx="6858000" cy="9144000"/>
@@ -253,7 +252,7 @@
           <a:p>
             <a:fld id="{BE0C07B0-B271-4EE5-BA4D-B7A9BA86B818}" type="datetimeFigureOut">
               <a:rPr lang="en-US" smtClean="0"/>
-              <a:t>10/21/2024</a:t>
+              <a:t>10/23/2024</a:t>
             </a:fld>
             <a:endParaRPr lang="en-US"/>
           </a:p>
@@ -783,7 +782,7 @@
           <a:p>
             <a:fld id="{241EB5C9-1307-BA42-ABA2-0BC069CD8E7F}" type="datetimeFigureOut">
               <a:rPr lang="en-US" smtClean="0"/>
-              <a:t>10/21/2024</a:t>
+              <a:t>10/23/2024</a:t>
             </a:fld>
             <a:endParaRPr lang="en-US"/>
           </a:p>
@@ -951,7 +950,7 @@
           <a:p>
             <a:fld id="{241EB5C9-1307-BA42-ABA2-0BC069CD8E7F}" type="datetimeFigureOut">
               <a:rPr lang="en-US" smtClean="0"/>
-              <a:t>10/21/2024</a:t>
+              <a:t>10/23/2024</a:t>
             </a:fld>
             <a:endParaRPr lang="en-US"/>
           </a:p>
@@ -1129,7 +1128,7 @@
           <a:p>
             <a:fld id="{241EB5C9-1307-BA42-ABA2-0BC069CD8E7F}" type="datetimeFigureOut">
               <a:rPr lang="en-US" smtClean="0"/>
-              <a:t>10/21/2024</a:t>
+              <a:t>10/23/2024</a:t>
             </a:fld>
             <a:endParaRPr lang="en-US"/>
           </a:p>
@@ -1447,7 +1446,7 @@
           <a:p>
             <a:fld id="{241EB5C9-1307-BA42-ABA2-0BC069CD8E7F}" type="datetimeFigureOut">
               <a:rPr lang="en-US" smtClean="0"/>
-              <a:t>10/21/2024</a:t>
+              <a:t>10/23/2024</a:t>
             </a:fld>
             <a:endParaRPr lang="en-US"/>
           </a:p>
@@ -1692,7 +1691,7 @@
           <a:p>
             <a:fld id="{241EB5C9-1307-BA42-ABA2-0BC069CD8E7F}" type="datetimeFigureOut">
               <a:rPr lang="en-US" smtClean="0"/>
-              <a:t>10/21/2024</a:t>
+              <a:t>10/23/2024</a:t>
             </a:fld>
             <a:endParaRPr lang="en-US"/>
           </a:p>
@@ -1977,7 +1976,7 @@
           <a:p>
             <a:fld id="{241EB5C9-1307-BA42-ABA2-0BC069CD8E7F}" type="datetimeFigureOut">
               <a:rPr lang="en-US" smtClean="0"/>
-              <a:t>10/21/2024</a:t>
+              <a:t>10/23/2024</a:t>
             </a:fld>
             <a:endParaRPr lang="en-US"/>
           </a:p>
@@ -2396,7 +2395,7 @@
           <a:p>
             <a:fld id="{241EB5C9-1307-BA42-ABA2-0BC069CD8E7F}" type="datetimeFigureOut">
               <a:rPr lang="en-US" smtClean="0"/>
-              <a:t>10/21/2024</a:t>
+              <a:t>10/23/2024</a:t>
             </a:fld>
             <a:endParaRPr lang="en-US"/>
           </a:p>
@@ -2513,7 +2512,7 @@
           <a:p>
             <a:fld id="{241EB5C9-1307-BA42-ABA2-0BC069CD8E7F}" type="datetimeFigureOut">
               <a:rPr lang="en-US" smtClean="0"/>
-              <a:t>10/21/2024</a:t>
+              <a:t>10/23/2024</a:t>
             </a:fld>
             <a:endParaRPr lang="en-US"/>
           </a:p>
@@ -2608,7 +2607,7 @@
           <a:p>
             <a:fld id="{241EB5C9-1307-BA42-ABA2-0BC069CD8E7F}" type="datetimeFigureOut">
               <a:rPr lang="en-US" smtClean="0"/>
-              <a:t>10/21/2024</a:t>
+              <a:t>10/23/2024</a:t>
             </a:fld>
             <a:endParaRPr lang="en-US"/>
           </a:p>
@@ -2883,7 +2882,7 @@
           <a:p>
             <a:fld id="{241EB5C9-1307-BA42-ABA2-0BC069CD8E7F}" type="datetimeFigureOut">
               <a:rPr lang="en-US" smtClean="0"/>
-              <a:t>10/21/2024</a:t>
+              <a:t>10/23/2024</a:t>
             </a:fld>
             <a:endParaRPr lang="en-US"/>
           </a:p>
@@ -3135,7 +3134,7 @@
           <a:p>
             <a:fld id="{241EB5C9-1307-BA42-ABA2-0BC069CD8E7F}" type="datetimeFigureOut">
               <a:rPr lang="en-US" smtClean="0"/>
-              <a:t>10/21/2024</a:t>
+              <a:t>10/23/2024</a:t>
             </a:fld>
             <a:endParaRPr lang="en-US"/>
           </a:p>
@@ -3346,7 +3345,7 @@
           <a:p>
             <a:fld id="{241EB5C9-1307-BA42-ABA2-0BC069CD8E7F}" type="datetimeFigureOut">
               <a:rPr lang="en-US" smtClean="0"/>
-              <a:t>10/21/2024</a:t>
+              <a:t>10/23/2024</a:t>
             </a:fld>
             <a:endParaRPr lang="en-US"/>
           </a:p>
@@ -3982,8 +3981,8 @@
           </a:p>
         </p:txBody>
       </p:sp>
-      <mc:AlternateContent xmlns:mc="http://schemas.openxmlformats.org/markup-compatibility/2006">
-        <mc:Choice xmlns:a14="http://schemas.microsoft.com/office/drawing/2010/main" Requires="a14">
+      <mc:AlternateContent xmlns:mc="http://schemas.openxmlformats.org/markup-compatibility/2006" xmlns:a14="http://schemas.microsoft.com/office/drawing/2010/main">
+        <mc:Choice Requires="a14">
           <p:sp>
             <p:nvSpPr>
               <p:cNvPr id="8" name="Content Placeholder 2">
@@ -4339,7 +4338,7 @@
             </p:txBody>
           </p:sp>
         </mc:Choice>
-        <mc:Fallback>
+        <mc:Fallback xmlns="">
           <p:sp>
             <p:nvSpPr>
               <p:cNvPr id="8" name="Content Placeholder 2">
@@ -4569,8 +4568,8 @@
           </a:p>
         </p:txBody>
       </p:sp>
-      <mc:AlternateContent xmlns:mc="http://schemas.openxmlformats.org/markup-compatibility/2006">
-        <mc:Choice xmlns:a14="http://schemas.microsoft.com/office/drawing/2010/main" Requires="a14">
+      <mc:AlternateContent xmlns:mc="http://schemas.openxmlformats.org/markup-compatibility/2006" xmlns:a14="http://schemas.microsoft.com/office/drawing/2010/main">
+        <mc:Choice Requires="a14">
           <p:sp>
             <p:nvSpPr>
               <p:cNvPr id="8" name="Content Placeholder 2">
@@ -4893,7 +4892,7 @@
             </p:txBody>
           </p:sp>
         </mc:Choice>
-        <mc:Fallback>
+        <mc:Fallback xmlns="">
           <p:sp>
             <p:nvSpPr>
               <p:cNvPr id="8" name="Content Placeholder 2">
@@ -6196,8 +6195,8 @@
           </a:p>
         </p:txBody>
       </p:sp>
-      <mc:AlternateContent xmlns:mc="http://schemas.openxmlformats.org/markup-compatibility/2006">
-        <mc:Choice xmlns:a14="http://schemas.microsoft.com/office/drawing/2010/main" Requires="a14">
+      <mc:AlternateContent xmlns:mc="http://schemas.openxmlformats.org/markup-compatibility/2006" xmlns:a14="http://schemas.microsoft.com/office/drawing/2010/main">
+        <mc:Choice Requires="a14">
           <p:sp>
             <p:nvSpPr>
               <p:cNvPr id="3" name="Content Placeholder 2"/>
@@ -6471,7 +6470,7 @@
             </p:txBody>
           </p:sp>
         </mc:Choice>
-        <mc:Fallback>
+        <mc:Fallback xmlns="">
           <p:sp>
             <p:nvSpPr>
               <p:cNvPr id="3" name="Content Placeholder 2"/>
@@ -6596,15 +6595,7 @@
                 <a:pPr lvl="0"/>
                 <a:r>
                   <a:rPr lang="en-US" dirty="0"/>
-                  <a:t>Can expand</a:t>
-                </a:r>
-                <a:r>
-                  <a:rPr dirty="0"/>
-                  <a:t> </a:t>
-                </a:r>
-                <a:r>
-                  <a:rPr lang="en-US" dirty="0"/>
-                  <a:t>expected</a:t>
+                  <a:t>Expected</a:t>
                 </a:r>
                 <a:r>
                   <a:rPr dirty="0"/>
@@ -9139,8 +9130,8 @@
           </a:p>
         </p:txBody>
       </p:sp>
-      <mc:AlternateContent xmlns:mc="http://schemas.openxmlformats.org/markup-compatibility/2006">
-        <mc:Choice xmlns:a14="http://schemas.microsoft.com/office/drawing/2010/main" Requires="a14">
+      <mc:AlternateContent xmlns:mc="http://schemas.openxmlformats.org/markup-compatibility/2006" xmlns:a14="http://schemas.microsoft.com/office/drawing/2010/main">
+        <mc:Choice Requires="a14">
           <p:sp>
             <p:nvSpPr>
               <p:cNvPr id="3" name="Content Placeholder 2"/>
@@ -9420,7 +9411,7 @@
             </p:txBody>
           </p:sp>
         </mc:Choice>
-        <mc:Fallback>
+        <mc:Fallback xmlns="">
           <p:sp>
             <p:nvSpPr>
               <p:cNvPr id="3" name="Content Placeholder 2"/>
@@ -9640,7 +9631,14 @@
                           <a:latin typeface="Cambria Math" panose="02040503050406030204" pitchFamily="18" charset="0"/>
                           <a:ea typeface="Cambria Math" panose="02040503050406030204" pitchFamily="18" charset="0"/>
                         </a:rPr>
-                        <m:t>=0</m:t>
+                        <m:t>=</m:t>
+                      </m:r>
+                      <m:r>
+                        <a:rPr lang="en-US" i="1">
+                          <a:latin typeface="Cambria Math" panose="02040503050406030204" pitchFamily="18" charset="0"/>
+                          <a:ea typeface="Cambria Math" panose="02040503050406030204" pitchFamily="18" charset="0"/>
+                        </a:rPr>
+                        <m:t>0</m:t>
                       </m:r>
                     </m:oMath>
                   </m:oMathPara>
@@ -9707,7 +9705,14 @@
                           <a:latin typeface="Cambria Math" panose="02040503050406030204" pitchFamily="18" charset="0"/>
                           <a:ea typeface="Cambria Math" panose="02040503050406030204" pitchFamily="18" charset="0"/>
                         </a:rPr>
-                        <m:t>=0</m:t>
+                        <m:t>=</m:t>
+                      </m:r>
+                      <m:r>
+                        <a:rPr lang="en-US" i="1">
+                          <a:latin typeface="Cambria Math" panose="02040503050406030204" pitchFamily="18" charset="0"/>
+                          <a:ea typeface="Cambria Math" panose="02040503050406030204" pitchFamily="18" charset="0"/>
+                        </a:rPr>
+                        <m:t>0</m:t>
                       </m:r>
                     </m:oMath>
                   </m:oMathPara>
@@ -9847,15 +9852,15 @@
                 <a:pPr lvl="1"/>
                 <a:r>
                   <a:rPr lang="en-US" dirty="0"/>
-                  <a:t>With colinear </a:t>
-                </a:r>
-                <a:r>
-                  <a:rPr lang="en-US" dirty="0" err="1"/>
-                  <a:t>ivariables</a:t>
+                  <a:t>With </a:t>
+                </a:r>
+                <a:r>
+                  <a:rPr lang="en-US"/>
+                  <a:t>colinear variables </a:t>
                 </a:r>
                 <a:r>
                   <a:rPr lang="en-US" dirty="0"/>
-                  <a:t> some </a:t>
+                  <a:t>some </a:t>
                 </a:r>
                 <a14:m>
                   <m:oMath xmlns:m="http://schemas.openxmlformats.org/officeDocument/2006/math">
@@ -10011,8 +10016,8 @@
           </a:p>
         </p:txBody>
       </p:sp>
-      <mc:AlternateContent xmlns:mc="http://schemas.openxmlformats.org/markup-compatibility/2006">
-        <mc:Choice xmlns:a14="http://schemas.microsoft.com/office/drawing/2010/main" Requires="a14">
+      <mc:AlternateContent xmlns:mc="http://schemas.openxmlformats.org/markup-compatibility/2006" xmlns:a14="http://schemas.microsoft.com/office/drawing/2010/main">
+        <mc:Choice Requires="a14">
           <p:sp>
             <p:nvSpPr>
               <p:cNvPr id="3" name="Content Placeholder 2">
@@ -10288,7 +10293,21 @@
                                         <a:latin typeface="Cambria Math" panose="02040503050406030204" pitchFamily="18" charset="0"/>
                                         <a:cs typeface="Segoe UI" panose="020B0502040204020203" pitchFamily="34" charset="0"/>
                                       </a:rPr>
-                                      <m:t>(1)</m:t>
+                                      <m:t>(</m:t>
+                                    </m:r>
+                                    <m:r>
+                                      <a:rPr lang="en-US" sz="2100" i="1">
+                                        <a:latin typeface="Cambria Math" panose="02040503050406030204" pitchFamily="18" charset="0"/>
+                                        <a:cs typeface="Segoe UI" panose="020B0502040204020203" pitchFamily="34" charset="0"/>
+                                      </a:rPr>
+                                      <m:t>1</m:t>
+                                    </m:r>
+                                    <m:r>
+                                      <a:rPr lang="en-US" sz="2100" i="1">
+                                        <a:latin typeface="Cambria Math" panose="02040503050406030204" pitchFamily="18" charset="0"/>
+                                        <a:cs typeface="Segoe UI" panose="020B0502040204020203" pitchFamily="34" charset="0"/>
+                                      </a:rPr>
+                                      <m:t>)</m:t>
                                     </m:r>
                                   </m:sup>
                                 </m:sSubSup>
@@ -10420,7 +10439,21 @@
                                         <a:latin typeface="Cambria Math" panose="02040503050406030204" pitchFamily="18" charset="0"/>
                                         <a:cs typeface="Segoe UI" panose="020B0502040204020203" pitchFamily="34" charset="0"/>
                                       </a:rPr>
-                                      <m:t>(1)</m:t>
+                                      <m:t>(</m:t>
+                                    </m:r>
+                                    <m:r>
+                                      <a:rPr lang="en-US" sz="2100" i="1">
+                                        <a:latin typeface="Cambria Math" panose="02040503050406030204" pitchFamily="18" charset="0"/>
+                                        <a:cs typeface="Segoe UI" panose="020B0502040204020203" pitchFamily="34" charset="0"/>
+                                      </a:rPr>
+                                      <m:t>1</m:t>
+                                    </m:r>
+                                    <m:r>
+                                      <a:rPr lang="en-US" sz="2100" i="1">
+                                        <a:latin typeface="Cambria Math" panose="02040503050406030204" pitchFamily="18" charset="0"/>
+                                        <a:cs typeface="Segoe UI" panose="020B0502040204020203" pitchFamily="34" charset="0"/>
+                                      </a:rPr>
+                                      <m:t>)</m:t>
                                     </m:r>
                                   </m:sup>
                                 </m:sSubSup>
@@ -10729,7 +10762,21 @@
                                             <a:latin typeface="Cambria Math" panose="02040503050406030204" pitchFamily="18" charset="0"/>
                                             <a:cs typeface="Segoe UI" panose="020B0502040204020203" pitchFamily="34" charset="0"/>
                                           </a:rPr>
-                                          <m:t>(1)</m:t>
+                                          <m:t>(</m:t>
+                                        </m:r>
+                                        <m:r>
+                                          <a:rPr lang="en-US" i="1">
+                                            <a:latin typeface="Cambria Math" panose="02040503050406030204" pitchFamily="18" charset="0"/>
+                                            <a:cs typeface="Segoe UI" panose="020B0502040204020203" pitchFamily="34" charset="0"/>
+                                          </a:rPr>
+                                          <m:t>1</m:t>
+                                        </m:r>
+                                        <m:r>
+                                          <a:rPr lang="en-US" i="1">
+                                            <a:latin typeface="Cambria Math" panose="02040503050406030204" pitchFamily="18" charset="0"/>
+                                            <a:cs typeface="Segoe UI" panose="020B0502040204020203" pitchFamily="34" charset="0"/>
+                                          </a:rPr>
+                                          <m:t>)</m:t>
                                         </m:r>
                                       </m:sup>
                                     </m:sSubSup>
@@ -11306,7 +11353,7 @@
             </p:txBody>
           </p:sp>
         </mc:Choice>
-        <mc:Fallback>
+        <mc:Fallback xmlns="">
           <p:sp>
             <p:nvSpPr>
               <p:cNvPr id="3" name="Content Placeholder 2">
@@ -11482,27 +11529,11 @@
             </a:r>
             <a:r>
               <a:rPr dirty="0"/>
-              <a:t>: Time </a:t>
+              <a:t>: </a:t>
             </a:r>
             <a:r>
               <a:rPr lang="en-US" dirty="0"/>
-              <a:t>s</a:t>
-            </a:r>
-            <a:r>
-              <a:rPr dirty="0"/>
-              <a:t>eries </a:t>
-            </a:r>
-            <a:r>
-              <a:rPr lang="en-US" dirty="0"/>
-              <a:t>m</a:t>
-            </a:r>
-            <a:r>
-              <a:rPr dirty="0"/>
-              <a:t>odels</a:t>
-            </a:r>
-            <a:r>
-              <a:rPr lang="en-US" dirty="0"/>
-              <a:t> and forecasting</a:t>
+              <a:t>Properties of time series</a:t>
             </a:r>
             <a:endParaRPr dirty="0"/>
           </a:p>
@@ -11526,7 +11557,7 @@
             </a:r>
             <a:r>
               <a:rPr lang="en-US" dirty="0"/>
-              <a:t>Advanced time series models</a:t>
+              <a:t>Forecasting models</a:t>
             </a:r>
             <a:endParaRPr dirty="0"/>
           </a:p>
@@ -13804,8 +13835,8 @@
           </a:p>
         </p:txBody>
       </p:sp>
-      <mc:AlternateContent xmlns:mc="http://schemas.openxmlformats.org/markup-compatibility/2006">
-        <mc:Choice xmlns:a14="http://schemas.microsoft.com/office/drawing/2010/main" Requires="a14">
+      <mc:AlternateContent xmlns:mc="http://schemas.openxmlformats.org/markup-compatibility/2006" xmlns:a14="http://schemas.microsoft.com/office/drawing/2010/main">
+        <mc:Choice Requires="a14">
           <p:sp>
             <p:nvSpPr>
               <p:cNvPr id="3" name="Content Placeholder 2">
@@ -14225,7 +14256,7 @@
             </p:txBody>
           </p:sp>
         </mc:Choice>
-        <mc:Fallback>
+        <mc:Fallback xmlns="">
           <p:sp>
             <p:nvSpPr>
               <p:cNvPr id="3" name="Content Placeholder 2">
@@ -15222,8 +15253,8 @@
           </a:p>
         </p:txBody>
       </p:sp>
-      <mc:AlternateContent xmlns:mc="http://schemas.openxmlformats.org/markup-compatibility/2006">
-        <mc:Choice xmlns:a14="http://schemas.microsoft.com/office/drawing/2010/main" Requires="a14">
+      <mc:AlternateContent xmlns:mc="http://schemas.openxmlformats.org/markup-compatibility/2006" xmlns:a14="http://schemas.microsoft.com/office/drawing/2010/main">
+        <mc:Choice Requires="a14">
           <p:sp>
             <p:nvSpPr>
               <p:cNvPr id="3" name="Content Placeholder 2"/>
@@ -15639,7 +15670,7 @@
             </p:txBody>
           </p:sp>
         </mc:Choice>
-        <mc:Fallback>
+        <mc:Fallback xmlns="">
           <p:sp>
             <p:nvSpPr>
               <p:cNvPr id="3" name="Content Placeholder 2"/>
@@ -16579,8 +16610,8 @@
           </a:p>
         </p:txBody>
       </p:sp>
-      <mc:AlternateContent xmlns:mc="http://schemas.openxmlformats.org/markup-compatibility/2006">
-        <mc:Choice xmlns:a14="http://schemas.microsoft.com/office/drawing/2010/main" Requires="a14">
+      <mc:AlternateContent xmlns:mc="http://schemas.openxmlformats.org/markup-compatibility/2006" xmlns:a14="http://schemas.microsoft.com/office/drawing/2010/main">
+        <mc:Choice Requires="a14">
           <p:sp>
             <p:nvSpPr>
               <p:cNvPr id="3" name="Content Placeholder 2"/>
@@ -17017,7 +17048,7 @@
             </p:txBody>
           </p:sp>
         </mc:Choice>
-        <mc:Fallback>
+        <mc:Fallback xmlns="">
           <p:sp>
             <p:nvSpPr>
               <p:cNvPr id="3" name="Content Placeholder 2"/>
@@ -19823,8 +19854,8 @@
           </a:p>
         </p:txBody>
       </p:sp>
-      <mc:AlternateContent xmlns:mc="http://schemas.openxmlformats.org/markup-compatibility/2006">
-        <mc:Choice xmlns:a14="http://schemas.microsoft.com/office/drawing/2010/main" Requires="a14">
+      <mc:AlternateContent xmlns:mc="http://schemas.openxmlformats.org/markup-compatibility/2006" xmlns:a14="http://schemas.microsoft.com/office/drawing/2010/main">
+        <mc:Choice Requires="a14">
           <p:sp>
             <p:nvSpPr>
               <p:cNvPr id="3" name="Content Placeholder 2"/>
@@ -19939,7 +19970,7 @@
             </p:txBody>
           </p:sp>
         </mc:Choice>
-        <mc:Fallback>
+        <mc:Fallback xmlns="">
           <p:sp>
             <p:nvSpPr>
               <p:cNvPr id="3" name="Content Placeholder 2"/>
@@ -21003,8 +21034,8 @@
           </a:p>
         </p:txBody>
       </p:sp>
-      <mc:AlternateContent xmlns:mc="http://schemas.openxmlformats.org/markup-compatibility/2006">
-        <mc:Choice xmlns:a14="http://schemas.microsoft.com/office/drawing/2010/main" Requires="a14">
+      <mc:AlternateContent xmlns:mc="http://schemas.openxmlformats.org/markup-compatibility/2006" xmlns:a14="http://schemas.microsoft.com/office/drawing/2010/main">
+        <mc:Choice Requires="a14">
           <p:sp>
             <p:nvSpPr>
               <p:cNvPr id="3" name="Content Placeholder 2"/>
@@ -21607,7 +21638,7 @@
             </p:txBody>
           </p:sp>
         </mc:Choice>
-        <mc:Fallback>
+        <mc:Fallback xmlns="">
           <p:sp>
             <p:nvSpPr>
               <p:cNvPr id="3" name="Content Placeholder 2"/>
@@ -21962,269 +21993,6 @@
 </file>
 
 <file path=ppt/slides/slide37.xml><?xml version="1.0" encoding="utf-8"?>
-<p:sld xmlns:a="http://schemas.openxmlformats.org/drawingml/2006/main" xmlns:r="http://schemas.openxmlformats.org/officeDocument/2006/relationships" xmlns:p="http://schemas.openxmlformats.org/presentationml/2006/main" show="0">
-  <p:cSld>
-    <p:spTree>
-      <p:nvGrpSpPr>
-        <p:cNvPr id="1" name=""/>
-        <p:cNvGrpSpPr/>
-        <p:nvPr/>
-      </p:nvGrpSpPr>
-      <p:grpSpPr>
-        <a:xfrm>
-          <a:off x="0" y="0"/>
-          <a:ext cx="0" cy="0"/>
-          <a:chOff x="0" y="0"/>
-          <a:chExt cx="0" cy="0"/>
-        </a:xfrm>
-      </p:grpSpPr>
-      <p:sp>
-        <p:nvSpPr>
-          <p:cNvPr id="2" name="Title 1"/>
-          <p:cNvSpPr>
-            <a:spLocks noGrp="1"/>
-          </p:cNvSpPr>
-          <p:nvPr>
-            <p:ph type="title"/>
-          </p:nvPr>
-        </p:nvSpPr>
-        <p:spPr/>
-        <p:txBody>
-          <a:bodyPr/>
-          <a:lstStyle/>
-          <a:p>
-            <a:pPr marL="0" lvl="0" indent="0">
-              <a:buNone/>
-            </a:pPr>
-            <a:r>
-              <a:t>L1 Regularization</a:t>
-            </a:r>
-          </a:p>
-        </p:txBody>
-      </p:sp>
-      <p:sp>
-        <p:nvSpPr>
-          <p:cNvPr id="3" name="Content Placeholder 2"/>
-          <p:cNvSpPr>
-            <a:spLocks noGrp="1"/>
-          </p:cNvSpPr>
-          <p:nvPr>
-            <p:ph idx="1"/>
-          </p:nvPr>
-        </p:nvSpPr>
-        <p:spPr/>
-        <p:txBody>
-          <a:bodyPr>
-            <a:normAutofit fontScale="47500" lnSpcReduction="20000"/>
-          </a:bodyPr>
-          <a:lstStyle/>
-          <a:p>
-            <a:pPr marL="0" lvl="0" indent="0">
-              <a:buNone/>
-            </a:pPr>
-            <a:r>
-              <a:t>Example: Increasing constraint on model coefficients with larger L1 regularization hyperparameter</a:t>
-            </a:r>
-          </a:p>
-          <a:p>
-            <a:pPr lvl="0" indent="0">
-              <a:buNone/>
-            </a:pPr>
-            <a:r>
-              <a:rPr>
-                <a:latin typeface="Courier"/>
-              </a:rPr>
-              <a:t>alphas </a:t>
-            </a:r>
-            <a:r>
-              <a:rPr>
-                <a:solidFill>
-                  <a:srgbClr val="666666"/>
-                </a:solidFill>
-                <a:latin typeface="Courier"/>
-              </a:rPr>
-              <a:t>=</a:t>
-            </a:r>
-            <a:r>
-              <a:rPr>
-                <a:latin typeface="Courier"/>
-              </a:rPr>
-              <a:t> np.arange(</a:t>
-            </a:r>
-            <a:r>
-              <a:rPr>
-                <a:solidFill>
-                  <a:srgbClr val="40A070"/>
-                </a:solidFill>
-                <a:latin typeface="Courier"/>
-              </a:rPr>
-              <a:t>0.0</a:t>
-            </a:r>
-            <a:r>
-              <a:rPr>
-                <a:latin typeface="Courier"/>
-              </a:rPr>
-              <a:t>, </a:t>
-            </a:r>
-            <a:r>
-              <a:rPr>
-                <a:solidFill>
-                  <a:srgbClr val="40A070"/>
-                </a:solidFill>
-                <a:latin typeface="Courier"/>
-              </a:rPr>
-              <a:t>0.6</a:t>
-            </a:r>
-            <a:r>
-              <a:rPr>
-                <a:latin typeface="Courier"/>
-              </a:rPr>
-              <a:t>, step </a:t>
-            </a:r>
-            <a:r>
-              <a:rPr>
-                <a:solidFill>
-                  <a:srgbClr val="666666"/>
-                </a:solidFill>
-                <a:latin typeface="Courier"/>
-              </a:rPr>
-              <a:t>=</a:t>
-            </a:r>
-            <a:r>
-              <a:rPr>
-                <a:latin typeface="Courier"/>
-              </a:rPr>
-              <a:t> </a:t>
-            </a:r>
-            <a:r>
-              <a:rPr>
-                <a:solidFill>
-                  <a:srgbClr val="40A070"/>
-                </a:solidFill>
-                <a:latin typeface="Courier"/>
-              </a:rPr>
-              <a:t>0.02</a:t>
-            </a:r>
-            <a:r>
-              <a:rPr>
-                <a:latin typeface="Courier"/>
-              </a:rPr>
-              <a:t>)</a:t>
-            </a:r>
-            <a:br/>
-            <a:r>
-              <a:rPr>
-                <a:latin typeface="Courier"/>
-              </a:rPr>
-              <a:t>Betas, MSE_train, MSE_test </a:t>
-            </a:r>
-            <a:r>
-              <a:rPr>
-                <a:solidFill>
-                  <a:srgbClr val="666666"/>
-                </a:solidFill>
-                <a:latin typeface="Courier"/>
-              </a:rPr>
-              <a:t>=</a:t>
-            </a:r>
-            <a:r>
-              <a:rPr>
-                <a:latin typeface="Courier"/>
-              </a:rPr>
-              <a:t> regularized_coefs(test_scores_train, test_scores_test, alphas, L1_wt</a:t>
-            </a:r>
-            <a:r>
-              <a:rPr>
-                <a:solidFill>
-                  <a:srgbClr val="666666"/>
-                </a:solidFill>
-                <a:latin typeface="Courier"/>
-              </a:rPr>
-              <a:t>=</a:t>
-            </a:r>
-            <a:r>
-              <a:rPr>
-                <a:solidFill>
-                  <a:srgbClr val="40A070"/>
-                </a:solidFill>
-                <a:latin typeface="Courier"/>
-              </a:rPr>
-              <a:t>1.0</a:t>
-            </a:r>
-            <a:r>
-              <a:rPr>
-                <a:latin typeface="Courier"/>
-              </a:rPr>
-              <a:t>) </a:t>
-            </a:r>
-            <a:r>
-              <a:rPr i="1">
-                <a:solidFill>
-                  <a:srgbClr val="60A0B0"/>
-                </a:solidFill>
-                <a:latin typeface="Courier"/>
-              </a:rPr>
-              <a:t>#, formula=formula)</a:t>
-            </a:r>
-            <a:br/>
-            <a:r>
-              <a:rPr>
-                <a:latin typeface="Courier"/>
-              </a:rPr>
-              <a:t>Betas[:</a:t>
-            </a:r>
-            <a:r>
-              <a:rPr>
-                <a:solidFill>
-                  <a:srgbClr val="40A070"/>
-                </a:solidFill>
-                <a:latin typeface="Courier"/>
-              </a:rPr>
-              <a:t>5</a:t>
-            </a:r>
-            <a:r>
-              <a:rPr>
-                <a:latin typeface="Courier"/>
-              </a:rPr>
-              <a:t>]</a:t>
-            </a:r>
-          </a:p>
-          <a:p>
-            <a:pPr lvl="0" indent="0">
-              <a:buNone/>
-            </a:pPr>
-            <a:r>
-              <a:rPr>
-                <a:latin typeface="Courier"/>
-              </a:rPr>
-              <a:t>## array([[ -6.13412699,   3.62867936,  10.20615579,   5.88403028,
-##         -10.44293454,  -0.68215407,  -2.3846305 ,   9.37695361,
-##           1.44233432],
-##        [ -5.72441839,   3.43435166,   8.75855958,   4.84586199,
-##          -9.40956564,   0.05313331,   0.        ,   7.99487046,
-##           0.        ],
-##        [ -5.55039369,   3.33123726,   8.51053097,   4.79924961,
-##          -9.03159592,   0.        ,   0.        ,   7.41265712,
-##           0.        ],
-##        [ -5.35379746,   3.19004869,   8.26727483,   4.72128125,
-##          -8.68047004,   0.        ,   0.        ,   6.87279024,
-##           0.        ],
-##        [ -5.15720816,   3.04893453,   8.02408465,   4.64326246,
-##          -8.32934311,   0.        ,   0.        ,   6.33285484,
-##           0.        ]])</a:t>
-            </a:r>
-          </a:p>
-        </p:txBody>
-      </p:sp>
-    </p:spTree>
-  </p:cSld>
-  <p:clrMapOvr>
-    <a:masterClrMapping/>
-  </p:clrMapOvr>
-</p:sld>
-</file>
-
-<file path=ppt/slides/slide38.xml><?xml version="1.0" encoding="utf-8"?>
 <p:sld xmlns:a="http://schemas.openxmlformats.org/drawingml/2006/main" xmlns:r="http://schemas.openxmlformats.org/officeDocument/2006/relationships" xmlns:p="http://schemas.openxmlformats.org/presentationml/2006/main">
   <p:cSld>
     <p:spTree>
@@ -22433,7 +22201,7 @@
 </p:sld>
 </file>
 
-<file path=ppt/slides/slide39.xml><?xml version="1.0" encoding="utf-8"?>
+<file path=ppt/slides/slide38.xml><?xml version="1.0" encoding="utf-8"?>
 <p:sld xmlns:a="http://schemas.openxmlformats.org/drawingml/2006/main" xmlns:r="http://schemas.openxmlformats.org/officeDocument/2006/relationships" xmlns:p="http://schemas.openxmlformats.org/presentationml/2006/main">
   <p:cSld>
     <p:spTree>
@@ -22479,8 +22247,8 @@
           </a:p>
         </p:txBody>
       </p:sp>
-      <mc:AlternateContent xmlns:mc="http://schemas.openxmlformats.org/markup-compatibility/2006">
-        <mc:Choice xmlns:a14="http://schemas.microsoft.com/office/drawing/2010/main" Requires="a14">
+      <mc:AlternateContent xmlns:mc="http://schemas.openxmlformats.org/markup-compatibility/2006" xmlns:a14="http://schemas.microsoft.com/office/drawing/2010/main">
+        <mc:Choice Requires="a14">
           <p:sp>
             <p:nvSpPr>
               <p:cNvPr id="3" name="Content Placeholder 2"/>
@@ -22892,7 +22660,7 @@
             </p:txBody>
           </p:sp>
         </mc:Choice>
-        <mc:Fallback>
+        <mc:Fallback xmlns="">
           <p:sp>
             <p:nvSpPr>
               <p:cNvPr id="3" name="Content Placeholder 2"/>
@@ -22930,6 +22698,216 @@
           </p:sp>
         </mc:Fallback>
       </mc:AlternateContent>
+    </p:spTree>
+  </p:cSld>
+  <p:clrMapOvr>
+    <a:masterClrMapping/>
+  </p:clrMapOvr>
+</p:sld>
+</file>
+
+<file path=ppt/slides/slide39.xml><?xml version="1.0" encoding="utf-8"?>
+<p:sld xmlns:a="http://schemas.openxmlformats.org/drawingml/2006/main" xmlns:r="http://schemas.openxmlformats.org/officeDocument/2006/relationships" xmlns:p="http://schemas.openxmlformats.org/presentationml/2006/main">
+  <p:cSld>
+    <p:spTree>
+      <p:nvGrpSpPr>
+        <p:cNvPr id="1" name=""/>
+        <p:cNvGrpSpPr/>
+        <p:nvPr/>
+      </p:nvGrpSpPr>
+      <p:grpSpPr>
+        <a:xfrm>
+          <a:off x="0" y="0"/>
+          <a:ext cx="0" cy="0"/>
+          <a:chOff x="0" y="0"/>
+          <a:chExt cx="0" cy="0"/>
+        </a:xfrm>
+      </p:grpSpPr>
+      <p:sp>
+        <p:nvSpPr>
+          <p:cNvPr id="2" name="Title 1"/>
+          <p:cNvSpPr>
+            <a:spLocks noGrp="1"/>
+          </p:cNvSpPr>
+          <p:nvPr>
+            <p:ph type="title"/>
+          </p:nvPr>
+        </p:nvSpPr>
+        <p:spPr/>
+        <p:txBody>
+          <a:bodyPr/>
+          <a:lstStyle/>
+          <a:p>
+            <a:pPr marL="0" lvl="0" indent="0">
+              <a:buNone/>
+            </a:pPr>
+            <a:r>
+              <a:rPr dirty="0" err="1"/>
+              <a:t>ElasticNet</a:t>
+            </a:r>
+            <a:r>
+              <a:rPr dirty="0"/>
+              <a:t> Regularization</a:t>
+            </a:r>
+          </a:p>
+        </p:txBody>
+      </p:sp>
+      <p:sp>
+        <p:nvSpPr>
+          <p:cNvPr id="3" name="Content Placeholder 2"/>
+          <p:cNvSpPr>
+            <a:spLocks noGrp="1"/>
+          </p:cNvSpPr>
+          <p:nvPr>
+            <p:ph idx="1"/>
+          </p:nvPr>
+        </p:nvSpPr>
+        <p:spPr/>
+        <p:txBody>
+          <a:bodyPr/>
+          <a:lstStyle/>
+          <a:p>
+            <a:pPr marL="0" lvl="0" indent="0">
+              <a:buNone/>
+            </a:pPr>
+            <a:r>
+              <a:t>Example: Increasing constraint on model coefficients with larger L1 regularization hyperparameter</a:t>
+            </a:r>
+          </a:p>
+          <a:p>
+            <a:pPr lvl="0" indent="0">
+              <a:buNone/>
+            </a:pPr>
+            <a:r>
+              <a:rPr>
+                <a:latin typeface="Courier"/>
+              </a:rPr>
+              <a:t>alphas </a:t>
+            </a:r>
+            <a:r>
+              <a:rPr>
+                <a:solidFill>
+                  <a:srgbClr val="666666"/>
+                </a:solidFill>
+                <a:latin typeface="Courier"/>
+              </a:rPr>
+              <a:t>=</a:t>
+            </a:r>
+            <a:r>
+              <a:rPr>
+                <a:latin typeface="Courier"/>
+              </a:rPr>
+              <a:t> np.arange(</a:t>
+            </a:r>
+            <a:r>
+              <a:rPr>
+                <a:solidFill>
+                  <a:srgbClr val="40A070"/>
+                </a:solidFill>
+                <a:latin typeface="Courier"/>
+              </a:rPr>
+              <a:t>0.0</a:t>
+            </a:r>
+            <a:r>
+              <a:rPr>
+                <a:latin typeface="Courier"/>
+              </a:rPr>
+              <a:t>, </a:t>
+            </a:r>
+            <a:r>
+              <a:rPr>
+                <a:solidFill>
+                  <a:srgbClr val="40A070"/>
+                </a:solidFill>
+                <a:latin typeface="Courier"/>
+              </a:rPr>
+              <a:t>0.5</a:t>
+            </a:r>
+            <a:r>
+              <a:rPr>
+                <a:latin typeface="Courier"/>
+              </a:rPr>
+              <a:t>, step </a:t>
+            </a:r>
+            <a:r>
+              <a:rPr>
+                <a:solidFill>
+                  <a:srgbClr val="666666"/>
+                </a:solidFill>
+                <a:latin typeface="Courier"/>
+              </a:rPr>
+              <a:t>=</a:t>
+            </a:r>
+            <a:r>
+              <a:rPr>
+                <a:latin typeface="Courier"/>
+              </a:rPr>
+              <a:t> </a:t>
+            </a:r>
+            <a:r>
+              <a:rPr>
+                <a:solidFill>
+                  <a:srgbClr val="40A070"/>
+                </a:solidFill>
+                <a:latin typeface="Courier"/>
+              </a:rPr>
+              <a:t>0.02</a:t>
+            </a:r>
+            <a:r>
+              <a:rPr>
+                <a:latin typeface="Courier"/>
+              </a:rPr>
+              <a:t>)</a:t>
+            </a:r>
+            <a:br/>
+            <a:r>
+              <a:rPr>
+                <a:latin typeface="Courier"/>
+              </a:rPr>
+              <a:t>Betas, MSE_train, MSE_test </a:t>
+            </a:r>
+            <a:r>
+              <a:rPr>
+                <a:solidFill>
+                  <a:srgbClr val="666666"/>
+                </a:solidFill>
+                <a:latin typeface="Courier"/>
+              </a:rPr>
+              <a:t>=</a:t>
+            </a:r>
+            <a:r>
+              <a:rPr>
+                <a:latin typeface="Courier"/>
+              </a:rPr>
+              <a:t> regularized_coefs(test_scores_train, test_scores_test, alphas, L1_wt</a:t>
+            </a:r>
+            <a:r>
+              <a:rPr>
+                <a:solidFill>
+                  <a:srgbClr val="666666"/>
+                </a:solidFill>
+                <a:latin typeface="Courier"/>
+              </a:rPr>
+              <a:t>=</a:t>
+            </a:r>
+            <a:r>
+              <a:rPr>
+                <a:solidFill>
+                  <a:srgbClr val="40A070"/>
+                </a:solidFill>
+                <a:latin typeface="Courier"/>
+              </a:rPr>
+              <a:t>0.5</a:t>
+            </a:r>
+            <a:r>
+              <a:rPr>
+                <a:latin typeface="Courier"/>
+              </a:rPr>
+              <a:t>)</a:t>
+            </a:r>
+          </a:p>
+        </p:txBody>
+      </p:sp>
     </p:spTree>
   </p:cSld>
   <p:clrMapOvr>
@@ -23113,7 +23091,13 @@
                                   <a:rPr>
                                     <a:latin typeface="Cambria Math" panose="02040503050406030204" pitchFamily="18" charset="0"/>
                                   </a:rPr>
-                                  <m:t>1,</m:t>
+                                  <m:t>1</m:t>
+                                </m:r>
+                                <m:r>
+                                  <a:rPr>
+                                    <a:latin typeface="Cambria Math" panose="02040503050406030204" pitchFamily="18" charset="0"/>
+                                  </a:rPr>
+                                  <m:t>,</m:t>
                                 </m:r>
                                 <m:sSub>
                                   <m:sSubPr>
@@ -23136,7 +23120,19 @@
                                       <a:rPr>
                                         <a:latin typeface="Cambria Math" panose="02040503050406030204" pitchFamily="18" charset="0"/>
                                       </a:rPr>
-                                      <m:t>1,1</m:t>
+                                      <m:t>1</m:t>
+                                    </m:r>
+                                    <m:r>
+                                      <a:rPr>
+                                        <a:latin typeface="Cambria Math" panose="02040503050406030204" pitchFamily="18" charset="0"/>
+                                      </a:rPr>
+                                      <m:t>,</m:t>
+                                    </m:r>
+                                    <m:r>
+                                      <a:rPr>
+                                        <a:latin typeface="Cambria Math" panose="02040503050406030204" pitchFamily="18" charset="0"/>
+                                      </a:rPr>
+                                      <m:t>1</m:t>
                                     </m:r>
                                   </m:sub>
                                 </m:sSub>
@@ -23167,7 +23163,19 @@
                                       <a:rPr>
                                         <a:latin typeface="Cambria Math" panose="02040503050406030204" pitchFamily="18" charset="0"/>
                                       </a:rPr>
-                                      <m:t>1,2</m:t>
+                                      <m:t>1</m:t>
+                                    </m:r>
+                                    <m:r>
+                                      <a:rPr>
+                                        <a:latin typeface="Cambria Math" panose="02040503050406030204" pitchFamily="18" charset="0"/>
+                                      </a:rPr>
+                                      <m:t>,</m:t>
+                                    </m:r>
+                                    <m:r>
+                                      <a:rPr>
+                                        <a:latin typeface="Cambria Math" panose="02040503050406030204" pitchFamily="18" charset="0"/>
+                                      </a:rPr>
+                                      <m:t>2</m:t>
                                     </m:r>
                                   </m:sub>
                                 </m:sSub>
@@ -23198,7 +23206,13 @@
                                       <a:rPr>
                                         <a:latin typeface="Cambria Math" panose="02040503050406030204" pitchFamily="18" charset="0"/>
                                       </a:rPr>
-                                      <m:t>1,</m:t>
+                                      <m:t>1</m:t>
+                                    </m:r>
+                                    <m:r>
+                                      <a:rPr>
+                                        <a:latin typeface="Cambria Math" panose="02040503050406030204" pitchFamily="18" charset="0"/>
+                                      </a:rPr>
+                                      <m:t>,</m:t>
                                     </m:r>
                                     <m:r>
                                       <a:rPr>
@@ -23216,7 +23230,13 @@
                                   <a:rPr>
                                     <a:latin typeface="Cambria Math" panose="02040503050406030204" pitchFamily="18" charset="0"/>
                                   </a:rPr>
-                                  <m:t>1,</m:t>
+                                  <m:t>1</m:t>
+                                </m:r>
+                                <m:r>
+                                  <a:rPr>
+                                    <a:latin typeface="Cambria Math" panose="02040503050406030204" pitchFamily="18" charset="0"/>
+                                  </a:rPr>
+                                  <m:t>,</m:t>
                                 </m:r>
                                 <m:sSub>
                                   <m:sSubPr>
@@ -23239,7 +23259,19 @@
                                       <a:rPr>
                                         <a:latin typeface="Cambria Math" panose="02040503050406030204" pitchFamily="18" charset="0"/>
                                       </a:rPr>
-                                      <m:t>2,1</m:t>
+                                      <m:t>2</m:t>
+                                    </m:r>
+                                    <m:r>
+                                      <a:rPr>
+                                        <a:latin typeface="Cambria Math" panose="02040503050406030204" pitchFamily="18" charset="0"/>
+                                      </a:rPr>
+                                      <m:t>,</m:t>
+                                    </m:r>
+                                    <m:r>
+                                      <a:rPr>
+                                        <a:latin typeface="Cambria Math" panose="02040503050406030204" pitchFamily="18" charset="0"/>
+                                      </a:rPr>
+                                      <m:t>1</m:t>
                                     </m:r>
                                   </m:sub>
                                 </m:sSub>
@@ -23270,7 +23302,19 @@
                                       <a:rPr>
                                         <a:latin typeface="Cambria Math" panose="02040503050406030204" pitchFamily="18" charset="0"/>
                                       </a:rPr>
-                                      <m:t>2,2</m:t>
+                                      <m:t>2</m:t>
+                                    </m:r>
+                                    <m:r>
+                                      <a:rPr>
+                                        <a:latin typeface="Cambria Math" panose="02040503050406030204" pitchFamily="18" charset="0"/>
+                                      </a:rPr>
+                                      <m:t>,</m:t>
+                                    </m:r>
+                                    <m:r>
+                                      <a:rPr>
+                                        <a:latin typeface="Cambria Math" panose="02040503050406030204" pitchFamily="18" charset="0"/>
+                                      </a:rPr>
+                                      <m:t>2</m:t>
                                     </m:r>
                                   </m:sub>
                                 </m:sSub>
@@ -23301,7 +23345,13 @@
                                       <a:rPr>
                                         <a:latin typeface="Cambria Math" panose="02040503050406030204" pitchFamily="18" charset="0"/>
                                       </a:rPr>
-                                      <m:t>2,</m:t>
+                                      <m:t>2</m:t>
+                                    </m:r>
+                                    <m:r>
+                                      <a:rPr>
+                                        <a:latin typeface="Cambria Math" panose="02040503050406030204" pitchFamily="18" charset="0"/>
+                                      </a:rPr>
+                                      <m:t>,</m:t>
                                     </m:r>
                                     <m:r>
                                       <a:rPr>
@@ -23319,7 +23369,13 @@
                                   <a:rPr>
                                     <a:latin typeface="Cambria Math" panose="02040503050406030204" pitchFamily="18" charset="0"/>
                                   </a:rPr>
-                                  <m:t>1,</m:t>
+                                  <m:t>1</m:t>
+                                </m:r>
+                                <m:r>
+                                  <a:rPr>
+                                    <a:latin typeface="Cambria Math" panose="02040503050406030204" pitchFamily="18" charset="0"/>
+                                  </a:rPr>
+                                  <m:t>,</m:t>
                                 </m:r>
                                 <m:sSub>
                                   <m:sSubPr>
@@ -23342,7 +23398,19 @@
                                       <a:rPr>
                                         <a:latin typeface="Cambria Math" panose="02040503050406030204" pitchFamily="18" charset="0"/>
                                       </a:rPr>
-                                      <m:t>3,1</m:t>
+                                      <m:t>3</m:t>
+                                    </m:r>
+                                    <m:r>
+                                      <a:rPr>
+                                        <a:latin typeface="Cambria Math" panose="02040503050406030204" pitchFamily="18" charset="0"/>
+                                      </a:rPr>
+                                      <m:t>,</m:t>
+                                    </m:r>
+                                    <m:r>
+                                      <a:rPr>
+                                        <a:latin typeface="Cambria Math" panose="02040503050406030204" pitchFamily="18" charset="0"/>
+                                      </a:rPr>
+                                      <m:t>1</m:t>
                                     </m:r>
                                   </m:sub>
                                 </m:sSub>
@@ -23373,7 +23441,19 @@
                                       <a:rPr>
                                         <a:latin typeface="Cambria Math" panose="02040503050406030204" pitchFamily="18" charset="0"/>
                                       </a:rPr>
-                                      <m:t>3,2</m:t>
+                                      <m:t>3</m:t>
+                                    </m:r>
+                                    <m:r>
+                                      <a:rPr>
+                                        <a:latin typeface="Cambria Math" panose="02040503050406030204" pitchFamily="18" charset="0"/>
+                                      </a:rPr>
+                                      <m:t>,</m:t>
+                                    </m:r>
+                                    <m:r>
+                                      <a:rPr>
+                                        <a:latin typeface="Cambria Math" panose="02040503050406030204" pitchFamily="18" charset="0"/>
+                                      </a:rPr>
+                                      <m:t>2</m:t>
                                     </m:r>
                                   </m:sub>
                                 </m:sSub>
@@ -23404,7 +23484,13 @@
                                       <a:rPr>
                                         <a:latin typeface="Cambria Math" panose="02040503050406030204" pitchFamily="18" charset="0"/>
                                       </a:rPr>
-                                      <m:t>3,</m:t>
+                                      <m:t>3</m:t>
+                                    </m:r>
+                                    <m:r>
+                                      <a:rPr>
+                                        <a:latin typeface="Cambria Math" panose="02040503050406030204" pitchFamily="18" charset="0"/>
+                                      </a:rPr>
+                                      <m:t>,</m:t>
                                     </m:r>
                                     <m:r>
                                       <a:rPr>
@@ -23432,7 +23518,13 @@
                                   <a:rPr>
                                     <a:latin typeface="Cambria Math" panose="02040503050406030204" pitchFamily="18" charset="0"/>
                                   </a:rPr>
-                                  <m:t>1,</m:t>
+                                  <m:t>1</m:t>
+                                </m:r>
+                                <m:r>
+                                  <a:rPr>
+                                    <a:latin typeface="Cambria Math" panose="02040503050406030204" pitchFamily="18" charset="0"/>
+                                  </a:rPr>
+                                  <m:t>,</m:t>
                                 </m:r>
                                 <m:sSub>
                                   <m:sSubPr>
@@ -23461,7 +23553,13 @@
                                       <a:rPr>
                                         <a:latin typeface="Cambria Math" panose="02040503050406030204" pitchFamily="18" charset="0"/>
                                       </a:rPr>
-                                      <m:t>,1</m:t>
+                                      <m:t>,</m:t>
+                                    </m:r>
+                                    <m:r>
+                                      <a:rPr>
+                                        <a:latin typeface="Cambria Math" panose="02040503050406030204" pitchFamily="18" charset="0"/>
+                                      </a:rPr>
+                                      <m:t>1</m:t>
                                     </m:r>
                                   </m:sub>
                                 </m:sSub>
@@ -23498,7 +23596,13 @@
                                       <a:rPr>
                                         <a:latin typeface="Cambria Math" panose="02040503050406030204" pitchFamily="18" charset="0"/>
                                       </a:rPr>
-                                      <m:t>,2</m:t>
+                                      <m:t>,</m:t>
+                                    </m:r>
+                                    <m:r>
+                                      <a:rPr>
+                                        <a:latin typeface="Cambria Math" panose="02040503050406030204" pitchFamily="18" charset="0"/>
+                                      </a:rPr>
+                                      <m:t>2</m:t>
                                     </m:r>
                                   </m:sub>
                                 </m:sSub>
@@ -23626,216 +23730,6 @@
 </file>
 
 <file path=ppt/slides/slide40.xml><?xml version="1.0" encoding="utf-8"?>
-<p:sld xmlns:a="http://schemas.openxmlformats.org/drawingml/2006/main" xmlns:r="http://schemas.openxmlformats.org/officeDocument/2006/relationships" xmlns:p="http://schemas.openxmlformats.org/presentationml/2006/main">
-  <p:cSld>
-    <p:spTree>
-      <p:nvGrpSpPr>
-        <p:cNvPr id="1" name=""/>
-        <p:cNvGrpSpPr/>
-        <p:nvPr/>
-      </p:nvGrpSpPr>
-      <p:grpSpPr>
-        <a:xfrm>
-          <a:off x="0" y="0"/>
-          <a:ext cx="0" cy="0"/>
-          <a:chOff x="0" y="0"/>
-          <a:chExt cx="0" cy="0"/>
-        </a:xfrm>
-      </p:grpSpPr>
-      <p:sp>
-        <p:nvSpPr>
-          <p:cNvPr id="2" name="Title 1"/>
-          <p:cNvSpPr>
-            <a:spLocks noGrp="1"/>
-          </p:cNvSpPr>
-          <p:nvPr>
-            <p:ph type="title"/>
-          </p:nvPr>
-        </p:nvSpPr>
-        <p:spPr/>
-        <p:txBody>
-          <a:bodyPr/>
-          <a:lstStyle/>
-          <a:p>
-            <a:pPr marL="0" lvl="0" indent="0">
-              <a:buNone/>
-            </a:pPr>
-            <a:r>
-              <a:rPr dirty="0" err="1"/>
-              <a:t>ElasticNet</a:t>
-            </a:r>
-            <a:r>
-              <a:rPr dirty="0"/>
-              <a:t> Regularization</a:t>
-            </a:r>
-          </a:p>
-        </p:txBody>
-      </p:sp>
-      <p:sp>
-        <p:nvSpPr>
-          <p:cNvPr id="3" name="Content Placeholder 2"/>
-          <p:cNvSpPr>
-            <a:spLocks noGrp="1"/>
-          </p:cNvSpPr>
-          <p:nvPr>
-            <p:ph idx="1"/>
-          </p:nvPr>
-        </p:nvSpPr>
-        <p:spPr/>
-        <p:txBody>
-          <a:bodyPr/>
-          <a:lstStyle/>
-          <a:p>
-            <a:pPr marL="0" lvl="0" indent="0">
-              <a:buNone/>
-            </a:pPr>
-            <a:r>
-              <a:t>Example: Increasing constraint on model coefficients with larger L1 regularization hyperparameter</a:t>
-            </a:r>
-          </a:p>
-          <a:p>
-            <a:pPr lvl="0" indent="0">
-              <a:buNone/>
-            </a:pPr>
-            <a:r>
-              <a:rPr>
-                <a:latin typeface="Courier"/>
-              </a:rPr>
-              <a:t>alphas </a:t>
-            </a:r>
-            <a:r>
-              <a:rPr>
-                <a:solidFill>
-                  <a:srgbClr val="666666"/>
-                </a:solidFill>
-                <a:latin typeface="Courier"/>
-              </a:rPr>
-              <a:t>=</a:t>
-            </a:r>
-            <a:r>
-              <a:rPr>
-                <a:latin typeface="Courier"/>
-              </a:rPr>
-              <a:t> np.arange(</a:t>
-            </a:r>
-            <a:r>
-              <a:rPr>
-                <a:solidFill>
-                  <a:srgbClr val="40A070"/>
-                </a:solidFill>
-                <a:latin typeface="Courier"/>
-              </a:rPr>
-              <a:t>0.0</a:t>
-            </a:r>
-            <a:r>
-              <a:rPr>
-                <a:latin typeface="Courier"/>
-              </a:rPr>
-              <a:t>, </a:t>
-            </a:r>
-            <a:r>
-              <a:rPr>
-                <a:solidFill>
-                  <a:srgbClr val="40A070"/>
-                </a:solidFill>
-                <a:latin typeface="Courier"/>
-              </a:rPr>
-              <a:t>0.5</a:t>
-            </a:r>
-            <a:r>
-              <a:rPr>
-                <a:latin typeface="Courier"/>
-              </a:rPr>
-              <a:t>, step </a:t>
-            </a:r>
-            <a:r>
-              <a:rPr>
-                <a:solidFill>
-                  <a:srgbClr val="666666"/>
-                </a:solidFill>
-                <a:latin typeface="Courier"/>
-              </a:rPr>
-              <a:t>=</a:t>
-            </a:r>
-            <a:r>
-              <a:rPr>
-                <a:latin typeface="Courier"/>
-              </a:rPr>
-              <a:t> </a:t>
-            </a:r>
-            <a:r>
-              <a:rPr>
-                <a:solidFill>
-                  <a:srgbClr val="40A070"/>
-                </a:solidFill>
-                <a:latin typeface="Courier"/>
-              </a:rPr>
-              <a:t>0.02</a:t>
-            </a:r>
-            <a:r>
-              <a:rPr>
-                <a:latin typeface="Courier"/>
-              </a:rPr>
-              <a:t>)</a:t>
-            </a:r>
-            <a:br/>
-            <a:r>
-              <a:rPr>
-                <a:latin typeface="Courier"/>
-              </a:rPr>
-              <a:t>Betas, MSE_train, MSE_test </a:t>
-            </a:r>
-            <a:r>
-              <a:rPr>
-                <a:solidFill>
-                  <a:srgbClr val="666666"/>
-                </a:solidFill>
-                <a:latin typeface="Courier"/>
-              </a:rPr>
-              <a:t>=</a:t>
-            </a:r>
-            <a:r>
-              <a:rPr>
-                <a:latin typeface="Courier"/>
-              </a:rPr>
-              <a:t> regularized_coefs(test_scores_train, test_scores_test, alphas, L1_wt</a:t>
-            </a:r>
-            <a:r>
-              <a:rPr>
-                <a:solidFill>
-                  <a:srgbClr val="666666"/>
-                </a:solidFill>
-                <a:latin typeface="Courier"/>
-              </a:rPr>
-              <a:t>=</a:t>
-            </a:r>
-            <a:r>
-              <a:rPr>
-                <a:solidFill>
-                  <a:srgbClr val="40A070"/>
-                </a:solidFill>
-                <a:latin typeface="Courier"/>
-              </a:rPr>
-              <a:t>0.5</a:t>
-            </a:r>
-            <a:r>
-              <a:rPr>
-                <a:latin typeface="Courier"/>
-              </a:rPr>
-              <a:t>)</a:t>
-            </a:r>
-          </a:p>
-        </p:txBody>
-      </p:sp>
-    </p:spTree>
-  </p:cSld>
-  <p:clrMapOvr>
-    <a:masterClrMapping/>
-  </p:clrMapOvr>
-</p:sld>
-</file>
-
-<file path=ppt/slides/slide41.xml><?xml version="1.0" encoding="utf-8"?>
 <p:sld xmlns:a="http://schemas.openxmlformats.org/drawingml/2006/main" xmlns:r="http://schemas.openxmlformats.org/officeDocument/2006/relationships" xmlns:p="http://schemas.openxmlformats.org/presentationml/2006/main">
   <p:cSld>
     <p:spTree>
@@ -24078,7 +23972,7 @@
 </p:sld>
 </file>
 
-<file path=ppt/slides/slide42.xml><?xml version="1.0" encoding="utf-8"?>
+<file path=ppt/slides/slide41.xml><?xml version="1.0" encoding="utf-8"?>
 <p:sld xmlns:a="http://schemas.openxmlformats.org/drawingml/2006/main" xmlns:r="http://schemas.openxmlformats.org/officeDocument/2006/relationships" xmlns:p="http://schemas.openxmlformats.org/presentationml/2006/main">
   <p:cSld>
     <p:spTree>
@@ -24262,7 +24156,7 @@
 </p:sld>
 </file>
 
-<file path=ppt/slides/slide43.xml><?xml version="1.0" encoding="utf-8"?>
+<file path=ppt/slides/slide42.xml><?xml version="1.0" encoding="utf-8"?>
 <p:sld xmlns:a="http://schemas.openxmlformats.org/drawingml/2006/main" xmlns:r="http://schemas.openxmlformats.org/officeDocument/2006/relationships" xmlns:p="http://schemas.openxmlformats.org/presentationml/2006/main">
   <p:cSld>
     <p:spTree>
@@ -24412,7 +24306,7 @@
 </p:sld>
 </file>
 
-<file path=ppt/slides/slide44.xml><?xml version="1.0" encoding="utf-8"?>
+<file path=ppt/slides/slide43.xml><?xml version="1.0" encoding="utf-8"?>
 <p:sld xmlns:a="http://schemas.openxmlformats.org/drawingml/2006/main" xmlns:r="http://schemas.openxmlformats.org/officeDocument/2006/relationships" xmlns:p="http://schemas.openxmlformats.org/presentationml/2006/main">
   <p:cSld>
     <p:spTree>
@@ -24801,7 +24695,7 @@
 </p:sld>
 </file>
 
-<file path=ppt/slides/slide45.xml><?xml version="1.0" encoding="utf-8"?>
+<file path=ppt/slides/slide44.xml><?xml version="1.0" encoding="utf-8"?>
 <p:sld xmlns:a="http://schemas.openxmlformats.org/drawingml/2006/main" xmlns:r="http://schemas.openxmlformats.org/officeDocument/2006/relationships" xmlns:p="http://schemas.openxmlformats.org/presentationml/2006/main">
   <p:cSld>
     <p:spTree>
@@ -24959,7 +24853,7 @@
 </p:sld>
 </file>
 
-<file path=ppt/slides/slide46.xml><?xml version="1.0" encoding="utf-8"?>
+<file path=ppt/slides/slide45.xml><?xml version="1.0" encoding="utf-8"?>
 <p:sld xmlns:a="http://schemas.openxmlformats.org/drawingml/2006/main" xmlns:r="http://schemas.openxmlformats.org/officeDocument/2006/relationships" xmlns:p="http://schemas.openxmlformats.org/presentationml/2006/main">
   <p:cSld>
     <p:spTree>
@@ -25927,8 +25821,8 @@
           </a:p>
         </p:txBody>
       </p:sp>
-      <mc:AlternateContent xmlns:mc="http://schemas.openxmlformats.org/markup-compatibility/2006">
-        <mc:Choice xmlns:a14="http://schemas.microsoft.com/office/drawing/2010/main" Requires="a14">
+      <mc:AlternateContent xmlns:mc="http://schemas.openxmlformats.org/markup-compatibility/2006" xmlns:a14="http://schemas.microsoft.com/office/drawing/2010/main">
+        <mc:Choice Requires="a14">
           <p:sp>
             <p:nvSpPr>
               <p:cNvPr id="8" name="Content Placeholder 2">
@@ -26321,7 +26215,7 @@
             </p:txBody>
           </p:sp>
         </mc:Choice>
-        <mc:Fallback>
+        <mc:Fallback xmlns="">
           <p:sp>
             <p:nvSpPr>
               <p:cNvPr id="8" name="Content Placeholder 2">

</xml_diff>

<commit_message>
Updated regularizaiton relationships to agree with statsmodels convention
</commit_message>
<xml_diff>
--- a/LectureSlides/10a_ModelsInHighDimensions.pptx
+++ b/LectureSlides/10a_ModelsInHighDimensions.pptx
@@ -5,7 +5,7 @@
     <p:sldMasterId id="2147483648" r:id="rId1"/>
   </p:sldMasterIdLst>
   <p:notesMasterIdLst>
-    <p:notesMasterId r:id="rId47"/>
+    <p:notesMasterId r:id="rId46"/>
   </p:notesMasterIdLst>
   <p:sldIdLst>
     <p:sldId id="299" r:id="rId2"/>
@@ -37,22 +37,21 @@
     <p:sldId id="275" r:id="rId28"/>
     <p:sldId id="276" r:id="rId29"/>
     <p:sldId id="277" r:id="rId30"/>
-    <p:sldId id="278" r:id="rId31"/>
-    <p:sldId id="279" r:id="rId32"/>
-    <p:sldId id="280" r:id="rId33"/>
-    <p:sldId id="281" r:id="rId34"/>
-    <p:sldId id="282" r:id="rId35"/>
-    <p:sldId id="283" r:id="rId36"/>
-    <p:sldId id="284" r:id="rId37"/>
-    <p:sldId id="286" r:id="rId38"/>
-    <p:sldId id="287" r:id="rId39"/>
-    <p:sldId id="288" r:id="rId40"/>
-    <p:sldId id="289" r:id="rId41"/>
-    <p:sldId id="290" r:id="rId42"/>
-    <p:sldId id="705" r:id="rId43"/>
-    <p:sldId id="701" r:id="rId44"/>
-    <p:sldId id="700" r:id="rId45"/>
-    <p:sldId id="291" r:id="rId46"/>
+    <p:sldId id="279" r:id="rId31"/>
+    <p:sldId id="280" r:id="rId32"/>
+    <p:sldId id="281" r:id="rId33"/>
+    <p:sldId id="282" r:id="rId34"/>
+    <p:sldId id="283" r:id="rId35"/>
+    <p:sldId id="284" r:id="rId36"/>
+    <p:sldId id="286" r:id="rId37"/>
+    <p:sldId id="287" r:id="rId38"/>
+    <p:sldId id="288" r:id="rId39"/>
+    <p:sldId id="289" r:id="rId40"/>
+    <p:sldId id="290" r:id="rId41"/>
+    <p:sldId id="705" r:id="rId42"/>
+    <p:sldId id="701" r:id="rId43"/>
+    <p:sldId id="700" r:id="rId44"/>
+    <p:sldId id="291" r:id="rId45"/>
   </p:sldIdLst>
   <p:sldSz cx="9144000" cy="5143500" type="screen16x9"/>
   <p:notesSz cx="6858000" cy="9144000"/>
@@ -252,7 +251,7 @@
           <a:p>
             <a:fld id="{BE0C07B0-B271-4EE5-BA4D-B7A9BA86B818}" type="datetimeFigureOut">
               <a:rPr lang="en-US" smtClean="0"/>
-              <a:t>10/23/2024</a:t>
+              <a:t>11/10/2024</a:t>
             </a:fld>
             <a:endParaRPr lang="en-US"/>
           </a:p>
@@ -782,7 +781,7 @@
           <a:p>
             <a:fld id="{241EB5C9-1307-BA42-ABA2-0BC069CD8E7F}" type="datetimeFigureOut">
               <a:rPr lang="en-US" smtClean="0"/>
-              <a:t>10/23/2024</a:t>
+              <a:t>11/10/2024</a:t>
             </a:fld>
             <a:endParaRPr lang="en-US"/>
           </a:p>
@@ -950,7 +949,7 @@
           <a:p>
             <a:fld id="{241EB5C9-1307-BA42-ABA2-0BC069CD8E7F}" type="datetimeFigureOut">
               <a:rPr lang="en-US" smtClean="0"/>
-              <a:t>10/23/2024</a:t>
+              <a:t>11/10/2024</a:t>
             </a:fld>
             <a:endParaRPr lang="en-US"/>
           </a:p>
@@ -1128,7 +1127,7 @@
           <a:p>
             <a:fld id="{241EB5C9-1307-BA42-ABA2-0BC069CD8E7F}" type="datetimeFigureOut">
               <a:rPr lang="en-US" smtClean="0"/>
-              <a:t>10/23/2024</a:t>
+              <a:t>11/10/2024</a:t>
             </a:fld>
             <a:endParaRPr lang="en-US"/>
           </a:p>
@@ -1446,7 +1445,7 @@
           <a:p>
             <a:fld id="{241EB5C9-1307-BA42-ABA2-0BC069CD8E7F}" type="datetimeFigureOut">
               <a:rPr lang="en-US" smtClean="0"/>
-              <a:t>10/23/2024</a:t>
+              <a:t>11/10/2024</a:t>
             </a:fld>
             <a:endParaRPr lang="en-US"/>
           </a:p>
@@ -1691,7 +1690,7 @@
           <a:p>
             <a:fld id="{241EB5C9-1307-BA42-ABA2-0BC069CD8E7F}" type="datetimeFigureOut">
               <a:rPr lang="en-US" smtClean="0"/>
-              <a:t>10/23/2024</a:t>
+              <a:t>11/10/2024</a:t>
             </a:fld>
             <a:endParaRPr lang="en-US"/>
           </a:p>
@@ -1976,7 +1975,7 @@
           <a:p>
             <a:fld id="{241EB5C9-1307-BA42-ABA2-0BC069CD8E7F}" type="datetimeFigureOut">
               <a:rPr lang="en-US" smtClean="0"/>
-              <a:t>10/23/2024</a:t>
+              <a:t>11/10/2024</a:t>
             </a:fld>
             <a:endParaRPr lang="en-US"/>
           </a:p>
@@ -2395,7 +2394,7 @@
           <a:p>
             <a:fld id="{241EB5C9-1307-BA42-ABA2-0BC069CD8E7F}" type="datetimeFigureOut">
               <a:rPr lang="en-US" smtClean="0"/>
-              <a:t>10/23/2024</a:t>
+              <a:t>11/10/2024</a:t>
             </a:fld>
             <a:endParaRPr lang="en-US"/>
           </a:p>
@@ -2512,7 +2511,7 @@
           <a:p>
             <a:fld id="{241EB5C9-1307-BA42-ABA2-0BC069CD8E7F}" type="datetimeFigureOut">
               <a:rPr lang="en-US" smtClean="0"/>
-              <a:t>10/23/2024</a:t>
+              <a:t>11/10/2024</a:t>
             </a:fld>
             <a:endParaRPr lang="en-US"/>
           </a:p>
@@ -2607,7 +2606,7 @@
           <a:p>
             <a:fld id="{241EB5C9-1307-BA42-ABA2-0BC069CD8E7F}" type="datetimeFigureOut">
               <a:rPr lang="en-US" smtClean="0"/>
-              <a:t>10/23/2024</a:t>
+              <a:t>11/10/2024</a:t>
             </a:fld>
             <a:endParaRPr lang="en-US"/>
           </a:p>
@@ -2882,7 +2881,7 @@
           <a:p>
             <a:fld id="{241EB5C9-1307-BA42-ABA2-0BC069CD8E7F}" type="datetimeFigureOut">
               <a:rPr lang="en-US" smtClean="0"/>
-              <a:t>10/23/2024</a:t>
+              <a:t>11/10/2024</a:t>
             </a:fld>
             <a:endParaRPr lang="en-US"/>
           </a:p>
@@ -3134,7 +3133,7 @@
           <a:p>
             <a:fld id="{241EB5C9-1307-BA42-ABA2-0BC069CD8E7F}" type="datetimeFigureOut">
               <a:rPr lang="en-US" smtClean="0"/>
-              <a:t>10/23/2024</a:t>
+              <a:t>11/10/2024</a:t>
             </a:fld>
             <a:endParaRPr lang="en-US"/>
           </a:p>
@@ -3345,7 +3344,7 @@
           <a:p>
             <a:fld id="{241EB5C9-1307-BA42-ABA2-0BC069CD8E7F}" type="datetimeFigureOut">
               <a:rPr lang="en-US" smtClean="0"/>
-              <a:t>10/23/2024</a:t>
+              <a:t>11/10/2024</a:t>
             </a:fld>
             <a:endParaRPr lang="en-US"/>
           </a:p>
@@ -6557,8 +6556,8 @@
           </a:p>
         </p:txBody>
       </p:sp>
-      <mc:AlternateContent xmlns:mc="http://schemas.openxmlformats.org/markup-compatibility/2006">
-        <mc:Choice xmlns:a14="http://schemas.microsoft.com/office/drawing/2010/main" Requires="a14">
+      <mc:AlternateContent xmlns:mc="http://schemas.openxmlformats.org/markup-compatibility/2006" xmlns:a14="http://schemas.microsoft.com/office/drawing/2010/main">
+        <mc:Choice Requires="a14">
           <p:sp>
             <p:nvSpPr>
               <p:cNvPr id="3" name="Content Placeholder 2"/>
@@ -7270,7 +7269,7 @@
             </p:txBody>
           </p:sp>
         </mc:Choice>
-        <mc:Fallback>
+        <mc:Fallback xmlns="">
           <p:sp>
             <p:nvSpPr>
               <p:cNvPr id="3" name="Content Placeholder 2"/>
@@ -9506,8 +9505,8 @@
           </a:p>
         </p:txBody>
       </p:sp>
-      <mc:AlternateContent xmlns:mc="http://schemas.openxmlformats.org/markup-compatibility/2006">
-        <mc:Choice xmlns:a14="http://schemas.microsoft.com/office/drawing/2010/main" Requires="a14">
+      <mc:AlternateContent xmlns:mc="http://schemas.openxmlformats.org/markup-compatibility/2006" xmlns:a14="http://schemas.microsoft.com/office/drawing/2010/main">
+        <mc:Choice Requires="a14">
           <p:sp>
             <p:nvSpPr>
               <p:cNvPr id="3" name="Content Placeholder 2">
@@ -9908,7 +9907,7 @@
             </p:txBody>
           </p:sp>
         </mc:Choice>
-        <mc:Fallback>
+        <mc:Fallback xmlns="">
           <p:sp>
             <p:nvSpPr>
               <p:cNvPr id="3" name="Content Placeholder 2">
@@ -15752,13 +15751,14 @@
               <a:buNone/>
             </a:pPr>
             <a:r>
+              <a:rPr dirty="0"/>
               <a:t>L2 Regularization</a:t>
             </a:r>
           </a:p>
         </p:txBody>
       </p:sp>
-      <mc:AlternateContent xmlns:mc="http://schemas.openxmlformats.org/markup-compatibility/2006" xmlns:a14="http://schemas.microsoft.com/office/drawing/2010/main">
-        <mc:Choice Requires="a14">
+      <mc:AlternateContent xmlns:mc="http://schemas.openxmlformats.org/markup-compatibility/2006">
+        <mc:Choice xmlns:a14="http://schemas.microsoft.com/office/drawing/2010/main" Requires="a14">
           <p:sp>
             <p:nvSpPr>
               <p:cNvPr id="3" name="Content Placeholder 2"/>
@@ -15777,7 +15777,7 @@
             </p:spPr>
             <p:txBody>
               <a:bodyPr>
-                <a:normAutofit fontScale="85000" lnSpcReduction="10000"/>
+                <a:normAutofit fontScale="85000" lnSpcReduction="20000"/>
               </a:bodyPr>
               <a:lstStyle/>
               <a:p>
@@ -15845,104 +15845,181 @@
                     </m:oMathParaPr>
                     <m:oMath xmlns:m="http://schemas.openxmlformats.org/officeDocument/2006/math">
                       <m:r>
-                        <a:rPr lang="en-US" b="0" i="1" smtClean="0">
+                        <a:rPr lang="ar-AE" i="1">
                           <a:latin typeface="Cambria Math" panose="02040503050406030204" pitchFamily="18" charset="0"/>
                         </a:rPr>
-                        <m:t>𝑚𝑖𝑛</m:t>
+                        <m:t>𝑚</m:t>
+                      </m:r>
+                      <m:r>
+                        <a:rPr lang="en-US" i="1">
+                          <a:latin typeface="Cambria Math" panose="02040503050406030204" pitchFamily="18" charset="0"/>
+                        </a:rPr>
+                        <m:t>𝑖𝑛</m:t>
                       </m:r>
                       <m:d>
                         <m:dPr>
                           <m:begChr m:val="["/>
                           <m:endChr m:val="]"/>
                           <m:ctrlPr>
-                            <a:rPr lang="en-US" b="0" i="1" smtClean="0">
+                            <a:rPr lang="en-US" i="1">
                               <a:latin typeface="Cambria Math" panose="02040503050406030204" pitchFamily="18" charset="0"/>
                             </a:rPr>
                           </m:ctrlPr>
                         </m:dPr>
                         <m:e>
-                          <m:d>
-                            <m:dPr>
-                              <m:begChr m:val="‖"/>
-                              <m:endChr m:val="‖"/>
+                          <m:sSubSup>
+                            <m:sSubSupPr>
                               <m:ctrlPr>
-                                <a:rPr lang="en-US" b="0" i="1" smtClean="0">
+                                <a:rPr lang="en-US" i="1">
                                   <a:latin typeface="Cambria Math" panose="02040503050406030204" pitchFamily="18" charset="0"/>
                                 </a:rPr>
                               </m:ctrlPr>
-                            </m:dPr>
+                            </m:sSubSupPr>
                             <m:e>
+                              <m:f>
+                                <m:fPr>
+                                  <m:ctrlPr>
+                                    <a:rPr lang="en-US" i="1">
+                                      <a:latin typeface="Cambria Math" panose="02040503050406030204" pitchFamily="18" charset="0"/>
+                                    </a:rPr>
+                                  </m:ctrlPr>
+                                </m:fPr>
+                                <m:num>
+                                  <m:r>
+                                    <a:rPr lang="en-US" i="1">
+                                      <a:latin typeface="Cambria Math" panose="02040503050406030204" pitchFamily="18" charset="0"/>
+                                    </a:rPr>
+                                    <m:t>1</m:t>
+                                  </m:r>
+                                </m:num>
+                                <m:den>
+                                  <m:r>
+                                    <a:rPr lang="en-US" i="1">
+                                      <a:latin typeface="Cambria Math" panose="02040503050406030204" pitchFamily="18" charset="0"/>
+                                    </a:rPr>
+                                    <m:t>2</m:t>
+                                  </m:r>
+                                  <m:r>
+                                    <a:rPr lang="en-US" i="1">
+                                      <a:latin typeface="Cambria Math" panose="02040503050406030204" pitchFamily="18" charset="0"/>
+                                    </a:rPr>
+                                    <m:t>𝑛</m:t>
+                                  </m:r>
+                                </m:den>
+                              </m:f>
+                              <m:d>
+                                <m:dPr>
+                                  <m:begChr m:val="‖"/>
+                                  <m:endChr m:val="‖"/>
+                                  <m:ctrlPr>
+                                    <a:rPr lang="en-US" i="1">
+                                      <a:latin typeface="Cambria Math" panose="02040503050406030204" pitchFamily="18" charset="0"/>
+                                    </a:rPr>
+                                  </m:ctrlPr>
+                                </m:dPr>
+                                <m:e>
+                                  <m:r>
+                                    <a:rPr lang="en-US" i="1">
+                                      <a:latin typeface="Cambria Math" panose="02040503050406030204" pitchFamily="18" charset="0"/>
+                                    </a:rPr>
+                                    <m:t>𝐴𝑥</m:t>
+                                  </m:r>
+                                  <m:r>
+                                    <a:rPr lang="en-US" i="1">
+                                      <a:latin typeface="Cambria Math" panose="02040503050406030204" pitchFamily="18" charset="0"/>
+                                    </a:rPr>
+                                    <m:t>−</m:t>
+                                  </m:r>
+                                  <m:r>
+                                    <a:rPr lang="en-US" i="1">
+                                      <a:latin typeface="Cambria Math" panose="02040503050406030204" pitchFamily="18" charset="0"/>
+                                    </a:rPr>
+                                    <m:t>𝑏</m:t>
+                                  </m:r>
+                                </m:e>
+                              </m:d>
+                            </m:e>
+                            <m:sub>
                               <m:r>
-                                <a:rPr lang="en-US" b="0" i="1" smtClean="0">
+                                <a:rPr lang="en-US" i="1">
                                   <a:latin typeface="Cambria Math" panose="02040503050406030204" pitchFamily="18" charset="0"/>
                                 </a:rPr>
-                                <m:t>𝐴𝑥</m:t>
+                                <m:t>2</m:t>
                               </m:r>
-                              <m:r>
-                                <a:rPr lang="en-US" b="0" i="1" smtClean="0">
-                                  <a:latin typeface="Cambria Math" panose="02040503050406030204" pitchFamily="18" charset="0"/>
-                                </a:rPr>
-                                <m:t>−</m:t>
-                              </m:r>
-                              <m:r>
-                                <a:rPr lang="en-US" b="0" i="1" smtClean="0">
-                                  <a:latin typeface="Cambria Math" panose="02040503050406030204" pitchFamily="18" charset="0"/>
-                                </a:rPr>
-                                <m:t>𝑏</m:t>
-                              </m:r>
-                            </m:e>
-                          </m:d>
-                          <m:r>
-                            <a:rPr lang="en-US" b="0" i="1" smtClean="0">
-                              <a:latin typeface="Cambria Math" panose="02040503050406030204" pitchFamily="18" charset="0"/>
-                            </a:rPr>
-                            <m:t>+</m:t>
-                          </m:r>
-                          <m:sSup>
-                            <m:sSupPr>
-                              <m:ctrlPr>
-                                <a:rPr lang="en-US" b="0" i="1" smtClean="0">
-                                  <a:latin typeface="Cambria Math" panose="02040503050406030204" pitchFamily="18" charset="0"/>
-                                </a:rPr>
-                              </m:ctrlPr>
-                            </m:sSupPr>
-                            <m:e>
-                              <m:r>
-                                <a:rPr lang="en-US" b="0" i="1" smtClean="0">
-                                  <a:latin typeface="Cambria Math" panose="02040503050406030204" pitchFamily="18" charset="0"/>
-                                  <a:ea typeface="Cambria Math" panose="02040503050406030204" pitchFamily="18" charset="0"/>
-                                </a:rPr>
-                                <m:t>𝛼</m:t>
-                              </m:r>
-                            </m:e>
+                            </m:sub>
                             <m:sup>
                               <m:r>
-                                <a:rPr lang="en-US" b="0" i="1" smtClean="0">
+                                <a:rPr lang="en-US" i="1">
                                   <a:latin typeface="Cambria Math" panose="02040503050406030204" pitchFamily="18" charset="0"/>
                                 </a:rPr>
                                 <m:t>2</m:t>
                               </m:r>
                             </m:sup>
-                          </m:sSup>
-                          <m:d>
-                            <m:dPr>
-                              <m:begChr m:val="‖"/>
-                              <m:endChr m:val="‖"/>
+                          </m:sSubSup>
+                          <m:r>
+                            <a:rPr lang="en-US" i="1">
+                              <a:latin typeface="Cambria Math" panose="02040503050406030204" pitchFamily="18" charset="0"/>
+                            </a:rPr>
+                            <m:t>+</m:t>
+                          </m:r>
+                          <m:r>
+                            <a:rPr lang="en-US" i="1">
+                              <a:latin typeface="Cambria Math" panose="02040503050406030204" pitchFamily="18" charset="0"/>
+                              <a:ea typeface="Cambria Math" panose="02040503050406030204" pitchFamily="18" charset="0"/>
+                            </a:rPr>
+                            <m:t>𝛼</m:t>
+                          </m:r>
+                          <m:sSubSup>
+                            <m:sSubSupPr>
                               <m:ctrlPr>
-                                <a:rPr lang="en-US" b="0" i="1" smtClean="0">
+                                <a:rPr lang="en-US" i="1">
                                   <a:latin typeface="Cambria Math" panose="02040503050406030204" pitchFamily="18" charset="0"/>
+                                  <a:ea typeface="Cambria Math" panose="02040503050406030204" pitchFamily="18" charset="0"/>
                                 </a:rPr>
                               </m:ctrlPr>
-                            </m:dPr>
+                            </m:sSubSupPr>
                             <m:e>
+                              <m:d>
+                                <m:dPr>
+                                  <m:begChr m:val="‖"/>
+                                  <m:endChr m:val="‖"/>
+                                  <m:ctrlPr>
+                                    <a:rPr lang="en-US" i="1">
+                                      <a:latin typeface="Cambria Math" panose="02040503050406030204" pitchFamily="18" charset="0"/>
+                                      <a:ea typeface="Cambria Math" panose="02040503050406030204" pitchFamily="18" charset="0"/>
+                                    </a:rPr>
+                                  </m:ctrlPr>
+                                </m:dPr>
+                                <m:e>
+                                  <m:r>
+                                    <a:rPr lang="en-US" i="1">
+                                      <a:latin typeface="Cambria Math" panose="02040503050406030204" pitchFamily="18" charset="0"/>
+                                      <a:ea typeface="Cambria Math" panose="02040503050406030204" pitchFamily="18" charset="0"/>
+                                    </a:rPr>
+                                    <m:t>𝑏</m:t>
+                                  </m:r>
+                                </m:e>
+                              </m:d>
+                            </m:e>
+                            <m:sub>
                               <m:r>
-                                <a:rPr lang="en-US" b="0" i="1" smtClean="0">
+                                <a:rPr lang="en-US" i="1">
                                   <a:latin typeface="Cambria Math" panose="02040503050406030204" pitchFamily="18" charset="0"/>
+                                  <a:ea typeface="Cambria Math" panose="02040503050406030204" pitchFamily="18" charset="0"/>
                                 </a:rPr>
-                                <m:t>𝑏</m:t>
+                                <m:t>2</m:t>
                               </m:r>
-                            </m:e>
-                          </m:d>
+                            </m:sub>
+                            <m:sup>
+                              <m:r>
+                                <a:rPr lang="en-US" i="1">
+                                  <a:latin typeface="Cambria Math" panose="02040503050406030204" pitchFamily="18" charset="0"/>
+                                  <a:ea typeface="Cambria Math" panose="02040503050406030204" pitchFamily="18" charset="0"/>
+                                </a:rPr>
+                                <m:t>2</m:t>
+                              </m:r>
+                            </m:sup>
+                          </m:sSubSup>
                         </m:e>
                       </m:d>
                     </m:oMath>
@@ -16211,30 +16288,69 @@
                       <m:jc m:val="center"/>
                     </m:oMathParaPr>
                     <m:oMath xmlns:m="http://schemas.openxmlformats.org/officeDocument/2006/math">
-                      <m:d>
-                        <m:dPr>
-                          <m:begChr m:val="‖"/>
-                          <m:endChr m:val="‖"/>
+                      <m:sSubSup>
+                        <m:sSubSupPr>
                           <m:ctrlPr>
-                            <a:rPr lang="ar-AE" i="1" smtClean="0">
+                            <a:rPr lang="en-US" i="1">
                               <a:latin typeface="Cambria Math" panose="02040503050406030204" pitchFamily="18" charset="0"/>
+                              <a:ea typeface="Cambria Math" panose="02040503050406030204" pitchFamily="18" charset="0"/>
                             </a:rPr>
                           </m:ctrlPr>
-                        </m:dPr>
+                        </m:sSubSupPr>
                         <m:e>
+                          <m:d>
+                            <m:dPr>
+                              <m:begChr m:val="‖"/>
+                              <m:endChr m:val="‖"/>
+                              <m:ctrlPr>
+                                <a:rPr lang="en-US" i="1">
+                                  <a:latin typeface="Cambria Math" panose="02040503050406030204" pitchFamily="18" charset="0"/>
+                                  <a:ea typeface="Cambria Math" panose="02040503050406030204" pitchFamily="18" charset="0"/>
+                                </a:rPr>
+                              </m:ctrlPr>
+                            </m:dPr>
+                            <m:e>
+                              <m:r>
+                                <a:rPr lang="en-US" i="1">
+                                  <a:latin typeface="Cambria Math" panose="02040503050406030204" pitchFamily="18" charset="0"/>
+                                  <a:ea typeface="Cambria Math" panose="02040503050406030204" pitchFamily="18" charset="0"/>
+                                </a:rPr>
+                                <m:t>𝑏</m:t>
+                              </m:r>
+                            </m:e>
+                          </m:d>
+                        </m:e>
+                        <m:sub>
+                          <m:r>
+                            <a:rPr lang="en-US" i="1">
+                              <a:latin typeface="Cambria Math" panose="02040503050406030204" pitchFamily="18" charset="0"/>
+                              <a:ea typeface="Cambria Math" panose="02040503050406030204" pitchFamily="18" charset="0"/>
+                            </a:rPr>
+                            <m:t>2</m:t>
+                          </m:r>
+                        </m:sub>
+                        <m:sup>
                           <m:r>
                             <a:rPr lang="en-US" b="0" i="1" smtClean="0">
                               <a:latin typeface="Cambria Math" panose="02040503050406030204" pitchFamily="18" charset="0"/>
+                              <a:ea typeface="Cambria Math" panose="02040503050406030204" pitchFamily="18" charset="0"/>
                             </a:rPr>
-                            <m:t>𝑏</m:t>
+                            <m:t> </m:t>
                           </m:r>
-                        </m:e>
-                      </m:d>
+                        </m:sup>
+                      </m:sSubSup>
+                      <m:r>
+                        <a:rPr lang="en-US" b="0" i="0" smtClean="0">
+                          <a:latin typeface="Cambria Math" panose="02040503050406030204" pitchFamily="18" charset="0"/>
+                          <a:ea typeface="Cambria Math" panose="02040503050406030204" pitchFamily="18" charset="0"/>
+                        </a:rPr>
+                        <m:t>=</m:t>
+                      </m:r>
                       <m:r>
                         <a:rPr lang="ar-AE">
                           <a:latin typeface="Cambria Math" panose="02040503050406030204" pitchFamily="18" charset="0"/>
                         </a:rPr>
-                        <m:t>=(</m:t>
+                        <m:t>(</m:t>
                       </m:r>
                       <m:sSubSup>
                         <m:sSubSupPr>
@@ -16523,7 +16639,7 @@
             </p:txBody>
           </p:sp>
         </mc:Choice>
-        <mc:Fallback xmlns="">
+        <mc:Fallback>
           <p:sp>
             <p:nvSpPr>
               <p:cNvPr id="3" name="Content Placeholder 2"/>
@@ -16542,7 +16658,7 @@
               <a:blipFill>
                 <a:blip r:embed="rId2"/>
                 <a:stretch>
-                  <a:fillRect l="-741" t="-484"/>
+                  <a:fillRect l="-741" t="-1452"/>
                 </a:stretch>
               </a:blipFill>
             </p:spPr>
@@ -18668,1151 +18784,6 @@
 </file>
 
 <file path=ppt/slides/slide30.xml><?xml version="1.0" encoding="utf-8"?>
-<p:sld xmlns:a="http://schemas.openxmlformats.org/drawingml/2006/main" xmlns:r="http://schemas.openxmlformats.org/officeDocument/2006/relationships" xmlns:p="http://schemas.openxmlformats.org/presentationml/2006/main" show="0">
-  <p:cSld>
-    <p:spTree>
-      <p:nvGrpSpPr>
-        <p:cNvPr id="1" name=""/>
-        <p:cNvGrpSpPr/>
-        <p:nvPr/>
-      </p:nvGrpSpPr>
-      <p:grpSpPr>
-        <a:xfrm>
-          <a:off x="0" y="0"/>
-          <a:ext cx="0" cy="0"/>
-          <a:chOff x="0" y="0"/>
-          <a:chExt cx="0" cy="0"/>
-        </a:xfrm>
-      </p:grpSpPr>
-      <p:sp>
-        <p:nvSpPr>
-          <p:cNvPr id="2" name="Title 1"/>
-          <p:cNvSpPr>
-            <a:spLocks noGrp="1"/>
-          </p:cNvSpPr>
-          <p:nvPr>
-            <p:ph type="title"/>
-          </p:nvPr>
-        </p:nvSpPr>
-        <p:spPr/>
-        <p:txBody>
-          <a:bodyPr/>
-          <a:lstStyle/>
-          <a:p>
-            <a:pPr marL="0" lvl="0" indent="0">
-              <a:buNone/>
-            </a:pPr>
-            <a:r>
-              <a:t>L2 Regularization</a:t>
-            </a:r>
-          </a:p>
-        </p:txBody>
-      </p:sp>
-      <mc:AlternateContent xmlns:mc="http://schemas.openxmlformats.org/markup-compatibility/2006" xmlns:a14="http://schemas.microsoft.com/office/drawing/2010/main">
-        <mc:Choice Requires="a14">
-          <p:sp>
-            <p:nvSpPr>
-              <p:cNvPr id="3" name="Content Placeholder 2"/>
-              <p:cNvSpPr>
-                <a:spLocks noGrp="1"/>
-              </p:cNvSpPr>
-              <p:nvPr>
-                <p:ph idx="1"/>
-              </p:nvPr>
-            </p:nvSpPr>
-            <p:spPr>
-              <a:xfrm>
-                <a:off x="457200" y="1200151"/>
-                <a:ext cx="8229600" cy="3662794"/>
-              </a:xfrm>
-            </p:spPr>
-            <p:txBody>
-              <a:bodyPr>
-                <a:normAutofit fontScale="47500" lnSpcReduction="20000"/>
-              </a:bodyPr>
-              <a:lstStyle/>
-              <a:p>
-                <a:pPr marL="0" lvl="0" indent="0">
-                  <a:buNone/>
-                </a:pPr>
-                <a:r>
-                  <a:rPr b="1" dirty="0"/>
-                  <a:t>Example:</a:t>
-                </a:r>
-                <a:r>
-                  <a:rPr dirty="0"/>
-                  <a:t> compute the eigenvalues of a covariance matrix</a:t>
-                </a:r>
-              </a:p>
-              <a:p>
-                <a:pPr lvl="0" indent="0">
-                  <a:buNone/>
-                </a:pPr>
-                <a:r>
-                  <a:rPr dirty="0" err="1">
-                    <a:latin typeface="Courier"/>
-                  </a:rPr>
-                  <a:t>test_scores</a:t>
-                </a:r>
-                <a:r>
-                  <a:rPr dirty="0">
-                    <a:latin typeface="Courier"/>
-                  </a:rPr>
-                  <a:t>[</a:t>
-                </a:r>
-                <a:r>
-                  <a:rPr dirty="0">
-                    <a:solidFill>
-                      <a:srgbClr val="4070A0"/>
-                    </a:solidFill>
-                    <a:latin typeface="Courier"/>
-                  </a:rPr>
-                  <a:t>'</a:t>
-                </a:r>
-                <a:r>
-                  <a:rPr dirty="0" err="1">
-                    <a:solidFill>
-                      <a:srgbClr val="4070A0"/>
-                    </a:solidFill>
-                    <a:latin typeface="Courier"/>
-                  </a:rPr>
-                  <a:t>socst_zero_mean</a:t>
-                </a:r>
-                <a:r>
-                  <a:rPr dirty="0">
-                    <a:solidFill>
-                      <a:srgbClr val="4070A0"/>
-                    </a:solidFill>
-                    <a:latin typeface="Courier"/>
-                  </a:rPr>
-                  <a:t>'</a:t>
-                </a:r>
-                <a:r>
-                  <a:rPr dirty="0">
-                    <a:latin typeface="Courier"/>
-                  </a:rPr>
-                  <a:t>] </a:t>
-                </a:r>
-                <a:r>
-                  <a:rPr dirty="0">
-                    <a:solidFill>
-                      <a:srgbClr val="666666"/>
-                    </a:solidFill>
-                    <a:latin typeface="Courier"/>
-                  </a:rPr>
-                  <a:t>=</a:t>
-                </a:r>
-                <a:r>
-                  <a:rPr dirty="0">
-                    <a:latin typeface="Courier"/>
-                  </a:rPr>
-                  <a:t> </a:t>
-                </a:r>
-                <a:r>
-                  <a:rPr dirty="0" err="1">
-                    <a:latin typeface="Courier"/>
-                  </a:rPr>
-                  <a:t>test_scores</a:t>
-                </a:r>
-                <a:r>
-                  <a:rPr dirty="0">
-                    <a:latin typeface="Courier"/>
-                  </a:rPr>
-                  <a:t>[</a:t>
-                </a:r>
-                <a:r>
-                  <a:rPr dirty="0">
-                    <a:solidFill>
-                      <a:srgbClr val="4070A0"/>
-                    </a:solidFill>
-                    <a:latin typeface="Courier"/>
-                  </a:rPr>
-                  <a:t>'</a:t>
-                </a:r>
-                <a:r>
-                  <a:rPr dirty="0" err="1">
-                    <a:solidFill>
-                      <a:srgbClr val="4070A0"/>
-                    </a:solidFill>
-                    <a:latin typeface="Courier"/>
-                  </a:rPr>
-                  <a:t>socst</a:t>
-                </a:r>
-                <a:r>
-                  <a:rPr dirty="0">
-                    <a:solidFill>
-                      <a:srgbClr val="4070A0"/>
-                    </a:solidFill>
-                    <a:latin typeface="Courier"/>
-                  </a:rPr>
-                  <a:t>'</a:t>
-                </a:r>
-                <a:r>
-                  <a:rPr dirty="0">
-                    <a:latin typeface="Courier"/>
-                  </a:rPr>
-                  <a:t>] </a:t>
-                </a:r>
-                <a:r>
-                  <a:rPr dirty="0">
-                    <a:solidFill>
-                      <a:srgbClr val="666666"/>
-                    </a:solidFill>
-                    <a:latin typeface="Courier"/>
-                  </a:rPr>
-                  <a:t>-</a:t>
-                </a:r>
-                <a:r>
-                  <a:rPr dirty="0">
-                    <a:latin typeface="Courier"/>
-                  </a:rPr>
-                  <a:t> </a:t>
-                </a:r>
-                <a:r>
-                  <a:rPr dirty="0" err="1">
-                    <a:latin typeface="Courier"/>
-                  </a:rPr>
-                  <a:t>np.mean</a:t>
-                </a:r>
-                <a:r>
-                  <a:rPr dirty="0">
-                    <a:latin typeface="Courier"/>
-                  </a:rPr>
-                  <a:t>(</a:t>
-                </a:r>
-                <a:r>
-                  <a:rPr dirty="0" err="1">
-                    <a:latin typeface="Courier"/>
-                  </a:rPr>
-                  <a:t>test_scores</a:t>
-                </a:r>
-                <a:r>
-                  <a:rPr dirty="0">
-                    <a:latin typeface="Courier"/>
-                  </a:rPr>
-                  <a:t>[</a:t>
-                </a:r>
-                <a:r>
-                  <a:rPr dirty="0">
-                    <a:solidFill>
-                      <a:srgbClr val="4070A0"/>
-                    </a:solidFill>
-                    <a:latin typeface="Courier"/>
-                  </a:rPr>
-                  <a:t>'</a:t>
-                </a:r>
-                <a:r>
-                  <a:rPr dirty="0" err="1">
-                    <a:solidFill>
-                      <a:srgbClr val="4070A0"/>
-                    </a:solidFill>
-                    <a:latin typeface="Courier"/>
-                  </a:rPr>
-                  <a:t>socst</a:t>
-                </a:r>
-                <a:r>
-                  <a:rPr dirty="0">
-                    <a:solidFill>
-                      <a:srgbClr val="4070A0"/>
-                    </a:solidFill>
-                    <a:latin typeface="Courier"/>
-                  </a:rPr>
-                  <a:t>'</a:t>
-                </a:r>
-                <a:r>
-                  <a:rPr dirty="0">
-                    <a:latin typeface="Courier"/>
-                  </a:rPr>
-                  <a:t>])</a:t>
-                </a:r>
-                <a:br>
-                  <a:rPr dirty="0"/>
-                </a:br>
-                <a:r>
-                  <a:rPr dirty="0">
-                    <a:latin typeface="Courier"/>
-                  </a:rPr>
-                  <a:t>Y, X </a:t>
-                </a:r>
-                <a:r>
-                  <a:rPr dirty="0">
-                    <a:solidFill>
-                      <a:srgbClr val="666666"/>
-                    </a:solidFill>
-                    <a:latin typeface="Courier"/>
-                  </a:rPr>
-                  <a:t>=</a:t>
-                </a:r>
-                <a:r>
-                  <a:rPr dirty="0">
-                    <a:latin typeface="Courier"/>
-                  </a:rPr>
-                  <a:t> </a:t>
-                </a:r>
-                <a:r>
-                  <a:rPr dirty="0" err="1">
-                    <a:latin typeface="Courier"/>
-                  </a:rPr>
-                  <a:t>dmatrices</a:t>
-                </a:r>
-                <a:r>
-                  <a:rPr dirty="0">
-                    <a:latin typeface="Courier"/>
-                  </a:rPr>
-                  <a:t>(</a:t>
-                </a:r>
-                <a:r>
-                  <a:rPr dirty="0">
-                    <a:solidFill>
-                      <a:srgbClr val="4070A0"/>
-                    </a:solidFill>
-                    <a:latin typeface="Courier"/>
-                  </a:rPr>
-                  <a:t>"</a:t>
-                </a:r>
-                <a:r>
-                  <a:rPr dirty="0" err="1">
-                    <a:solidFill>
-                      <a:srgbClr val="4070A0"/>
-                    </a:solidFill>
-                    <a:latin typeface="Courier"/>
-                  </a:rPr>
-                  <a:t>socst_zero_mean</a:t>
-                </a:r>
-                <a:r>
-                  <a:rPr dirty="0">
-                    <a:solidFill>
-                      <a:srgbClr val="4070A0"/>
-                    </a:solidFill>
-                    <a:latin typeface="Courier"/>
-                  </a:rPr>
-                  <a:t> ~ C(</a:t>
-                </a:r>
-                <a:r>
-                  <a:rPr dirty="0" err="1">
-                    <a:solidFill>
-                      <a:srgbClr val="4070A0"/>
-                    </a:solidFill>
-                    <a:latin typeface="Courier"/>
-                  </a:rPr>
-                  <a:t>ses</a:t>
-                </a:r>
-                <a:r>
-                  <a:rPr dirty="0">
-                    <a:solidFill>
-                      <a:srgbClr val="4070A0"/>
-                    </a:solidFill>
-                    <a:latin typeface="Courier"/>
-                  </a:rPr>
-                  <a:t>, levels=[1,2,3])*C(prog, levels=[1,2,3])"</a:t>
-                </a:r>
-                <a:r>
-                  <a:rPr dirty="0">
-                    <a:latin typeface="Courier"/>
-                  </a:rPr>
-                  <a:t>, data</a:t>
-                </a:r>
-                <a:r>
-                  <a:rPr dirty="0">
-                    <a:solidFill>
-                      <a:srgbClr val="666666"/>
-                    </a:solidFill>
-                    <a:latin typeface="Courier"/>
-                  </a:rPr>
-                  <a:t>=</a:t>
-                </a:r>
-                <a:r>
-                  <a:rPr dirty="0" err="1">
-                    <a:latin typeface="Courier"/>
-                  </a:rPr>
-                  <a:t>test_scores</a:t>
-                </a:r>
-                <a:r>
-                  <a:rPr dirty="0">
-                    <a:latin typeface="Courier"/>
-                  </a:rPr>
-                  <a:t>)</a:t>
-                </a:r>
-                <a:br>
-                  <a:rPr dirty="0"/>
-                </a:br>
-                <a:r>
-                  <a:rPr dirty="0" err="1">
-                    <a:latin typeface="Courier"/>
-                  </a:rPr>
-                  <a:t>cov_X</a:t>
-                </a:r>
-                <a:r>
-                  <a:rPr dirty="0">
-                    <a:latin typeface="Courier"/>
-                  </a:rPr>
-                  <a:t> </a:t>
-                </a:r>
-                <a:r>
-                  <a:rPr dirty="0">
-                    <a:solidFill>
-                      <a:srgbClr val="666666"/>
-                    </a:solidFill>
-                    <a:latin typeface="Courier"/>
-                  </a:rPr>
-                  <a:t>=</a:t>
-                </a:r>
-                <a:r>
-                  <a:rPr dirty="0">
-                    <a:latin typeface="Courier"/>
-                  </a:rPr>
-                  <a:t> </a:t>
-                </a:r>
-                <a:r>
-                  <a:rPr dirty="0" err="1">
-                    <a:latin typeface="Courier"/>
-                  </a:rPr>
-                  <a:t>np.matmul</a:t>
-                </a:r>
-                <a:r>
-                  <a:rPr dirty="0">
-                    <a:latin typeface="Courier"/>
-                  </a:rPr>
-                  <a:t>(</a:t>
-                </a:r>
-                <a:r>
-                  <a:rPr dirty="0" err="1">
-                    <a:latin typeface="Courier"/>
-                  </a:rPr>
-                  <a:t>np.transpose</a:t>
-                </a:r>
-                <a:r>
-                  <a:rPr dirty="0">
-                    <a:latin typeface="Courier"/>
-                  </a:rPr>
-                  <a:t>(X),X)</a:t>
-                </a:r>
-                <a:br>
-                  <a:rPr dirty="0"/>
-                </a:br>
-                <a:r>
-                  <a:rPr dirty="0" err="1">
-                    <a:latin typeface="Courier"/>
-                  </a:rPr>
-                  <a:t>cov_X</a:t>
-                </a:r>
-                <a:r>
-                  <a:rPr dirty="0">
-                    <a:latin typeface="Courier"/>
-                  </a:rPr>
-                  <a:t> </a:t>
-                </a:r>
-                <a:r>
-                  <a:rPr dirty="0">
-                    <a:solidFill>
-                      <a:srgbClr val="666666"/>
-                    </a:solidFill>
-                    <a:latin typeface="Courier"/>
-                  </a:rPr>
-                  <a:t>=</a:t>
-                </a:r>
-                <a:r>
-                  <a:rPr dirty="0">
-                    <a:latin typeface="Courier"/>
-                  </a:rPr>
-                  <a:t> </a:t>
-                </a:r>
-                <a:r>
-                  <a:rPr dirty="0" err="1">
-                    <a:latin typeface="Courier"/>
-                  </a:rPr>
-                  <a:t>np.divide</a:t>
-                </a:r>
-                <a:r>
-                  <a:rPr dirty="0">
-                    <a:latin typeface="Courier"/>
-                  </a:rPr>
-                  <a:t>(</a:t>
-                </a:r>
-                <a:r>
-                  <a:rPr dirty="0" err="1">
-                    <a:latin typeface="Courier"/>
-                  </a:rPr>
-                  <a:t>cov_X</a:t>
-                </a:r>
-                <a:r>
-                  <a:rPr dirty="0">
-                    <a:latin typeface="Courier"/>
-                  </a:rPr>
-                  <a:t>, </a:t>
-                </a:r>
-                <a:r>
-                  <a:rPr dirty="0">
-                    <a:solidFill>
-                      <a:srgbClr val="008000"/>
-                    </a:solidFill>
-                    <a:latin typeface="Courier"/>
-                  </a:rPr>
-                  <a:t>float</a:t>
-                </a:r>
-                <a:r>
-                  <a:rPr dirty="0">
-                    <a:latin typeface="Courier"/>
-                  </a:rPr>
-                  <a:t>(</a:t>
-                </a:r>
-                <a:r>
-                  <a:rPr dirty="0" err="1">
-                    <a:latin typeface="Courier"/>
-                  </a:rPr>
-                  <a:t>cov_X.shape</a:t>
-                </a:r>
-                <a:r>
-                  <a:rPr dirty="0">
-                    <a:latin typeface="Courier"/>
-                  </a:rPr>
-                  <a:t>[</a:t>
-                </a:r>
-                <a:r>
-                  <a:rPr dirty="0">
-                    <a:solidFill>
-                      <a:srgbClr val="40A070"/>
-                    </a:solidFill>
-                    <a:latin typeface="Courier"/>
-                  </a:rPr>
-                  <a:t>0</a:t>
-                </a:r>
-                <a:r>
-                  <a:rPr dirty="0">
-                    <a:latin typeface="Courier"/>
-                  </a:rPr>
-                  <a:t>]))</a:t>
-                </a:r>
-                <a:br>
-                  <a:rPr dirty="0"/>
-                </a:br>
-                <a:r>
-                  <a:rPr dirty="0" err="1">
-                    <a:latin typeface="Courier"/>
-                  </a:rPr>
-                  <a:t>np.real</a:t>
-                </a:r>
-                <a:r>
-                  <a:rPr dirty="0">
-                    <a:latin typeface="Courier"/>
-                  </a:rPr>
-                  <a:t>(</a:t>
-                </a:r>
-                <a:r>
-                  <a:rPr dirty="0" err="1">
-                    <a:latin typeface="Courier"/>
-                  </a:rPr>
-                  <a:t>np.linalg.eigvals</a:t>
-                </a:r>
-                <a:r>
-                  <a:rPr dirty="0">
-                    <a:latin typeface="Courier"/>
-                  </a:rPr>
-                  <a:t>(</a:t>
-                </a:r>
-                <a:r>
-                  <a:rPr dirty="0" err="1">
-                    <a:latin typeface="Courier"/>
-                  </a:rPr>
-                  <a:t>cov_X</a:t>
-                </a:r>
-                <a:r>
-                  <a:rPr dirty="0">
-                    <a:latin typeface="Courier"/>
-                  </a:rPr>
-                  <a:t>))</a:t>
-                </a:r>
-              </a:p>
-              <a:p>
-                <a:pPr lvl="0" indent="0">
-                  <a:buNone/>
-                </a:pPr>
-                <a:r>
-                  <a:rPr dirty="0">
-                    <a:latin typeface="Courier"/>
-                  </a:rPr>
-                  <a:t>## array([41.33783544, 13.34471885,  8.85600018,  2.37491505,  1.7218998 ,
-##         1.6220889 ,  0.11774255,  0.38848204,  0.45853941])</a:t>
-                </a:r>
-              </a:p>
-              <a:p>
-                <a:pPr marL="0" lvl="0" indent="0">
-                  <a:buNone/>
-                </a:pPr>
-                <a:r>
-                  <a:rPr dirty="0"/>
-                  <a:t>The condition number of the covariance is </a:t>
-                </a:r>
-                <a14:m>
-                  <m:oMath xmlns:m="http://schemas.openxmlformats.org/officeDocument/2006/math">
-                    <m:r>
-                      <a:rPr>
-                        <a:latin typeface="Cambria Math" panose="02040503050406030204" pitchFamily="18" charset="0"/>
-                      </a:rPr>
-                      <m:t>∼</m:t>
-                    </m:r>
-                    <m:r>
-                      <a:rPr>
-                        <a:latin typeface="Cambria Math" panose="02040503050406030204" pitchFamily="18" charset="0"/>
-                      </a:rPr>
-                      <m:t>90</m:t>
-                    </m:r>
-                  </m:oMath>
-                </a14:m>
-                <a:endParaRPr dirty="0"/>
-              </a:p>
-              <a:p>
-                <a:pPr marL="0" lvl="0" indent="0">
-                  <a:buNone/>
-                </a:pPr>
-                <a:r>
-                  <a:rPr b="1" dirty="0"/>
-                  <a:t>Add regularization</a:t>
-                </a:r>
-                <a:r>
-                  <a:rPr dirty="0"/>
-                  <a:t> with </a:t>
-                </a:r>
-                <a14:m>
-                  <m:oMath xmlns:m="http://schemas.openxmlformats.org/officeDocument/2006/math">
-                    <m:sSup>
-                      <m:sSupPr>
-                        <m:ctrlPr>
-                          <a:rPr i="1">
-                            <a:latin typeface="Cambria Math" panose="02040503050406030204" pitchFamily="18" charset="0"/>
-                          </a:rPr>
-                        </m:ctrlPr>
-                      </m:sSupPr>
-                      <m:e>
-                        <m:r>
-                          <a:rPr>
-                            <a:latin typeface="Cambria Math" panose="02040503050406030204" pitchFamily="18" charset="0"/>
-                          </a:rPr>
-                          <m:t>𝛼</m:t>
-                        </m:r>
-                      </m:e>
-                      <m:sup>
-                        <m:r>
-                          <a:rPr>
-                            <a:latin typeface="Cambria Math" panose="02040503050406030204" pitchFamily="18" charset="0"/>
-                          </a:rPr>
-                          <m:t>2</m:t>
-                        </m:r>
-                      </m:sup>
-                    </m:sSup>
-                    <m:r>
-                      <a:rPr>
-                        <a:latin typeface="Cambria Math" panose="02040503050406030204" pitchFamily="18" charset="0"/>
-                      </a:rPr>
-                      <m:t>=</m:t>
-                    </m:r>
-                    <m:r>
-                      <a:rPr>
-                        <a:latin typeface="Cambria Math" panose="02040503050406030204" pitchFamily="18" charset="0"/>
-                      </a:rPr>
-                      <m:t>0</m:t>
-                    </m:r>
-                    <m:r>
-                      <a:rPr>
-                        <a:latin typeface="Cambria Math" panose="02040503050406030204" pitchFamily="18" charset="0"/>
-                      </a:rPr>
-                      <m:t>.</m:t>
-                    </m:r>
-                    <m:r>
-                      <a:rPr>
-                        <a:latin typeface="Cambria Math" panose="02040503050406030204" pitchFamily="18" charset="0"/>
-                      </a:rPr>
-                      <m:t>1</m:t>
-                    </m:r>
-                  </m:oMath>
-                </a14:m>
-                <a:r>
-                  <a:rPr dirty="0"/>
-                  <a:t> and compute the eigenvalues</a:t>
-                </a:r>
-              </a:p>
-              <a:p>
-                <a:pPr lvl="0" indent="0">
-                  <a:buNone/>
-                </a:pPr>
-                <a:r>
-                  <a:rPr dirty="0" err="1">
-                    <a:latin typeface="Courier"/>
-                  </a:rPr>
-                  <a:t>alpha_sqr</a:t>
-                </a:r>
-                <a:r>
-                  <a:rPr dirty="0">
-                    <a:latin typeface="Courier"/>
-                  </a:rPr>
-                  <a:t> </a:t>
-                </a:r>
-                <a:r>
-                  <a:rPr dirty="0">
-                    <a:solidFill>
-                      <a:srgbClr val="666666"/>
-                    </a:solidFill>
-                    <a:latin typeface="Courier"/>
-                  </a:rPr>
-                  <a:t>=</a:t>
-                </a:r>
-                <a:r>
-                  <a:rPr dirty="0">
-                    <a:latin typeface="Courier"/>
-                  </a:rPr>
-                  <a:t> </a:t>
-                </a:r>
-                <a:r>
-                  <a:rPr dirty="0">
-                    <a:solidFill>
-                      <a:srgbClr val="40A070"/>
-                    </a:solidFill>
-                    <a:latin typeface="Courier"/>
-                  </a:rPr>
-                  <a:t>0.1</a:t>
-                </a:r>
-                <a:r>
-                  <a:rPr dirty="0">
-                    <a:latin typeface="Courier"/>
-                  </a:rPr>
-                  <a:t> </a:t>
-                </a:r>
-                <a:br>
-                  <a:rPr dirty="0"/>
-                </a:br>
-                <a:r>
-                  <a:rPr dirty="0" err="1">
-                    <a:latin typeface="Courier"/>
-                  </a:rPr>
-                  <a:t>alpha_sqr</a:t>
-                </a:r>
-                <a:r>
-                  <a:rPr dirty="0">
-                    <a:latin typeface="Courier"/>
-                  </a:rPr>
-                  <a:t> </a:t>
-                </a:r>
-                <a:r>
-                  <a:rPr dirty="0">
-                    <a:solidFill>
-                      <a:srgbClr val="666666"/>
-                    </a:solidFill>
-                    <a:latin typeface="Courier"/>
-                  </a:rPr>
-                  <a:t>=</a:t>
-                </a:r>
-                <a:r>
-                  <a:rPr dirty="0">
-                    <a:latin typeface="Courier"/>
-                  </a:rPr>
-                  <a:t> </a:t>
-                </a:r>
-                <a:r>
-                  <a:rPr dirty="0" err="1">
-                    <a:latin typeface="Courier"/>
-                  </a:rPr>
-                  <a:t>np.diag</a:t>
-                </a:r>
-                <a:r>
-                  <a:rPr dirty="0">
-                    <a:latin typeface="Courier"/>
-                  </a:rPr>
-                  <a:t>([</a:t>
-                </a:r>
-                <a:r>
-                  <a:rPr dirty="0" err="1">
-                    <a:latin typeface="Courier"/>
-                  </a:rPr>
-                  <a:t>alpha_sqr</a:t>
-                </a:r>
-                <a:r>
-                  <a:rPr dirty="0">
-                    <a:latin typeface="Courier"/>
-                  </a:rPr>
-                  <a:t>] </a:t>
-                </a:r>
-                <a:r>
-                  <a:rPr dirty="0">
-                    <a:solidFill>
-                      <a:srgbClr val="666666"/>
-                    </a:solidFill>
-                    <a:latin typeface="Courier"/>
-                  </a:rPr>
-                  <a:t>*</a:t>
-                </a:r>
-                <a:r>
-                  <a:rPr dirty="0">
-                    <a:latin typeface="Courier"/>
-                  </a:rPr>
-                  <a:t> </a:t>
-                </a:r>
-                <a:r>
-                  <a:rPr dirty="0" err="1">
-                    <a:latin typeface="Courier"/>
-                  </a:rPr>
-                  <a:t>cov_X.shape</a:t>
-                </a:r>
-                <a:r>
-                  <a:rPr dirty="0">
-                    <a:latin typeface="Courier"/>
-                  </a:rPr>
-                  <a:t>[</a:t>
-                </a:r>
-                <a:r>
-                  <a:rPr dirty="0">
-                    <a:solidFill>
-                      <a:srgbClr val="40A070"/>
-                    </a:solidFill>
-                    <a:latin typeface="Courier"/>
-                  </a:rPr>
-                  <a:t>0</a:t>
-                </a:r>
-                <a:r>
-                  <a:rPr dirty="0">
-                    <a:latin typeface="Courier"/>
-                  </a:rPr>
-                  <a:t>])</a:t>
-                </a:r>
-                <a:br>
-                  <a:rPr dirty="0"/>
-                </a:br>
-                <a:r>
-                  <a:rPr i="1" dirty="0">
-                    <a:solidFill>
-                      <a:srgbClr val="60A0B0"/>
-                    </a:solidFill>
-                    <a:latin typeface="Courier"/>
-                  </a:rPr>
-                  <a:t>#alpha_sqr = </a:t>
-                </a:r>
-                <a:r>
-                  <a:rPr i="1" dirty="0" err="1">
-                    <a:solidFill>
-                      <a:srgbClr val="60A0B0"/>
-                    </a:solidFill>
-                    <a:latin typeface="Courier"/>
-                  </a:rPr>
-                  <a:t>np.diag</a:t>
-                </a:r>
-                <a:r>
-                  <a:rPr i="1" dirty="0">
-                    <a:solidFill>
-                      <a:srgbClr val="60A0B0"/>
-                    </a:solidFill>
-                    <a:latin typeface="Courier"/>
-                  </a:rPr>
-                  <a:t>([alpha] * </a:t>
-                </a:r>
-                <a:r>
-                  <a:rPr i="1" dirty="0" err="1">
-                    <a:solidFill>
-                      <a:srgbClr val="60A0B0"/>
-                    </a:solidFill>
-                    <a:latin typeface="Courier"/>
-                  </a:rPr>
-                  <a:t>cov_X.shape</a:t>
-                </a:r>
-                <a:r>
-                  <a:rPr i="1" dirty="0">
-                    <a:solidFill>
-                      <a:srgbClr val="60A0B0"/>
-                    </a:solidFill>
-                    <a:latin typeface="Courier"/>
-                  </a:rPr>
-                  <a:t>[0])</a:t>
-                </a:r>
-                <a:br>
-                  <a:rPr dirty="0"/>
-                </a:br>
-                <a:r>
-                  <a:rPr i="1" dirty="0">
-                    <a:solidFill>
-                      <a:srgbClr val="60A0B0"/>
-                    </a:solidFill>
-                    <a:latin typeface="Courier"/>
-                  </a:rPr>
-                  <a:t>#cov_X = </a:t>
-                </a:r>
-                <a:r>
-                  <a:rPr i="1" dirty="0" err="1">
-                    <a:solidFill>
-                      <a:srgbClr val="60A0B0"/>
-                    </a:solidFill>
-                    <a:latin typeface="Courier"/>
-                  </a:rPr>
-                  <a:t>np.divide</a:t>
-                </a:r>
-                <a:r>
-                  <a:rPr i="1" dirty="0">
-                    <a:solidFill>
-                      <a:srgbClr val="60A0B0"/>
-                    </a:solidFill>
-                    <a:latin typeface="Courier"/>
-                  </a:rPr>
-                  <a:t>(</a:t>
-                </a:r>
-                <a:r>
-                  <a:rPr i="1" dirty="0" err="1">
-                    <a:solidFill>
-                      <a:srgbClr val="60A0B0"/>
-                    </a:solidFill>
-                    <a:latin typeface="Courier"/>
-                  </a:rPr>
-                  <a:t>np.matmul</a:t>
-                </a:r>
-                <a:r>
-                  <a:rPr i="1" dirty="0">
-                    <a:solidFill>
-                      <a:srgbClr val="60A0B0"/>
-                    </a:solidFill>
-                    <a:latin typeface="Courier"/>
-                  </a:rPr>
-                  <a:t>(</a:t>
-                </a:r>
-                <a:r>
-                  <a:rPr i="1" dirty="0" err="1">
-                    <a:solidFill>
-                      <a:srgbClr val="60A0B0"/>
-                    </a:solidFill>
-                    <a:latin typeface="Courier"/>
-                  </a:rPr>
-                  <a:t>np.transpose</a:t>
-                </a:r>
-                <a:r>
-                  <a:rPr i="1" dirty="0">
-                    <a:solidFill>
-                      <a:srgbClr val="60A0B0"/>
-                    </a:solidFill>
-                    <a:latin typeface="Courier"/>
-                  </a:rPr>
-                  <a:t>(X),X), float(</a:t>
-                </a:r>
-                <a:r>
-                  <a:rPr i="1" dirty="0" err="1">
-                    <a:solidFill>
-                      <a:srgbClr val="60A0B0"/>
-                    </a:solidFill>
-                    <a:latin typeface="Courier"/>
-                  </a:rPr>
-                  <a:t>cov_X.shape</a:t>
-                </a:r>
-                <a:r>
-                  <a:rPr i="1" dirty="0">
-                    <a:solidFill>
-                      <a:srgbClr val="60A0B0"/>
-                    </a:solidFill>
-                    <a:latin typeface="Courier"/>
-                  </a:rPr>
-                  <a:t>[0]))</a:t>
-                </a:r>
-                <a:br>
-                  <a:rPr dirty="0"/>
-                </a:br>
-                <a:r>
-                  <a:rPr dirty="0" err="1">
-                    <a:latin typeface="Courier"/>
-                  </a:rPr>
-                  <a:t>cov_X</a:t>
-                </a:r>
-                <a:r>
-                  <a:rPr dirty="0">
-                    <a:latin typeface="Courier"/>
-                  </a:rPr>
-                  <a:t> </a:t>
-                </a:r>
-                <a:r>
-                  <a:rPr dirty="0">
-                    <a:solidFill>
-                      <a:srgbClr val="666666"/>
-                    </a:solidFill>
-                    <a:latin typeface="Courier"/>
-                  </a:rPr>
-                  <a:t>=</a:t>
-                </a:r>
-                <a:r>
-                  <a:rPr dirty="0">
-                    <a:latin typeface="Courier"/>
-                  </a:rPr>
-                  <a:t> </a:t>
-                </a:r>
-                <a:r>
-                  <a:rPr dirty="0" err="1">
-                    <a:latin typeface="Courier"/>
-                  </a:rPr>
-                  <a:t>np.add</a:t>
-                </a:r>
-                <a:r>
-                  <a:rPr dirty="0">
-                    <a:latin typeface="Courier"/>
-                  </a:rPr>
-                  <a:t>(</a:t>
-                </a:r>
-                <a:r>
-                  <a:rPr dirty="0" err="1">
-                    <a:latin typeface="Courier"/>
-                  </a:rPr>
-                  <a:t>cov_X</a:t>
-                </a:r>
-                <a:r>
-                  <a:rPr dirty="0">
-                    <a:latin typeface="Courier"/>
-                  </a:rPr>
-                  <a:t>, </a:t>
-                </a:r>
-                <a:r>
-                  <a:rPr dirty="0" err="1">
-                    <a:latin typeface="Courier"/>
-                  </a:rPr>
-                  <a:t>alpha_sqr</a:t>
-                </a:r>
-                <a:r>
-                  <a:rPr dirty="0">
-                    <a:latin typeface="Courier"/>
-                  </a:rPr>
-                  <a:t>)</a:t>
-                </a:r>
-                <a:br>
-                  <a:rPr dirty="0"/>
-                </a:br>
-                <a:r>
-                  <a:rPr dirty="0" err="1">
-                    <a:latin typeface="Courier"/>
-                  </a:rPr>
-                  <a:t>np.real</a:t>
-                </a:r>
-                <a:r>
-                  <a:rPr dirty="0">
-                    <a:latin typeface="Courier"/>
-                  </a:rPr>
-                  <a:t>(</a:t>
-                </a:r>
-                <a:r>
-                  <a:rPr dirty="0" err="1">
-                    <a:latin typeface="Courier"/>
-                  </a:rPr>
-                  <a:t>np.linalg.eigvals</a:t>
-                </a:r>
-                <a:r>
-                  <a:rPr dirty="0">
-                    <a:latin typeface="Courier"/>
-                  </a:rPr>
-                  <a:t>(</a:t>
-                </a:r>
-                <a:r>
-                  <a:rPr dirty="0" err="1">
-                    <a:latin typeface="Courier"/>
-                  </a:rPr>
-                  <a:t>cov_X</a:t>
-                </a:r>
-                <a:r>
-                  <a:rPr dirty="0">
-                    <a:latin typeface="Courier"/>
-                  </a:rPr>
-                  <a:t>))</a:t>
-                </a:r>
-              </a:p>
-              <a:p>
-                <a:pPr lvl="0" indent="0">
-                  <a:buNone/>
-                </a:pPr>
-                <a:r>
-                  <a:rPr dirty="0">
-                    <a:latin typeface="Courier"/>
-                  </a:rPr>
-                  <a:t>## array([41.43783544, 13.44471885,  8.95600018,  2.47491505,  1.8218998 ,
-##         1.7220889 ,  0.21774255,  0.48848204,  0.55853941])</a:t>
-                </a:r>
-              </a:p>
-              <a:p>
-                <a:pPr marL="0" lvl="0" indent="0">
-                  <a:buNone/>
-                </a:pPr>
-                <a:r>
-                  <a:rPr dirty="0"/>
-                  <a:t>The condition number of the covariance is </a:t>
-                </a:r>
-                <a14:m>
-                  <m:oMath xmlns:m="http://schemas.openxmlformats.org/officeDocument/2006/math">
-                    <m:r>
-                      <a:rPr>
-                        <a:latin typeface="Cambria Math" panose="02040503050406030204" pitchFamily="18" charset="0"/>
-                      </a:rPr>
-                      <m:t>∼</m:t>
-                    </m:r>
-                    <m:r>
-                      <a:rPr>
-                        <a:latin typeface="Cambria Math" panose="02040503050406030204" pitchFamily="18" charset="0"/>
-                      </a:rPr>
-                      <m:t>74</m:t>
-                    </m:r>
-                  </m:oMath>
-                </a14:m>
-                <a:endParaRPr dirty="0"/>
-              </a:p>
-              <a:p>
-                <a:pPr lvl="0"/>
-                <a:r>
-                  <a:rPr dirty="0"/>
-                  <a:t>Notice that the largest and most influential eigenvalues hardly change</a:t>
-                </a:r>
-              </a:p>
-              <a:p>
-                <a:pPr lvl="0"/>
-                <a:r>
-                  <a:rPr dirty="0"/>
-                  <a:t>Limited bias in this case</a:t>
-                </a:r>
-              </a:p>
-            </p:txBody>
-          </p:sp>
-        </mc:Choice>
-        <mc:Fallback xmlns="">
-          <p:sp>
-            <p:nvSpPr>
-              <p:cNvPr id="3" name="Content Placeholder 2"/>
-              <p:cNvSpPr>
-                <a:spLocks noGrp="1" noRot="1" noChangeAspect="1" noMove="1" noResize="1" noEditPoints="1" noAdjustHandles="1" noChangeArrowheads="1" noChangeShapeType="1" noTextEdit="1"/>
-              </p:cNvSpPr>
-              <p:nvPr>
-                <p:ph idx="1"/>
-              </p:nvPr>
-            </p:nvSpPr>
-            <p:spPr>
-              <a:xfrm>
-                <a:off x="457200" y="1200151"/>
-                <a:ext cx="8229600" cy="3662794"/>
-              </a:xfrm>
-              <a:blipFill>
-                <a:blip r:embed="rId2"/>
-                <a:stretch>
-                  <a:fillRect t="-832"/>
-                </a:stretch>
-              </a:blipFill>
-            </p:spPr>
-            <p:txBody>
-              <a:bodyPr/>
-              <a:lstStyle/>
-              <a:p>
-                <a:r>
-                  <a:rPr lang="en-US">
-                    <a:noFill/>
-                  </a:rPr>
-                  <a:t> </a:t>
-                </a:r>
-              </a:p>
-            </p:txBody>
-          </p:sp>
-        </mc:Fallback>
-      </mc:AlternateContent>
-    </p:spTree>
-  </p:cSld>
-  <p:clrMapOvr>
-    <a:masterClrMapping/>
-  </p:clrMapOvr>
-</p:sld>
-</file>
-
-<file path=ppt/slides/slide31.xml><?xml version="1.0" encoding="utf-8"?>
 <p:sld xmlns:a="http://schemas.openxmlformats.org/drawingml/2006/main" xmlns:r="http://schemas.openxmlformats.org/officeDocument/2006/relationships" xmlns:p="http://schemas.openxmlformats.org/presentationml/2006/main">
   <p:cSld>
     <p:spTree>
@@ -20076,7 +19047,7 @@
 </p:sld>
 </file>
 
-<file path=ppt/slides/slide32.xml><?xml version="1.0" encoding="utf-8"?>
+<file path=ppt/slides/slide31.xml><?xml version="1.0" encoding="utf-8"?>
 <p:sld xmlns:a="http://schemas.openxmlformats.org/drawingml/2006/main" xmlns:r="http://schemas.openxmlformats.org/officeDocument/2006/relationships" xmlns:p="http://schemas.openxmlformats.org/presentationml/2006/main">
   <p:cSld>
     <p:spTree>
@@ -20785,7 +19756,7 @@
 </p:sld>
 </file>
 
-<file path=ppt/slides/slide33.xml><?xml version="1.0" encoding="utf-8"?>
+<file path=ppt/slides/slide32.xml><?xml version="1.0" encoding="utf-8"?>
 <p:sld xmlns:a="http://schemas.openxmlformats.org/drawingml/2006/main" xmlns:r="http://schemas.openxmlformats.org/officeDocument/2006/relationships" xmlns:p="http://schemas.openxmlformats.org/presentationml/2006/main">
   <p:cSld>
     <p:spTree>
@@ -20993,7 +19964,7 @@
 </p:sld>
 </file>
 
-<file path=ppt/slides/slide34.xml><?xml version="1.0" encoding="utf-8"?>
+<file path=ppt/slides/slide33.xml><?xml version="1.0" encoding="utf-8"?>
 <p:sld xmlns:a="http://schemas.openxmlformats.org/drawingml/2006/main" xmlns:r="http://schemas.openxmlformats.org/officeDocument/2006/relationships" xmlns:p="http://schemas.openxmlformats.org/presentationml/2006/main">
   <p:cSld>
     <p:spTree>
@@ -21034,8 +20005,8 @@
           </a:p>
         </p:txBody>
       </p:sp>
-      <mc:AlternateContent xmlns:mc="http://schemas.openxmlformats.org/markup-compatibility/2006" xmlns:a14="http://schemas.microsoft.com/office/drawing/2010/main">
-        <mc:Choice Requires="a14">
+      <mc:AlternateContent xmlns:mc="http://schemas.openxmlformats.org/markup-compatibility/2006">
+        <mc:Choice xmlns:a14="http://schemas.microsoft.com/office/drawing/2010/main" Requires="a14">
           <p:sp>
             <p:nvSpPr>
               <p:cNvPr id="3" name="Content Placeholder 2"/>
@@ -21049,7 +20020,7 @@
             <p:spPr/>
             <p:txBody>
               <a:bodyPr>
-                <a:normAutofit lnSpcReduction="10000"/>
+                <a:normAutofit fontScale="92500" lnSpcReduction="20000"/>
               </a:bodyPr>
               <a:lstStyle/>
               <a:p>
@@ -21079,126 +20050,173 @@
                     </m:oMathParaPr>
                     <m:oMath xmlns:m="http://schemas.openxmlformats.org/officeDocument/2006/math">
                       <m:r>
-                        <a:rPr lang="en-US">
+                        <a:rPr lang="ar-AE" i="1">
                           <a:latin typeface="Cambria Math" panose="02040503050406030204" pitchFamily="18" charset="0"/>
                         </a:rPr>
-                        <m:t>𝑚𝑖𝑛</m:t>
+                        <m:t>𝑚</m:t>
+                      </m:r>
+                      <m:r>
+                        <a:rPr lang="en-US" i="1">
+                          <a:latin typeface="Cambria Math" panose="02040503050406030204" pitchFamily="18" charset="0"/>
+                        </a:rPr>
+                        <m:t>𝑖𝑛</m:t>
                       </m:r>
                       <m:d>
                         <m:dPr>
                           <m:begChr m:val="["/>
                           <m:endChr m:val="]"/>
                           <m:ctrlPr>
-                            <a:rPr lang="ar-AE" i="1">
+                            <a:rPr lang="en-US" i="1">
                               <a:latin typeface="Cambria Math" panose="02040503050406030204" pitchFamily="18" charset="0"/>
                             </a:rPr>
                           </m:ctrlPr>
                         </m:dPr>
                         <m:e>
-                          <m:r>
-                            <a:rPr lang="ar-AE">
-                              <a:latin typeface="Cambria Math" panose="02040503050406030204" pitchFamily="18" charset="0"/>
-                            </a:rPr>
-                            <m:t>∥</m:t>
-                          </m:r>
-                          <m:r>
-                            <a:rPr lang="ar-AE">
-                              <a:latin typeface="Cambria Math" panose="02040503050406030204" pitchFamily="18" charset="0"/>
-                            </a:rPr>
-                            <m:t>𝐴</m:t>
-                          </m:r>
-                          <m:r>
-                            <a:rPr lang="ar-AE">
-                              <a:latin typeface="Cambria Math" panose="02040503050406030204" pitchFamily="18" charset="0"/>
-                            </a:rPr>
-                            <m:t>⋅</m:t>
-                          </m:r>
-                          <m:r>
-                            <a:rPr lang="ar-AE">
-                              <a:latin typeface="Cambria Math" panose="02040503050406030204" pitchFamily="18" charset="0"/>
-                            </a:rPr>
-                            <m:t>𝑥</m:t>
-                          </m:r>
-                          <m:r>
-                            <a:rPr lang="ar-AE">
-                              <a:latin typeface="Cambria Math" panose="02040503050406030204" pitchFamily="18" charset="0"/>
-                            </a:rPr>
-                            <m:t>−</m:t>
-                          </m:r>
-                          <m:r>
-                            <a:rPr lang="ar-AE">
-                              <a:latin typeface="Cambria Math" panose="02040503050406030204" pitchFamily="18" charset="0"/>
-                            </a:rPr>
-                            <m:t>𝑏</m:t>
-                          </m:r>
-                          <m:r>
-                            <a:rPr lang="ar-AE">
-                              <a:latin typeface="Cambria Math" panose="02040503050406030204" pitchFamily="18" charset="0"/>
-                            </a:rPr>
-                            <m:t>∥+ </m:t>
-                          </m:r>
-                          <m:sSup>
-                            <m:sSupPr>
+                          <m:sSubSup>
+                            <m:sSubSupPr>
                               <m:ctrlPr>
-                                <a:rPr lang="ar-AE" i="1">
+                                <a:rPr lang="en-US" i="1">
                                   <a:latin typeface="Cambria Math" panose="02040503050406030204" pitchFamily="18" charset="0"/>
                                 </a:rPr>
                               </m:ctrlPr>
-                            </m:sSupPr>
+                            </m:sSubSupPr>
                             <m:e>
+                              <m:f>
+                                <m:fPr>
+                                  <m:ctrlPr>
+                                    <a:rPr lang="en-US" i="1">
+                                      <a:latin typeface="Cambria Math" panose="02040503050406030204" pitchFamily="18" charset="0"/>
+                                    </a:rPr>
+                                  </m:ctrlPr>
+                                </m:fPr>
+                                <m:num>
+                                  <m:r>
+                                    <a:rPr lang="en-US" i="1">
+                                      <a:latin typeface="Cambria Math" panose="02040503050406030204" pitchFamily="18" charset="0"/>
+                                    </a:rPr>
+                                    <m:t>1</m:t>
+                                  </m:r>
+                                </m:num>
+                                <m:den>
+                                  <m:r>
+                                    <a:rPr lang="en-US" i="1">
+                                      <a:latin typeface="Cambria Math" panose="02040503050406030204" pitchFamily="18" charset="0"/>
+                                    </a:rPr>
+                                    <m:t>2</m:t>
+                                  </m:r>
+                                  <m:r>
+                                    <a:rPr lang="en-US" i="1">
+                                      <a:latin typeface="Cambria Math" panose="02040503050406030204" pitchFamily="18" charset="0"/>
+                                    </a:rPr>
+                                    <m:t>𝑛</m:t>
+                                  </m:r>
+                                </m:den>
+                              </m:f>
+                              <m:d>
+                                <m:dPr>
+                                  <m:begChr m:val="‖"/>
+                                  <m:endChr m:val="‖"/>
+                                  <m:ctrlPr>
+                                    <a:rPr lang="en-US" i="1">
+                                      <a:latin typeface="Cambria Math" panose="02040503050406030204" pitchFamily="18" charset="0"/>
+                                    </a:rPr>
+                                  </m:ctrlPr>
+                                </m:dPr>
+                                <m:e>
+                                  <m:r>
+                                    <a:rPr lang="en-US" i="1">
+                                      <a:latin typeface="Cambria Math" panose="02040503050406030204" pitchFamily="18" charset="0"/>
+                                    </a:rPr>
+                                    <m:t>𝐴𝑥</m:t>
+                                  </m:r>
+                                  <m:r>
+                                    <a:rPr lang="en-US" i="1">
+                                      <a:latin typeface="Cambria Math" panose="02040503050406030204" pitchFamily="18" charset="0"/>
+                                    </a:rPr>
+                                    <m:t>−</m:t>
+                                  </m:r>
+                                  <m:r>
+                                    <a:rPr lang="en-US" i="1">
+                                      <a:latin typeface="Cambria Math" panose="02040503050406030204" pitchFamily="18" charset="0"/>
+                                    </a:rPr>
+                                    <m:t>𝑏</m:t>
+                                  </m:r>
+                                </m:e>
+                              </m:d>
+                            </m:e>
+                            <m:sub>
                               <m:r>
-                                <a:rPr lang="ar-AE">
+                                <a:rPr lang="en-US" i="1">
                                   <a:latin typeface="Cambria Math" panose="02040503050406030204" pitchFamily="18" charset="0"/>
                                 </a:rPr>
-                                <m:t>𝛼</m:t>
+                                <m:t>2</m:t>
                               </m:r>
-                            </m:e>
+                            </m:sub>
                             <m:sup>
                               <m:r>
-                                <a:rPr lang="ar-AE">
+                                <a:rPr lang="en-US" i="1">
                                   <a:latin typeface="Cambria Math" panose="02040503050406030204" pitchFamily="18" charset="0"/>
                                 </a:rPr>
                                 <m:t>2</m:t>
                               </m:r>
                             </m:sup>
-                          </m:sSup>
+                          </m:sSubSup>
                           <m:r>
-                            <a:rPr lang="ar-AE">
+                            <a:rPr lang="en-US" i="1">
                               <a:latin typeface="Cambria Math" panose="02040503050406030204" pitchFamily="18" charset="0"/>
+                              <a:ea typeface="Cambria Math" panose="02040503050406030204" pitchFamily="18" charset="0"/>
                             </a:rPr>
-                            <m:t>∥</m:t>
+                            <m:t>+</m:t>
                           </m:r>
                           <m:r>
-                            <a:rPr lang="ar-AE">
+                            <a:rPr lang="en-US" i="1">
                               <a:latin typeface="Cambria Math" panose="02040503050406030204" pitchFamily="18" charset="0"/>
+                              <a:ea typeface="Cambria Math" panose="02040503050406030204" pitchFamily="18" charset="0"/>
                             </a:rPr>
-                            <m:t>𝑏</m:t>
+                            <m:t>𝛼</m:t>
                           </m:r>
-                          <m:sSup>
-                            <m:sSupPr>
+                          <m:sSub>
+                            <m:sSubPr>
                               <m:ctrlPr>
-                                <a:rPr lang="ar-AE" i="1">
+                                <a:rPr lang="en-US" i="1">
                                   <a:latin typeface="Cambria Math" panose="02040503050406030204" pitchFamily="18" charset="0"/>
+                                  <a:ea typeface="Cambria Math" panose="02040503050406030204" pitchFamily="18" charset="0"/>
                                 </a:rPr>
                               </m:ctrlPr>
-                            </m:sSupPr>
+                            </m:sSubPr>
                             <m:e>
+                              <m:d>
+                                <m:dPr>
+                                  <m:begChr m:val="‖"/>
+                                  <m:endChr m:val="‖"/>
+                                  <m:ctrlPr>
+                                    <a:rPr lang="en-US" i="1">
+                                      <a:latin typeface="Cambria Math" panose="02040503050406030204" pitchFamily="18" charset="0"/>
+                                      <a:ea typeface="Cambria Math" panose="02040503050406030204" pitchFamily="18" charset="0"/>
+                                    </a:rPr>
+                                  </m:ctrlPr>
+                                </m:dPr>
+                                <m:e>
+                                  <m:r>
+                                    <a:rPr lang="en-US" i="1">
+                                      <a:latin typeface="Cambria Math" panose="02040503050406030204" pitchFamily="18" charset="0"/>
+                                      <a:ea typeface="Cambria Math" panose="02040503050406030204" pitchFamily="18" charset="0"/>
+                                    </a:rPr>
+                                    <m:t>𝑏</m:t>
+                                  </m:r>
+                                </m:e>
+                              </m:d>
+                            </m:e>
+                            <m:sub>
                               <m:r>
-                                <a:rPr lang="ar-AE">
+                                <a:rPr lang="en-US" i="1">
                                   <a:latin typeface="Cambria Math" panose="02040503050406030204" pitchFamily="18" charset="0"/>
-                                </a:rPr>
-                                <m:t>∥</m:t>
-                              </m:r>
-                            </m:e>
-                            <m:sup>
-                              <m:r>
-                                <a:rPr lang="ar-AE">
-                                  <a:latin typeface="Cambria Math" panose="02040503050406030204" pitchFamily="18" charset="0"/>
+                                  <a:ea typeface="Cambria Math" panose="02040503050406030204" pitchFamily="18" charset="0"/>
                                 </a:rPr>
                                 <m:t>1</m:t>
                               </m:r>
-                            </m:sup>
-                          </m:sSup>
+                            </m:sub>
+                          </m:sSub>
                         </m:e>
                       </m:d>
                     </m:oMath>
@@ -21638,7 +20656,7 @@
             </p:txBody>
           </p:sp>
         </mc:Choice>
-        <mc:Fallback xmlns="">
+        <mc:Fallback>
           <p:sp>
             <p:nvSpPr>
               <p:cNvPr id="3" name="Content Placeholder 2"/>
@@ -21653,7 +20671,7 @@
               <a:blipFill>
                 <a:blip r:embed="rId2"/>
                 <a:stretch>
-                  <a:fillRect l="-1111" t="-2513" b="-1257"/>
+                  <a:fillRect l="-963" t="-3052"/>
                 </a:stretch>
               </a:blipFill>
             </p:spPr>
@@ -21680,7 +20698,7 @@
 </p:sld>
 </file>
 
-<file path=ppt/slides/slide35.xml><?xml version="1.0" encoding="utf-8"?>
+<file path=ppt/slides/slide34.xml><?xml version="1.0" encoding="utf-8"?>
 <p:sld xmlns:a="http://schemas.openxmlformats.org/drawingml/2006/main" xmlns:r="http://schemas.openxmlformats.org/officeDocument/2006/relationships" xmlns:p="http://schemas.openxmlformats.org/presentationml/2006/main">
   <p:cSld>
     <p:spTree>
@@ -21825,7 +20843,7 @@
 </p:sld>
 </file>
 
-<file path=ppt/slides/slide36.xml><?xml version="1.0" encoding="utf-8"?>
+<file path=ppt/slides/slide35.xml><?xml version="1.0" encoding="utf-8"?>
 <p:sld xmlns:a="http://schemas.openxmlformats.org/drawingml/2006/main" xmlns:r="http://schemas.openxmlformats.org/officeDocument/2006/relationships" xmlns:p="http://schemas.openxmlformats.org/presentationml/2006/main">
   <p:cSld>
     <p:spTree>
@@ -21992,7 +21010,7 @@
 </p:sld>
 </file>
 
-<file path=ppt/slides/slide37.xml><?xml version="1.0" encoding="utf-8"?>
+<file path=ppt/slides/slide36.xml><?xml version="1.0" encoding="utf-8"?>
 <p:sld xmlns:a="http://schemas.openxmlformats.org/drawingml/2006/main" xmlns:r="http://schemas.openxmlformats.org/officeDocument/2006/relationships" xmlns:p="http://schemas.openxmlformats.org/presentationml/2006/main">
   <p:cSld>
     <p:spTree>
@@ -22201,6 +21219,558 @@
 </p:sld>
 </file>
 
+<file path=ppt/slides/slide37.xml><?xml version="1.0" encoding="utf-8"?>
+<p:sld xmlns:a="http://schemas.openxmlformats.org/drawingml/2006/main" xmlns:r="http://schemas.openxmlformats.org/officeDocument/2006/relationships" xmlns:p="http://schemas.openxmlformats.org/presentationml/2006/main">
+  <p:cSld>
+    <p:spTree>
+      <p:nvGrpSpPr>
+        <p:cNvPr id="1" name=""/>
+        <p:cNvGrpSpPr/>
+        <p:nvPr/>
+      </p:nvGrpSpPr>
+      <p:grpSpPr>
+        <a:xfrm>
+          <a:off x="0" y="0"/>
+          <a:ext cx="0" cy="0"/>
+          <a:chOff x="0" y="0"/>
+          <a:chExt cx="0" cy="0"/>
+        </a:xfrm>
+      </p:grpSpPr>
+      <p:sp>
+        <p:nvSpPr>
+          <p:cNvPr id="2" name="Title 1"/>
+          <p:cNvSpPr>
+            <a:spLocks noGrp="1"/>
+          </p:cNvSpPr>
+          <p:nvPr>
+            <p:ph type="title"/>
+          </p:nvPr>
+        </p:nvSpPr>
+        <p:spPr/>
+        <p:txBody>
+          <a:bodyPr/>
+          <a:lstStyle/>
+          <a:p>
+            <a:pPr marL="0" lvl="0" indent="0">
+              <a:buNone/>
+            </a:pPr>
+            <a:r>
+              <a:rPr dirty="0" err="1"/>
+              <a:t>ElasticNet</a:t>
+            </a:r>
+            <a:r>
+              <a:rPr dirty="0"/>
+              <a:t> Regularization</a:t>
+            </a:r>
+          </a:p>
+        </p:txBody>
+      </p:sp>
+      <mc:AlternateContent xmlns:mc="http://schemas.openxmlformats.org/markup-compatibility/2006">
+        <mc:Choice xmlns:a14="http://schemas.microsoft.com/office/drawing/2010/main" Requires="a14">
+          <p:sp>
+            <p:nvSpPr>
+              <p:cNvPr id="3" name="Content Placeholder 2"/>
+              <p:cNvSpPr>
+                <a:spLocks noGrp="1"/>
+              </p:cNvSpPr>
+              <p:nvPr>
+                <p:ph idx="1"/>
+              </p:nvPr>
+            </p:nvSpPr>
+            <p:spPr>
+              <a:xfrm>
+                <a:off x="457200" y="1061770"/>
+                <a:ext cx="8229600" cy="3836085"/>
+              </a:xfrm>
+            </p:spPr>
+            <p:txBody>
+              <a:bodyPr>
+                <a:normAutofit fontScale="85000" lnSpcReduction="20000"/>
+              </a:bodyPr>
+              <a:lstStyle/>
+              <a:p>
+                <a:pPr marL="0" lvl="0" indent="0">
+                  <a:buNone/>
+                </a:pPr>
+                <a:r>
+                  <a:rPr lang="en-US" dirty="0"/>
+                  <a:t>Do we always have to choose between the soft L2 constraint and the hard L1 constraint?</a:t>
+                </a:r>
+              </a:p>
+              <a:p>
+                <a:pPr lvl="0"/>
+                <a:r>
+                  <a:rPr lang="en-US" dirty="0"/>
+                  <a:t>L2 regularization works well for </a:t>
+                </a:r>
+                <a:r>
+                  <a:rPr lang="en-US" b="1" dirty="0"/>
+                  <a:t>colinear features</a:t>
+                </a:r>
+                <a:r>
+                  <a:rPr lang="en-US" dirty="0"/>
+                  <a:t> as a soft constraint</a:t>
+                </a:r>
+              </a:p>
+              <a:p>
+                <a:pPr lvl="1"/>
+                <a:r>
+                  <a:rPr lang="en-US" dirty="0"/>
+                  <a:t>Down-weights coefficients of colinear features</a:t>
+                </a:r>
+              </a:p>
+              <a:p>
+                <a:pPr lvl="1"/>
+                <a:r>
+                  <a:rPr lang="en-US" dirty="0"/>
+                  <a:t>But soft constraint gives poor model selection</a:t>
+                </a:r>
+              </a:p>
+              <a:p>
+                <a:pPr lvl="0"/>
+                <a:r>
+                  <a:rPr lang="en-US" dirty="0"/>
+                  <a:t>L1 regularization provides </a:t>
+                </a:r>
+                <a:r>
+                  <a:rPr lang="en-US" b="1" dirty="0"/>
+                  <a:t>good model selection</a:t>
+                </a:r>
+                <a:r>
+                  <a:rPr lang="en-US" dirty="0"/>
+                  <a:t> as a hard constraint</a:t>
+                </a:r>
+              </a:p>
+              <a:p>
+                <a:pPr lvl="1"/>
+                <a:r>
+                  <a:rPr lang="en-US" dirty="0"/>
+                  <a:t>Drives coefficients of non-informative variables to 0</a:t>
+                </a:r>
+              </a:p>
+              <a:p>
+                <a:pPr lvl="1"/>
+                <a:r>
+                  <a:rPr lang="en-US" dirty="0"/>
+                  <a:t>But poor selection for colinear features</a:t>
+                </a:r>
+              </a:p>
+              <a:p>
+                <a:pPr lvl="0"/>
+                <a:r>
+                  <a:rPr lang="en-US" dirty="0"/>
+                  <a:t>The </a:t>
+                </a:r>
+                <a:r>
+                  <a:rPr lang="en-US" b="1" dirty="0"/>
+                  <a:t>Elastic Net</a:t>
+                </a:r>
+                <a:r>
+                  <a:rPr lang="en-US" dirty="0"/>
+                  <a:t> weights L1 and L2 regularization</a:t>
+                </a:r>
+              </a:p>
+              <a:p>
+                <a:pPr lvl="1"/>
+                <a:r>
+                  <a:rPr lang="en-US" dirty="0"/>
+                  <a:t>Hyperparameter </a:t>
+                </a:r>
+                <a14:m>
+                  <m:oMath xmlns:m="http://schemas.openxmlformats.org/officeDocument/2006/math">
+                    <m:r>
+                      <a:rPr lang="en-US">
+                        <a:latin typeface="Cambria Math" panose="02040503050406030204" pitchFamily="18" charset="0"/>
+                      </a:rPr>
+                      <m:t>𝜆</m:t>
+                    </m:r>
+                  </m:oMath>
+                </a14:m>
+                <a:r>
+                  <a:rPr lang="en-US" dirty="0"/>
+                  <a:t> weights L1 vs. L2 regularization</a:t>
+                </a:r>
+              </a:p>
+              <a:p>
+                <a:pPr lvl="1"/>
+                <a:r>
+                  <a:rPr lang="en-US" dirty="0"/>
+                  <a:t>Hyperparameter </a:t>
+                </a:r>
+                <a14:m>
+                  <m:oMath xmlns:m="http://schemas.openxmlformats.org/officeDocument/2006/math">
+                    <m:r>
+                      <a:rPr lang="en-US">
+                        <a:latin typeface="Cambria Math" panose="02040503050406030204" pitchFamily="18" charset="0"/>
+                      </a:rPr>
+                      <m:t>𝛼</m:t>
+                    </m:r>
+                  </m:oMath>
+                </a14:m>
+                <a:r>
+                  <a:rPr lang="en-US" dirty="0"/>
+                  <a:t> sets strength of regularization</a:t>
+                </a:r>
+              </a:p>
+              <a:p>
+                <a:pPr marL="0" lvl="0" indent="0">
+                  <a:buNone/>
+                </a:pPr>
+                <a14:m>
+                  <m:oMathPara xmlns:m="http://schemas.openxmlformats.org/officeDocument/2006/math">
+                    <m:oMathParaPr>
+                      <m:jc m:val="center"/>
+                    </m:oMathParaPr>
+                    <m:oMath xmlns:m="http://schemas.openxmlformats.org/officeDocument/2006/math">
+                      <m:r>
+                        <a:rPr lang="ar-AE" b="0" i="1" smtClean="0">
+                          <a:latin typeface="Cambria Math" panose="02040503050406030204" pitchFamily="18" charset="0"/>
+                        </a:rPr>
+                        <m:t>𝑚</m:t>
+                      </m:r>
+                      <m:r>
+                        <a:rPr lang="en-US" b="0" i="1" smtClean="0">
+                          <a:latin typeface="Cambria Math" panose="02040503050406030204" pitchFamily="18" charset="0"/>
+                        </a:rPr>
+                        <m:t>𝑖𝑛</m:t>
+                      </m:r>
+                      <m:d>
+                        <m:dPr>
+                          <m:begChr m:val="["/>
+                          <m:endChr m:val="]"/>
+                          <m:ctrlPr>
+                            <a:rPr lang="en-US" b="0" i="1" smtClean="0">
+                              <a:latin typeface="Cambria Math" panose="02040503050406030204" pitchFamily="18" charset="0"/>
+                            </a:rPr>
+                          </m:ctrlPr>
+                        </m:dPr>
+                        <m:e>
+                          <m:sSubSup>
+                            <m:sSubSupPr>
+                              <m:ctrlPr>
+                                <a:rPr lang="en-US" b="0" i="1" smtClean="0">
+                                  <a:latin typeface="Cambria Math" panose="02040503050406030204" pitchFamily="18" charset="0"/>
+                                </a:rPr>
+                              </m:ctrlPr>
+                            </m:sSubSupPr>
+                            <m:e>
+                              <m:f>
+                                <m:fPr>
+                                  <m:ctrlPr>
+                                    <a:rPr lang="en-US" b="0" i="1" smtClean="0">
+                                      <a:latin typeface="Cambria Math" panose="02040503050406030204" pitchFamily="18" charset="0"/>
+                                    </a:rPr>
+                                  </m:ctrlPr>
+                                </m:fPr>
+                                <m:num>
+                                  <m:r>
+                                    <a:rPr lang="en-US" b="0" i="1" smtClean="0">
+                                      <a:latin typeface="Cambria Math" panose="02040503050406030204" pitchFamily="18" charset="0"/>
+                                    </a:rPr>
+                                    <m:t>1</m:t>
+                                  </m:r>
+                                </m:num>
+                                <m:den>
+                                  <m:r>
+                                    <a:rPr lang="en-US" b="0" i="1" smtClean="0">
+                                      <a:latin typeface="Cambria Math" panose="02040503050406030204" pitchFamily="18" charset="0"/>
+                                    </a:rPr>
+                                    <m:t>2</m:t>
+                                  </m:r>
+                                  <m:r>
+                                    <a:rPr lang="en-US" b="0" i="1" smtClean="0">
+                                      <a:latin typeface="Cambria Math" panose="02040503050406030204" pitchFamily="18" charset="0"/>
+                                    </a:rPr>
+                                    <m:t>𝑛</m:t>
+                                  </m:r>
+                                </m:den>
+                              </m:f>
+                              <m:d>
+                                <m:dPr>
+                                  <m:begChr m:val="‖"/>
+                                  <m:endChr m:val="‖"/>
+                                  <m:ctrlPr>
+                                    <a:rPr lang="en-US" b="0" i="1" smtClean="0">
+                                      <a:latin typeface="Cambria Math" panose="02040503050406030204" pitchFamily="18" charset="0"/>
+                                    </a:rPr>
+                                  </m:ctrlPr>
+                                </m:dPr>
+                                <m:e>
+                                  <m:r>
+                                    <a:rPr lang="en-US" b="0" i="1" smtClean="0">
+                                      <a:latin typeface="Cambria Math" panose="02040503050406030204" pitchFamily="18" charset="0"/>
+                                    </a:rPr>
+                                    <m:t>𝐴𝑥</m:t>
+                                  </m:r>
+                                  <m:r>
+                                    <a:rPr lang="en-US" b="0" i="1" smtClean="0">
+                                      <a:latin typeface="Cambria Math" panose="02040503050406030204" pitchFamily="18" charset="0"/>
+                                    </a:rPr>
+                                    <m:t>−</m:t>
+                                  </m:r>
+                                  <m:r>
+                                    <a:rPr lang="en-US" b="0" i="1" smtClean="0">
+                                      <a:latin typeface="Cambria Math" panose="02040503050406030204" pitchFamily="18" charset="0"/>
+                                    </a:rPr>
+                                    <m:t>𝑏</m:t>
+                                  </m:r>
+                                </m:e>
+                              </m:d>
+                            </m:e>
+                            <m:sub>
+                              <m:r>
+                                <a:rPr lang="en-US" b="0" i="1" smtClean="0">
+                                  <a:latin typeface="Cambria Math" panose="02040503050406030204" pitchFamily="18" charset="0"/>
+                                </a:rPr>
+                                <m:t>2</m:t>
+                              </m:r>
+                            </m:sub>
+                            <m:sup>
+                              <m:r>
+                                <a:rPr lang="en-US" b="0" i="1" smtClean="0">
+                                  <a:latin typeface="Cambria Math" panose="02040503050406030204" pitchFamily="18" charset="0"/>
+                                </a:rPr>
+                                <m:t>2</m:t>
+                              </m:r>
+                            </m:sup>
+                          </m:sSubSup>
+                          <m:r>
+                            <a:rPr lang="en-US" b="0" i="1" smtClean="0">
+                              <a:latin typeface="Cambria Math" panose="02040503050406030204" pitchFamily="18" charset="0"/>
+                            </a:rPr>
+                            <m:t>+(</m:t>
+                          </m:r>
+                          <m:r>
+                            <a:rPr lang="en-US" b="0" i="1" smtClean="0">
+                              <a:latin typeface="Cambria Math" panose="02040503050406030204" pitchFamily="18" charset="0"/>
+                            </a:rPr>
+                            <m:t>1</m:t>
+                          </m:r>
+                          <m:r>
+                            <a:rPr lang="en-US" b="0" i="1" smtClean="0">
+                              <a:latin typeface="Cambria Math" panose="02040503050406030204" pitchFamily="18" charset="0"/>
+                            </a:rPr>
+                            <m:t>−</m:t>
+                          </m:r>
+                          <m:r>
+                            <a:rPr lang="en-US" b="0" i="1" smtClean="0">
+                              <a:latin typeface="Cambria Math" panose="02040503050406030204" pitchFamily="18" charset="0"/>
+                              <a:ea typeface="Cambria Math" panose="02040503050406030204" pitchFamily="18" charset="0"/>
+                            </a:rPr>
+                            <m:t>𝜆</m:t>
+                          </m:r>
+                          <m:r>
+                            <a:rPr lang="en-US" b="0" i="1" smtClean="0">
+                              <a:latin typeface="Cambria Math" panose="02040503050406030204" pitchFamily="18" charset="0"/>
+                              <a:ea typeface="Cambria Math" panose="02040503050406030204" pitchFamily="18" charset="0"/>
+                            </a:rPr>
+                            <m:t>)</m:t>
+                          </m:r>
+                          <m:f>
+                            <m:fPr>
+                              <m:ctrlPr>
+                                <a:rPr lang="en-US" b="0" i="1" smtClean="0">
+                                  <a:latin typeface="Cambria Math" panose="02040503050406030204" pitchFamily="18" charset="0"/>
+                                  <a:ea typeface="Cambria Math" panose="02040503050406030204" pitchFamily="18" charset="0"/>
+                                </a:rPr>
+                              </m:ctrlPr>
+                            </m:fPr>
+                            <m:num>
+                              <m:r>
+                                <a:rPr lang="en-US" b="0" i="1" smtClean="0">
+                                  <a:latin typeface="Cambria Math" panose="02040503050406030204" pitchFamily="18" charset="0"/>
+                                  <a:ea typeface="Cambria Math" panose="02040503050406030204" pitchFamily="18" charset="0"/>
+                                </a:rPr>
+                                <m:t>𝛼</m:t>
+                              </m:r>
+                            </m:num>
+                            <m:den>
+                              <m:r>
+                                <a:rPr lang="en-US" b="0" i="1" smtClean="0">
+                                  <a:latin typeface="Cambria Math" panose="02040503050406030204" pitchFamily="18" charset="0"/>
+                                  <a:ea typeface="Cambria Math" panose="02040503050406030204" pitchFamily="18" charset="0"/>
+                                </a:rPr>
+                                <m:t>2</m:t>
+                              </m:r>
+                            </m:den>
+                          </m:f>
+                          <m:sSubSup>
+                            <m:sSubSupPr>
+                              <m:ctrlPr>
+                                <a:rPr lang="en-US" b="0" i="1" smtClean="0">
+                                  <a:latin typeface="Cambria Math" panose="02040503050406030204" pitchFamily="18" charset="0"/>
+                                  <a:ea typeface="Cambria Math" panose="02040503050406030204" pitchFamily="18" charset="0"/>
+                                </a:rPr>
+                              </m:ctrlPr>
+                            </m:sSubSupPr>
+                            <m:e>
+                              <m:d>
+                                <m:dPr>
+                                  <m:begChr m:val="‖"/>
+                                  <m:endChr m:val="‖"/>
+                                  <m:ctrlPr>
+                                    <a:rPr lang="en-US" b="0" i="1" smtClean="0">
+                                      <a:latin typeface="Cambria Math" panose="02040503050406030204" pitchFamily="18" charset="0"/>
+                                      <a:ea typeface="Cambria Math" panose="02040503050406030204" pitchFamily="18" charset="0"/>
+                                    </a:rPr>
+                                  </m:ctrlPr>
+                                </m:dPr>
+                                <m:e>
+                                  <m:r>
+                                    <a:rPr lang="en-US" b="0" i="1" smtClean="0">
+                                      <a:latin typeface="Cambria Math" panose="02040503050406030204" pitchFamily="18" charset="0"/>
+                                      <a:ea typeface="Cambria Math" panose="02040503050406030204" pitchFamily="18" charset="0"/>
+                                    </a:rPr>
+                                    <m:t>𝑏</m:t>
+                                  </m:r>
+                                </m:e>
+                              </m:d>
+                            </m:e>
+                            <m:sub>
+                              <m:r>
+                                <a:rPr lang="en-US" b="0" i="1" smtClean="0">
+                                  <a:latin typeface="Cambria Math" panose="02040503050406030204" pitchFamily="18" charset="0"/>
+                                  <a:ea typeface="Cambria Math" panose="02040503050406030204" pitchFamily="18" charset="0"/>
+                                </a:rPr>
+                                <m:t>2</m:t>
+                              </m:r>
+                            </m:sub>
+                            <m:sup>
+                              <m:r>
+                                <a:rPr lang="en-US" b="0" i="1" smtClean="0">
+                                  <a:latin typeface="Cambria Math" panose="02040503050406030204" pitchFamily="18" charset="0"/>
+                                  <a:ea typeface="Cambria Math" panose="02040503050406030204" pitchFamily="18" charset="0"/>
+                                </a:rPr>
+                                <m:t>2</m:t>
+                              </m:r>
+                            </m:sup>
+                          </m:sSubSup>
+                          <m:r>
+                            <a:rPr lang="en-US" b="0" i="1" smtClean="0">
+                              <a:latin typeface="Cambria Math" panose="02040503050406030204" pitchFamily="18" charset="0"/>
+                              <a:ea typeface="Cambria Math" panose="02040503050406030204" pitchFamily="18" charset="0"/>
+                            </a:rPr>
+                            <m:t>+</m:t>
+                          </m:r>
+                          <m:r>
+                            <a:rPr lang="en-US" b="0" i="1" smtClean="0">
+                              <a:latin typeface="Cambria Math" panose="02040503050406030204" pitchFamily="18" charset="0"/>
+                              <a:ea typeface="Cambria Math" panose="02040503050406030204" pitchFamily="18" charset="0"/>
+                            </a:rPr>
+                            <m:t>𝜆</m:t>
+                          </m:r>
+                          <m:r>
+                            <a:rPr lang="en-US" b="0" i="1" smtClean="0">
+                              <a:latin typeface="Cambria Math" panose="02040503050406030204" pitchFamily="18" charset="0"/>
+                              <a:ea typeface="Cambria Math" panose="02040503050406030204" pitchFamily="18" charset="0"/>
+                            </a:rPr>
+                            <m:t> </m:t>
+                          </m:r>
+                          <m:r>
+                            <a:rPr lang="en-US" b="0" i="1" smtClean="0">
+                              <a:latin typeface="Cambria Math" panose="02040503050406030204" pitchFamily="18" charset="0"/>
+                              <a:ea typeface="Cambria Math" panose="02040503050406030204" pitchFamily="18" charset="0"/>
+                            </a:rPr>
+                            <m:t>𝛼</m:t>
+                          </m:r>
+                          <m:sSub>
+                            <m:sSubPr>
+                              <m:ctrlPr>
+                                <a:rPr lang="en-US" b="0" i="1" smtClean="0">
+                                  <a:latin typeface="Cambria Math" panose="02040503050406030204" pitchFamily="18" charset="0"/>
+                                  <a:ea typeface="Cambria Math" panose="02040503050406030204" pitchFamily="18" charset="0"/>
+                                </a:rPr>
+                              </m:ctrlPr>
+                            </m:sSubPr>
+                            <m:e>
+                              <m:d>
+                                <m:dPr>
+                                  <m:begChr m:val="‖"/>
+                                  <m:endChr m:val="‖"/>
+                                  <m:ctrlPr>
+                                    <a:rPr lang="en-US" b="0" i="1" smtClean="0">
+                                      <a:latin typeface="Cambria Math" panose="02040503050406030204" pitchFamily="18" charset="0"/>
+                                      <a:ea typeface="Cambria Math" panose="02040503050406030204" pitchFamily="18" charset="0"/>
+                                    </a:rPr>
+                                  </m:ctrlPr>
+                                </m:dPr>
+                                <m:e>
+                                  <m:r>
+                                    <a:rPr lang="en-US" b="0" i="1" smtClean="0">
+                                      <a:latin typeface="Cambria Math" panose="02040503050406030204" pitchFamily="18" charset="0"/>
+                                      <a:ea typeface="Cambria Math" panose="02040503050406030204" pitchFamily="18" charset="0"/>
+                                    </a:rPr>
+                                    <m:t>𝑏</m:t>
+                                  </m:r>
+                                </m:e>
+                              </m:d>
+                            </m:e>
+                            <m:sub>
+                              <m:r>
+                                <a:rPr lang="en-US" b="0" i="1" smtClean="0">
+                                  <a:latin typeface="Cambria Math" panose="02040503050406030204" pitchFamily="18" charset="0"/>
+                                  <a:ea typeface="Cambria Math" panose="02040503050406030204" pitchFamily="18" charset="0"/>
+                                </a:rPr>
+                                <m:t>1</m:t>
+                              </m:r>
+                            </m:sub>
+                          </m:sSub>
+                        </m:e>
+                      </m:d>
+                    </m:oMath>
+                  </m:oMathPara>
+                </a14:m>
+                <a:endParaRPr dirty="0"/>
+              </a:p>
+            </p:txBody>
+          </p:sp>
+        </mc:Choice>
+        <mc:Fallback>
+          <p:sp>
+            <p:nvSpPr>
+              <p:cNvPr id="3" name="Content Placeholder 2"/>
+              <p:cNvSpPr>
+                <a:spLocks noGrp="1" noRot="1" noChangeAspect="1" noMove="1" noResize="1" noEditPoints="1" noAdjustHandles="1" noChangeArrowheads="1" noChangeShapeType="1" noTextEdit="1"/>
+              </p:cNvSpPr>
+              <p:nvPr>
+                <p:ph idx="1"/>
+              </p:nvPr>
+            </p:nvSpPr>
+            <p:spPr>
+              <a:xfrm>
+                <a:off x="457200" y="1061770"/>
+                <a:ext cx="8229600" cy="3836085"/>
+              </a:xfrm>
+              <a:blipFill>
+                <a:blip r:embed="rId2"/>
+                <a:stretch>
+                  <a:fillRect l="-741" t="-2226"/>
+                </a:stretch>
+              </a:blipFill>
+            </p:spPr>
+            <p:txBody>
+              <a:bodyPr/>
+              <a:lstStyle/>
+              <a:p>
+                <a:r>
+                  <a:rPr lang="en-US">
+                    <a:noFill/>
+                  </a:rPr>
+                  <a:t> </a:t>
+                </a:r>
+              </a:p>
+            </p:txBody>
+          </p:sp>
+        </mc:Fallback>
+      </mc:AlternateContent>
+    </p:spTree>
+  </p:cSld>
+  <p:clrMapOvr>
+    <a:masterClrMapping/>
+  </p:clrMapOvr>
+</p:sld>
+</file>
+
 <file path=ppt/slides/slide38.xml><?xml version="1.0" encoding="utf-8"?>
 <p:sld xmlns:a="http://schemas.openxmlformats.org/drawingml/2006/main" xmlns:r="http://schemas.openxmlformats.org/officeDocument/2006/relationships" xmlns:p="http://schemas.openxmlformats.org/presentationml/2006/main">
   <p:cSld>
@@ -22247,457 +21817,162 @@
           </a:p>
         </p:txBody>
       </p:sp>
-      <mc:AlternateContent xmlns:mc="http://schemas.openxmlformats.org/markup-compatibility/2006" xmlns:a14="http://schemas.microsoft.com/office/drawing/2010/main">
-        <mc:Choice Requires="a14">
-          <p:sp>
-            <p:nvSpPr>
-              <p:cNvPr id="3" name="Content Placeholder 2"/>
-              <p:cNvSpPr>
-                <a:spLocks noGrp="1"/>
-              </p:cNvSpPr>
-              <p:nvPr>
-                <p:ph idx="1"/>
-              </p:nvPr>
-            </p:nvSpPr>
-            <p:spPr>
-              <a:xfrm>
-                <a:off x="457200" y="1101436"/>
-                <a:ext cx="8229600" cy="3836085"/>
-              </a:xfrm>
-            </p:spPr>
-            <p:txBody>
-              <a:bodyPr>
-                <a:normAutofit fontScale="85000" lnSpcReduction="10000"/>
-              </a:bodyPr>
-              <a:lstStyle/>
-              <a:p>
-                <a:pPr marL="0" lvl="0" indent="0">
-                  <a:buNone/>
-                </a:pPr>
-                <a:r>
-                  <a:rPr dirty="0"/>
-                  <a:t>Do we always have to choose between the soft L2 </a:t>
-                </a:r>
-                <a:r>
-                  <a:rPr lang="en-US" dirty="0"/>
-                  <a:t>constraint </a:t>
-                </a:r>
-                <a:r>
-                  <a:rPr dirty="0"/>
-                  <a:t>and the hard L1</a:t>
-                </a:r>
-                <a:r>
-                  <a:rPr lang="en-US" dirty="0"/>
-                  <a:t> constraint</a:t>
-                </a:r>
-                <a:r>
-                  <a:rPr dirty="0"/>
-                  <a:t>?</a:t>
-                </a:r>
-              </a:p>
-              <a:p>
-                <a:pPr lvl="0"/>
-                <a:r>
-                  <a:rPr dirty="0"/>
-                  <a:t>L2 regularization works well for </a:t>
-                </a:r>
-                <a:r>
-                  <a:rPr b="1" dirty="0"/>
-                  <a:t>colinear features</a:t>
-                </a:r>
-                <a:r>
-                  <a:rPr dirty="0"/>
-                  <a:t> as </a:t>
-                </a:r>
-                <a:r>
-                  <a:rPr lang="en-US" dirty="0"/>
-                  <a:t>a </a:t>
-                </a:r>
-                <a:r>
-                  <a:rPr dirty="0"/>
-                  <a:t>soft constraint</a:t>
-                </a:r>
-              </a:p>
-              <a:p>
-                <a:pPr lvl="1"/>
-                <a:r>
-                  <a:rPr dirty="0"/>
-                  <a:t>Down-weights </a:t>
-                </a:r>
-                <a:r>
-                  <a:rPr lang="en-US" dirty="0"/>
-                  <a:t>coefficients of </a:t>
-                </a:r>
-                <a:r>
-                  <a:rPr dirty="0"/>
-                  <a:t>colinear features</a:t>
-                </a:r>
-              </a:p>
-              <a:p>
-                <a:pPr lvl="1"/>
-                <a:r>
-                  <a:rPr dirty="0"/>
-                  <a:t>But soft constraint </a:t>
-                </a:r>
-                <a:r>
-                  <a:rPr lang="en-US" dirty="0"/>
-                  <a:t>gives </a:t>
-                </a:r>
-                <a:r>
-                  <a:rPr dirty="0"/>
-                  <a:t>poor model selection</a:t>
-                </a:r>
-              </a:p>
-              <a:p>
-                <a:pPr lvl="0"/>
-                <a:r>
-                  <a:rPr dirty="0"/>
-                  <a:t>L1 regularization provides </a:t>
-                </a:r>
-                <a:r>
-                  <a:rPr b="1" dirty="0"/>
-                  <a:t>good model selection</a:t>
-                </a:r>
-                <a:r>
-                  <a:rPr dirty="0"/>
-                  <a:t> as</a:t>
-                </a:r>
-                <a:r>
-                  <a:rPr lang="en-US" dirty="0"/>
-                  <a:t> a</a:t>
-                </a:r>
-                <a:r>
-                  <a:rPr dirty="0"/>
-                  <a:t> hard constraint</a:t>
-                </a:r>
-              </a:p>
-              <a:p>
-                <a:pPr lvl="1"/>
-                <a:r>
-                  <a:rPr dirty="0"/>
-                  <a:t>Drives coefficients of non-informative variables to 0</a:t>
-                </a:r>
-              </a:p>
-              <a:p>
-                <a:pPr lvl="1"/>
-                <a:r>
-                  <a:rPr dirty="0"/>
-                  <a:t>But poor selection for colinear features</a:t>
-                </a:r>
-              </a:p>
-              <a:p>
-                <a:pPr lvl="0"/>
-                <a:r>
-                  <a:rPr dirty="0"/>
-                  <a:t>The </a:t>
-                </a:r>
-                <a:r>
-                  <a:rPr b="1" dirty="0"/>
-                  <a:t>Elastic Net</a:t>
-                </a:r>
-                <a:r>
-                  <a:rPr dirty="0"/>
-                  <a:t> weights L1 and L2 regularization</a:t>
-                </a:r>
-              </a:p>
-              <a:p>
-                <a:pPr lvl="1"/>
-                <a:r>
-                  <a:rPr dirty="0"/>
-                  <a:t>Hyperparameter </a:t>
-                </a:r>
-                <a14:m>
-                  <m:oMath xmlns:m="http://schemas.openxmlformats.org/officeDocument/2006/math">
-                    <m:r>
-                      <a:rPr>
-                        <a:latin typeface="Cambria Math" panose="02040503050406030204" pitchFamily="18" charset="0"/>
-                      </a:rPr>
-                      <m:t>𝜆</m:t>
-                    </m:r>
-                  </m:oMath>
-                </a14:m>
-                <a:r>
-                  <a:rPr dirty="0"/>
-                  <a:t> weights L1 vs. L2 regularization</a:t>
-                </a:r>
-              </a:p>
-              <a:p>
-                <a:pPr lvl="1"/>
-                <a:r>
-                  <a:rPr dirty="0"/>
-                  <a:t>Hyperparameter </a:t>
-                </a:r>
-                <a14:m>
-                  <m:oMath xmlns:m="http://schemas.openxmlformats.org/officeDocument/2006/math">
-                    <m:r>
-                      <a:rPr>
-                        <a:latin typeface="Cambria Math" panose="02040503050406030204" pitchFamily="18" charset="0"/>
-                      </a:rPr>
-                      <m:t>𝛼</m:t>
-                    </m:r>
-                  </m:oMath>
-                </a14:m>
-                <a:r>
-                  <a:rPr dirty="0"/>
-                  <a:t> sets strength of regularization</a:t>
-                </a:r>
-              </a:p>
-              <a:p>
-                <a:pPr marL="0" lvl="0" indent="0">
-                  <a:buNone/>
-                </a:pPr>
-                <a14:m>
-                  <m:oMathPara xmlns:m="http://schemas.openxmlformats.org/officeDocument/2006/math">
-                    <m:oMathParaPr>
-                      <m:jc m:val="center"/>
-                    </m:oMathParaPr>
-                    <m:oMath xmlns:m="http://schemas.openxmlformats.org/officeDocument/2006/math">
-                      <m:r>
-                        <a:rPr>
-                          <a:latin typeface="Cambria Math" panose="02040503050406030204" pitchFamily="18" charset="0"/>
-                        </a:rPr>
-                        <m:t>𝑚𝑖𝑛</m:t>
-                      </m:r>
-                      <m:d>
-                        <m:dPr>
-                          <m:begChr m:val="["/>
-                          <m:endChr m:val="]"/>
-                          <m:ctrlPr>
-                            <a:rPr i="1">
-                              <a:latin typeface="Cambria Math" panose="02040503050406030204" pitchFamily="18" charset="0"/>
-                            </a:rPr>
-                          </m:ctrlPr>
-                        </m:dPr>
-                        <m:e>
-                          <m:r>
-                            <a:rPr>
-                              <a:latin typeface="Cambria Math" panose="02040503050406030204" pitchFamily="18" charset="0"/>
-                            </a:rPr>
-                            <m:t>∥</m:t>
-                          </m:r>
-                          <m:r>
-                            <a:rPr>
-                              <a:latin typeface="Cambria Math" panose="02040503050406030204" pitchFamily="18" charset="0"/>
-                            </a:rPr>
-                            <m:t>𝐴</m:t>
-                          </m:r>
-                          <m:r>
-                            <a:rPr>
-                              <a:latin typeface="Cambria Math" panose="02040503050406030204" pitchFamily="18" charset="0"/>
-                            </a:rPr>
-                            <m:t>⋅</m:t>
-                          </m:r>
-                          <m:r>
-                            <a:rPr>
-                              <a:latin typeface="Cambria Math" panose="02040503050406030204" pitchFamily="18" charset="0"/>
-                            </a:rPr>
-                            <m:t>𝑥</m:t>
-                          </m:r>
-                          <m:r>
-                            <a:rPr>
-                              <a:latin typeface="Cambria Math" panose="02040503050406030204" pitchFamily="18" charset="0"/>
-                            </a:rPr>
-                            <m:t>−</m:t>
-                          </m:r>
-                          <m:r>
-                            <a:rPr>
-                              <a:latin typeface="Cambria Math" panose="02040503050406030204" pitchFamily="18" charset="0"/>
-                            </a:rPr>
-                            <m:t>𝑏</m:t>
-                          </m:r>
-                          <m:r>
-                            <a:rPr>
-                              <a:latin typeface="Cambria Math" panose="02040503050406030204" pitchFamily="18" charset="0"/>
-                            </a:rPr>
-                            <m:t>∥+ </m:t>
-                          </m:r>
-                          <m:r>
-                            <a:rPr>
-                              <a:latin typeface="Cambria Math" panose="02040503050406030204" pitchFamily="18" charset="0"/>
-                            </a:rPr>
-                            <m:t>𝜆</m:t>
-                          </m:r>
-                          <m:r>
-                            <a:rPr>
-                              <a:latin typeface="Cambria Math" panose="02040503050406030204" pitchFamily="18" charset="0"/>
-                            </a:rPr>
-                            <m:t> </m:t>
-                          </m:r>
-                          <m:r>
-                            <a:rPr>
-                              <a:latin typeface="Cambria Math" panose="02040503050406030204" pitchFamily="18" charset="0"/>
-                            </a:rPr>
-                            <m:t>𝛼</m:t>
-                          </m:r>
-                          <m:r>
-                            <a:rPr>
-                              <a:latin typeface="Cambria Math" panose="02040503050406030204" pitchFamily="18" charset="0"/>
-                            </a:rPr>
-                            <m:t>∥</m:t>
-                          </m:r>
-                          <m:r>
-                            <a:rPr>
-                              <a:latin typeface="Cambria Math" panose="02040503050406030204" pitchFamily="18" charset="0"/>
-                            </a:rPr>
-                            <m:t>𝑏</m:t>
-                          </m:r>
-                          <m:sSup>
-                            <m:sSupPr>
-                              <m:ctrlPr>
-                                <a:rPr i="1">
-                                  <a:latin typeface="Cambria Math" panose="02040503050406030204" pitchFamily="18" charset="0"/>
-                                </a:rPr>
-                              </m:ctrlPr>
-                            </m:sSupPr>
-                            <m:e>
-                              <m:r>
-                                <a:rPr>
-                                  <a:latin typeface="Cambria Math" panose="02040503050406030204" pitchFamily="18" charset="0"/>
-                                </a:rPr>
-                                <m:t>∥</m:t>
-                              </m:r>
-                            </m:e>
-                            <m:sup>
-                              <m:r>
-                                <a:rPr>
-                                  <a:latin typeface="Cambria Math" panose="02040503050406030204" pitchFamily="18" charset="0"/>
-                                </a:rPr>
-                                <m:t>1</m:t>
-                              </m:r>
-                            </m:sup>
-                          </m:sSup>
-                          <m:r>
-                            <a:rPr>
-                              <a:latin typeface="Cambria Math" panose="02040503050406030204" pitchFamily="18" charset="0"/>
-                            </a:rPr>
-                            <m:t>+ </m:t>
-                          </m:r>
-                          <m:d>
-                            <m:dPr>
-                              <m:ctrlPr>
-                                <a:rPr i="1">
-                                  <a:latin typeface="Cambria Math" panose="02040503050406030204" pitchFamily="18" charset="0"/>
-                                </a:rPr>
-                              </m:ctrlPr>
-                            </m:dPr>
-                            <m:e>
-                              <m:r>
-                                <a:rPr>
-                                  <a:latin typeface="Cambria Math" panose="02040503050406030204" pitchFamily="18" charset="0"/>
-                                </a:rPr>
-                                <m:t>1</m:t>
-                              </m:r>
-                              <m:r>
-                                <a:rPr>
-                                  <a:latin typeface="Cambria Math" panose="02040503050406030204" pitchFamily="18" charset="0"/>
-                                </a:rPr>
-                                <m:t>−</m:t>
-                              </m:r>
-                              <m:r>
-                                <a:rPr>
-                                  <a:latin typeface="Cambria Math" panose="02040503050406030204" pitchFamily="18" charset="0"/>
-                                </a:rPr>
-                                <m:t>𝜆</m:t>
-                              </m:r>
-                            </m:e>
-                          </m:d>
-                          <m:r>
-                            <a:rPr>
-                              <a:latin typeface="Cambria Math" panose="02040503050406030204" pitchFamily="18" charset="0"/>
-                            </a:rPr>
-                            <m:t> </m:t>
-                          </m:r>
-                          <m:r>
-                            <a:rPr>
-                              <a:latin typeface="Cambria Math" panose="02040503050406030204" pitchFamily="18" charset="0"/>
-                            </a:rPr>
-                            <m:t>𝛼</m:t>
-                          </m:r>
-                          <m:r>
-                            <a:rPr>
-                              <a:latin typeface="Cambria Math" panose="02040503050406030204" pitchFamily="18" charset="0"/>
-                            </a:rPr>
-                            <m:t>∥</m:t>
-                          </m:r>
-                          <m:r>
-                            <a:rPr>
-                              <a:latin typeface="Cambria Math" panose="02040503050406030204" pitchFamily="18" charset="0"/>
-                            </a:rPr>
-                            <m:t>𝑏</m:t>
-                          </m:r>
-                          <m:sSup>
-                            <m:sSupPr>
-                              <m:ctrlPr>
-                                <a:rPr i="1">
-                                  <a:latin typeface="Cambria Math" panose="02040503050406030204" pitchFamily="18" charset="0"/>
-                                </a:rPr>
-                              </m:ctrlPr>
-                            </m:sSupPr>
-                            <m:e>
-                              <m:r>
-                                <a:rPr>
-                                  <a:latin typeface="Cambria Math" panose="02040503050406030204" pitchFamily="18" charset="0"/>
-                                </a:rPr>
-                                <m:t>∥</m:t>
-                              </m:r>
-                            </m:e>
-                            <m:sup>
-                              <m:r>
-                                <a:rPr>
-                                  <a:latin typeface="Cambria Math" panose="02040503050406030204" pitchFamily="18" charset="0"/>
-                                </a:rPr>
-                                <m:t>2</m:t>
-                              </m:r>
-                            </m:sup>
-                          </m:sSup>
-                        </m:e>
-                      </m:d>
-                    </m:oMath>
-                  </m:oMathPara>
-                </a14:m>
-                <a:endParaRPr dirty="0"/>
-              </a:p>
-            </p:txBody>
-          </p:sp>
-        </mc:Choice>
-        <mc:Fallback xmlns="">
-          <p:sp>
-            <p:nvSpPr>
-              <p:cNvPr id="3" name="Content Placeholder 2"/>
-              <p:cNvSpPr>
-                <a:spLocks noGrp="1" noRot="1" noChangeAspect="1" noMove="1" noResize="1" noEditPoints="1" noAdjustHandles="1" noChangeArrowheads="1" noChangeShapeType="1" noTextEdit="1"/>
-              </p:cNvSpPr>
-              <p:nvPr>
-                <p:ph idx="1"/>
-              </p:nvPr>
-            </p:nvSpPr>
-            <p:spPr>
-              <a:xfrm>
-                <a:off x="457200" y="1101436"/>
-                <a:ext cx="8229600" cy="3836085"/>
-              </a:xfrm>
-              <a:blipFill>
-                <a:blip r:embed="rId2"/>
-                <a:stretch>
-                  <a:fillRect l="-741" t="-1749"/>
-                </a:stretch>
-              </a:blipFill>
-            </p:spPr>
-            <p:txBody>
-              <a:bodyPr/>
-              <a:lstStyle/>
-              <a:p>
-                <a:r>
-                  <a:rPr lang="en-US">
-                    <a:noFill/>
-                  </a:rPr>
-                  <a:t> </a:t>
-                </a:r>
-              </a:p>
-            </p:txBody>
-          </p:sp>
-        </mc:Fallback>
-      </mc:AlternateContent>
+      <p:sp>
+        <p:nvSpPr>
+          <p:cNvPr id="3" name="Content Placeholder 2"/>
+          <p:cNvSpPr>
+            <a:spLocks noGrp="1"/>
+          </p:cNvSpPr>
+          <p:nvPr>
+            <p:ph idx="1"/>
+          </p:nvPr>
+        </p:nvSpPr>
+        <p:spPr/>
+        <p:txBody>
+          <a:bodyPr/>
+          <a:lstStyle/>
+          <a:p>
+            <a:pPr marL="0" lvl="0" indent="0">
+              <a:buNone/>
+            </a:pPr>
+            <a:r>
+              <a:t>Example: Increasing constraint on model coefficients with larger L1 regularization hyperparameter</a:t>
+            </a:r>
+          </a:p>
+          <a:p>
+            <a:pPr lvl="0" indent="0">
+              <a:buNone/>
+            </a:pPr>
+            <a:r>
+              <a:rPr>
+                <a:latin typeface="Courier"/>
+              </a:rPr>
+              <a:t>alphas </a:t>
+            </a:r>
+            <a:r>
+              <a:rPr>
+                <a:solidFill>
+                  <a:srgbClr val="666666"/>
+                </a:solidFill>
+                <a:latin typeface="Courier"/>
+              </a:rPr>
+              <a:t>=</a:t>
+            </a:r>
+            <a:r>
+              <a:rPr>
+                <a:latin typeface="Courier"/>
+              </a:rPr>
+              <a:t> np.arange(</a:t>
+            </a:r>
+            <a:r>
+              <a:rPr>
+                <a:solidFill>
+                  <a:srgbClr val="40A070"/>
+                </a:solidFill>
+                <a:latin typeface="Courier"/>
+              </a:rPr>
+              <a:t>0.0</a:t>
+            </a:r>
+            <a:r>
+              <a:rPr>
+                <a:latin typeface="Courier"/>
+              </a:rPr>
+              <a:t>, </a:t>
+            </a:r>
+            <a:r>
+              <a:rPr>
+                <a:solidFill>
+                  <a:srgbClr val="40A070"/>
+                </a:solidFill>
+                <a:latin typeface="Courier"/>
+              </a:rPr>
+              <a:t>0.5</a:t>
+            </a:r>
+            <a:r>
+              <a:rPr>
+                <a:latin typeface="Courier"/>
+              </a:rPr>
+              <a:t>, step </a:t>
+            </a:r>
+            <a:r>
+              <a:rPr>
+                <a:solidFill>
+                  <a:srgbClr val="666666"/>
+                </a:solidFill>
+                <a:latin typeface="Courier"/>
+              </a:rPr>
+              <a:t>=</a:t>
+            </a:r>
+            <a:r>
+              <a:rPr>
+                <a:latin typeface="Courier"/>
+              </a:rPr>
+              <a:t> </a:t>
+            </a:r>
+            <a:r>
+              <a:rPr>
+                <a:solidFill>
+                  <a:srgbClr val="40A070"/>
+                </a:solidFill>
+                <a:latin typeface="Courier"/>
+              </a:rPr>
+              <a:t>0.02</a:t>
+            </a:r>
+            <a:r>
+              <a:rPr>
+                <a:latin typeface="Courier"/>
+              </a:rPr>
+              <a:t>)</a:t>
+            </a:r>
+            <a:br/>
+            <a:r>
+              <a:rPr>
+                <a:latin typeface="Courier"/>
+              </a:rPr>
+              <a:t>Betas, MSE_train, MSE_test </a:t>
+            </a:r>
+            <a:r>
+              <a:rPr>
+                <a:solidFill>
+                  <a:srgbClr val="666666"/>
+                </a:solidFill>
+                <a:latin typeface="Courier"/>
+              </a:rPr>
+              <a:t>=</a:t>
+            </a:r>
+            <a:r>
+              <a:rPr>
+                <a:latin typeface="Courier"/>
+              </a:rPr>
+              <a:t> regularized_coefs(test_scores_train, test_scores_test, alphas, L1_wt</a:t>
+            </a:r>
+            <a:r>
+              <a:rPr>
+                <a:solidFill>
+                  <a:srgbClr val="666666"/>
+                </a:solidFill>
+                <a:latin typeface="Courier"/>
+              </a:rPr>
+              <a:t>=</a:t>
+            </a:r>
+            <a:r>
+              <a:rPr>
+                <a:solidFill>
+                  <a:srgbClr val="40A070"/>
+                </a:solidFill>
+                <a:latin typeface="Courier"/>
+              </a:rPr>
+              <a:t>0.5</a:t>
+            </a:r>
+            <a:r>
+              <a:rPr>
+                <a:latin typeface="Courier"/>
+              </a:rPr>
+              <a:t>)</a:t>
+            </a:r>
+          </a:p>
+        </p:txBody>
+      </p:sp>
     </p:spTree>
   </p:cSld>
   <p:clrMapOvr>
@@ -22733,181 +22008,214 @@
             <p:ph type="title"/>
           </p:nvPr>
         </p:nvSpPr>
-        <p:spPr/>
+        <p:spPr>
+          <a:xfrm>
+            <a:off x="457201" y="204787"/>
+            <a:ext cx="8520544" cy="580766"/>
+          </a:xfrm>
+        </p:spPr>
         <p:txBody>
-          <a:bodyPr/>
+          <a:bodyPr>
+            <a:normAutofit/>
+          </a:bodyPr>
           <a:lstStyle/>
           <a:p>
-            <a:pPr marL="0" lvl="0" indent="0">
+            <a:pPr marL="0" lvl="0" indent="0" algn="ctr">
               <a:buNone/>
             </a:pPr>
             <a:r>
-              <a:rPr dirty="0" err="1"/>
+              <a:rPr sz="3200" dirty="0" err="1"/>
               <a:t>ElasticNet</a:t>
             </a:r>
             <a:r>
-              <a:rPr dirty="0"/>
+              <a:rPr sz="3200" dirty="0"/>
               <a:t> Regularization</a:t>
             </a:r>
           </a:p>
         </p:txBody>
       </p:sp>
-      <p:sp>
-        <p:nvSpPr>
-          <p:cNvPr id="3" name="Content Placeholder 2"/>
-          <p:cNvSpPr>
-            <a:spLocks noGrp="1"/>
-          </p:cNvSpPr>
-          <p:nvPr>
-            <p:ph idx="1"/>
-          </p:nvPr>
-        </p:nvSpPr>
-        <p:spPr/>
-        <p:txBody>
-          <a:bodyPr/>
-          <a:lstStyle/>
-          <a:p>
-            <a:pPr marL="0" lvl="0" indent="0">
-              <a:buNone/>
-            </a:pPr>
-            <a:r>
-              <a:t>Example: Increasing constraint on model coefficients with larger L1 regularization hyperparameter</a:t>
-            </a:r>
-          </a:p>
-          <a:p>
-            <a:pPr lvl="0" indent="0">
-              <a:buNone/>
-            </a:pPr>
-            <a:r>
-              <a:rPr>
-                <a:latin typeface="Courier"/>
-              </a:rPr>
-              <a:t>alphas </a:t>
-            </a:r>
-            <a:r>
-              <a:rPr>
-                <a:solidFill>
-                  <a:srgbClr val="666666"/>
-                </a:solidFill>
-                <a:latin typeface="Courier"/>
-              </a:rPr>
-              <a:t>=</a:t>
-            </a:r>
-            <a:r>
-              <a:rPr>
-                <a:latin typeface="Courier"/>
-              </a:rPr>
-              <a:t> np.arange(</a:t>
-            </a:r>
-            <a:r>
-              <a:rPr>
-                <a:solidFill>
-                  <a:srgbClr val="40A070"/>
-                </a:solidFill>
-                <a:latin typeface="Courier"/>
-              </a:rPr>
-              <a:t>0.0</a:t>
-            </a:r>
-            <a:r>
-              <a:rPr>
-                <a:latin typeface="Courier"/>
-              </a:rPr>
-              <a:t>, </a:t>
-            </a:r>
-            <a:r>
-              <a:rPr>
-                <a:solidFill>
-                  <a:srgbClr val="40A070"/>
-                </a:solidFill>
-                <a:latin typeface="Courier"/>
-              </a:rPr>
-              <a:t>0.5</a:t>
-            </a:r>
-            <a:r>
-              <a:rPr>
-                <a:latin typeface="Courier"/>
-              </a:rPr>
-              <a:t>, step </a:t>
-            </a:r>
-            <a:r>
-              <a:rPr>
-                <a:solidFill>
-                  <a:srgbClr val="666666"/>
-                </a:solidFill>
-                <a:latin typeface="Courier"/>
-              </a:rPr>
-              <a:t>=</a:t>
-            </a:r>
-            <a:r>
-              <a:rPr>
-                <a:latin typeface="Courier"/>
-              </a:rPr>
-              <a:t> </a:t>
-            </a:r>
-            <a:r>
-              <a:rPr>
-                <a:solidFill>
-                  <a:srgbClr val="40A070"/>
-                </a:solidFill>
-                <a:latin typeface="Courier"/>
-              </a:rPr>
-              <a:t>0.02</a:t>
-            </a:r>
-            <a:r>
-              <a:rPr>
-                <a:latin typeface="Courier"/>
-              </a:rPr>
-              <a:t>)</a:t>
-            </a:r>
-            <a:br/>
-            <a:r>
-              <a:rPr>
-                <a:latin typeface="Courier"/>
-              </a:rPr>
-              <a:t>Betas, MSE_train, MSE_test </a:t>
-            </a:r>
-            <a:r>
-              <a:rPr>
-                <a:solidFill>
-                  <a:srgbClr val="666666"/>
-                </a:solidFill>
-                <a:latin typeface="Courier"/>
-              </a:rPr>
-              <a:t>=</a:t>
-            </a:r>
-            <a:r>
-              <a:rPr>
-                <a:latin typeface="Courier"/>
-              </a:rPr>
-              <a:t> regularized_coefs(test_scores_train, test_scores_test, alphas, L1_wt</a:t>
-            </a:r>
-            <a:r>
-              <a:rPr>
-                <a:solidFill>
-                  <a:srgbClr val="666666"/>
-                </a:solidFill>
-                <a:latin typeface="Courier"/>
-              </a:rPr>
-              <a:t>=</a:t>
-            </a:r>
-            <a:r>
-              <a:rPr>
-                <a:solidFill>
-                  <a:srgbClr val="40A070"/>
-                </a:solidFill>
-                <a:latin typeface="Courier"/>
-              </a:rPr>
-              <a:t>0.5</a:t>
-            </a:r>
-            <a:r>
-              <a:rPr>
-                <a:latin typeface="Courier"/>
-              </a:rPr>
-              <a:t>)</a:t>
-            </a:r>
-          </a:p>
-        </p:txBody>
-      </p:sp>
+      <p:pic>
+        <p:nvPicPr>
+          <p:cNvPr id="6" name="Picture 5">
+            <a:extLst>
+              <a:ext uri="{FF2B5EF4-FFF2-40B4-BE49-F238E27FC236}">
+                <a16:creationId xmlns:a16="http://schemas.microsoft.com/office/drawing/2014/main" id="{65AC5AA6-C332-53AA-4323-D2CFDD73F57E}"/>
+              </a:ext>
+            </a:extLst>
+          </p:cNvPr>
+          <p:cNvPicPr>
+            <a:picLocks noChangeAspect="1"/>
+          </p:cNvPicPr>
+          <p:nvPr/>
+        </p:nvPicPr>
+        <p:blipFill>
+          <a:blip r:embed="rId2"/>
+          <a:stretch>
+            <a:fillRect/>
+          </a:stretch>
+        </p:blipFill>
+        <p:spPr>
+          <a:xfrm>
+            <a:off x="1596043" y="2660854"/>
+            <a:ext cx="5345083" cy="2438033"/>
+          </a:xfrm>
+          <a:prstGeom prst="rect">
+            <a:avLst/>
+          </a:prstGeom>
+        </p:spPr>
+      </p:pic>
+      <mc:AlternateContent xmlns:mc="http://schemas.openxmlformats.org/markup-compatibility/2006" xmlns:a14="http://schemas.microsoft.com/office/drawing/2010/main">
+        <mc:Choice Requires="a14">
+          <p:sp>
+            <p:nvSpPr>
+              <p:cNvPr id="9" name="Text Placeholder 3">
+                <a:extLst>
+                  <a:ext uri="{FF2B5EF4-FFF2-40B4-BE49-F238E27FC236}">
+                    <a16:creationId xmlns:a16="http://schemas.microsoft.com/office/drawing/2014/main" id="{5B5EF54E-3AF0-1F64-2096-EAAC1B2DA252}"/>
+                  </a:ext>
+                </a:extLst>
+              </p:cNvPr>
+              <p:cNvSpPr>
+                <a:spLocks noGrp="1"/>
+              </p:cNvSpPr>
+              <p:nvPr>
+                <p:ph type="body" sz="half" idx="2"/>
+              </p:nvPr>
+            </p:nvSpPr>
+            <p:spPr>
+              <a:xfrm>
+                <a:off x="448888" y="819583"/>
+                <a:ext cx="8528857" cy="1841271"/>
+              </a:xfrm>
+            </p:spPr>
+            <p:txBody>
+              <a:bodyPr>
+                <a:normAutofit fontScale="92500" lnSpcReduction="20000"/>
+              </a:bodyPr>
+              <a:lstStyle/>
+              <a:p>
+                <a:pPr marL="0" lvl="0" indent="0">
+                  <a:buNone/>
+                </a:pPr>
+                <a:r>
+                  <a:rPr lang="en-US" sz="2000" dirty="0"/>
+                  <a:t>Example: Effect of increasing the regularization parameter   </a:t>
+                </a:r>
+              </a:p>
+              <a:p>
+                <a:pPr marL="342900" lvl="0" indent="-342900">
+                  <a:buFont typeface="Arial" panose="020B0604020202020204" pitchFamily="34" charset="0"/>
+                  <a:buChar char="•"/>
+                </a:pPr>
+                <a:r>
+                  <a:rPr lang="en-US" sz="2000" dirty="0"/>
+                  <a:t>Increased constraint on model parameters of </a:t>
+                </a:r>
+                <a:r>
+                  <a:rPr lang="en-US" sz="2000" dirty="0" err="1"/>
+                  <a:t>elasticnet</a:t>
+                </a:r>
+                <a:r>
+                  <a:rPr lang="en-US" sz="2000" dirty="0"/>
+                  <a:t> regularization hyperparameter increases </a:t>
+                </a:r>
+              </a:p>
+              <a:p>
+                <a:pPr marL="342900" lvl="0" indent="-342900">
+                  <a:buFont typeface="Arial" panose="020B0604020202020204" pitchFamily="34" charset="0"/>
+                  <a:buChar char="•"/>
+                </a:pPr>
+                <a:r>
+                  <a:rPr lang="en-US" sz="2000" dirty="0"/>
+                  <a:t>Some coefficients driven to 0 by L1 constraint </a:t>
+                </a:r>
+              </a:p>
+              <a:p>
+                <a:pPr marL="342900" lvl="0" indent="-342900">
+                  <a:buFont typeface="Arial" panose="020B0604020202020204" pitchFamily="34" charset="0"/>
+                  <a:buChar char="•"/>
+                </a:pPr>
+                <a:r>
+                  <a:rPr lang="en-US" sz="2000" dirty="0"/>
+                  <a:t>Other parameters softy L2 constrained </a:t>
+                </a:r>
+              </a:p>
+              <a:p>
+                <a:pPr marL="342900" indent="-342900">
+                  <a:buFont typeface="Arial" panose="020B0604020202020204" pitchFamily="34" charset="0"/>
+                  <a:buChar char="•"/>
+                </a:pPr>
+                <a:r>
+                  <a:rPr lang="en-US" sz="2000" dirty="0"/>
+                  <a:t>Select </a:t>
+                </a:r>
+                <a14:m>
+                  <m:oMath xmlns:m="http://schemas.openxmlformats.org/officeDocument/2006/math">
+                    <m:r>
+                      <a:rPr lang="en-US" sz="2000" i="1" smtClean="0">
+                        <a:latin typeface="Cambria Math" panose="02040503050406030204" pitchFamily="18" charset="0"/>
+                        <a:ea typeface="Cambria Math" panose="02040503050406030204" pitchFamily="18" charset="0"/>
+                      </a:rPr>
+                      <m:t>𝛼</m:t>
+                    </m:r>
+                  </m:oMath>
+                </a14:m>
+                <a:r>
+                  <a:rPr lang="en-US" sz="2000" dirty="0"/>
+                  <a:t> that minimizes test error metric, or other metric  </a:t>
+                </a:r>
+              </a:p>
+              <a:p>
+                <a:pPr lvl="0"/>
+                <a:endParaRPr lang="en-US" sz="2000" dirty="0"/>
+              </a:p>
+            </p:txBody>
+          </p:sp>
+        </mc:Choice>
+        <mc:Fallback xmlns="">
+          <p:sp>
+            <p:nvSpPr>
+              <p:cNvPr id="9" name="Text Placeholder 3">
+                <a:extLst>
+                  <a:ext uri="{FF2B5EF4-FFF2-40B4-BE49-F238E27FC236}">
+                    <a16:creationId xmlns:a16="http://schemas.microsoft.com/office/drawing/2014/main" id="{5B5EF54E-3AF0-1F64-2096-EAAC1B2DA252}"/>
+                  </a:ext>
+                </a:extLst>
+              </p:cNvPr>
+              <p:cNvSpPr>
+                <a:spLocks noGrp="1" noRot="1" noChangeAspect="1" noMove="1" noResize="1" noEditPoints="1" noAdjustHandles="1" noChangeArrowheads="1" noChangeShapeType="1" noTextEdit="1"/>
+              </p:cNvSpPr>
+              <p:nvPr>
+                <p:ph type="body" sz="half" idx="2"/>
+              </p:nvPr>
+            </p:nvSpPr>
+            <p:spPr>
+              <a:xfrm>
+                <a:off x="448888" y="819583"/>
+                <a:ext cx="8528857" cy="1841271"/>
+              </a:xfrm>
+              <a:blipFill>
+                <a:blip r:embed="rId3"/>
+                <a:stretch>
+                  <a:fillRect l="-715" t="-4305"/>
+                </a:stretch>
+              </a:blipFill>
+            </p:spPr>
+            <p:txBody>
+              <a:bodyPr/>
+              <a:lstStyle/>
+              <a:p>
+                <a:r>
+                  <a:rPr lang="en-US">
+                    <a:noFill/>
+                  </a:rPr>
+                  <a:t> </a:t>
+                </a:r>
+              </a:p>
+            </p:txBody>
+          </p:sp>
+        </mc:Fallback>
+      </mc:AlternateContent>
     </p:spTree>
   </p:cSld>
   <p:clrMapOvr>
@@ -23759,249 +23067,6 @@
         <p:spPr>
           <a:xfrm>
             <a:off x="457201" y="204787"/>
-            <a:ext cx="8520544" cy="580766"/>
-          </a:xfrm>
-        </p:spPr>
-        <p:txBody>
-          <a:bodyPr>
-            <a:normAutofit/>
-          </a:bodyPr>
-          <a:lstStyle/>
-          <a:p>
-            <a:pPr marL="0" lvl="0" indent="0" algn="ctr">
-              <a:buNone/>
-            </a:pPr>
-            <a:r>
-              <a:rPr sz="3200" dirty="0" err="1"/>
-              <a:t>ElasticNet</a:t>
-            </a:r>
-            <a:r>
-              <a:rPr sz="3200" dirty="0"/>
-              <a:t> Regularization</a:t>
-            </a:r>
-          </a:p>
-        </p:txBody>
-      </p:sp>
-      <p:pic>
-        <p:nvPicPr>
-          <p:cNvPr id="6" name="Picture 5">
-            <a:extLst>
-              <a:ext uri="{FF2B5EF4-FFF2-40B4-BE49-F238E27FC236}">
-                <a16:creationId xmlns:a16="http://schemas.microsoft.com/office/drawing/2014/main" id="{65AC5AA6-C332-53AA-4323-D2CFDD73F57E}"/>
-              </a:ext>
-            </a:extLst>
-          </p:cNvPr>
-          <p:cNvPicPr>
-            <a:picLocks noChangeAspect="1"/>
-          </p:cNvPicPr>
-          <p:nvPr/>
-        </p:nvPicPr>
-        <p:blipFill>
-          <a:blip r:embed="rId2"/>
-          <a:stretch>
-            <a:fillRect/>
-          </a:stretch>
-        </p:blipFill>
-        <p:spPr>
-          <a:xfrm>
-            <a:off x="1596043" y="2660854"/>
-            <a:ext cx="5345083" cy="2438033"/>
-          </a:xfrm>
-          <a:prstGeom prst="rect">
-            <a:avLst/>
-          </a:prstGeom>
-        </p:spPr>
-      </p:pic>
-      <mc:AlternateContent xmlns:mc="http://schemas.openxmlformats.org/markup-compatibility/2006" xmlns:a14="http://schemas.microsoft.com/office/drawing/2010/main">
-        <mc:Choice Requires="a14">
-          <p:sp>
-            <p:nvSpPr>
-              <p:cNvPr id="9" name="Text Placeholder 3">
-                <a:extLst>
-                  <a:ext uri="{FF2B5EF4-FFF2-40B4-BE49-F238E27FC236}">
-                    <a16:creationId xmlns:a16="http://schemas.microsoft.com/office/drawing/2014/main" id="{5B5EF54E-3AF0-1F64-2096-EAAC1B2DA252}"/>
-                  </a:ext>
-                </a:extLst>
-              </p:cNvPr>
-              <p:cNvSpPr>
-                <a:spLocks noGrp="1"/>
-              </p:cNvSpPr>
-              <p:nvPr>
-                <p:ph type="body" sz="half" idx="2"/>
-              </p:nvPr>
-            </p:nvSpPr>
-            <p:spPr>
-              <a:xfrm>
-                <a:off x="448888" y="819583"/>
-                <a:ext cx="8528857" cy="1841271"/>
-              </a:xfrm>
-            </p:spPr>
-            <p:txBody>
-              <a:bodyPr>
-                <a:normAutofit fontScale="92500" lnSpcReduction="20000"/>
-              </a:bodyPr>
-              <a:lstStyle/>
-              <a:p>
-                <a:pPr marL="0" lvl="0" indent="0">
-                  <a:buNone/>
-                </a:pPr>
-                <a:r>
-                  <a:rPr lang="en-US" sz="2000" dirty="0"/>
-                  <a:t>Example: Effect of increasing the regularization parameter   </a:t>
-                </a:r>
-              </a:p>
-              <a:p>
-                <a:pPr marL="342900" lvl="0" indent="-342900">
-                  <a:buFont typeface="Arial" panose="020B0604020202020204" pitchFamily="34" charset="0"/>
-                  <a:buChar char="•"/>
-                </a:pPr>
-                <a:r>
-                  <a:rPr lang="en-US" sz="2000" dirty="0"/>
-                  <a:t>Increased constraint on model parameters of </a:t>
-                </a:r>
-                <a:r>
-                  <a:rPr lang="en-US" sz="2000" dirty="0" err="1"/>
-                  <a:t>elasticnet</a:t>
-                </a:r>
-                <a:r>
-                  <a:rPr lang="en-US" sz="2000" dirty="0"/>
-                  <a:t> regularization hyperparameter increases </a:t>
-                </a:r>
-              </a:p>
-              <a:p>
-                <a:pPr marL="342900" lvl="0" indent="-342900">
-                  <a:buFont typeface="Arial" panose="020B0604020202020204" pitchFamily="34" charset="0"/>
-                  <a:buChar char="•"/>
-                </a:pPr>
-                <a:r>
-                  <a:rPr lang="en-US" sz="2000" dirty="0"/>
-                  <a:t>Some coefficients driven to 0 by L1 constraint </a:t>
-                </a:r>
-              </a:p>
-              <a:p>
-                <a:pPr marL="342900" lvl="0" indent="-342900">
-                  <a:buFont typeface="Arial" panose="020B0604020202020204" pitchFamily="34" charset="0"/>
-                  <a:buChar char="•"/>
-                </a:pPr>
-                <a:r>
-                  <a:rPr lang="en-US" sz="2000" dirty="0"/>
-                  <a:t>Other parameters softy L2 constrained </a:t>
-                </a:r>
-              </a:p>
-              <a:p>
-                <a:pPr marL="342900" indent="-342900">
-                  <a:buFont typeface="Arial" panose="020B0604020202020204" pitchFamily="34" charset="0"/>
-                  <a:buChar char="•"/>
-                </a:pPr>
-                <a:r>
-                  <a:rPr lang="en-US" sz="2000" dirty="0"/>
-                  <a:t>Select </a:t>
-                </a:r>
-                <a14:m>
-                  <m:oMath xmlns:m="http://schemas.openxmlformats.org/officeDocument/2006/math">
-                    <m:r>
-                      <a:rPr lang="en-US" sz="2000" i="1" smtClean="0">
-                        <a:latin typeface="Cambria Math" panose="02040503050406030204" pitchFamily="18" charset="0"/>
-                        <a:ea typeface="Cambria Math" panose="02040503050406030204" pitchFamily="18" charset="0"/>
-                      </a:rPr>
-                      <m:t>𝛼</m:t>
-                    </m:r>
-                  </m:oMath>
-                </a14:m>
-                <a:r>
-                  <a:rPr lang="en-US" sz="2000" dirty="0"/>
-                  <a:t> that minimizes test error metric, or other metric  </a:t>
-                </a:r>
-              </a:p>
-              <a:p>
-                <a:pPr lvl="0"/>
-                <a:endParaRPr lang="en-US" sz="2000" dirty="0"/>
-              </a:p>
-            </p:txBody>
-          </p:sp>
-        </mc:Choice>
-        <mc:Fallback xmlns="">
-          <p:sp>
-            <p:nvSpPr>
-              <p:cNvPr id="9" name="Text Placeholder 3">
-                <a:extLst>
-                  <a:ext uri="{FF2B5EF4-FFF2-40B4-BE49-F238E27FC236}">
-                    <a16:creationId xmlns:a16="http://schemas.microsoft.com/office/drawing/2014/main" id="{5B5EF54E-3AF0-1F64-2096-EAAC1B2DA252}"/>
-                  </a:ext>
-                </a:extLst>
-              </p:cNvPr>
-              <p:cNvSpPr>
-                <a:spLocks noGrp="1" noRot="1" noChangeAspect="1" noMove="1" noResize="1" noEditPoints="1" noAdjustHandles="1" noChangeArrowheads="1" noChangeShapeType="1" noTextEdit="1"/>
-              </p:cNvSpPr>
-              <p:nvPr>
-                <p:ph type="body" sz="half" idx="2"/>
-              </p:nvPr>
-            </p:nvSpPr>
-            <p:spPr>
-              <a:xfrm>
-                <a:off x="448888" y="819583"/>
-                <a:ext cx="8528857" cy="1841271"/>
-              </a:xfrm>
-              <a:blipFill>
-                <a:blip r:embed="rId3"/>
-                <a:stretch>
-                  <a:fillRect l="-715" t="-4305"/>
-                </a:stretch>
-              </a:blipFill>
-            </p:spPr>
-            <p:txBody>
-              <a:bodyPr/>
-              <a:lstStyle/>
-              <a:p>
-                <a:r>
-                  <a:rPr lang="en-US">
-                    <a:noFill/>
-                  </a:rPr>
-                  <a:t> </a:t>
-                </a:r>
-              </a:p>
-            </p:txBody>
-          </p:sp>
-        </mc:Fallback>
-      </mc:AlternateContent>
-    </p:spTree>
-  </p:cSld>
-  <p:clrMapOvr>
-    <a:masterClrMapping/>
-  </p:clrMapOvr>
-</p:sld>
-</file>
-
-<file path=ppt/slides/slide41.xml><?xml version="1.0" encoding="utf-8"?>
-<p:sld xmlns:a="http://schemas.openxmlformats.org/drawingml/2006/main" xmlns:r="http://schemas.openxmlformats.org/officeDocument/2006/relationships" xmlns:p="http://schemas.openxmlformats.org/presentationml/2006/main">
-  <p:cSld>
-    <p:spTree>
-      <p:nvGrpSpPr>
-        <p:cNvPr id="1" name=""/>
-        <p:cNvGrpSpPr/>
-        <p:nvPr/>
-      </p:nvGrpSpPr>
-      <p:grpSpPr>
-        <a:xfrm>
-          <a:off x="0" y="0"/>
-          <a:ext cx="0" cy="0"/>
-          <a:chOff x="0" y="0"/>
-          <a:chExt cx="0" cy="0"/>
-        </a:xfrm>
-      </p:grpSpPr>
-      <p:sp>
-        <p:nvSpPr>
-          <p:cNvPr id="2" name="Title 1"/>
-          <p:cNvSpPr>
-            <a:spLocks noGrp="1"/>
-          </p:cNvSpPr>
-          <p:nvPr>
-            <p:ph type="title"/>
-          </p:nvPr>
-        </p:nvSpPr>
-        <p:spPr>
-          <a:xfrm>
-            <a:off x="457201" y="204787"/>
             <a:ext cx="8433261" cy="497638"/>
           </a:xfrm>
         </p:spPr>
@@ -24156,7 +23221,7 @@
 </p:sld>
 </file>
 
-<file path=ppt/slides/slide42.xml><?xml version="1.0" encoding="utf-8"?>
+<file path=ppt/slides/slide41.xml><?xml version="1.0" encoding="utf-8"?>
 <p:sld xmlns:a="http://schemas.openxmlformats.org/drawingml/2006/main" xmlns:r="http://schemas.openxmlformats.org/officeDocument/2006/relationships" xmlns:p="http://schemas.openxmlformats.org/presentationml/2006/main">
   <p:cSld>
     <p:spTree>
@@ -24306,7 +23371,7 @@
 </p:sld>
 </file>
 
-<file path=ppt/slides/slide43.xml><?xml version="1.0" encoding="utf-8"?>
+<file path=ppt/slides/slide42.xml><?xml version="1.0" encoding="utf-8"?>
 <p:sld xmlns:a="http://schemas.openxmlformats.org/drawingml/2006/main" xmlns:r="http://schemas.openxmlformats.org/officeDocument/2006/relationships" xmlns:p="http://schemas.openxmlformats.org/presentationml/2006/main">
   <p:cSld>
     <p:spTree>
@@ -24695,7 +23760,7 @@
 </p:sld>
 </file>
 
-<file path=ppt/slides/slide44.xml><?xml version="1.0" encoding="utf-8"?>
+<file path=ppt/slides/slide43.xml><?xml version="1.0" encoding="utf-8"?>
 <p:sld xmlns:a="http://schemas.openxmlformats.org/drawingml/2006/main" xmlns:r="http://schemas.openxmlformats.org/officeDocument/2006/relationships" xmlns:p="http://schemas.openxmlformats.org/presentationml/2006/main">
   <p:cSld>
     <p:spTree>
@@ -24853,7 +23918,7 @@
 </p:sld>
 </file>
 
-<file path=ppt/slides/slide45.xml><?xml version="1.0" encoding="utf-8"?>
+<file path=ppt/slides/slide44.xml><?xml version="1.0" encoding="utf-8"?>
 <p:sld xmlns:a="http://schemas.openxmlformats.org/drawingml/2006/main" xmlns:r="http://schemas.openxmlformats.org/officeDocument/2006/relationships" xmlns:p="http://schemas.openxmlformats.org/presentationml/2006/main">
   <p:cSld>
     <p:spTree>

</xml_diff>

<commit_message>
added example slides, improved wording, fixed typos
</commit_message>
<xml_diff>
--- a/LectureSlides/10a_ModelsInHighDimensions.pptx
+++ b/LectureSlides/10a_ModelsInHighDimensions.pptx
@@ -5,7 +5,7 @@
     <p:sldMasterId id="2147483648" r:id="rId1"/>
   </p:sldMasterIdLst>
   <p:notesMasterIdLst>
-    <p:notesMasterId r:id="rId55"/>
+    <p:notesMasterId r:id="rId58"/>
   </p:notesMasterIdLst>
   <p:sldIdLst>
     <p:sldId id="299" r:id="rId2"/>
@@ -45,22 +45,25 @@
     <p:sldId id="276" r:id="rId36"/>
     <p:sldId id="277" r:id="rId37"/>
     <p:sldId id="279" r:id="rId38"/>
-    <p:sldId id="280" r:id="rId39"/>
-    <p:sldId id="281" r:id="rId40"/>
-    <p:sldId id="712" r:id="rId41"/>
-    <p:sldId id="282" r:id="rId42"/>
-    <p:sldId id="283" r:id="rId43"/>
-    <p:sldId id="284" r:id="rId44"/>
-    <p:sldId id="286" r:id="rId45"/>
-    <p:sldId id="713" r:id="rId46"/>
-    <p:sldId id="287" r:id="rId47"/>
-    <p:sldId id="288" r:id="rId48"/>
-    <p:sldId id="289" r:id="rId49"/>
-    <p:sldId id="290" r:id="rId50"/>
-    <p:sldId id="705" r:id="rId51"/>
-    <p:sldId id="701" r:id="rId52"/>
-    <p:sldId id="700" r:id="rId53"/>
-    <p:sldId id="291" r:id="rId54"/>
+    <p:sldId id="719" r:id="rId39"/>
+    <p:sldId id="280" r:id="rId40"/>
+    <p:sldId id="281" r:id="rId41"/>
+    <p:sldId id="721" r:id="rId42"/>
+    <p:sldId id="712" r:id="rId43"/>
+    <p:sldId id="282" r:id="rId44"/>
+    <p:sldId id="283" r:id="rId45"/>
+    <p:sldId id="284" r:id="rId46"/>
+    <p:sldId id="286" r:id="rId47"/>
+    <p:sldId id="720" r:id="rId48"/>
+    <p:sldId id="713" r:id="rId49"/>
+    <p:sldId id="287" r:id="rId50"/>
+    <p:sldId id="288" r:id="rId51"/>
+    <p:sldId id="289" r:id="rId52"/>
+    <p:sldId id="290" r:id="rId53"/>
+    <p:sldId id="701" r:id="rId54"/>
+    <p:sldId id="705" r:id="rId55"/>
+    <p:sldId id="700" r:id="rId56"/>
+    <p:sldId id="291" r:id="rId57"/>
   </p:sldIdLst>
   <p:sldSz cx="9144000" cy="5143500" type="screen16x9"/>
   <p:notesSz cx="6858000" cy="9144000"/>
@@ -260,7 +263,7 @@
           <a:p>
             <a:fld id="{BE0C07B0-B271-4EE5-BA4D-B7A9BA86B818}" type="datetimeFigureOut">
               <a:rPr lang="en-US" smtClean="0"/>
-              <a:t>10/7/2025</a:t>
+              <a:t>10/8/2025</a:t>
             </a:fld>
             <a:endParaRPr lang="en-US"/>
           </a:p>
@@ -706,7 +709,7 @@
           <a:p>
             <a:fld id="{241EB5C9-1307-BA42-ABA2-0BC069CD8E7F}" type="datetimeFigureOut">
               <a:rPr lang="en-US" smtClean="0"/>
-              <a:t>10/7/2025</a:t>
+              <a:t>10/8/2025</a:t>
             </a:fld>
             <a:endParaRPr lang="en-US"/>
           </a:p>
@@ -874,7 +877,7 @@
           <a:p>
             <a:fld id="{241EB5C9-1307-BA42-ABA2-0BC069CD8E7F}" type="datetimeFigureOut">
               <a:rPr lang="en-US" smtClean="0"/>
-              <a:t>10/7/2025</a:t>
+              <a:t>10/8/2025</a:t>
             </a:fld>
             <a:endParaRPr lang="en-US"/>
           </a:p>
@@ -1052,7 +1055,7 @@
           <a:p>
             <a:fld id="{241EB5C9-1307-BA42-ABA2-0BC069CD8E7F}" type="datetimeFigureOut">
               <a:rPr lang="en-US" smtClean="0"/>
-              <a:t>10/7/2025</a:t>
+              <a:t>10/8/2025</a:t>
             </a:fld>
             <a:endParaRPr lang="en-US"/>
           </a:p>
@@ -1370,7 +1373,7 @@
           <a:p>
             <a:fld id="{241EB5C9-1307-BA42-ABA2-0BC069CD8E7F}" type="datetimeFigureOut">
               <a:rPr lang="en-US" smtClean="0"/>
-              <a:t>10/7/2025</a:t>
+              <a:t>10/8/2025</a:t>
             </a:fld>
             <a:endParaRPr lang="en-US"/>
           </a:p>
@@ -1615,7 +1618,7 @@
           <a:p>
             <a:fld id="{241EB5C9-1307-BA42-ABA2-0BC069CD8E7F}" type="datetimeFigureOut">
               <a:rPr lang="en-US" smtClean="0"/>
-              <a:t>10/7/2025</a:t>
+              <a:t>10/8/2025</a:t>
             </a:fld>
             <a:endParaRPr lang="en-US"/>
           </a:p>
@@ -1900,7 +1903,7 @@
           <a:p>
             <a:fld id="{241EB5C9-1307-BA42-ABA2-0BC069CD8E7F}" type="datetimeFigureOut">
               <a:rPr lang="en-US" smtClean="0"/>
-              <a:t>10/7/2025</a:t>
+              <a:t>10/8/2025</a:t>
             </a:fld>
             <a:endParaRPr lang="en-US"/>
           </a:p>
@@ -2319,7 +2322,7 @@
           <a:p>
             <a:fld id="{241EB5C9-1307-BA42-ABA2-0BC069CD8E7F}" type="datetimeFigureOut">
               <a:rPr lang="en-US" smtClean="0"/>
-              <a:t>10/7/2025</a:t>
+              <a:t>10/8/2025</a:t>
             </a:fld>
             <a:endParaRPr lang="en-US"/>
           </a:p>
@@ -2436,7 +2439,7 @@
           <a:p>
             <a:fld id="{241EB5C9-1307-BA42-ABA2-0BC069CD8E7F}" type="datetimeFigureOut">
               <a:rPr lang="en-US" smtClean="0"/>
-              <a:t>10/7/2025</a:t>
+              <a:t>10/8/2025</a:t>
             </a:fld>
             <a:endParaRPr lang="en-US"/>
           </a:p>
@@ -2531,7 +2534,7 @@
           <a:p>
             <a:fld id="{241EB5C9-1307-BA42-ABA2-0BC069CD8E7F}" type="datetimeFigureOut">
               <a:rPr lang="en-US" smtClean="0"/>
-              <a:t>10/7/2025</a:t>
+              <a:t>10/8/2025</a:t>
             </a:fld>
             <a:endParaRPr lang="en-US"/>
           </a:p>
@@ -2806,7 +2809,7 @@
           <a:p>
             <a:fld id="{241EB5C9-1307-BA42-ABA2-0BC069CD8E7F}" type="datetimeFigureOut">
               <a:rPr lang="en-US" smtClean="0"/>
-              <a:t>10/7/2025</a:t>
+              <a:t>10/8/2025</a:t>
             </a:fld>
             <a:endParaRPr lang="en-US"/>
           </a:p>
@@ -3058,7 +3061,7 @@
           <a:p>
             <a:fld id="{241EB5C9-1307-BA42-ABA2-0BC069CD8E7F}" type="datetimeFigureOut">
               <a:rPr lang="en-US" smtClean="0"/>
-              <a:t>10/7/2025</a:t>
+              <a:t>10/8/2025</a:t>
             </a:fld>
             <a:endParaRPr lang="en-US"/>
           </a:p>
@@ -3269,7 +3272,7 @@
           <a:p>
             <a:fld id="{241EB5C9-1307-BA42-ABA2-0BC069CD8E7F}" type="datetimeFigureOut">
               <a:rPr lang="en-US" smtClean="0"/>
-              <a:t>10/7/2025</a:t>
+              <a:t>10/8/2025</a:t>
             </a:fld>
             <a:endParaRPr lang="en-US"/>
           </a:p>
@@ -3714,30 +3717,6 @@
           </a:p>
         </p:txBody>
       </p:sp>
-      <p:sp>
-        <p:nvSpPr>
-          <p:cNvPr id="4" name="Date Placeholder 3"/>
-          <p:cNvSpPr>
-            <a:spLocks noGrp="1"/>
-          </p:cNvSpPr>
-          <p:nvPr>
-            <p:ph type="dt" sz="half" idx="10"/>
-          </p:nvPr>
-        </p:nvSpPr>
-        <p:spPr/>
-        <p:txBody>
-          <a:bodyPr/>
-          <a:lstStyle/>
-          <a:p>
-            <a:pPr marL="0" lvl="0" indent="0">
-              <a:buNone/>
-            </a:pPr>
-            <a:r>
-              <a:t>09/04/2023</a:t>
-            </a:r>
-          </a:p>
-        </p:txBody>
-      </p:sp>
       <p:pic>
         <p:nvPicPr>
           <p:cNvPr id="5" name="Picture 2" descr="Image result for harvard extension school logo">
@@ -3799,8 +3778,8 @@
         </p:nvSpPr>
         <p:spPr>
           <a:xfrm>
-            <a:off x="1805276" y="4705706"/>
-            <a:ext cx="5744633" cy="369332"/>
+            <a:off x="922714" y="4705706"/>
+            <a:ext cx="7265322" cy="369332"/>
           </a:xfrm>
           <a:prstGeom prst="rect">
             <a:avLst/>
@@ -3816,7 +3795,7 @@
             <a:pPr algn="ctr"/>
             <a:r>
               <a:rPr lang="en-US" sz="1100" dirty="0"/>
-              <a:t>Copyright 2018, 2019, 2020, 2021, 2022, 2023 2024, Stephen F Elston. All rights reserved</a:t>
+              <a:t>Copyright 2018, 2019, 2020, 2021, 2022, 2023 2024, 2025 Stephen F Elston. All rights reserved</a:t>
             </a:r>
             <a:r>
               <a:rPr lang="en-US" dirty="0"/>
@@ -5614,7 +5593,7 @@
             </p:spPr>
             <p:txBody>
               <a:bodyPr vert="horz" lIns="91440" tIns="45720" rIns="91440" bIns="45720" rtlCol="0">
-                <a:normAutofit fontScale="92500" lnSpcReduction="20000"/>
+                <a:normAutofit/>
               </a:bodyPr>
               <a:lstStyle>
                 <a:lvl1pPr marL="342900" indent="-342900" algn="l" defTabSz="342900" rtl="0" eaLnBrk="1" latinLnBrk="0" hangingPunct="1">
@@ -5790,7 +5769,7 @@
                 </a:pPr>
                 <a:r>
                   <a:rPr lang="en-US" sz="1600" dirty="0"/>
-                  <a:t>CI width of variable coefficient vs updated interaction coefficient </a:t>
+                  <a:t>Value of first interaction </a:t>
                 </a:r>
                 <a14:m>
                   <m:oMath xmlns:m="http://schemas.openxmlformats.org/officeDocument/2006/math">
@@ -5798,7 +5777,7 @@
                       <a:rPr lang="en-US" sz="1600" b="0" i="1" smtClean="0">
                         <a:latin typeface="Cambria Math" panose="02040503050406030204" pitchFamily="18" charset="0"/>
                       </a:rPr>
-                      <m:t>12</m:t>
+                      <m:t>47</m:t>
                     </m:r>
                     <m:r>
                       <a:rPr lang="en-US" sz="1600" b="0" i="1" smtClean="0">
@@ -5810,7 +5789,58 @@
                       <a:rPr lang="en-US" sz="1600" b="0" i="1" smtClean="0">
                         <a:latin typeface="Cambria Math" panose="02040503050406030204" pitchFamily="18" charset="0"/>
                       </a:rPr>
-                      <m:t>3</m:t>
+                      <m:t>5</m:t>
+                    </m:r>
+                    <m:r>
+                      <a:rPr lang="en-US" sz="1600" i="1">
+                        <a:latin typeface="Cambria Math" panose="02040503050406030204" pitchFamily="18" charset="0"/>
+                        <a:ea typeface="Cambria Math" panose="02040503050406030204" pitchFamily="18" charset="0"/>
+                      </a:rPr>
+                      <m:t>→</m:t>
+                    </m:r>
+                    <m:r>
+                      <a:rPr lang="en-US" sz="1600" b="0" i="1" smtClean="0">
+                        <a:latin typeface="Cambria Math" panose="02040503050406030204" pitchFamily="18" charset="0"/>
+                      </a:rPr>
+                      <m:t>55</m:t>
+                    </m:r>
+                    <m:r>
+                      <a:rPr lang="en-US" sz="1600" b="0" i="1" smtClean="0">
+                        <a:latin typeface="Cambria Math" panose="02040503050406030204" pitchFamily="18" charset="0"/>
+                      </a:rPr>
+                      <m:t>.</m:t>
+                    </m:r>
+                    <m:r>
+                      <a:rPr lang="en-US" sz="1600" b="0" i="1" smtClean="0">
+                        <a:latin typeface="Cambria Math" panose="02040503050406030204" pitchFamily="18" charset="0"/>
+                      </a:rPr>
+                      <m:t>5</m:t>
+                    </m:r>
+                  </m:oMath>
+                </a14:m>
+                <a:r>
+                  <a:rPr lang="en-US" sz="1600" dirty="0"/>
+                  <a:t>, CI width of coefficient </a:t>
+                </a:r>
+                <a14:m>
+                  <m:oMath xmlns:m="http://schemas.openxmlformats.org/officeDocument/2006/math">
+                    <m:r>
+                      <a:rPr lang="en-US" sz="1600" b="0" i="1" smtClean="0">
+                        <a:latin typeface="Cambria Math" panose="02040503050406030204" pitchFamily="18" charset="0"/>
+                      </a:rPr>
+                      <m:t>15</m:t>
+                    </m:r>
+                    <m:r>
+                      <a:rPr lang="en-US" sz="1600" b="0" i="1" smtClean="0">
+                        <a:latin typeface="Cambria Math" panose="02040503050406030204" pitchFamily="18" charset="0"/>
+                      </a:rPr>
+                      <m:t>.</m:t>
+                    </m:r>
+                    <m:r>
+                      <a:rPr lang="en-US" sz="1600" b="0" i="1" smtClean="0">
+                        <a:latin typeface="Cambria Math" panose="02040503050406030204" pitchFamily="18" charset="0"/>
+                      </a:rPr>
+                      <m:t>7</m:t>
                     </m:r>
                     <m:r>
                       <a:rPr lang="en-US" sz="1600" b="0" i="1" smtClean="0">
@@ -5824,75 +5854,14 @@
                         <a:latin typeface="Cambria Math" panose="02040503050406030204" pitchFamily="18" charset="0"/>
                         <a:ea typeface="Cambria Math" panose="02040503050406030204" pitchFamily="18" charset="0"/>
                       </a:rPr>
-                      <m:t>8</m:t>
+                      <m:t>5</m:t>
                     </m:r>
                     <m:r>
                       <a:rPr lang="en-US" sz="1600" b="0" i="1" smtClean="0">
                         <a:latin typeface="Cambria Math" panose="02040503050406030204" pitchFamily="18" charset="0"/>
                         <a:ea typeface="Cambria Math" panose="02040503050406030204" pitchFamily="18" charset="0"/>
                       </a:rPr>
-                      <m:t>.</m:t>
-                    </m:r>
-                    <m:r>
-                      <a:rPr lang="en-US" sz="1600" b="0" i="1" smtClean="0">
-                        <a:latin typeface="Cambria Math" panose="02040503050406030204" pitchFamily="18" charset="0"/>
-                        <a:ea typeface="Cambria Math" panose="02040503050406030204" pitchFamily="18" charset="0"/>
-                      </a:rPr>
-                      <m:t>7</m:t>
-                    </m:r>
-                  </m:oMath>
-                </a14:m>
-                <a:endParaRPr lang="en-US" sz="1600" dirty="0"/>
-              </a:p>
-              <a:p>
-                <a:pPr>
-                  <a:buFont typeface="+mj-lt"/>
-                  <a:buAutoNum type="arabicPeriod"/>
-                </a:pPr>
-                <a:r>
-                  <a:rPr lang="en-US" sz="1600" dirty="0"/>
-                  <a:t>CI width of interaction coefficient vs. updated interaction coefficient </a:t>
-                </a:r>
-                <a14:m>
-                  <m:oMath xmlns:m="http://schemas.openxmlformats.org/officeDocument/2006/math">
-                    <m:r>
-                      <a:rPr lang="en-US" sz="1600" b="0" i="1" smtClean="0">
-                        <a:latin typeface="Cambria Math" panose="02040503050406030204" pitchFamily="18" charset="0"/>
-                      </a:rPr>
-                      <m:t>17</m:t>
-                    </m:r>
-                    <m:r>
-                      <a:rPr lang="en-US" sz="1600" b="0" i="1" smtClean="0">
-                        <a:latin typeface="Cambria Math" panose="02040503050406030204" pitchFamily="18" charset="0"/>
-                      </a:rPr>
-                      <m:t>.</m:t>
-                    </m:r>
-                    <m:r>
-                      <a:rPr lang="en-US" sz="1600" b="0" i="1" smtClean="0">
-                        <a:latin typeface="Cambria Math" panose="02040503050406030204" pitchFamily="18" charset="0"/>
-                      </a:rPr>
-                      <m:t>3</m:t>
-                    </m:r>
-                    <m:r>
-                      <a:rPr lang="en-US" sz="1600" b="0" i="1" smtClean="0">
-                        <a:latin typeface="Cambria Math" panose="02040503050406030204" pitchFamily="18" charset="0"/>
-                        <a:ea typeface="Cambria Math" panose="02040503050406030204" pitchFamily="18" charset="0"/>
-                      </a:rPr>
-                      <m:t>→</m:t>
-                    </m:r>
-                    <m:r>
-                      <a:rPr lang="en-US" sz="1600" b="0" i="1" smtClean="0">
-                        <a:latin typeface="Cambria Math" panose="02040503050406030204" pitchFamily="18" charset="0"/>
-                        <a:ea typeface="Cambria Math" panose="02040503050406030204" pitchFamily="18" charset="0"/>
-                      </a:rPr>
-                      <m:t>6</m:t>
-                    </m:r>
-                    <m:r>
-                      <a:rPr lang="en-US" sz="1600" b="0" i="1" smtClean="0">
-                        <a:latin typeface="Cambria Math" panose="02040503050406030204" pitchFamily="18" charset="0"/>
-                        <a:ea typeface="Cambria Math" panose="02040503050406030204" pitchFamily="18" charset="0"/>
-                      </a:rPr>
-                      <m:t>.</m:t>
+                      <m:t>..</m:t>
                     </m:r>
                     <m:r>
                       <a:rPr lang="en-US" sz="1600" b="0" i="1" smtClean="0">
@@ -5937,7 +5906,7 @@
               <a:blipFill>
                 <a:blip r:embed="rId3"/>
                 <a:stretch>
-                  <a:fillRect l="-287" t="-3922" b="-1961"/>
+                  <a:fillRect l="-358" t="-1471" b="-3922"/>
                 </a:stretch>
               </a:blipFill>
             </p:spPr>
@@ -5971,9 +5940,9 @@
           <p:nvPr/>
         </p:nvCxnSpPr>
         <p:spPr>
-          <a:xfrm>
-            <a:off x="4206240" y="3603050"/>
-            <a:ext cx="2024149" cy="0"/>
+          <a:xfrm flipV="1">
+            <a:off x="4197927" y="3993748"/>
+            <a:ext cx="1028700" cy="125208"/>
           </a:xfrm>
           <a:prstGeom prst="straightConnector1">
             <a:avLst/>
@@ -6016,8 +5985,8 @@
         </p:nvCxnSpPr>
         <p:spPr>
           <a:xfrm>
-            <a:off x="4197927" y="3898669"/>
-            <a:ext cx="4044142" cy="0"/>
+            <a:off x="4251960" y="3573196"/>
+            <a:ext cx="953170" cy="0"/>
           </a:xfrm>
           <a:prstGeom prst="straightConnector1">
             <a:avLst/>
@@ -6074,50 +6043,6 @@
           </a:prstGeom>
         </p:spPr>
       </p:pic>
-      <p:cxnSp>
-        <p:nvCxnSpPr>
-          <p:cNvPr id="11" name="Straight Arrow Connector 10">
-            <a:extLst>
-              <a:ext uri="{FF2B5EF4-FFF2-40B4-BE49-F238E27FC236}">
-                <a16:creationId xmlns:a16="http://schemas.microsoft.com/office/drawing/2014/main" id="{FB6A023B-D5DB-6AED-22C9-842AAFBD091C}"/>
-              </a:ext>
-            </a:extLst>
-          </p:cNvPr>
-          <p:cNvCxnSpPr>
-            <a:cxnSpLocks/>
-          </p:cNvCxnSpPr>
-          <p:nvPr/>
-        </p:nvCxnSpPr>
-        <p:spPr>
-          <a:xfrm>
-            <a:off x="4206240" y="4300450"/>
-            <a:ext cx="4044142" cy="0"/>
-          </a:xfrm>
-          <a:prstGeom prst="straightConnector1">
-            <a:avLst/>
-          </a:prstGeom>
-          <a:ln>
-            <a:solidFill>
-              <a:schemeClr val="tx1"/>
-            </a:solidFill>
-            <a:tailEnd type="triangle"/>
-          </a:ln>
-        </p:spPr>
-        <p:style>
-          <a:lnRef idx="2">
-            <a:schemeClr val="accent1"/>
-          </a:lnRef>
-          <a:fillRef idx="0">
-            <a:schemeClr val="accent1"/>
-          </a:fillRef>
-          <a:effectRef idx="1">
-            <a:schemeClr val="accent1"/>
-          </a:effectRef>
-          <a:fontRef idx="minor">
-            <a:schemeClr val="tx1"/>
-          </a:fontRef>
-        </p:style>
-      </p:cxnSp>
       <p:sp>
         <p:nvSpPr>
           <p:cNvPr id="12" name="Content Placeholder 2">
@@ -6134,7 +6059,7 @@
         </p:nvSpPr>
         <p:spPr>
           <a:xfrm>
-            <a:off x="4206241" y="3573196"/>
+            <a:off x="4202083" y="3603824"/>
             <a:ext cx="1007204" cy="279749"/>
           </a:xfrm>
           <a:prstGeom prst="rect">
@@ -6310,8 +6235,8 @@
         </p:nvSpPr>
         <p:spPr>
           <a:xfrm>
-            <a:off x="4214553" y="3898669"/>
-            <a:ext cx="998891" cy="279749"/>
+            <a:off x="4197927" y="3869632"/>
+            <a:ext cx="374073" cy="279749"/>
           </a:xfrm>
           <a:prstGeom prst="rect">
             <a:avLst/>
@@ -6572,182 +6497,6 @@
               <a:buNone/>
             </a:pPr>
             <a:endParaRPr lang="en-US" sz="1400" dirty="0"/>
-          </a:p>
-        </p:txBody>
-      </p:sp>
-      <p:sp>
-        <p:nvSpPr>
-          <p:cNvPr id="14" name="Content Placeholder 2">
-            <a:extLst>
-              <a:ext uri="{FF2B5EF4-FFF2-40B4-BE49-F238E27FC236}">
-                <a16:creationId xmlns:a16="http://schemas.microsoft.com/office/drawing/2014/main" id="{99EEFE48-0B88-97B0-2DAF-7AFF1F3429D7}"/>
-              </a:ext>
-            </a:extLst>
-          </p:cNvPr>
-          <p:cNvSpPr txBox="1">
-            <a:spLocks/>
-          </p:cNvSpPr>
-          <p:nvPr/>
-        </p:nvSpPr>
-        <p:spPr>
-          <a:xfrm>
-            <a:off x="4197927" y="4300450"/>
-            <a:ext cx="1007204" cy="279749"/>
-          </a:xfrm>
-          <a:prstGeom prst="rect">
-            <a:avLst/>
-          </a:prstGeom>
-        </p:spPr>
-        <p:txBody>
-          <a:bodyPr vert="horz" lIns="91440" tIns="45720" rIns="91440" bIns="45720" rtlCol="0">
-            <a:normAutofit fontScale="92500" lnSpcReduction="10000"/>
-          </a:bodyPr>
-          <a:lstStyle>
-            <a:lvl1pPr marL="342900" indent="-342900" algn="l" defTabSz="342900" rtl="0" eaLnBrk="1" latinLnBrk="0" hangingPunct="1">
-              <a:spcBef>
-                <a:spcPct val="20000"/>
-              </a:spcBef>
-              <a:buFont typeface="Arial"/>
-              <a:buChar char="•"/>
-              <a:defRPr sz="2400" kern="1200">
-                <a:solidFill>
-                  <a:schemeClr val="tx1"/>
-                </a:solidFill>
-                <a:latin typeface="+mn-lt"/>
-                <a:ea typeface="+mn-ea"/>
-                <a:cs typeface="+mn-cs"/>
-              </a:defRPr>
-            </a:lvl1pPr>
-            <a:lvl2pPr marL="685800" indent="-342900" algn="l" defTabSz="342900" rtl="0" eaLnBrk="1" latinLnBrk="0" hangingPunct="1">
-              <a:spcBef>
-                <a:spcPct val="20000"/>
-              </a:spcBef>
-              <a:buFont typeface="Arial"/>
-              <a:buChar char="–"/>
-              <a:defRPr sz="2100" kern="1200">
-                <a:solidFill>
-                  <a:schemeClr val="tx1"/>
-                </a:solidFill>
-                <a:latin typeface="+mn-lt"/>
-                <a:ea typeface="+mn-ea"/>
-                <a:cs typeface="+mn-cs"/>
-              </a:defRPr>
-            </a:lvl2pPr>
-            <a:lvl3pPr marL="1028700" indent="-342900" algn="l" defTabSz="342900" rtl="0" eaLnBrk="1" latinLnBrk="0" hangingPunct="1">
-              <a:spcBef>
-                <a:spcPct val="20000"/>
-              </a:spcBef>
-              <a:buFont typeface="Arial"/>
-              <a:buChar char="•"/>
-              <a:defRPr sz="1800" kern="1200">
-                <a:solidFill>
-                  <a:schemeClr val="tx1"/>
-                </a:solidFill>
-                <a:latin typeface="+mn-lt"/>
-                <a:ea typeface="+mn-ea"/>
-                <a:cs typeface="+mn-cs"/>
-              </a:defRPr>
-            </a:lvl3pPr>
-            <a:lvl4pPr marL="1371600" indent="-342900" algn="l" defTabSz="342900" rtl="0" eaLnBrk="1" latinLnBrk="0" hangingPunct="1">
-              <a:spcBef>
-                <a:spcPct val="20000"/>
-              </a:spcBef>
-              <a:buFont typeface="Arial"/>
-              <a:buChar char="–"/>
-              <a:defRPr sz="1500" kern="1200">
-                <a:solidFill>
-                  <a:schemeClr val="tx1"/>
-                </a:solidFill>
-                <a:latin typeface="+mn-lt"/>
-                <a:ea typeface="+mn-ea"/>
-                <a:cs typeface="+mn-cs"/>
-              </a:defRPr>
-            </a:lvl4pPr>
-            <a:lvl5pPr marL="1714500" indent="-342900" algn="l" defTabSz="342900" rtl="0" eaLnBrk="1" latinLnBrk="0" hangingPunct="1">
-              <a:spcBef>
-                <a:spcPct val="20000"/>
-              </a:spcBef>
-              <a:buFont typeface="Arial"/>
-              <a:buChar char="»"/>
-              <a:defRPr sz="1500" kern="1200">
-                <a:solidFill>
-                  <a:schemeClr val="tx1"/>
-                </a:solidFill>
-                <a:latin typeface="+mn-lt"/>
-                <a:ea typeface="+mn-ea"/>
-                <a:cs typeface="+mn-cs"/>
-              </a:defRPr>
-            </a:lvl5pPr>
-            <a:lvl6pPr marL="2057400" indent="-342900" algn="l" defTabSz="342900" rtl="0" eaLnBrk="1" latinLnBrk="0" hangingPunct="1">
-              <a:spcBef>
-                <a:spcPct val="20000"/>
-              </a:spcBef>
-              <a:buFont typeface="Arial"/>
-              <a:buChar char="•"/>
-              <a:defRPr sz="1500" kern="1200">
-                <a:solidFill>
-                  <a:schemeClr val="tx1"/>
-                </a:solidFill>
-                <a:latin typeface="+mn-lt"/>
-                <a:ea typeface="+mn-ea"/>
-                <a:cs typeface="+mn-cs"/>
-              </a:defRPr>
-            </a:lvl6pPr>
-            <a:lvl7pPr marL="2400300" indent="-342900" algn="l" defTabSz="342900" rtl="0" eaLnBrk="1" latinLnBrk="0" hangingPunct="1">
-              <a:spcBef>
-                <a:spcPct val="20000"/>
-              </a:spcBef>
-              <a:buFont typeface="Arial"/>
-              <a:buChar char="•"/>
-              <a:defRPr sz="1500" kern="1200">
-                <a:solidFill>
-                  <a:schemeClr val="tx1"/>
-                </a:solidFill>
-                <a:latin typeface="+mn-lt"/>
-                <a:ea typeface="+mn-ea"/>
-                <a:cs typeface="+mn-cs"/>
-              </a:defRPr>
-            </a:lvl7pPr>
-            <a:lvl8pPr marL="2743200" indent="-342900" algn="l" defTabSz="342900" rtl="0" eaLnBrk="1" latinLnBrk="0" hangingPunct="1">
-              <a:spcBef>
-                <a:spcPct val="20000"/>
-              </a:spcBef>
-              <a:buFont typeface="Arial"/>
-              <a:buChar char="•"/>
-              <a:defRPr sz="1500" kern="1200">
-                <a:solidFill>
-                  <a:schemeClr val="tx1"/>
-                </a:solidFill>
-                <a:latin typeface="+mn-lt"/>
-                <a:ea typeface="+mn-ea"/>
-                <a:cs typeface="+mn-cs"/>
-              </a:defRPr>
-            </a:lvl8pPr>
-            <a:lvl9pPr marL="3086100" indent="-342900" algn="l" defTabSz="342900" rtl="0" eaLnBrk="1" latinLnBrk="0" hangingPunct="1">
-              <a:spcBef>
-                <a:spcPct val="20000"/>
-              </a:spcBef>
-              <a:buFont typeface="Arial"/>
-              <a:buChar char="•"/>
-              <a:defRPr sz="1500" kern="1200">
-                <a:solidFill>
-                  <a:schemeClr val="tx1"/>
-                </a:solidFill>
-                <a:latin typeface="+mn-lt"/>
-                <a:ea typeface="+mn-ea"/>
-                <a:cs typeface="+mn-cs"/>
-              </a:defRPr>
-            </a:lvl9pPr>
-          </a:lstStyle>
-          <a:p>
-            <a:pPr marL="0" indent="0">
-              <a:buFont typeface="Arial"/>
-              <a:buNone/>
-            </a:pPr>
-            <a:r>
-              <a:rPr lang="en-US" sz="1400" dirty="0"/>
-              <a:t>3</a:t>
-            </a:r>
           </a:p>
         </p:txBody>
       </p:sp>
@@ -6922,7 +6671,7 @@
             </a:pPr>
             <a:r>
               <a:rPr lang="en-US" sz="1200" dirty="0"/>
-              <a:t>4. Reduced condition </a:t>
+              <a:t>3. Reduced condition </a:t>
             </a:r>
           </a:p>
           <a:p>
@@ -7056,7 +6805,7 @@
                                           </p:stCondLst>
                                         </p:cTn>
                                         <p:tgtEl>
-                                          <p:spTgt spid="5"/>
+                                          <p:spTgt spid="17"/>
                                         </p:tgtEl>
                                         <p:attrNameLst>
                                           <p:attrName>style.visibility</p:attrName>
@@ -7128,11 +6877,7 @@
                                           </p:stCondLst>
                                         </p:cTn>
                                         <p:tgtEl>
-                                          <p:spTgt spid="8">
-                                            <p:txEl>
-                                              <p:pRg st="3" end="3"/>
-                                            </p:txEl>
-                                          </p:spTgt>
+                                          <p:spTgt spid="5"/>
                                         </p:tgtEl>
                                         <p:attrNameLst>
                                           <p:attrName>style.visibility</p:attrName>
@@ -7159,7 +6904,11 @@
                                           </p:stCondLst>
                                         </p:cTn>
                                         <p:tgtEl>
-                                          <p:spTgt spid="17"/>
+                                          <p:spTgt spid="8">
+                                            <p:txEl>
+                                              <p:pRg st="3" end="3"/>
+                                            </p:txEl>
+                                          </p:spTgt>
                                         </p:tgtEl>
                                         <p:attrNameLst>
                                           <p:attrName>style.visibility</p:attrName>
@@ -7231,11 +6980,7 @@
                                           </p:stCondLst>
                                         </p:cTn>
                                         <p:tgtEl>
-                                          <p:spTgt spid="8">
-                                            <p:txEl>
-                                              <p:pRg st="4" end="4"/>
-                                            </p:txEl>
-                                          </p:spTgt>
+                                          <p:spTgt spid="16"/>
                                         </p:tgtEl>
                                         <p:attrNameLst>
                                           <p:attrName>style.visibility</p:attrName>
@@ -7249,7 +6994,7 @@
                                 </p:cTn>
                               </p:par>
                               <p:par>
-                                <p:cTn id="23" presetID="1" presetClass="entr" presetSubtype="0" fill="hold" nodeType="withEffect">
+                                <p:cTn id="23" presetID="1" presetClass="entr" presetSubtype="0" fill="hold" grpId="0" nodeType="withEffect">
                                   <p:stCondLst>
                                     <p:cond delay="0"/>
                                   </p:stCondLst>
@@ -7262,106 +7007,7 @@
                                           </p:stCondLst>
                                         </p:cTn>
                                         <p:tgtEl>
-                                          <p:spTgt spid="11"/>
-                                        </p:tgtEl>
-                                        <p:attrNameLst>
-                                          <p:attrName>style.visibility</p:attrName>
-                                        </p:attrNameLst>
-                                      </p:cBhvr>
-                                      <p:to>
-                                        <p:strVal val="visible"/>
-                                      </p:to>
-                                    </p:set>
-                                  </p:childTnLst>
-                                </p:cTn>
-                              </p:par>
-                              <p:par>
-                                <p:cTn id="25" presetID="1" presetClass="entr" presetSubtype="0" fill="hold" grpId="0" nodeType="withEffect">
-                                  <p:stCondLst>
-                                    <p:cond delay="0"/>
-                                  </p:stCondLst>
-                                  <p:childTnLst>
-                                    <p:set>
-                                      <p:cBhvr>
-                                        <p:cTn id="26" dur="1" fill="hold">
-                                          <p:stCondLst>
-                                            <p:cond delay="0"/>
-                                          </p:stCondLst>
-                                        </p:cTn>
-                                        <p:tgtEl>
-                                          <p:spTgt spid="14"/>
-                                        </p:tgtEl>
-                                        <p:attrNameLst>
-                                          <p:attrName>style.visibility</p:attrName>
-                                        </p:attrNameLst>
-                                      </p:cBhvr>
-                                      <p:to>
-                                        <p:strVal val="visible"/>
-                                      </p:to>
-                                    </p:set>
-                                  </p:childTnLst>
-                                </p:cTn>
-                              </p:par>
-                            </p:childTnLst>
-                          </p:cTn>
-                        </p:par>
-                      </p:childTnLst>
-                    </p:cTn>
-                  </p:par>
-                  <p:par>
-                    <p:cTn id="27" fill="hold">
-                      <p:stCondLst>
-                        <p:cond delay="indefinite"/>
-                      </p:stCondLst>
-                      <p:childTnLst>
-                        <p:par>
-                          <p:cTn id="28" fill="hold">
-                            <p:stCondLst>
-                              <p:cond delay="0"/>
-                            </p:stCondLst>
-                            <p:childTnLst>
-                              <p:par>
-                                <p:cTn id="29" presetID="1" presetClass="entr" presetSubtype="0" fill="hold" grpId="0" nodeType="clickEffect">
-                                  <p:stCondLst>
-                                    <p:cond delay="0"/>
-                                  </p:stCondLst>
-                                  <p:childTnLst>
-                                    <p:set>
-                                      <p:cBhvr>
-                                        <p:cTn id="30" dur="1" fill="hold">
-                                          <p:stCondLst>
-                                            <p:cond delay="0"/>
-                                          </p:stCondLst>
-                                        </p:cTn>
-                                        <p:tgtEl>
                                           <p:spTgt spid="15"/>
-                                        </p:tgtEl>
-                                        <p:attrNameLst>
-                                          <p:attrName>style.visibility</p:attrName>
-                                        </p:attrNameLst>
-                                      </p:cBhvr>
-                                      <p:to>
-                                        <p:strVal val="visible"/>
-                                      </p:to>
-                                    </p:set>
-                                  </p:childTnLst>
-                                </p:cTn>
-                              </p:par>
-                              <p:par>
-                                <p:cTn id="31" presetID="1" presetClass="entr" presetSubtype="0" fill="hold" nodeType="withEffect">
-                                  <p:stCondLst>
-                                    <p:cond delay="0"/>
-                                  </p:stCondLst>
-                                  <p:childTnLst>
-                                    <p:set>
-                                      <p:cBhvr>
-                                        <p:cTn id="32" dur="1" fill="hold">
-                                          <p:stCondLst>
-                                            <p:cond delay="0"/>
-                                          </p:stCondLst>
-                                        </p:cTn>
-                                        <p:tgtEl>
-                                          <p:spTgt spid="16"/>
                                         </p:tgtEl>
                                         <p:attrNameLst>
                                           <p:attrName>style.visibility</p:attrName>
@@ -7404,7 +7050,6 @@
     <p:bldLst>
       <p:bldP spid="12" grpId="0"/>
       <p:bldP spid="13" grpId="0"/>
-      <p:bldP spid="14" grpId="0"/>
       <p:bldP spid="15" grpId="0"/>
     </p:bldLst>
   </p:timing>
@@ -7464,8 +7109,8 @@
         </p:nvSpPr>
         <p:spPr>
           <a:xfrm>
-            <a:off x="457200" y="950976"/>
-            <a:ext cx="8229600" cy="4088384"/>
+            <a:off x="457199" y="950976"/>
+            <a:ext cx="8533015" cy="4128100"/>
           </a:xfrm>
         </p:spPr>
         <p:txBody>
@@ -7541,8 +7186,13 @@
             </a:r>
             <a:r>
               <a:rPr sz="2200" dirty="0"/>
-              <a:t>confound model fitting - coefficient values correlated</a:t>
-            </a:r>
+              <a:t>confound model fitting - coefficient values </a:t>
+            </a:r>
+            <a:r>
+              <a:rPr lang="en-US" sz="2200" dirty="0"/>
+              <a:t>not independent</a:t>
+            </a:r>
+            <a:endParaRPr sz="2200" dirty="0"/>
           </a:p>
           <a:p>
             <a:pPr lvl="1"/>
@@ -8071,88 +7721,72 @@
                   <a:buNone/>
                 </a:pPr>
                 <a:r>
-                  <a:rPr b="1" dirty="0"/>
+                  <a:rPr lang="en-US" b="1" dirty="0"/>
                   <a:t>Idea!:</a:t>
                 </a:r>
                 <a:r>
-                  <a:rPr dirty="0"/>
+                  <a:rPr lang="en-US" dirty="0"/>
                   <a:t> Try systematically pruning the model using some metric</a:t>
                 </a:r>
               </a:p>
               <a:p>
                 <a:pPr lvl="0"/>
                 <a:r>
-                  <a:rPr dirty="0"/>
+                  <a:rPr lang="en-US" dirty="0"/>
                   <a:t>Leads to the </a:t>
                 </a:r>
                 <a:r>
-                  <a:rPr b="1" dirty="0">
+                  <a:rPr lang="en-US" b="1" dirty="0">
                     <a:hlinkClick r:id="rId2"/>
                   </a:rPr>
                   <a:t>step-wise regression algorithm</a:t>
                 </a:r>
-                <a:endParaRPr b="1" dirty="0"/>
+                <a:endParaRPr lang="en-US" b="1" dirty="0"/>
               </a:p>
               <a:p>
                 <a:pPr lvl="1"/>
                 <a:r>
-                  <a:rPr b="1" dirty="0"/>
+                  <a:rPr lang="en-US" b="1" dirty="0"/>
                   <a:t>Forward step-wise regression</a:t>
                 </a:r>
                 <a:r>
-                  <a:rPr dirty="0"/>
-                  <a:t> adds </a:t>
-                </a:r>
-                <a:r>
                   <a:rPr lang="en-US" dirty="0"/>
-                  <a:t>the most </a:t>
-                </a:r>
-                <a:r>
-                  <a:rPr dirty="0"/>
-                  <a:t>explanatory variable one at a time</a:t>
+                  <a:t> adds the most explanatory variable one at a time</a:t>
                 </a:r>
               </a:p>
               <a:p>
                 <a:pPr lvl="1"/>
                 <a:r>
-                  <a:rPr b="1" dirty="0"/>
+                  <a:rPr lang="en-US" b="1" dirty="0"/>
                   <a:t>Backward step-wise regression </a:t>
                 </a:r>
                 <a:r>
-                  <a:rPr dirty="0"/>
-                  <a:t>removes</a:t>
-                </a:r>
-                <a:r>
                   <a:rPr lang="en-US" dirty="0"/>
-                  <a:t> the</a:t>
-                </a:r>
-                <a:r>
-                  <a:rPr dirty="0"/>
-                  <a:t> least explanatory variable one at a time</a:t>
+                  <a:t>removes the least explanatory variable one at a time</a:t>
                 </a:r>
               </a:p>
               <a:p>
                 <a:pPr lvl="1"/>
                 <a:r>
-                  <a:rPr b="1" dirty="0"/>
+                  <a:rPr lang="en-US" b="1" dirty="0"/>
                   <a:t>Can go both directions </a:t>
                 </a:r>
                 <a:r>
-                  <a:rPr dirty="0"/>
+                  <a:rPr lang="en-US" dirty="0"/>
                   <a:t>- see the R documentation</a:t>
                 </a:r>
               </a:p>
               <a:p>
                 <a:pPr lvl="1"/>
                 <a:r>
-                  <a:rPr dirty="0"/>
+                  <a:rPr lang="en-US" dirty="0"/>
                   <a:t>Hard to find a good metric</a:t>
                 </a:r>
               </a:p>
               <a:p>
                 <a:pPr lvl="0"/>
                 <a:r>
-                  <a:rPr dirty="0"/>
+                  <a:rPr lang="en-US" dirty="0"/>
                   <a:t>But, making multiple hypothesis tests is a fraught undertaking</a:t>
                 </a:r>
               </a:p>
@@ -8163,14 +7797,14 @@
                     <m:sSub>
                       <m:sSubPr>
                         <m:ctrlPr>
-                          <a:rPr i="1">
+                          <a:rPr lang="ar-AE" i="1">
                             <a:latin typeface="Cambria Math" panose="02040503050406030204" pitchFamily="18" charset="0"/>
                           </a:rPr>
                         </m:ctrlPr>
                       </m:sSubPr>
                       <m:e>
                         <m:r>
-                          <a:rPr>
+                          <a:rPr lang="ar-AE">
                             <a:latin typeface="Cambria Math" panose="02040503050406030204" pitchFamily="18" charset="0"/>
                           </a:rPr>
                           <m:t>𝐻</m:t>
@@ -8178,7 +7812,7 @@
                       </m:e>
                       <m:sub>
                         <m:r>
-                          <a:rPr>
+                          <a:rPr lang="ar-AE">
                             <a:latin typeface="Cambria Math" panose="02040503050406030204" pitchFamily="18" charset="0"/>
                           </a:rPr>
                           <m:t>0</m:t>
@@ -8188,40 +7822,44 @@
                   </m:oMath>
                 </a14:m>
                 <a:r>
-                  <a:rPr dirty="0"/>
-                  <a:t> is null or insignificant predictor</a:t>
+                  <a:rPr lang="ar-AE" dirty="0"/>
+                  <a:t> </a:t>
+                </a:r>
+                <a:r>
+                  <a:rPr lang="en-US" dirty="0"/>
+                  <a:t>is null or insignificant predictor</a:t>
                 </a:r>
               </a:p>
               <a:p>
                 <a:pPr lvl="1"/>
                 <a:r>
-                  <a:rPr dirty="0"/>
+                  <a:rPr lang="en-US" dirty="0"/>
                   <a:t>High probability of Type 1 or Type 2 error</a:t>
                 </a:r>
               </a:p>
               <a:p>
                 <a:pPr lvl="1"/>
                 <a:r>
-                  <a:rPr b="1" dirty="0"/>
+                  <a:rPr lang="en-US" b="1" dirty="0"/>
                   <a:t>Type 1 error</a:t>
                 </a:r>
                 <a:r>
-                  <a:rPr dirty="0"/>
-                  <a:t>, fail to accept </a:t>
+                  <a:rPr lang="en-US" dirty="0"/>
+                  <a:t>, reject </a:t>
                 </a:r>
                 <a14:m>
                   <m:oMath xmlns:m="http://schemas.openxmlformats.org/officeDocument/2006/math">
                     <m:sSub>
                       <m:sSubPr>
                         <m:ctrlPr>
-                          <a:rPr i="1">
+                          <a:rPr lang="ar-AE" i="1">
                             <a:latin typeface="Cambria Math" panose="02040503050406030204" pitchFamily="18" charset="0"/>
                           </a:rPr>
                         </m:ctrlPr>
                       </m:sSubPr>
                       <m:e>
                         <m:r>
-                          <a:rPr>
+                          <a:rPr lang="ar-AE">
                             <a:latin typeface="Cambria Math" panose="02040503050406030204" pitchFamily="18" charset="0"/>
                           </a:rPr>
                           <m:t>𝐻</m:t>
@@ -8229,7 +7867,7 @@
                       </m:e>
                       <m:sub>
                         <m:r>
-                          <a:rPr>
+                          <a:rPr lang="ar-AE">
                             <a:latin typeface="Cambria Math" panose="02040503050406030204" pitchFamily="18" charset="0"/>
                           </a:rPr>
                           <m:t>0</m:t>
@@ -8239,13 +7877,13 @@
                   </m:oMath>
                 </a14:m>
                 <a:r>
-                  <a:rPr dirty="0"/>
+                  <a:rPr lang="ar-AE" dirty="0"/>
                   <a:t>, </a:t>
                 </a:r>
                 <a14:m>
                   <m:oMath xmlns:m="http://schemas.openxmlformats.org/officeDocument/2006/math">
                     <m:r>
-                      <a:rPr>
+                      <a:rPr lang="ar-AE">
                         <a:latin typeface="Cambria Math" panose="02040503050406030204" pitchFamily="18" charset="0"/>
                       </a:rPr>
                       <m:t>→</m:t>
@@ -8253,18 +7891,22 @@
                   </m:oMath>
                 </a14:m>
                 <a:r>
-                  <a:rPr dirty="0"/>
-                  <a:t> include insignificant predictor</a:t>
+                  <a:rPr lang="ar-AE" dirty="0"/>
+                  <a:t> </a:t>
+                </a:r>
+                <a:r>
+                  <a:rPr lang="en-US" dirty="0"/>
+                  <a:t>include insignificant predictor</a:t>
                 </a:r>
               </a:p>
               <a:p>
                 <a:pPr lvl="1"/>
                 <a:r>
-                  <a:rPr b="1" dirty="0"/>
+                  <a:rPr lang="en-US" b="1" dirty="0"/>
                   <a:t>Type 2 error</a:t>
                 </a:r>
                 <a:r>
-                  <a:rPr dirty="0"/>
+                  <a:rPr lang="en-US" dirty="0"/>
                   <a:t>, fail to reject </a:t>
                 </a:r>
                 <a14:m>
@@ -8272,14 +7914,14 @@
                     <m:sSub>
                       <m:sSubPr>
                         <m:ctrlPr>
-                          <a:rPr i="1">
+                          <a:rPr lang="ar-AE" i="1">
                             <a:latin typeface="Cambria Math" panose="02040503050406030204" pitchFamily="18" charset="0"/>
                           </a:rPr>
                         </m:ctrlPr>
                       </m:sSubPr>
                       <m:e>
                         <m:r>
-                          <a:rPr>
+                          <a:rPr lang="ar-AE">
                             <a:latin typeface="Cambria Math" panose="02040503050406030204" pitchFamily="18" charset="0"/>
                           </a:rPr>
                           <m:t>𝐻</m:t>
@@ -8287,7 +7929,7 @@
                       </m:e>
                       <m:sub>
                         <m:r>
-                          <a:rPr>
+                          <a:rPr lang="ar-AE">
                             <a:latin typeface="Cambria Math" panose="02040503050406030204" pitchFamily="18" charset="0"/>
                           </a:rPr>
                           <m:t>0</m:t>
@@ -8297,13 +7939,13 @@
                   </m:oMath>
                 </a14:m>
                 <a:r>
-                  <a:rPr dirty="0"/>
+                  <a:rPr lang="ar-AE" dirty="0"/>
                   <a:t>, </a:t>
                 </a:r>
                 <a14:m>
                   <m:oMath xmlns:m="http://schemas.openxmlformats.org/officeDocument/2006/math">
                     <m:r>
-                      <a:rPr>
+                      <a:rPr lang="ar-AE">
                         <a:latin typeface="Cambria Math" panose="02040503050406030204" pitchFamily="18" charset="0"/>
                       </a:rPr>
                       <m:t>→</m:t>
@@ -8311,9 +7953,14 @@
                   </m:oMath>
                 </a14:m>
                 <a:r>
-                  <a:rPr dirty="0"/>
-                  <a:t> drop significant predictor</a:t>
+                  <a:rPr lang="ar-AE" dirty="0"/>
+                  <a:t> </a:t>
                 </a:r>
+                <a:r>
+                  <a:rPr lang="en-US" dirty="0"/>
+                  <a:t>drop significant predictor</a:t>
+                </a:r>
+                <a:endParaRPr dirty="0"/>
               </a:p>
             </p:txBody>
           </p:sp>
@@ -21863,29 +21510,23 @@
             </a:r>
           </a:p>
           <a:p>
-            <a:pPr marL="0" indent="0">
+            <a:pPr marL="0" indent="0" latinLnBrk="1">
               <a:buNone/>
             </a:pPr>
             <a:r>
-              <a:rPr lang="en-US" sz="1500" dirty="0"/>
-              <a:t>array([37.12, 25.61, 13.43,  2.9 ,  2.19,  1.94,  0.71,  0.26,  0.04])</a:t>
+              <a:rPr lang="en-US" sz="1800" dirty="0">
+                <a:latin typeface="Courier"/>
+              </a:rPr>
+              <a:t>[3.709e+01 2.557e+01 1.340e+01 2.870e+00 2.160e+00 1.910e+00 6.800e-01, 2.300e-01 1.000e-02]</a:t>
             </a:r>
           </a:p>
           <a:p>
             <a:pPr marL="0" indent="0">
               <a:buNone/>
             </a:pPr>
-            <a:endParaRPr lang="en-US" sz="1700" dirty="0">
-              <a:latin typeface="+mj-lt"/>
-            </a:endParaRPr>
-          </a:p>
-          <a:p>
-            <a:pPr marL="0" indent="0">
-              <a:buNone/>
-            </a:pPr>
-            <a:r>
-              <a:rPr lang="en-US" sz="1700" dirty="0">
-                <a:latin typeface="+mj-lt"/>
+            <a:r>
+              <a:rPr lang="en-US" sz="1800" dirty="0">
+                <a:latin typeface="Courier"/>
               </a:rPr>
               <a:t>The condition number = 4120.9 </a:t>
             </a:r>
@@ -26400,6 +26041,611 @@
   <p:cSld>
     <p:spTree>
       <p:nvGrpSpPr>
+        <p:cNvPr id="1" name="">
+          <a:extLst>
+            <a:ext uri="{FF2B5EF4-FFF2-40B4-BE49-F238E27FC236}">
+              <a16:creationId xmlns:a16="http://schemas.microsoft.com/office/drawing/2014/main" id="{BE1FBE10-2899-E56A-47EB-3EB20FB89BD9}"/>
+            </a:ext>
+          </a:extLst>
+        </p:cNvPr>
+        <p:cNvGrpSpPr/>
+        <p:nvPr/>
+      </p:nvGrpSpPr>
+      <p:grpSpPr>
+        <a:xfrm>
+          <a:off x="0" y="0"/>
+          <a:ext cx="0" cy="0"/>
+          <a:chOff x="0" y="0"/>
+          <a:chExt cx="0" cy="0"/>
+        </a:xfrm>
+      </p:grpSpPr>
+      <p:sp>
+        <p:nvSpPr>
+          <p:cNvPr id="2" name="Title 1">
+            <a:extLst>
+              <a:ext uri="{FF2B5EF4-FFF2-40B4-BE49-F238E27FC236}">
+                <a16:creationId xmlns:a16="http://schemas.microsoft.com/office/drawing/2014/main" id="{3563DF86-A4F5-01D3-D772-DB5F28F3F1E7}"/>
+              </a:ext>
+            </a:extLst>
+          </p:cNvPr>
+          <p:cNvSpPr>
+            <a:spLocks noGrp="1"/>
+          </p:cNvSpPr>
+          <p:nvPr>
+            <p:ph type="title"/>
+          </p:nvPr>
+        </p:nvSpPr>
+        <p:spPr/>
+        <p:txBody>
+          <a:bodyPr/>
+          <a:lstStyle/>
+          <a:p>
+            <a:pPr marL="0" lvl="0" indent="0">
+              <a:buNone/>
+            </a:pPr>
+            <a:r>
+              <a:rPr dirty="0"/>
+              <a:t>Ill-Posed Problems</a:t>
+            </a:r>
+            <a:r>
+              <a:rPr lang="en-US" dirty="0"/>
+              <a:t> – Example  </a:t>
+            </a:r>
+            <a:endParaRPr dirty="0"/>
+          </a:p>
+        </p:txBody>
+      </p:sp>
+      <mc:AlternateContent xmlns:mc="http://schemas.openxmlformats.org/markup-compatibility/2006" xmlns:a14="http://schemas.microsoft.com/office/drawing/2010/main">
+        <mc:Choice Requires="a14">
+          <p:sp>
+            <p:nvSpPr>
+              <p:cNvPr id="3" name="Content Placeholder 2">
+                <a:extLst>
+                  <a:ext uri="{FF2B5EF4-FFF2-40B4-BE49-F238E27FC236}">
+                    <a16:creationId xmlns:a16="http://schemas.microsoft.com/office/drawing/2014/main" id="{AFBB58E6-0165-0DE4-52DC-92250B96A357}"/>
+                  </a:ext>
+                </a:extLst>
+              </p:cNvPr>
+              <p:cNvSpPr>
+                <a:spLocks noGrp="1"/>
+              </p:cNvSpPr>
+              <p:nvPr>
+                <p:ph idx="1"/>
+              </p:nvPr>
+            </p:nvSpPr>
+            <p:spPr>
+              <a:xfrm>
+                <a:off x="457200" y="1101040"/>
+                <a:ext cx="8229600" cy="3953097"/>
+              </a:xfrm>
+            </p:spPr>
+            <p:txBody>
+              <a:bodyPr>
+                <a:normAutofit fontScale="92500"/>
+              </a:bodyPr>
+              <a:lstStyle/>
+              <a:p>
+                <a:pPr marL="0" lvl="0" indent="0">
+                  <a:buNone/>
+                </a:pPr>
+                <a:r>
+                  <a:rPr lang="en-US" sz="2800" dirty="0"/>
+                  <a:t>Evaluate the eigenvalues of regularized covariance matrix</a:t>
+                </a:r>
+              </a:p>
+              <a:p>
+                <a:r>
+                  <a:rPr lang="en-US" dirty="0"/>
+                  <a:t>Without regularization, the eigenvalues and condition number</a:t>
+                </a:r>
+              </a:p>
+              <a:p>
+                <a:pPr marL="0" indent="0" latinLnBrk="1">
+                  <a:buNone/>
+                </a:pPr>
+                <a:r>
+                  <a:rPr lang="en-US" sz="1600" dirty="0">
+                    <a:latin typeface="Courier"/>
+                  </a:rPr>
+                  <a:t>[3.709e+01 2.557e+01 1.340e+01 2.870e+00 2.160e+00 1.910e+00 6.800e-01, 2.300e-01 1.000e-02]</a:t>
+                </a:r>
+              </a:p>
+              <a:p>
+                <a:pPr marL="0" indent="0">
+                  <a:buNone/>
+                </a:pPr>
+                <a:r>
+                  <a:rPr lang="en-US" sz="1600" dirty="0">
+                    <a:latin typeface="Courier"/>
+                  </a:rPr>
+                  <a:t>The condition number = 4120.9 </a:t>
+                </a:r>
+              </a:p>
+              <a:p>
+                <a:r>
+                  <a:rPr lang="en-US" dirty="0">
+                    <a:latin typeface="+mj-lt"/>
+                  </a:rPr>
+                  <a:t>Adding L2 regularization of </a:t>
+                </a:r>
+                <a14:m>
+                  <m:oMath xmlns:m="http://schemas.openxmlformats.org/officeDocument/2006/math">
+                    <m:rad>
+                      <m:radPr>
+                        <m:degHide m:val="on"/>
+                        <m:ctrlPr>
+                          <a:rPr lang="en-US" i="1" smtClean="0">
+                            <a:latin typeface="Cambria Math" panose="02040503050406030204" pitchFamily="18" charset="0"/>
+                          </a:rPr>
+                        </m:ctrlPr>
+                      </m:radPr>
+                      <m:deg/>
+                      <m:e>
+                        <m:r>
+                          <a:rPr lang="en-US" b="0" i="1" smtClean="0">
+                            <a:latin typeface="Cambria Math" panose="02040503050406030204" pitchFamily="18" charset="0"/>
+                          </a:rPr>
+                          <m:t>0</m:t>
+                        </m:r>
+                        <m:r>
+                          <a:rPr lang="en-US" b="0" i="1" smtClean="0">
+                            <a:latin typeface="Cambria Math" panose="02040503050406030204" pitchFamily="18" charset="0"/>
+                          </a:rPr>
+                          <m:t>.</m:t>
+                        </m:r>
+                        <m:r>
+                          <a:rPr lang="en-US" b="0" i="1" smtClean="0">
+                            <a:latin typeface="Cambria Math" panose="02040503050406030204" pitchFamily="18" charset="0"/>
+                          </a:rPr>
+                          <m:t>001</m:t>
+                        </m:r>
+                      </m:e>
+                    </m:rad>
+                  </m:oMath>
+                </a14:m>
+                <a:r>
+                  <a:rPr lang="en-US" dirty="0">
+                    <a:latin typeface="+mj-lt"/>
+                  </a:rPr>
+                  <a:t> to diagonal of the covariance matrix</a:t>
+                </a:r>
+              </a:p>
+              <a:p>
+                <a:pPr marL="0" indent="0">
+                  <a:buNone/>
+                </a:pPr>
+                <a:r>
+                  <a:rPr lang="en-US" sz="1700" dirty="0">
+                    <a:latin typeface="Courier"/>
+                  </a:rPr>
+                  <a:t>&gt; Eigenvalues</a:t>
+                </a:r>
+              </a:p>
+              <a:p>
+                <a:pPr marL="0" indent="0" latinLnBrk="1">
+                  <a:buNone/>
+                </a:pPr>
+                <a:r>
+                  <a:rPr lang="en-US" sz="1700" dirty="0">
+                    <a:latin typeface="Courier"/>
+                  </a:rPr>
+                  <a:t>[37.12 25.61 13.43  2.9   2.19  1.94  0.71  0.26  0.04]</a:t>
+                </a:r>
+              </a:p>
+              <a:p>
+                <a:pPr marL="0" indent="0">
+                  <a:buNone/>
+                </a:pPr>
+                <a:r>
+                  <a:rPr lang="en-US" sz="1700" dirty="0">
+                    <a:latin typeface="Courier"/>
+                  </a:rPr>
+                  <a:t>The condition number =  913.8</a:t>
+                </a:r>
+              </a:p>
+              <a:p>
+                <a:r>
+                  <a:rPr lang="en-US" dirty="0"/>
+                  <a:t>Notice the increasing bias for the smallest eigenvalues</a:t>
+                </a:r>
+              </a:p>
+            </p:txBody>
+          </p:sp>
+        </mc:Choice>
+        <mc:Fallback xmlns="">
+          <p:sp>
+            <p:nvSpPr>
+              <p:cNvPr id="3" name="Content Placeholder 2">
+                <a:extLst>
+                  <a:ext uri="{FF2B5EF4-FFF2-40B4-BE49-F238E27FC236}">
+                    <a16:creationId xmlns:a16="http://schemas.microsoft.com/office/drawing/2014/main" id="{AFBB58E6-0165-0DE4-52DC-92250B96A357}"/>
+                  </a:ext>
+                </a:extLst>
+              </p:cNvPr>
+              <p:cNvSpPr>
+                <a:spLocks noGrp="1" noRot="1" noChangeAspect="1" noMove="1" noResize="1" noEditPoints="1" noAdjustHandles="1" noChangeArrowheads="1" noChangeShapeType="1" noTextEdit="1"/>
+              </p:cNvSpPr>
+              <p:nvPr>
+                <p:ph idx="1"/>
+              </p:nvPr>
+            </p:nvSpPr>
+            <p:spPr>
+              <a:xfrm>
+                <a:off x="457200" y="1101040"/>
+                <a:ext cx="8229600" cy="3953097"/>
+              </a:xfrm>
+              <a:blipFill>
+                <a:blip r:embed="rId2"/>
+                <a:stretch>
+                  <a:fillRect l="-1333" t="-1389"/>
+                </a:stretch>
+              </a:blipFill>
+            </p:spPr>
+            <p:txBody>
+              <a:bodyPr/>
+              <a:lstStyle/>
+              <a:p>
+                <a:r>
+                  <a:rPr lang="en-US">
+                    <a:noFill/>
+                  </a:rPr>
+                  <a:t> </a:t>
+                </a:r>
+              </a:p>
+            </p:txBody>
+          </p:sp>
+        </mc:Fallback>
+      </mc:AlternateContent>
+    </p:spTree>
+    <p:extLst>
+      <p:ext uri="{BB962C8B-B14F-4D97-AF65-F5344CB8AC3E}">
+        <p14:creationId xmlns:p14="http://schemas.microsoft.com/office/powerpoint/2010/main" val="3258588422"/>
+      </p:ext>
+    </p:extLst>
+  </p:cSld>
+  <p:clrMapOvr>
+    <a:masterClrMapping/>
+  </p:clrMapOvr>
+  <p:timing>
+    <p:tnLst>
+      <p:par>
+        <p:cTn id="1" dur="indefinite" restart="never" nodeType="tmRoot">
+          <p:childTnLst>
+            <p:seq concurrent="1" nextAc="seek">
+              <p:cTn id="2" dur="indefinite" nodeType="mainSeq">
+                <p:childTnLst>
+                  <p:par>
+                    <p:cTn id="3" fill="hold">
+                      <p:stCondLst>
+                        <p:cond delay="indefinite"/>
+                      </p:stCondLst>
+                      <p:childTnLst>
+                        <p:par>
+                          <p:cTn id="4" fill="hold">
+                            <p:stCondLst>
+                              <p:cond delay="0"/>
+                            </p:stCondLst>
+                            <p:childTnLst>
+                              <p:par>
+                                <p:cTn id="5" presetID="1" presetClass="entr" presetSubtype="0" fill="hold" nodeType="clickEffect">
+                                  <p:stCondLst>
+                                    <p:cond delay="0"/>
+                                  </p:stCondLst>
+                                  <p:childTnLst>
+                                    <p:set>
+                                      <p:cBhvr>
+                                        <p:cTn id="6" dur="1" fill="hold">
+                                          <p:stCondLst>
+                                            <p:cond delay="0"/>
+                                          </p:stCondLst>
+                                        </p:cTn>
+                                        <p:tgtEl>
+                                          <p:spTgt spid="3">
+                                            <p:txEl>
+                                              <p:pRg st="1" end="1"/>
+                                            </p:txEl>
+                                          </p:spTgt>
+                                        </p:tgtEl>
+                                        <p:attrNameLst>
+                                          <p:attrName>style.visibility</p:attrName>
+                                        </p:attrNameLst>
+                                      </p:cBhvr>
+                                      <p:to>
+                                        <p:strVal val="visible"/>
+                                      </p:to>
+                                    </p:set>
+                                  </p:childTnLst>
+                                </p:cTn>
+                              </p:par>
+                              <p:par>
+                                <p:cTn id="7" presetID="1" presetClass="entr" presetSubtype="0" fill="hold" nodeType="withEffect">
+                                  <p:stCondLst>
+                                    <p:cond delay="0"/>
+                                  </p:stCondLst>
+                                  <p:childTnLst>
+                                    <p:set>
+                                      <p:cBhvr>
+                                        <p:cTn id="8" dur="1" fill="hold">
+                                          <p:stCondLst>
+                                            <p:cond delay="0"/>
+                                          </p:stCondLst>
+                                        </p:cTn>
+                                        <p:tgtEl>
+                                          <p:spTgt spid="3">
+                                            <p:txEl>
+                                              <p:pRg st="2" end="2"/>
+                                            </p:txEl>
+                                          </p:spTgt>
+                                        </p:tgtEl>
+                                        <p:attrNameLst>
+                                          <p:attrName>style.visibility</p:attrName>
+                                        </p:attrNameLst>
+                                      </p:cBhvr>
+                                      <p:to>
+                                        <p:strVal val="visible"/>
+                                      </p:to>
+                                    </p:set>
+                                  </p:childTnLst>
+                                </p:cTn>
+                              </p:par>
+                              <p:par>
+                                <p:cTn id="9" presetID="1" presetClass="entr" presetSubtype="0" fill="hold" nodeType="withEffect">
+                                  <p:stCondLst>
+                                    <p:cond delay="0"/>
+                                  </p:stCondLst>
+                                  <p:childTnLst>
+                                    <p:set>
+                                      <p:cBhvr>
+                                        <p:cTn id="10" dur="1" fill="hold">
+                                          <p:stCondLst>
+                                            <p:cond delay="0"/>
+                                          </p:stCondLst>
+                                        </p:cTn>
+                                        <p:tgtEl>
+                                          <p:spTgt spid="3">
+                                            <p:txEl>
+                                              <p:pRg st="3" end="3"/>
+                                            </p:txEl>
+                                          </p:spTgt>
+                                        </p:tgtEl>
+                                        <p:attrNameLst>
+                                          <p:attrName>style.visibility</p:attrName>
+                                        </p:attrNameLst>
+                                      </p:cBhvr>
+                                      <p:to>
+                                        <p:strVal val="visible"/>
+                                      </p:to>
+                                    </p:set>
+                                  </p:childTnLst>
+                                </p:cTn>
+                              </p:par>
+                            </p:childTnLst>
+                          </p:cTn>
+                        </p:par>
+                      </p:childTnLst>
+                    </p:cTn>
+                  </p:par>
+                  <p:par>
+                    <p:cTn id="11" fill="hold">
+                      <p:stCondLst>
+                        <p:cond delay="indefinite"/>
+                      </p:stCondLst>
+                      <p:childTnLst>
+                        <p:par>
+                          <p:cTn id="12" fill="hold">
+                            <p:stCondLst>
+                              <p:cond delay="0"/>
+                            </p:stCondLst>
+                            <p:childTnLst>
+                              <p:par>
+                                <p:cTn id="13" presetID="1" presetClass="entr" presetSubtype="0" fill="hold" nodeType="clickEffect">
+                                  <p:stCondLst>
+                                    <p:cond delay="0"/>
+                                  </p:stCondLst>
+                                  <p:childTnLst>
+                                    <p:set>
+                                      <p:cBhvr>
+                                        <p:cTn id="14" dur="1" fill="hold">
+                                          <p:stCondLst>
+                                            <p:cond delay="0"/>
+                                          </p:stCondLst>
+                                        </p:cTn>
+                                        <p:tgtEl>
+                                          <p:spTgt spid="3">
+                                            <p:txEl>
+                                              <p:pRg st="4" end="4"/>
+                                            </p:txEl>
+                                          </p:spTgt>
+                                        </p:tgtEl>
+                                        <p:attrNameLst>
+                                          <p:attrName>style.visibility</p:attrName>
+                                        </p:attrNameLst>
+                                      </p:cBhvr>
+                                      <p:to>
+                                        <p:strVal val="visible"/>
+                                      </p:to>
+                                    </p:set>
+                                  </p:childTnLst>
+                                </p:cTn>
+                              </p:par>
+                              <p:par>
+                                <p:cTn id="15" presetID="1" presetClass="entr" presetSubtype="0" fill="hold" nodeType="withEffect">
+                                  <p:stCondLst>
+                                    <p:cond delay="0"/>
+                                  </p:stCondLst>
+                                  <p:childTnLst>
+                                    <p:set>
+                                      <p:cBhvr>
+                                        <p:cTn id="16" dur="1" fill="hold">
+                                          <p:stCondLst>
+                                            <p:cond delay="0"/>
+                                          </p:stCondLst>
+                                        </p:cTn>
+                                        <p:tgtEl>
+                                          <p:spTgt spid="3">
+                                            <p:txEl>
+                                              <p:pRg st="5" end="5"/>
+                                            </p:txEl>
+                                          </p:spTgt>
+                                        </p:tgtEl>
+                                        <p:attrNameLst>
+                                          <p:attrName>style.visibility</p:attrName>
+                                        </p:attrNameLst>
+                                      </p:cBhvr>
+                                      <p:to>
+                                        <p:strVal val="visible"/>
+                                      </p:to>
+                                    </p:set>
+                                  </p:childTnLst>
+                                </p:cTn>
+                              </p:par>
+                              <p:par>
+                                <p:cTn id="17" presetID="1" presetClass="entr" presetSubtype="0" fill="hold" nodeType="withEffect">
+                                  <p:stCondLst>
+                                    <p:cond delay="0"/>
+                                  </p:stCondLst>
+                                  <p:childTnLst>
+                                    <p:set>
+                                      <p:cBhvr>
+                                        <p:cTn id="18" dur="1" fill="hold">
+                                          <p:stCondLst>
+                                            <p:cond delay="0"/>
+                                          </p:stCondLst>
+                                        </p:cTn>
+                                        <p:tgtEl>
+                                          <p:spTgt spid="3">
+                                            <p:txEl>
+                                              <p:pRg st="6" end="6"/>
+                                            </p:txEl>
+                                          </p:spTgt>
+                                        </p:tgtEl>
+                                        <p:attrNameLst>
+                                          <p:attrName>style.visibility</p:attrName>
+                                        </p:attrNameLst>
+                                      </p:cBhvr>
+                                      <p:to>
+                                        <p:strVal val="visible"/>
+                                      </p:to>
+                                    </p:set>
+                                  </p:childTnLst>
+                                </p:cTn>
+                              </p:par>
+                              <p:par>
+                                <p:cTn id="19" presetID="1" presetClass="entr" presetSubtype="0" fill="hold" nodeType="withEffect">
+                                  <p:stCondLst>
+                                    <p:cond delay="0"/>
+                                  </p:stCondLst>
+                                  <p:childTnLst>
+                                    <p:set>
+                                      <p:cBhvr>
+                                        <p:cTn id="20" dur="1" fill="hold">
+                                          <p:stCondLst>
+                                            <p:cond delay="0"/>
+                                          </p:stCondLst>
+                                        </p:cTn>
+                                        <p:tgtEl>
+                                          <p:spTgt spid="3">
+                                            <p:txEl>
+                                              <p:pRg st="7" end="7"/>
+                                            </p:txEl>
+                                          </p:spTgt>
+                                        </p:tgtEl>
+                                        <p:attrNameLst>
+                                          <p:attrName>style.visibility</p:attrName>
+                                        </p:attrNameLst>
+                                      </p:cBhvr>
+                                      <p:to>
+                                        <p:strVal val="visible"/>
+                                      </p:to>
+                                    </p:set>
+                                  </p:childTnLst>
+                                </p:cTn>
+                              </p:par>
+                            </p:childTnLst>
+                          </p:cTn>
+                        </p:par>
+                      </p:childTnLst>
+                    </p:cTn>
+                  </p:par>
+                  <p:par>
+                    <p:cTn id="21" fill="hold">
+                      <p:stCondLst>
+                        <p:cond delay="indefinite"/>
+                      </p:stCondLst>
+                      <p:childTnLst>
+                        <p:par>
+                          <p:cTn id="22" fill="hold">
+                            <p:stCondLst>
+                              <p:cond delay="0"/>
+                            </p:stCondLst>
+                            <p:childTnLst>
+                              <p:par>
+                                <p:cTn id="23" presetID="1" presetClass="entr" presetSubtype="0" fill="hold" nodeType="clickEffect">
+                                  <p:stCondLst>
+                                    <p:cond delay="0"/>
+                                  </p:stCondLst>
+                                  <p:childTnLst>
+                                    <p:set>
+                                      <p:cBhvr>
+                                        <p:cTn id="24" dur="1" fill="hold">
+                                          <p:stCondLst>
+                                            <p:cond delay="0"/>
+                                          </p:stCondLst>
+                                        </p:cTn>
+                                        <p:tgtEl>
+                                          <p:spTgt spid="3">
+                                            <p:txEl>
+                                              <p:pRg st="8" end="8"/>
+                                            </p:txEl>
+                                          </p:spTgt>
+                                        </p:tgtEl>
+                                        <p:attrNameLst>
+                                          <p:attrName>style.visibility</p:attrName>
+                                        </p:attrNameLst>
+                                      </p:cBhvr>
+                                      <p:to>
+                                        <p:strVal val="visible"/>
+                                      </p:to>
+                                    </p:set>
+                                  </p:childTnLst>
+                                </p:cTn>
+                              </p:par>
+                            </p:childTnLst>
+                          </p:cTn>
+                        </p:par>
+                      </p:childTnLst>
+                    </p:cTn>
+                  </p:par>
+                </p:childTnLst>
+              </p:cTn>
+              <p:prevCondLst>
+                <p:cond evt="onPrev" delay="0">
+                  <p:tgtEl>
+                    <p:sldTgt/>
+                  </p:tgtEl>
+                </p:cond>
+              </p:prevCondLst>
+              <p:nextCondLst>
+                <p:cond evt="onNext" delay="0">
+                  <p:tgtEl>
+                    <p:sldTgt/>
+                  </p:tgtEl>
+                </p:cond>
+              </p:nextCondLst>
+            </p:seq>
+          </p:childTnLst>
+        </p:cTn>
+      </p:par>
+    </p:tnLst>
+  </p:timing>
+</p:sld>
+</file>
+
+<file path=ppt/slides/slide39.xml><?xml version="1.0" encoding="utf-8"?>
+<p:sld xmlns:a="http://schemas.openxmlformats.org/drawingml/2006/main" xmlns:r="http://schemas.openxmlformats.org/officeDocument/2006/relationships" xmlns:p="http://schemas.openxmlformats.org/presentationml/2006/main">
+  <p:cSld>
+    <p:spTree>
+      <p:nvGrpSpPr>
         <p:cNvPr id="1" name=""/>
         <p:cNvGrpSpPr/>
         <p:nvPr/>
@@ -27637,7 +27883,144 @@
 </p:sld>
 </file>
 
-<file path=ppt/slides/slide39.xml><?xml version="1.0" encoding="utf-8"?>
+<file path=ppt/slides/slide4.xml><?xml version="1.0" encoding="utf-8"?>
+<p:sld xmlns:a="http://schemas.openxmlformats.org/drawingml/2006/main" xmlns:r="http://schemas.openxmlformats.org/officeDocument/2006/relationships" xmlns:p="http://schemas.openxmlformats.org/presentationml/2006/main">
+  <p:cSld>
+    <p:spTree>
+      <p:nvGrpSpPr>
+        <p:cNvPr id="1" name=""/>
+        <p:cNvGrpSpPr/>
+        <p:nvPr/>
+      </p:nvGrpSpPr>
+      <p:grpSpPr>
+        <a:xfrm>
+          <a:off x="0" y="0"/>
+          <a:ext cx="0" cy="0"/>
+          <a:chOff x="0" y="0"/>
+          <a:chExt cx="0" cy="0"/>
+        </a:xfrm>
+      </p:grpSpPr>
+      <p:sp>
+        <p:nvSpPr>
+          <p:cNvPr id="2" name="Title 1"/>
+          <p:cNvSpPr>
+            <a:spLocks noGrp="1"/>
+          </p:cNvSpPr>
+          <p:nvPr>
+            <p:ph type="title"/>
+          </p:nvPr>
+        </p:nvSpPr>
+        <p:spPr/>
+        <p:txBody>
+          <a:bodyPr/>
+          <a:lstStyle/>
+          <a:p>
+            <a:pPr marL="0" lvl="0" indent="0">
+              <a:buNone/>
+            </a:pPr>
+            <a:r>
+              <a:t>Review</a:t>
+            </a:r>
+          </a:p>
+        </p:txBody>
+      </p:sp>
+      <p:sp>
+        <p:nvSpPr>
+          <p:cNvPr id="3" name="Content Placeholder 2"/>
+          <p:cNvSpPr>
+            <a:spLocks noGrp="1"/>
+          </p:cNvSpPr>
+          <p:nvPr>
+            <p:ph idx="1"/>
+          </p:nvPr>
+        </p:nvSpPr>
+        <p:spPr/>
+        <p:txBody>
+          <a:bodyPr>
+            <a:normAutofit fontScale="92500" lnSpcReduction="20000"/>
+          </a:bodyPr>
+          <a:lstStyle/>
+          <a:p>
+            <a:pPr marL="0" lvl="0" indent="0">
+              <a:buNone/>
+            </a:pPr>
+            <a:r>
+              <a:rPr dirty="0"/>
+              <a:t>Models with nonlinear response have non-Normal distributions</a:t>
+            </a:r>
+          </a:p>
+          <a:p>
+            <a:pPr lvl="0"/>
+            <a:r>
+              <a:rPr dirty="0"/>
+              <a:t>The generalized linear model accommodates nonlinear response distributions</a:t>
+            </a:r>
+          </a:p>
+          <a:p>
+            <a:pPr lvl="0"/>
+            <a:r>
+              <a:rPr dirty="0"/>
+              <a:t>Link function transforms to linear model</a:t>
+            </a:r>
+          </a:p>
+          <a:p>
+            <a:pPr lvl="1"/>
+            <a:r>
+              <a:rPr dirty="0"/>
+              <a:t>Inverse link function transforms from Normal distribution to response distribution</a:t>
+            </a:r>
+          </a:p>
+          <a:p>
+            <a:pPr lvl="0"/>
+            <a:r>
+              <a:rPr dirty="0"/>
+              <a:t>Evaluating Binomial response models</a:t>
+            </a:r>
+          </a:p>
+          <a:p>
+            <a:pPr lvl="1"/>
+            <a:r>
+              <a:rPr dirty="0"/>
+              <a:t>Confusion matrix organizes</a:t>
+            </a:r>
+            <a:r>
+              <a:rPr lang="en-US" dirty="0"/>
+              <a:t> outcomes</a:t>
+            </a:r>
+            <a:endParaRPr dirty="0"/>
+          </a:p>
+          <a:p>
+            <a:pPr lvl="1"/>
+            <a:r>
+              <a:rPr dirty="0"/>
+              <a:t>Compute metrics from confusion matrix</a:t>
+            </a:r>
+          </a:p>
+          <a:p>
+            <a:pPr lvl="1"/>
+            <a:r>
+              <a:rPr dirty="0"/>
+              <a:t>Use multiple evaluation criteria</a:t>
+            </a:r>
+          </a:p>
+          <a:p>
+            <a:pPr lvl="0"/>
+            <a:r>
+              <a:rPr dirty="0"/>
+              <a:t>Compare model performance with deviance</a:t>
+            </a:r>
+          </a:p>
+        </p:txBody>
+      </p:sp>
+    </p:spTree>
+  </p:cSld>
+  <p:clrMapOvr>
+    <a:masterClrMapping/>
+  </p:clrMapOvr>
+</p:sld>
+</file>
+
+<file path=ppt/slides/slide40.xml><?xml version="1.0" encoding="utf-8"?>
 <p:sld xmlns:a="http://schemas.openxmlformats.org/drawingml/2006/main" xmlns:r="http://schemas.openxmlformats.org/officeDocument/2006/relationships" xmlns:p="http://schemas.openxmlformats.org/presentationml/2006/main">
   <p:cSld>
     <p:spTree>
@@ -27845,12 +28228,18 @@
 </p:sld>
 </file>
 
-<file path=ppt/slides/slide4.xml><?xml version="1.0" encoding="utf-8"?>
+<file path=ppt/slides/slide41.xml><?xml version="1.0" encoding="utf-8"?>
 <p:sld xmlns:a="http://schemas.openxmlformats.org/drawingml/2006/main" xmlns:r="http://schemas.openxmlformats.org/officeDocument/2006/relationships" xmlns:p="http://schemas.openxmlformats.org/presentationml/2006/main">
   <p:cSld>
     <p:spTree>
       <p:nvGrpSpPr>
-        <p:cNvPr id="1" name=""/>
+        <p:cNvPr id="1" name="">
+          <a:extLst>
+            <a:ext uri="{FF2B5EF4-FFF2-40B4-BE49-F238E27FC236}">
+              <a16:creationId xmlns:a16="http://schemas.microsoft.com/office/drawing/2014/main" id="{E69012D6-F781-FE19-62B0-206DD6B4A1CA}"/>
+            </a:ext>
+          </a:extLst>
+        </p:cNvPr>
         <p:cNvGrpSpPr/>
         <p:nvPr/>
       </p:nvGrpSpPr>
@@ -27862,9 +28251,45 @@
           <a:chExt cx="0" cy="0"/>
         </a:xfrm>
       </p:grpSpPr>
+      <p:pic>
+        <p:nvPicPr>
+          <p:cNvPr id="8" name="Picture 7">
+            <a:extLst>
+              <a:ext uri="{FF2B5EF4-FFF2-40B4-BE49-F238E27FC236}">
+                <a16:creationId xmlns:a16="http://schemas.microsoft.com/office/drawing/2014/main" id="{90DBCB55-CF18-C4CE-383A-A0BE4DB213CB}"/>
+              </a:ext>
+            </a:extLst>
+          </p:cNvPr>
+          <p:cNvPicPr>
+            <a:picLocks noChangeAspect="1"/>
+          </p:cNvPicPr>
+          <p:nvPr/>
+        </p:nvPicPr>
+        <p:blipFill>
+          <a:blip r:embed="rId2"/>
+          <a:stretch>
+            <a:fillRect/>
+          </a:stretch>
+        </p:blipFill>
+        <p:spPr>
+          <a:xfrm>
+            <a:off x="40863" y="1589088"/>
+            <a:ext cx="4256817" cy="2313941"/>
+          </a:xfrm>
+          <a:prstGeom prst="rect">
+            <a:avLst/>
+          </a:prstGeom>
+        </p:spPr>
+      </p:pic>
       <p:sp>
         <p:nvSpPr>
-          <p:cNvPr id="2" name="Title 1"/>
+          <p:cNvPr id="2" name="Title 1">
+            <a:extLst>
+              <a:ext uri="{FF2B5EF4-FFF2-40B4-BE49-F238E27FC236}">
+                <a16:creationId xmlns:a16="http://schemas.microsoft.com/office/drawing/2014/main" id="{42AA09E8-89E0-DF0E-AA5B-337D8C1F326D}"/>
+              </a:ext>
+            </a:extLst>
+          </p:cNvPr>
           <p:cNvSpPr>
             <a:spLocks noGrp="1"/>
           </p:cNvSpPr>
@@ -27872,23 +28297,41 @@
             <p:ph type="title"/>
           </p:nvPr>
         </p:nvSpPr>
-        <p:spPr/>
+        <p:spPr>
+          <a:xfrm>
+            <a:off x="457201" y="204787"/>
+            <a:ext cx="8433261" cy="497638"/>
+          </a:xfrm>
+        </p:spPr>
         <p:txBody>
-          <a:bodyPr/>
+          <a:bodyPr>
+            <a:noAutofit/>
+          </a:bodyPr>
           <a:lstStyle/>
           <a:p>
-            <a:pPr marL="0" lvl="0" indent="0">
+            <a:pPr marL="0" lvl="0" indent="0" algn="ctr">
               <a:buNone/>
             </a:pPr>
             <a:r>
-              <a:t>Review</a:t>
+              <a:rPr lang="en-US" sz="3200" dirty="0"/>
+              <a:t>Example: L2 </a:t>
+            </a:r>
+            <a:r>
+              <a:rPr sz="3200" dirty="0"/>
+              <a:t>Regularization</a:t>
             </a:r>
           </a:p>
         </p:txBody>
       </p:sp>
       <p:sp>
         <p:nvSpPr>
-          <p:cNvPr id="3" name="Content Placeholder 2"/>
+          <p:cNvPr id="3" name="Content Placeholder 2">
+            <a:extLst>
+              <a:ext uri="{FF2B5EF4-FFF2-40B4-BE49-F238E27FC236}">
+                <a16:creationId xmlns:a16="http://schemas.microsoft.com/office/drawing/2014/main" id="{BCEC381E-93B4-16AB-0669-0601BCD83F02}"/>
+              </a:ext>
+            </a:extLst>
+          </p:cNvPr>
           <p:cNvSpPr>
             <a:spLocks noGrp="1"/>
           </p:cNvSpPr>
@@ -27896,10 +28339,15 @@
             <p:ph idx="1"/>
           </p:nvPr>
         </p:nvSpPr>
-        <p:spPr/>
+        <p:spPr>
+          <a:xfrm>
+            <a:off x="4148052" y="914012"/>
+            <a:ext cx="4879570" cy="4085705"/>
+          </a:xfrm>
+        </p:spPr>
         <p:txBody>
           <a:bodyPr>
-            <a:normAutofit fontScale="92500" lnSpcReduction="20000"/>
+            <a:normAutofit/>
           </a:bodyPr>
           <a:lstStyle/>
           <a:p>
@@ -27907,82 +28355,760 @@
               <a:buNone/>
             </a:pPr>
             <a:r>
-              <a:rPr dirty="0"/>
-              <a:t>Models with nonlinear response have non-Normal distributions</a:t>
+              <a:rPr lang="en-US" dirty="0"/>
+              <a:t>L2 regression is no longer overfit       </a:t>
             </a:r>
           </a:p>
           <a:p>
-            <a:pPr lvl="0"/>
-            <a:r>
-              <a:rPr dirty="0"/>
-              <a:t>The generalized linear model accommodates nonlinear response distributions</a:t>
+            <a:r>
+              <a:rPr lang="en-US" dirty="0"/>
+              <a:t>Intercept parameter has decreased</a:t>
             </a:r>
           </a:p>
           <a:p>
-            <a:pPr lvl="0"/>
-            <a:r>
-              <a:rPr dirty="0"/>
-              <a:t>Link function transforms to linear model</a:t>
+            <a:r>
+              <a:rPr lang="en-US" dirty="0"/>
+              <a:t>Some parameters increased</a:t>
             </a:r>
           </a:p>
           <a:p>
-            <a:pPr lvl="1"/>
-            <a:r>
-              <a:rPr dirty="0"/>
-              <a:t>Inverse link function transforms from Normal distribution to response distribution</a:t>
+            <a:r>
+              <a:rPr lang="en-US" dirty="0"/>
+              <a:t>One parameter is constrained</a:t>
             </a:r>
           </a:p>
           <a:p>
-            <a:pPr lvl="0"/>
-            <a:r>
-              <a:rPr dirty="0"/>
-              <a:t>Evaluating Binomial response models</a:t>
+            <a:r>
+              <a:rPr lang="en-US" dirty="0"/>
+              <a:t>Norm of coefficient vector is limited</a:t>
             </a:r>
           </a:p>
           <a:p>
-            <a:pPr lvl="1"/>
-            <a:r>
-              <a:rPr dirty="0"/>
-              <a:t>Confusion matrix organizes</a:t>
-            </a:r>
             <a:r>
               <a:rPr lang="en-US" dirty="0"/>
-              <a:t> outcomes</a:t>
-            </a:r>
-            <a:endParaRPr dirty="0"/>
+              <a:t>No model coefficients are driven to 0</a:t>
+            </a:r>
           </a:p>
           <a:p>
-            <a:pPr lvl="1"/>
-            <a:r>
-              <a:rPr dirty="0"/>
-              <a:t>Compute metrics from confusion matrix</a:t>
-            </a:r>
-          </a:p>
-          <a:p>
-            <a:pPr lvl="1"/>
-            <a:r>
-              <a:rPr dirty="0"/>
-              <a:t>Use multiple evaluation criteria</a:t>
-            </a:r>
-          </a:p>
-          <a:p>
-            <a:pPr lvl="0"/>
-            <a:r>
-              <a:rPr dirty="0"/>
-              <a:t>Compare model performance with deviance</a:t>
-            </a:r>
+            <a:endParaRPr dirty="0"/>
           </a:p>
         </p:txBody>
       </p:sp>
+      <p:cxnSp>
+        <p:nvCxnSpPr>
+          <p:cNvPr id="6" name="Straight Arrow Connector 5">
+            <a:extLst>
+              <a:ext uri="{FF2B5EF4-FFF2-40B4-BE49-F238E27FC236}">
+                <a16:creationId xmlns:a16="http://schemas.microsoft.com/office/drawing/2014/main" id="{94B2C032-036B-1425-3B3B-617B4B70D2CC}"/>
+              </a:ext>
+            </a:extLst>
+          </p:cNvPr>
+          <p:cNvCxnSpPr>
+            <a:cxnSpLocks/>
+          </p:cNvCxnSpPr>
+          <p:nvPr/>
+        </p:nvCxnSpPr>
+        <p:spPr>
+          <a:xfrm flipH="1" flipV="1">
+            <a:off x="3670069" y="1997006"/>
+            <a:ext cx="581891" cy="69292"/>
+          </a:xfrm>
+          <a:prstGeom prst="straightConnector1">
+            <a:avLst/>
+          </a:prstGeom>
+          <a:ln>
+            <a:solidFill>
+              <a:schemeClr val="tx1"/>
+            </a:solidFill>
+            <a:tailEnd type="triangle"/>
+          </a:ln>
+        </p:spPr>
+        <p:style>
+          <a:lnRef idx="2">
+            <a:schemeClr val="accent1"/>
+          </a:lnRef>
+          <a:fillRef idx="0">
+            <a:schemeClr val="accent1"/>
+          </a:fillRef>
+          <a:effectRef idx="1">
+            <a:schemeClr val="accent1"/>
+          </a:effectRef>
+          <a:fontRef idx="minor">
+            <a:schemeClr val="tx1"/>
+          </a:fontRef>
+        </p:style>
+      </p:cxnSp>
+      <p:cxnSp>
+        <p:nvCxnSpPr>
+          <p:cNvPr id="12" name="Straight Arrow Connector 11">
+            <a:extLst>
+              <a:ext uri="{FF2B5EF4-FFF2-40B4-BE49-F238E27FC236}">
+                <a16:creationId xmlns:a16="http://schemas.microsoft.com/office/drawing/2014/main" id="{428366F8-0488-E93B-ACBE-C12977F64BEF}"/>
+              </a:ext>
+            </a:extLst>
+          </p:cNvPr>
+          <p:cNvCxnSpPr>
+            <a:cxnSpLocks/>
+          </p:cNvCxnSpPr>
+          <p:nvPr/>
+        </p:nvCxnSpPr>
+        <p:spPr>
+          <a:xfrm flipH="1">
+            <a:off x="3624960" y="2516253"/>
+            <a:ext cx="809880" cy="500878"/>
+          </a:xfrm>
+          <a:prstGeom prst="straightConnector1">
+            <a:avLst/>
+          </a:prstGeom>
+          <a:ln>
+            <a:solidFill>
+              <a:schemeClr val="tx1"/>
+            </a:solidFill>
+            <a:tailEnd type="triangle"/>
+          </a:ln>
+        </p:spPr>
+        <p:style>
+          <a:lnRef idx="2">
+            <a:schemeClr val="accent1"/>
+          </a:lnRef>
+          <a:fillRef idx="0">
+            <a:schemeClr val="accent1"/>
+          </a:fillRef>
+          <a:effectRef idx="1">
+            <a:schemeClr val="accent1"/>
+          </a:effectRef>
+          <a:fontRef idx="minor">
+            <a:schemeClr val="tx1"/>
+          </a:fontRef>
+        </p:style>
+      </p:cxnSp>
+      <p:cxnSp>
+        <p:nvCxnSpPr>
+          <p:cNvPr id="15" name="Straight Arrow Connector 14">
+            <a:extLst>
+              <a:ext uri="{FF2B5EF4-FFF2-40B4-BE49-F238E27FC236}">
+                <a16:creationId xmlns:a16="http://schemas.microsoft.com/office/drawing/2014/main" id="{DC7EA784-4FB0-56F7-7BEA-ED600AEAAC82}"/>
+              </a:ext>
+            </a:extLst>
+          </p:cNvPr>
+          <p:cNvCxnSpPr>
+            <a:cxnSpLocks/>
+          </p:cNvCxnSpPr>
+          <p:nvPr/>
+        </p:nvCxnSpPr>
+        <p:spPr>
+          <a:xfrm flipH="1">
+            <a:off x="3616037" y="2052856"/>
+            <a:ext cx="598516" cy="471032"/>
+          </a:xfrm>
+          <a:prstGeom prst="straightConnector1">
+            <a:avLst/>
+          </a:prstGeom>
+          <a:ln>
+            <a:solidFill>
+              <a:schemeClr val="tx1"/>
+            </a:solidFill>
+            <a:tailEnd type="triangle"/>
+          </a:ln>
+        </p:spPr>
+        <p:style>
+          <a:lnRef idx="2">
+            <a:schemeClr val="accent1"/>
+          </a:lnRef>
+          <a:fillRef idx="0">
+            <a:schemeClr val="accent1"/>
+          </a:fillRef>
+          <a:effectRef idx="1">
+            <a:schemeClr val="accent1"/>
+          </a:effectRef>
+          <a:fontRef idx="minor">
+            <a:schemeClr val="tx1"/>
+          </a:fontRef>
+        </p:style>
+      </p:cxnSp>
+      <p:cxnSp>
+        <p:nvCxnSpPr>
+          <p:cNvPr id="20" name="Straight Arrow Connector 19">
+            <a:extLst>
+              <a:ext uri="{FF2B5EF4-FFF2-40B4-BE49-F238E27FC236}">
+                <a16:creationId xmlns:a16="http://schemas.microsoft.com/office/drawing/2014/main" id="{7BDCD59E-7FDE-A76B-4AC5-0CD8EDD9AB29}"/>
+              </a:ext>
+            </a:extLst>
+          </p:cNvPr>
+          <p:cNvCxnSpPr>
+            <a:cxnSpLocks/>
+          </p:cNvCxnSpPr>
+          <p:nvPr/>
+        </p:nvCxnSpPr>
+        <p:spPr>
+          <a:xfrm flipH="1">
+            <a:off x="3624960" y="1642546"/>
+            <a:ext cx="589593" cy="198723"/>
+          </a:xfrm>
+          <a:prstGeom prst="straightConnector1">
+            <a:avLst/>
+          </a:prstGeom>
+          <a:ln>
+            <a:solidFill>
+              <a:schemeClr val="tx1"/>
+            </a:solidFill>
+            <a:tailEnd type="triangle"/>
+          </a:ln>
+        </p:spPr>
+        <p:style>
+          <a:lnRef idx="2">
+            <a:schemeClr val="accent1"/>
+          </a:lnRef>
+          <a:fillRef idx="0">
+            <a:schemeClr val="accent1"/>
+          </a:fillRef>
+          <a:effectRef idx="1">
+            <a:schemeClr val="accent1"/>
+          </a:effectRef>
+          <a:fontRef idx="minor">
+            <a:schemeClr val="tx1"/>
+          </a:fontRef>
+        </p:style>
+      </p:cxnSp>
+      <p:cxnSp>
+        <p:nvCxnSpPr>
+          <p:cNvPr id="7" name="Straight Arrow Connector 6">
+            <a:extLst>
+              <a:ext uri="{FF2B5EF4-FFF2-40B4-BE49-F238E27FC236}">
+                <a16:creationId xmlns:a16="http://schemas.microsoft.com/office/drawing/2014/main" id="{06FB5562-D1B4-3031-A90B-6A5A5B9E724E}"/>
+              </a:ext>
+            </a:extLst>
+          </p:cNvPr>
+          <p:cNvCxnSpPr>
+            <a:cxnSpLocks/>
+          </p:cNvCxnSpPr>
+          <p:nvPr/>
+        </p:nvCxnSpPr>
+        <p:spPr>
+          <a:xfrm flipH="1">
+            <a:off x="3597333" y="2052856"/>
+            <a:ext cx="654627" cy="853611"/>
+          </a:xfrm>
+          <a:prstGeom prst="straightConnector1">
+            <a:avLst/>
+          </a:prstGeom>
+          <a:ln>
+            <a:solidFill>
+              <a:schemeClr val="tx1"/>
+            </a:solidFill>
+            <a:tailEnd type="triangle"/>
+          </a:ln>
+        </p:spPr>
+        <p:style>
+          <a:lnRef idx="2">
+            <a:schemeClr val="accent1"/>
+          </a:lnRef>
+          <a:fillRef idx="0">
+            <a:schemeClr val="accent1"/>
+          </a:fillRef>
+          <a:effectRef idx="1">
+            <a:schemeClr val="accent1"/>
+          </a:effectRef>
+          <a:fontRef idx="minor">
+            <a:schemeClr val="tx1"/>
+          </a:fontRef>
+        </p:style>
+      </p:cxnSp>
+      <p:cxnSp>
+        <p:nvCxnSpPr>
+          <p:cNvPr id="29" name="Straight Arrow Connector 28">
+            <a:extLst>
+              <a:ext uri="{FF2B5EF4-FFF2-40B4-BE49-F238E27FC236}">
+                <a16:creationId xmlns:a16="http://schemas.microsoft.com/office/drawing/2014/main" id="{DF9A3D74-EC92-63BD-39C4-0B497591B8A2}"/>
+              </a:ext>
+            </a:extLst>
+          </p:cNvPr>
+          <p:cNvCxnSpPr>
+            <a:cxnSpLocks/>
+          </p:cNvCxnSpPr>
+          <p:nvPr/>
+        </p:nvCxnSpPr>
+        <p:spPr>
+          <a:xfrm flipH="1">
+            <a:off x="2356658" y="3178218"/>
+            <a:ext cx="2148840" cy="392098"/>
+          </a:xfrm>
+          <a:prstGeom prst="straightConnector1">
+            <a:avLst/>
+          </a:prstGeom>
+          <a:ln>
+            <a:solidFill>
+              <a:schemeClr val="tx1"/>
+            </a:solidFill>
+            <a:tailEnd type="triangle"/>
+          </a:ln>
+        </p:spPr>
+        <p:style>
+          <a:lnRef idx="2">
+            <a:schemeClr val="accent1"/>
+          </a:lnRef>
+          <a:fillRef idx="0">
+            <a:schemeClr val="accent1"/>
+          </a:fillRef>
+          <a:effectRef idx="1">
+            <a:schemeClr val="accent1"/>
+          </a:effectRef>
+          <a:fontRef idx="minor">
+            <a:schemeClr val="tx1"/>
+          </a:fontRef>
+        </p:style>
+      </p:cxnSp>
     </p:spTree>
+    <p:extLst>
+      <p:ext uri="{BB962C8B-B14F-4D97-AF65-F5344CB8AC3E}">
+        <p14:creationId xmlns:p14="http://schemas.microsoft.com/office/powerpoint/2010/main" val="3495801980"/>
+      </p:ext>
+    </p:extLst>
   </p:cSld>
   <p:clrMapOvr>
     <a:masterClrMapping/>
   </p:clrMapOvr>
+  <p:timing>
+    <p:tnLst>
+      <p:par>
+        <p:cTn id="1" dur="indefinite" restart="never" nodeType="tmRoot">
+          <p:childTnLst>
+            <p:seq concurrent="1" nextAc="seek">
+              <p:cTn id="2" dur="indefinite" nodeType="mainSeq">
+                <p:childTnLst>
+                  <p:par>
+                    <p:cTn id="3" fill="hold">
+                      <p:stCondLst>
+                        <p:cond delay="indefinite"/>
+                      </p:stCondLst>
+                      <p:childTnLst>
+                        <p:par>
+                          <p:cTn id="4" fill="hold">
+                            <p:stCondLst>
+                              <p:cond delay="0"/>
+                            </p:stCondLst>
+                            <p:childTnLst>
+                              <p:par>
+                                <p:cTn id="5" presetID="1" presetClass="entr" presetSubtype="0" fill="hold" nodeType="clickEffect">
+                                  <p:stCondLst>
+                                    <p:cond delay="0"/>
+                                  </p:stCondLst>
+                                  <p:childTnLst>
+                                    <p:set>
+                                      <p:cBhvr>
+                                        <p:cTn id="6" dur="1" fill="hold">
+                                          <p:stCondLst>
+                                            <p:cond delay="0"/>
+                                          </p:stCondLst>
+                                        </p:cTn>
+                                        <p:tgtEl>
+                                          <p:spTgt spid="3">
+                                            <p:txEl>
+                                              <p:pRg st="1" end="1"/>
+                                            </p:txEl>
+                                          </p:spTgt>
+                                        </p:tgtEl>
+                                        <p:attrNameLst>
+                                          <p:attrName>style.visibility</p:attrName>
+                                        </p:attrNameLst>
+                                      </p:cBhvr>
+                                      <p:to>
+                                        <p:strVal val="visible"/>
+                                      </p:to>
+                                    </p:set>
+                                  </p:childTnLst>
+                                </p:cTn>
+                              </p:par>
+                              <p:par>
+                                <p:cTn id="7" presetID="1" presetClass="entr" presetSubtype="0" fill="hold" nodeType="withEffect">
+                                  <p:stCondLst>
+                                    <p:cond delay="0"/>
+                                  </p:stCondLst>
+                                  <p:childTnLst>
+                                    <p:set>
+                                      <p:cBhvr>
+                                        <p:cTn id="8" dur="1" fill="hold">
+                                          <p:stCondLst>
+                                            <p:cond delay="0"/>
+                                          </p:stCondLst>
+                                        </p:cTn>
+                                        <p:tgtEl>
+                                          <p:spTgt spid="20"/>
+                                        </p:tgtEl>
+                                        <p:attrNameLst>
+                                          <p:attrName>style.visibility</p:attrName>
+                                        </p:attrNameLst>
+                                      </p:cBhvr>
+                                      <p:to>
+                                        <p:strVal val="visible"/>
+                                      </p:to>
+                                    </p:set>
+                                  </p:childTnLst>
+                                </p:cTn>
+                              </p:par>
+                            </p:childTnLst>
+                          </p:cTn>
+                        </p:par>
+                      </p:childTnLst>
+                    </p:cTn>
+                  </p:par>
+                  <p:par>
+                    <p:cTn id="9" fill="hold">
+                      <p:stCondLst>
+                        <p:cond delay="indefinite"/>
+                      </p:stCondLst>
+                      <p:childTnLst>
+                        <p:par>
+                          <p:cTn id="10" fill="hold">
+                            <p:stCondLst>
+                              <p:cond delay="0"/>
+                            </p:stCondLst>
+                            <p:childTnLst>
+                              <p:par>
+                                <p:cTn id="11" presetID="1" presetClass="entr" presetSubtype="0" fill="hold" nodeType="clickEffect">
+                                  <p:stCondLst>
+                                    <p:cond delay="0"/>
+                                  </p:stCondLst>
+                                  <p:childTnLst>
+                                    <p:set>
+                                      <p:cBhvr>
+                                        <p:cTn id="12" dur="1" fill="hold">
+                                          <p:stCondLst>
+                                            <p:cond delay="0"/>
+                                          </p:stCondLst>
+                                        </p:cTn>
+                                        <p:tgtEl>
+                                          <p:spTgt spid="3">
+                                            <p:txEl>
+                                              <p:pRg st="2" end="2"/>
+                                            </p:txEl>
+                                          </p:spTgt>
+                                        </p:tgtEl>
+                                        <p:attrNameLst>
+                                          <p:attrName>style.visibility</p:attrName>
+                                        </p:attrNameLst>
+                                      </p:cBhvr>
+                                      <p:to>
+                                        <p:strVal val="visible"/>
+                                      </p:to>
+                                    </p:set>
+                                  </p:childTnLst>
+                                </p:cTn>
+                              </p:par>
+                              <p:par>
+                                <p:cTn id="13" presetID="1" presetClass="entr" presetSubtype="0" fill="hold" nodeType="withEffect">
+                                  <p:stCondLst>
+                                    <p:cond delay="0"/>
+                                  </p:stCondLst>
+                                  <p:childTnLst>
+                                    <p:set>
+                                      <p:cBhvr>
+                                        <p:cTn id="14" dur="1" fill="hold">
+                                          <p:stCondLst>
+                                            <p:cond delay="0"/>
+                                          </p:stCondLst>
+                                        </p:cTn>
+                                        <p:tgtEl>
+                                          <p:spTgt spid="15"/>
+                                        </p:tgtEl>
+                                        <p:attrNameLst>
+                                          <p:attrName>style.visibility</p:attrName>
+                                        </p:attrNameLst>
+                                      </p:cBhvr>
+                                      <p:to>
+                                        <p:strVal val="visible"/>
+                                      </p:to>
+                                    </p:set>
+                                  </p:childTnLst>
+                                </p:cTn>
+                              </p:par>
+                              <p:par>
+                                <p:cTn id="15" presetID="1" presetClass="entr" presetSubtype="0" fill="hold" nodeType="withEffect">
+                                  <p:stCondLst>
+                                    <p:cond delay="0"/>
+                                  </p:stCondLst>
+                                  <p:childTnLst>
+                                    <p:set>
+                                      <p:cBhvr>
+                                        <p:cTn id="16" dur="1" fill="hold">
+                                          <p:stCondLst>
+                                            <p:cond delay="0"/>
+                                          </p:stCondLst>
+                                        </p:cTn>
+                                        <p:tgtEl>
+                                          <p:spTgt spid="6"/>
+                                        </p:tgtEl>
+                                        <p:attrNameLst>
+                                          <p:attrName>style.visibility</p:attrName>
+                                        </p:attrNameLst>
+                                      </p:cBhvr>
+                                      <p:to>
+                                        <p:strVal val="visible"/>
+                                      </p:to>
+                                    </p:set>
+                                  </p:childTnLst>
+                                </p:cTn>
+                              </p:par>
+                              <p:par>
+                                <p:cTn id="17" presetID="1" presetClass="entr" presetSubtype="0" fill="hold" nodeType="withEffect">
+                                  <p:stCondLst>
+                                    <p:cond delay="0"/>
+                                  </p:stCondLst>
+                                  <p:childTnLst>
+                                    <p:set>
+                                      <p:cBhvr>
+                                        <p:cTn id="18" dur="1" fill="hold">
+                                          <p:stCondLst>
+                                            <p:cond delay="0"/>
+                                          </p:stCondLst>
+                                        </p:cTn>
+                                        <p:tgtEl>
+                                          <p:spTgt spid="7"/>
+                                        </p:tgtEl>
+                                        <p:attrNameLst>
+                                          <p:attrName>style.visibility</p:attrName>
+                                        </p:attrNameLst>
+                                      </p:cBhvr>
+                                      <p:to>
+                                        <p:strVal val="visible"/>
+                                      </p:to>
+                                    </p:set>
+                                  </p:childTnLst>
+                                </p:cTn>
+                              </p:par>
+                            </p:childTnLst>
+                          </p:cTn>
+                        </p:par>
+                      </p:childTnLst>
+                    </p:cTn>
+                  </p:par>
+                  <p:par>
+                    <p:cTn id="19" fill="hold">
+                      <p:stCondLst>
+                        <p:cond delay="indefinite"/>
+                      </p:stCondLst>
+                      <p:childTnLst>
+                        <p:par>
+                          <p:cTn id="20" fill="hold">
+                            <p:stCondLst>
+                              <p:cond delay="0"/>
+                            </p:stCondLst>
+                            <p:childTnLst>
+                              <p:par>
+                                <p:cTn id="21" presetID="1" presetClass="entr" presetSubtype="0" fill="hold" nodeType="clickEffect">
+                                  <p:stCondLst>
+                                    <p:cond delay="0"/>
+                                  </p:stCondLst>
+                                  <p:childTnLst>
+                                    <p:set>
+                                      <p:cBhvr>
+                                        <p:cTn id="22" dur="1" fill="hold">
+                                          <p:stCondLst>
+                                            <p:cond delay="0"/>
+                                          </p:stCondLst>
+                                        </p:cTn>
+                                        <p:tgtEl>
+                                          <p:spTgt spid="3">
+                                            <p:txEl>
+                                              <p:pRg st="3" end="3"/>
+                                            </p:txEl>
+                                          </p:spTgt>
+                                        </p:tgtEl>
+                                        <p:attrNameLst>
+                                          <p:attrName>style.visibility</p:attrName>
+                                        </p:attrNameLst>
+                                      </p:cBhvr>
+                                      <p:to>
+                                        <p:strVal val="visible"/>
+                                      </p:to>
+                                    </p:set>
+                                  </p:childTnLst>
+                                </p:cTn>
+                              </p:par>
+                              <p:par>
+                                <p:cTn id="23" presetID="1" presetClass="entr" presetSubtype="0" fill="hold" nodeType="withEffect">
+                                  <p:stCondLst>
+                                    <p:cond delay="0"/>
+                                  </p:stCondLst>
+                                  <p:childTnLst>
+                                    <p:set>
+                                      <p:cBhvr>
+                                        <p:cTn id="24" dur="1" fill="hold">
+                                          <p:stCondLst>
+                                            <p:cond delay="0"/>
+                                          </p:stCondLst>
+                                        </p:cTn>
+                                        <p:tgtEl>
+                                          <p:spTgt spid="12"/>
+                                        </p:tgtEl>
+                                        <p:attrNameLst>
+                                          <p:attrName>style.visibility</p:attrName>
+                                        </p:attrNameLst>
+                                      </p:cBhvr>
+                                      <p:to>
+                                        <p:strVal val="visible"/>
+                                      </p:to>
+                                    </p:set>
+                                  </p:childTnLst>
+                                </p:cTn>
+                              </p:par>
+                            </p:childTnLst>
+                          </p:cTn>
+                        </p:par>
+                      </p:childTnLst>
+                    </p:cTn>
+                  </p:par>
+                  <p:par>
+                    <p:cTn id="25" fill="hold">
+                      <p:stCondLst>
+                        <p:cond delay="indefinite"/>
+                      </p:stCondLst>
+                      <p:childTnLst>
+                        <p:par>
+                          <p:cTn id="26" fill="hold">
+                            <p:stCondLst>
+                              <p:cond delay="0"/>
+                            </p:stCondLst>
+                            <p:childTnLst>
+                              <p:par>
+                                <p:cTn id="27" presetID="1" presetClass="entr" presetSubtype="0" fill="hold" nodeType="clickEffect">
+                                  <p:stCondLst>
+                                    <p:cond delay="0"/>
+                                  </p:stCondLst>
+                                  <p:childTnLst>
+                                    <p:set>
+                                      <p:cBhvr>
+                                        <p:cTn id="28" dur="1" fill="hold">
+                                          <p:stCondLst>
+                                            <p:cond delay="0"/>
+                                          </p:stCondLst>
+                                        </p:cTn>
+                                        <p:tgtEl>
+                                          <p:spTgt spid="3">
+                                            <p:txEl>
+                                              <p:pRg st="4" end="4"/>
+                                            </p:txEl>
+                                          </p:spTgt>
+                                        </p:tgtEl>
+                                        <p:attrNameLst>
+                                          <p:attrName>style.visibility</p:attrName>
+                                        </p:attrNameLst>
+                                      </p:cBhvr>
+                                      <p:to>
+                                        <p:strVal val="visible"/>
+                                      </p:to>
+                                    </p:set>
+                                  </p:childTnLst>
+                                </p:cTn>
+                              </p:par>
+                              <p:par>
+                                <p:cTn id="29" presetID="1" presetClass="entr" presetSubtype="0" fill="hold" nodeType="withEffect">
+                                  <p:stCondLst>
+                                    <p:cond delay="0"/>
+                                  </p:stCondLst>
+                                  <p:childTnLst>
+                                    <p:set>
+                                      <p:cBhvr>
+                                        <p:cTn id="30" dur="1" fill="hold">
+                                          <p:stCondLst>
+                                            <p:cond delay="0"/>
+                                          </p:stCondLst>
+                                        </p:cTn>
+                                        <p:tgtEl>
+                                          <p:spTgt spid="29"/>
+                                        </p:tgtEl>
+                                        <p:attrNameLst>
+                                          <p:attrName>style.visibility</p:attrName>
+                                        </p:attrNameLst>
+                                      </p:cBhvr>
+                                      <p:to>
+                                        <p:strVal val="visible"/>
+                                      </p:to>
+                                    </p:set>
+                                  </p:childTnLst>
+                                </p:cTn>
+                              </p:par>
+                            </p:childTnLst>
+                          </p:cTn>
+                        </p:par>
+                      </p:childTnLst>
+                    </p:cTn>
+                  </p:par>
+                  <p:par>
+                    <p:cTn id="31" fill="hold">
+                      <p:stCondLst>
+                        <p:cond delay="indefinite"/>
+                      </p:stCondLst>
+                      <p:childTnLst>
+                        <p:par>
+                          <p:cTn id="32" fill="hold">
+                            <p:stCondLst>
+                              <p:cond delay="0"/>
+                            </p:stCondLst>
+                            <p:childTnLst>
+                              <p:par>
+                                <p:cTn id="33" presetID="1" presetClass="entr" presetSubtype="0" fill="hold" nodeType="clickEffect">
+                                  <p:stCondLst>
+                                    <p:cond delay="0"/>
+                                  </p:stCondLst>
+                                  <p:childTnLst>
+                                    <p:set>
+                                      <p:cBhvr>
+                                        <p:cTn id="34" dur="1" fill="hold">
+                                          <p:stCondLst>
+                                            <p:cond delay="0"/>
+                                          </p:stCondLst>
+                                        </p:cTn>
+                                        <p:tgtEl>
+                                          <p:spTgt spid="3">
+                                            <p:txEl>
+                                              <p:pRg st="5" end="5"/>
+                                            </p:txEl>
+                                          </p:spTgt>
+                                        </p:tgtEl>
+                                        <p:attrNameLst>
+                                          <p:attrName>style.visibility</p:attrName>
+                                        </p:attrNameLst>
+                                      </p:cBhvr>
+                                      <p:to>
+                                        <p:strVal val="visible"/>
+                                      </p:to>
+                                    </p:set>
+                                  </p:childTnLst>
+                                </p:cTn>
+                              </p:par>
+                            </p:childTnLst>
+                          </p:cTn>
+                        </p:par>
+                      </p:childTnLst>
+                    </p:cTn>
+                  </p:par>
+                </p:childTnLst>
+              </p:cTn>
+              <p:prevCondLst>
+                <p:cond evt="onPrev" delay="0">
+                  <p:tgtEl>
+                    <p:sldTgt/>
+                  </p:tgtEl>
+                </p:cond>
+              </p:prevCondLst>
+              <p:nextCondLst>
+                <p:cond evt="onNext" delay="0">
+                  <p:tgtEl>
+                    <p:sldTgt/>
+                  </p:tgtEl>
+                </p:cond>
+              </p:nextCondLst>
+            </p:seq>
+          </p:childTnLst>
+        </p:cTn>
+      </p:par>
+    </p:tnLst>
+  </p:timing>
 </p:sld>
 </file>
 
-<file path=ppt/slides/slide40.xml><?xml version="1.0" encoding="utf-8"?>
+<file path=ppt/slides/slide42.xml><?xml version="1.0" encoding="utf-8"?>
 <p:sld xmlns:a="http://schemas.openxmlformats.org/drawingml/2006/main" xmlns:r="http://schemas.openxmlformats.org/officeDocument/2006/relationships" xmlns:p="http://schemas.openxmlformats.org/presentationml/2006/main">
   <p:cSld>
     <p:spTree>
@@ -28049,7 +29175,7 @@
 </p:sld>
 </file>
 
-<file path=ppt/slides/slide41.xml><?xml version="1.0" encoding="utf-8"?>
+<file path=ppt/slides/slide43.xml><?xml version="1.0" encoding="utf-8"?>
 <p:sld xmlns:a="http://schemas.openxmlformats.org/drawingml/2006/main" xmlns:r="http://schemas.openxmlformats.org/officeDocument/2006/relationships" xmlns:p="http://schemas.openxmlformats.org/presentationml/2006/main">
   <p:cSld>
     <p:spTree>
@@ -28090,8 +29216,8 @@
           </a:p>
         </p:txBody>
       </p:sp>
-      <mc:AlternateContent xmlns:mc="http://schemas.openxmlformats.org/markup-compatibility/2006">
-        <mc:Choice xmlns:a14="http://schemas.microsoft.com/office/drawing/2010/main" Requires="a14">
+      <mc:AlternateContent xmlns:mc="http://schemas.openxmlformats.org/markup-compatibility/2006" xmlns:a14="http://schemas.microsoft.com/office/drawing/2010/main">
+        <mc:Choice Requires="a14">
           <p:sp>
             <p:nvSpPr>
               <p:cNvPr id="3" name="Content Placeholder 2"/>
@@ -28746,7 +29872,7 @@
             </p:txBody>
           </p:sp>
         </mc:Choice>
-        <mc:Fallback>
+        <mc:Fallback xmlns="">
           <p:sp>
             <p:nvSpPr>
               <p:cNvPr id="3" name="Content Placeholder 2"/>
@@ -29062,7 +30188,7 @@
 </p:sld>
 </file>
 
-<file path=ppt/slides/slide42.xml><?xml version="1.0" encoding="utf-8"?>
+<file path=ppt/slides/slide44.xml><?xml version="1.0" encoding="utf-8"?>
 <p:sld xmlns:a="http://schemas.openxmlformats.org/drawingml/2006/main" xmlns:r="http://schemas.openxmlformats.org/officeDocument/2006/relationships" xmlns:p="http://schemas.openxmlformats.org/presentationml/2006/main">
   <p:cSld>
     <p:spTree>
@@ -29433,7 +30559,7 @@
 </p:sld>
 </file>
 
-<file path=ppt/slides/slide43.xml><?xml version="1.0" encoding="utf-8"?>
+<file path=ppt/slides/slide45.xml><?xml version="1.0" encoding="utf-8"?>
 <p:sld xmlns:a="http://schemas.openxmlformats.org/drawingml/2006/main" xmlns:r="http://schemas.openxmlformats.org/officeDocument/2006/relationships" xmlns:p="http://schemas.openxmlformats.org/presentationml/2006/main">
   <p:cSld>
     <p:spTree>
@@ -29777,7 +30903,7 @@
 </p:sld>
 </file>
 
-<file path=ppt/slides/slide44.xml><?xml version="1.0" encoding="utf-8"?>
+<file path=ppt/slides/slide46.xml><?xml version="1.0" encoding="utf-8"?>
 <p:sld xmlns:a="http://schemas.openxmlformats.org/drawingml/2006/main" xmlns:r="http://schemas.openxmlformats.org/officeDocument/2006/relationships" xmlns:p="http://schemas.openxmlformats.org/presentationml/2006/main">
   <p:cSld>
     <p:spTree>
@@ -29986,7 +31112,901 @@
 </p:sld>
 </file>
 
-<file path=ppt/slides/slide45.xml><?xml version="1.0" encoding="utf-8"?>
+<file path=ppt/slides/slide47.xml><?xml version="1.0" encoding="utf-8"?>
+<p:sld xmlns:a="http://schemas.openxmlformats.org/drawingml/2006/main" xmlns:r="http://schemas.openxmlformats.org/officeDocument/2006/relationships" xmlns:p="http://schemas.openxmlformats.org/presentationml/2006/main">
+  <p:cSld>
+    <p:spTree>
+      <p:nvGrpSpPr>
+        <p:cNvPr id="1" name="">
+          <a:extLst>
+            <a:ext uri="{FF2B5EF4-FFF2-40B4-BE49-F238E27FC236}">
+              <a16:creationId xmlns:a16="http://schemas.microsoft.com/office/drawing/2014/main" id="{231181A4-3124-0406-D556-38129BE512F1}"/>
+            </a:ext>
+          </a:extLst>
+        </p:cNvPr>
+        <p:cNvGrpSpPr/>
+        <p:nvPr/>
+      </p:nvGrpSpPr>
+      <p:grpSpPr>
+        <a:xfrm>
+          <a:off x="0" y="0"/>
+          <a:ext cx="0" cy="0"/>
+          <a:chOff x="0" y="0"/>
+          <a:chExt cx="0" cy="0"/>
+        </a:xfrm>
+      </p:grpSpPr>
+      <p:pic>
+        <p:nvPicPr>
+          <p:cNvPr id="9" name="Picture 8">
+            <a:extLst>
+              <a:ext uri="{FF2B5EF4-FFF2-40B4-BE49-F238E27FC236}">
+                <a16:creationId xmlns:a16="http://schemas.microsoft.com/office/drawing/2014/main" id="{0DF1DF5E-B54A-CFFB-3A9E-D342D948A8DE}"/>
+              </a:ext>
+            </a:extLst>
+          </p:cNvPr>
+          <p:cNvPicPr>
+            <a:picLocks noChangeAspect="1"/>
+          </p:cNvPicPr>
+          <p:nvPr/>
+        </p:nvPicPr>
+        <p:blipFill>
+          <a:blip r:embed="rId2"/>
+          <a:stretch>
+            <a:fillRect/>
+          </a:stretch>
+        </p:blipFill>
+        <p:spPr>
+          <a:xfrm>
+            <a:off x="41563" y="1547730"/>
+            <a:ext cx="4214553" cy="2305220"/>
+          </a:xfrm>
+          <a:prstGeom prst="rect">
+            <a:avLst/>
+          </a:prstGeom>
+        </p:spPr>
+      </p:pic>
+      <p:sp>
+        <p:nvSpPr>
+          <p:cNvPr id="2" name="Title 1">
+            <a:extLst>
+              <a:ext uri="{FF2B5EF4-FFF2-40B4-BE49-F238E27FC236}">
+                <a16:creationId xmlns:a16="http://schemas.microsoft.com/office/drawing/2014/main" id="{369A0318-266B-ED86-E783-692494CE9CBF}"/>
+              </a:ext>
+            </a:extLst>
+          </p:cNvPr>
+          <p:cNvSpPr>
+            <a:spLocks noGrp="1"/>
+          </p:cNvSpPr>
+          <p:nvPr>
+            <p:ph type="title"/>
+          </p:nvPr>
+        </p:nvSpPr>
+        <p:spPr>
+          <a:xfrm>
+            <a:off x="457201" y="204787"/>
+            <a:ext cx="8433261" cy="497638"/>
+          </a:xfrm>
+        </p:spPr>
+        <p:txBody>
+          <a:bodyPr>
+            <a:noAutofit/>
+          </a:bodyPr>
+          <a:lstStyle/>
+          <a:p>
+            <a:pPr marL="0" lvl="0" indent="0" algn="ctr">
+              <a:buNone/>
+            </a:pPr>
+            <a:r>
+              <a:rPr lang="en-US" sz="3200" dirty="0"/>
+              <a:t>Example: L1 </a:t>
+            </a:r>
+            <a:r>
+              <a:rPr sz="3200" dirty="0"/>
+              <a:t>Regularization</a:t>
+            </a:r>
+          </a:p>
+        </p:txBody>
+      </p:sp>
+      <p:sp>
+        <p:nvSpPr>
+          <p:cNvPr id="3" name="Content Placeholder 2">
+            <a:extLst>
+              <a:ext uri="{FF2B5EF4-FFF2-40B4-BE49-F238E27FC236}">
+                <a16:creationId xmlns:a16="http://schemas.microsoft.com/office/drawing/2014/main" id="{00CFB5CB-C9FC-0147-EE59-7472A9893D84}"/>
+              </a:ext>
+            </a:extLst>
+          </p:cNvPr>
+          <p:cNvSpPr>
+            <a:spLocks noGrp="1"/>
+          </p:cNvSpPr>
+          <p:nvPr>
+            <p:ph idx="1"/>
+          </p:nvPr>
+        </p:nvSpPr>
+        <p:spPr>
+          <a:xfrm>
+            <a:off x="4148052" y="914012"/>
+            <a:ext cx="4879570" cy="4085705"/>
+          </a:xfrm>
+        </p:spPr>
+        <p:txBody>
+          <a:bodyPr>
+            <a:normAutofit/>
+          </a:bodyPr>
+          <a:lstStyle/>
+          <a:p>
+            <a:pPr marL="0" lvl="0" indent="0">
+              <a:buNone/>
+            </a:pPr>
+            <a:r>
+              <a:rPr lang="en-US" dirty="0"/>
+              <a:t>L1 regression is no longer overfit       </a:t>
+            </a:r>
+          </a:p>
+          <a:p>
+            <a:r>
+              <a:rPr lang="en-US" dirty="0"/>
+              <a:t>Intercept parameter has increased</a:t>
+            </a:r>
+          </a:p>
+          <a:p>
+            <a:r>
+              <a:rPr lang="en-US" dirty="0"/>
+              <a:t>Most model coefficients are driven to 0</a:t>
+            </a:r>
+          </a:p>
+          <a:p>
+            <a:r>
+              <a:rPr lang="en-US" dirty="0"/>
+              <a:t>Other parameters are constrained</a:t>
+            </a:r>
+          </a:p>
+          <a:p>
+            <a:r>
+              <a:rPr lang="en-US" dirty="0"/>
+              <a:t>Norm of coefficient vector is limited, except intercept</a:t>
+            </a:r>
+            <a:endParaRPr dirty="0"/>
+          </a:p>
+        </p:txBody>
+      </p:sp>
+      <p:cxnSp>
+        <p:nvCxnSpPr>
+          <p:cNvPr id="6" name="Straight Arrow Connector 5">
+            <a:extLst>
+              <a:ext uri="{FF2B5EF4-FFF2-40B4-BE49-F238E27FC236}">
+                <a16:creationId xmlns:a16="http://schemas.microsoft.com/office/drawing/2014/main" id="{649DD9F6-B5A4-652C-CFB8-590D591C3E0D}"/>
+              </a:ext>
+            </a:extLst>
+          </p:cNvPr>
+          <p:cNvCxnSpPr>
+            <a:cxnSpLocks/>
+          </p:cNvCxnSpPr>
+          <p:nvPr/>
+        </p:nvCxnSpPr>
+        <p:spPr>
+          <a:xfrm flipH="1" flipV="1">
+            <a:off x="3670069" y="1990898"/>
+            <a:ext cx="627611" cy="195738"/>
+          </a:xfrm>
+          <a:prstGeom prst="straightConnector1">
+            <a:avLst/>
+          </a:prstGeom>
+          <a:ln>
+            <a:solidFill>
+              <a:schemeClr val="tx1"/>
+            </a:solidFill>
+            <a:tailEnd type="triangle"/>
+          </a:ln>
+        </p:spPr>
+        <p:style>
+          <a:lnRef idx="2">
+            <a:schemeClr val="accent1"/>
+          </a:lnRef>
+          <a:fillRef idx="0">
+            <a:schemeClr val="accent1"/>
+          </a:fillRef>
+          <a:effectRef idx="1">
+            <a:schemeClr val="accent1"/>
+          </a:effectRef>
+          <a:fontRef idx="minor">
+            <a:schemeClr val="tx1"/>
+          </a:fontRef>
+        </p:style>
+      </p:cxnSp>
+      <p:cxnSp>
+        <p:nvCxnSpPr>
+          <p:cNvPr id="12" name="Straight Arrow Connector 11">
+            <a:extLst>
+              <a:ext uri="{FF2B5EF4-FFF2-40B4-BE49-F238E27FC236}">
+                <a16:creationId xmlns:a16="http://schemas.microsoft.com/office/drawing/2014/main" id="{14A094C9-6F6D-6270-70DA-3BAC2404B89A}"/>
+              </a:ext>
+            </a:extLst>
+          </p:cNvPr>
+          <p:cNvCxnSpPr>
+            <a:cxnSpLocks/>
+          </p:cNvCxnSpPr>
+          <p:nvPr/>
+        </p:nvCxnSpPr>
+        <p:spPr>
+          <a:xfrm flipH="1">
+            <a:off x="3624960" y="2820354"/>
+            <a:ext cx="589593" cy="196777"/>
+          </a:xfrm>
+          <a:prstGeom prst="straightConnector1">
+            <a:avLst/>
+          </a:prstGeom>
+          <a:ln>
+            <a:solidFill>
+              <a:schemeClr val="tx1"/>
+            </a:solidFill>
+            <a:tailEnd type="triangle"/>
+          </a:ln>
+        </p:spPr>
+        <p:style>
+          <a:lnRef idx="2">
+            <a:schemeClr val="accent1"/>
+          </a:lnRef>
+          <a:fillRef idx="0">
+            <a:schemeClr val="accent1"/>
+          </a:fillRef>
+          <a:effectRef idx="1">
+            <a:schemeClr val="accent1"/>
+          </a:effectRef>
+          <a:fontRef idx="minor">
+            <a:schemeClr val="tx1"/>
+          </a:fontRef>
+        </p:style>
+      </p:cxnSp>
+      <p:cxnSp>
+        <p:nvCxnSpPr>
+          <p:cNvPr id="15" name="Straight Arrow Connector 14">
+            <a:extLst>
+              <a:ext uri="{FF2B5EF4-FFF2-40B4-BE49-F238E27FC236}">
+                <a16:creationId xmlns:a16="http://schemas.microsoft.com/office/drawing/2014/main" id="{9EF4A99E-C81B-9561-B144-BE30548AC46F}"/>
+              </a:ext>
+            </a:extLst>
+          </p:cNvPr>
+          <p:cNvCxnSpPr>
+            <a:cxnSpLocks/>
+          </p:cNvCxnSpPr>
+          <p:nvPr/>
+        </p:nvCxnSpPr>
+        <p:spPr>
+          <a:xfrm flipH="1">
+            <a:off x="3628505" y="2186636"/>
+            <a:ext cx="669175" cy="86896"/>
+          </a:xfrm>
+          <a:prstGeom prst="straightConnector1">
+            <a:avLst/>
+          </a:prstGeom>
+          <a:ln>
+            <a:solidFill>
+              <a:schemeClr val="tx1"/>
+            </a:solidFill>
+            <a:tailEnd type="triangle"/>
+          </a:ln>
+        </p:spPr>
+        <p:style>
+          <a:lnRef idx="2">
+            <a:schemeClr val="accent1"/>
+          </a:lnRef>
+          <a:fillRef idx="0">
+            <a:schemeClr val="accent1"/>
+          </a:fillRef>
+          <a:effectRef idx="1">
+            <a:schemeClr val="accent1"/>
+          </a:effectRef>
+          <a:fontRef idx="minor">
+            <a:schemeClr val="tx1"/>
+          </a:fontRef>
+        </p:style>
+      </p:cxnSp>
+      <p:cxnSp>
+        <p:nvCxnSpPr>
+          <p:cNvPr id="20" name="Straight Arrow Connector 19">
+            <a:extLst>
+              <a:ext uri="{FF2B5EF4-FFF2-40B4-BE49-F238E27FC236}">
+                <a16:creationId xmlns:a16="http://schemas.microsoft.com/office/drawing/2014/main" id="{0BCACCD2-343C-5A9C-8C59-3F195768D956}"/>
+              </a:ext>
+            </a:extLst>
+          </p:cNvPr>
+          <p:cNvCxnSpPr>
+            <a:cxnSpLocks/>
+          </p:cNvCxnSpPr>
+          <p:nvPr/>
+        </p:nvCxnSpPr>
+        <p:spPr>
+          <a:xfrm flipH="1">
+            <a:off x="3624960" y="1642546"/>
+            <a:ext cx="589593" cy="198723"/>
+          </a:xfrm>
+          <a:prstGeom prst="straightConnector1">
+            <a:avLst/>
+          </a:prstGeom>
+          <a:ln>
+            <a:solidFill>
+              <a:schemeClr val="tx1"/>
+            </a:solidFill>
+            <a:tailEnd type="triangle"/>
+          </a:ln>
+        </p:spPr>
+        <p:style>
+          <a:lnRef idx="2">
+            <a:schemeClr val="accent1"/>
+          </a:lnRef>
+          <a:fillRef idx="0">
+            <a:schemeClr val="accent1"/>
+          </a:fillRef>
+          <a:effectRef idx="1">
+            <a:schemeClr val="accent1"/>
+          </a:effectRef>
+          <a:fontRef idx="minor">
+            <a:schemeClr val="tx1"/>
+          </a:fontRef>
+        </p:style>
+      </p:cxnSp>
+      <p:cxnSp>
+        <p:nvCxnSpPr>
+          <p:cNvPr id="4" name="Straight Arrow Connector 3">
+            <a:extLst>
+              <a:ext uri="{FF2B5EF4-FFF2-40B4-BE49-F238E27FC236}">
+                <a16:creationId xmlns:a16="http://schemas.microsoft.com/office/drawing/2014/main" id="{ED5A1D79-E34B-C19E-DFE0-2AC7E8018920}"/>
+              </a:ext>
+            </a:extLst>
+          </p:cNvPr>
+          <p:cNvCxnSpPr>
+            <a:cxnSpLocks/>
+          </p:cNvCxnSpPr>
+          <p:nvPr/>
+        </p:nvCxnSpPr>
+        <p:spPr>
+          <a:xfrm flipH="1" flipV="1">
+            <a:off x="3670069" y="2686574"/>
+            <a:ext cx="544484" cy="118970"/>
+          </a:xfrm>
+          <a:prstGeom prst="straightConnector1">
+            <a:avLst/>
+          </a:prstGeom>
+          <a:ln>
+            <a:solidFill>
+              <a:schemeClr val="tx1"/>
+            </a:solidFill>
+            <a:tailEnd type="triangle"/>
+          </a:ln>
+        </p:spPr>
+        <p:style>
+          <a:lnRef idx="2">
+            <a:schemeClr val="accent1"/>
+          </a:lnRef>
+          <a:fillRef idx="0">
+            <a:schemeClr val="accent1"/>
+          </a:fillRef>
+          <a:effectRef idx="1">
+            <a:schemeClr val="accent1"/>
+          </a:effectRef>
+          <a:fontRef idx="minor">
+            <a:schemeClr val="tx1"/>
+          </a:fontRef>
+        </p:style>
+      </p:cxnSp>
+      <p:cxnSp>
+        <p:nvCxnSpPr>
+          <p:cNvPr id="7" name="Straight Arrow Connector 6">
+            <a:extLst>
+              <a:ext uri="{FF2B5EF4-FFF2-40B4-BE49-F238E27FC236}">
+                <a16:creationId xmlns:a16="http://schemas.microsoft.com/office/drawing/2014/main" id="{101863BD-4585-0A79-F062-53CA070751ED}"/>
+              </a:ext>
+            </a:extLst>
+          </p:cNvPr>
+          <p:cNvCxnSpPr>
+            <a:cxnSpLocks/>
+          </p:cNvCxnSpPr>
+          <p:nvPr/>
+        </p:nvCxnSpPr>
+        <p:spPr>
+          <a:xfrm flipH="1">
+            <a:off x="3670069" y="2171572"/>
+            <a:ext cx="627611" cy="276526"/>
+          </a:xfrm>
+          <a:prstGeom prst="straightConnector1">
+            <a:avLst/>
+          </a:prstGeom>
+          <a:ln>
+            <a:solidFill>
+              <a:schemeClr val="tx1"/>
+            </a:solidFill>
+            <a:tailEnd type="triangle"/>
+          </a:ln>
+        </p:spPr>
+        <p:style>
+          <a:lnRef idx="2">
+            <a:schemeClr val="accent1"/>
+          </a:lnRef>
+          <a:fillRef idx="0">
+            <a:schemeClr val="accent1"/>
+          </a:fillRef>
+          <a:effectRef idx="1">
+            <a:schemeClr val="accent1"/>
+          </a:effectRef>
+          <a:fontRef idx="minor">
+            <a:schemeClr val="tx1"/>
+          </a:fontRef>
+        </p:style>
+      </p:cxnSp>
+      <p:cxnSp>
+        <p:nvCxnSpPr>
+          <p:cNvPr id="29" name="Straight Arrow Connector 28">
+            <a:extLst>
+              <a:ext uri="{FF2B5EF4-FFF2-40B4-BE49-F238E27FC236}">
+                <a16:creationId xmlns:a16="http://schemas.microsoft.com/office/drawing/2014/main" id="{8A4CC857-92A2-43AC-2903-04F7E4DCD69E}"/>
+              </a:ext>
+            </a:extLst>
+          </p:cNvPr>
+          <p:cNvCxnSpPr>
+            <a:cxnSpLocks/>
+          </p:cNvCxnSpPr>
+          <p:nvPr/>
+        </p:nvCxnSpPr>
+        <p:spPr>
+          <a:xfrm flipH="1">
+            <a:off x="4256116" y="3364057"/>
+            <a:ext cx="178724" cy="164696"/>
+          </a:xfrm>
+          <a:prstGeom prst="straightConnector1">
+            <a:avLst/>
+          </a:prstGeom>
+          <a:ln>
+            <a:solidFill>
+              <a:schemeClr val="tx1"/>
+            </a:solidFill>
+            <a:tailEnd type="triangle"/>
+          </a:ln>
+        </p:spPr>
+        <p:style>
+          <a:lnRef idx="2">
+            <a:schemeClr val="accent1"/>
+          </a:lnRef>
+          <a:fillRef idx="0">
+            <a:schemeClr val="accent1"/>
+          </a:fillRef>
+          <a:effectRef idx="1">
+            <a:schemeClr val="accent1"/>
+          </a:effectRef>
+          <a:fontRef idx="minor">
+            <a:schemeClr val="tx1"/>
+          </a:fontRef>
+        </p:style>
+      </p:cxnSp>
+    </p:spTree>
+    <p:extLst>
+      <p:ext uri="{BB962C8B-B14F-4D97-AF65-F5344CB8AC3E}">
+        <p14:creationId xmlns:p14="http://schemas.microsoft.com/office/powerpoint/2010/main" val="316601783"/>
+      </p:ext>
+    </p:extLst>
+  </p:cSld>
+  <p:clrMapOvr>
+    <a:masterClrMapping/>
+  </p:clrMapOvr>
+  <p:timing>
+    <p:tnLst>
+      <p:par>
+        <p:cTn id="1" dur="indefinite" restart="never" nodeType="tmRoot">
+          <p:childTnLst>
+            <p:seq concurrent="1" nextAc="seek">
+              <p:cTn id="2" dur="indefinite" nodeType="mainSeq">
+                <p:childTnLst>
+                  <p:par>
+                    <p:cTn id="3" fill="hold">
+                      <p:stCondLst>
+                        <p:cond delay="indefinite"/>
+                      </p:stCondLst>
+                      <p:childTnLst>
+                        <p:par>
+                          <p:cTn id="4" fill="hold">
+                            <p:stCondLst>
+                              <p:cond delay="0"/>
+                            </p:stCondLst>
+                            <p:childTnLst>
+                              <p:par>
+                                <p:cTn id="5" presetID="1" presetClass="entr" presetSubtype="0" fill="hold" nodeType="clickEffect">
+                                  <p:stCondLst>
+                                    <p:cond delay="0"/>
+                                  </p:stCondLst>
+                                  <p:childTnLst>
+                                    <p:set>
+                                      <p:cBhvr>
+                                        <p:cTn id="6" dur="1" fill="hold">
+                                          <p:stCondLst>
+                                            <p:cond delay="0"/>
+                                          </p:stCondLst>
+                                        </p:cTn>
+                                        <p:tgtEl>
+                                          <p:spTgt spid="3">
+                                            <p:txEl>
+                                              <p:pRg st="1" end="1"/>
+                                            </p:txEl>
+                                          </p:spTgt>
+                                        </p:tgtEl>
+                                        <p:attrNameLst>
+                                          <p:attrName>style.visibility</p:attrName>
+                                        </p:attrNameLst>
+                                      </p:cBhvr>
+                                      <p:to>
+                                        <p:strVal val="visible"/>
+                                      </p:to>
+                                    </p:set>
+                                  </p:childTnLst>
+                                </p:cTn>
+                              </p:par>
+                              <p:par>
+                                <p:cTn id="7" presetID="1" presetClass="entr" presetSubtype="0" fill="hold" nodeType="withEffect">
+                                  <p:stCondLst>
+                                    <p:cond delay="0"/>
+                                  </p:stCondLst>
+                                  <p:childTnLst>
+                                    <p:set>
+                                      <p:cBhvr>
+                                        <p:cTn id="8" dur="1" fill="hold">
+                                          <p:stCondLst>
+                                            <p:cond delay="0"/>
+                                          </p:stCondLst>
+                                        </p:cTn>
+                                        <p:tgtEl>
+                                          <p:spTgt spid="20"/>
+                                        </p:tgtEl>
+                                        <p:attrNameLst>
+                                          <p:attrName>style.visibility</p:attrName>
+                                        </p:attrNameLst>
+                                      </p:cBhvr>
+                                      <p:to>
+                                        <p:strVal val="visible"/>
+                                      </p:to>
+                                    </p:set>
+                                  </p:childTnLst>
+                                </p:cTn>
+                              </p:par>
+                            </p:childTnLst>
+                          </p:cTn>
+                        </p:par>
+                      </p:childTnLst>
+                    </p:cTn>
+                  </p:par>
+                  <p:par>
+                    <p:cTn id="9" fill="hold">
+                      <p:stCondLst>
+                        <p:cond delay="indefinite"/>
+                      </p:stCondLst>
+                      <p:childTnLst>
+                        <p:par>
+                          <p:cTn id="10" fill="hold">
+                            <p:stCondLst>
+                              <p:cond delay="0"/>
+                            </p:stCondLst>
+                            <p:childTnLst>
+                              <p:par>
+                                <p:cTn id="11" presetID="1" presetClass="entr" presetSubtype="0" fill="hold" nodeType="clickEffect">
+                                  <p:stCondLst>
+                                    <p:cond delay="0"/>
+                                  </p:stCondLst>
+                                  <p:childTnLst>
+                                    <p:set>
+                                      <p:cBhvr>
+                                        <p:cTn id="12" dur="1" fill="hold">
+                                          <p:stCondLst>
+                                            <p:cond delay="0"/>
+                                          </p:stCondLst>
+                                        </p:cTn>
+                                        <p:tgtEl>
+                                          <p:spTgt spid="3">
+                                            <p:txEl>
+                                              <p:pRg st="2" end="2"/>
+                                            </p:txEl>
+                                          </p:spTgt>
+                                        </p:tgtEl>
+                                        <p:attrNameLst>
+                                          <p:attrName>style.visibility</p:attrName>
+                                        </p:attrNameLst>
+                                      </p:cBhvr>
+                                      <p:to>
+                                        <p:strVal val="visible"/>
+                                      </p:to>
+                                    </p:set>
+                                  </p:childTnLst>
+                                </p:cTn>
+                              </p:par>
+                              <p:par>
+                                <p:cTn id="13" presetID="1" presetClass="entr" presetSubtype="0" fill="hold" nodeType="withEffect">
+                                  <p:stCondLst>
+                                    <p:cond delay="0"/>
+                                  </p:stCondLst>
+                                  <p:childTnLst>
+                                    <p:set>
+                                      <p:cBhvr>
+                                        <p:cTn id="14" dur="1" fill="hold">
+                                          <p:stCondLst>
+                                            <p:cond delay="0"/>
+                                          </p:stCondLst>
+                                        </p:cTn>
+                                        <p:tgtEl>
+                                          <p:spTgt spid="15"/>
+                                        </p:tgtEl>
+                                        <p:attrNameLst>
+                                          <p:attrName>style.visibility</p:attrName>
+                                        </p:attrNameLst>
+                                      </p:cBhvr>
+                                      <p:to>
+                                        <p:strVal val="visible"/>
+                                      </p:to>
+                                    </p:set>
+                                  </p:childTnLst>
+                                </p:cTn>
+                              </p:par>
+                              <p:par>
+                                <p:cTn id="15" presetID="1" presetClass="entr" presetSubtype="0" fill="hold" nodeType="withEffect">
+                                  <p:stCondLst>
+                                    <p:cond delay="0"/>
+                                  </p:stCondLst>
+                                  <p:childTnLst>
+                                    <p:set>
+                                      <p:cBhvr>
+                                        <p:cTn id="16" dur="1" fill="hold">
+                                          <p:stCondLst>
+                                            <p:cond delay="0"/>
+                                          </p:stCondLst>
+                                        </p:cTn>
+                                        <p:tgtEl>
+                                          <p:spTgt spid="6"/>
+                                        </p:tgtEl>
+                                        <p:attrNameLst>
+                                          <p:attrName>style.visibility</p:attrName>
+                                        </p:attrNameLst>
+                                      </p:cBhvr>
+                                      <p:to>
+                                        <p:strVal val="visible"/>
+                                      </p:to>
+                                    </p:set>
+                                  </p:childTnLst>
+                                </p:cTn>
+                              </p:par>
+                              <p:par>
+                                <p:cTn id="17" presetID="1" presetClass="entr" presetSubtype="0" fill="hold" nodeType="withEffect">
+                                  <p:stCondLst>
+                                    <p:cond delay="0"/>
+                                  </p:stCondLst>
+                                  <p:childTnLst>
+                                    <p:set>
+                                      <p:cBhvr>
+                                        <p:cTn id="18" dur="1" fill="hold">
+                                          <p:stCondLst>
+                                            <p:cond delay="0"/>
+                                          </p:stCondLst>
+                                        </p:cTn>
+                                        <p:tgtEl>
+                                          <p:spTgt spid="7"/>
+                                        </p:tgtEl>
+                                        <p:attrNameLst>
+                                          <p:attrName>style.visibility</p:attrName>
+                                        </p:attrNameLst>
+                                      </p:cBhvr>
+                                      <p:to>
+                                        <p:strVal val="visible"/>
+                                      </p:to>
+                                    </p:set>
+                                  </p:childTnLst>
+                                </p:cTn>
+                              </p:par>
+                            </p:childTnLst>
+                          </p:cTn>
+                        </p:par>
+                      </p:childTnLst>
+                    </p:cTn>
+                  </p:par>
+                  <p:par>
+                    <p:cTn id="19" fill="hold">
+                      <p:stCondLst>
+                        <p:cond delay="indefinite"/>
+                      </p:stCondLst>
+                      <p:childTnLst>
+                        <p:par>
+                          <p:cTn id="20" fill="hold">
+                            <p:stCondLst>
+                              <p:cond delay="0"/>
+                            </p:stCondLst>
+                            <p:childTnLst>
+                              <p:par>
+                                <p:cTn id="21" presetID="1" presetClass="entr" presetSubtype="0" fill="hold" nodeType="clickEffect">
+                                  <p:stCondLst>
+                                    <p:cond delay="0"/>
+                                  </p:stCondLst>
+                                  <p:childTnLst>
+                                    <p:set>
+                                      <p:cBhvr>
+                                        <p:cTn id="22" dur="1" fill="hold">
+                                          <p:stCondLst>
+                                            <p:cond delay="0"/>
+                                          </p:stCondLst>
+                                        </p:cTn>
+                                        <p:tgtEl>
+                                          <p:spTgt spid="3">
+                                            <p:txEl>
+                                              <p:pRg st="3" end="3"/>
+                                            </p:txEl>
+                                          </p:spTgt>
+                                        </p:tgtEl>
+                                        <p:attrNameLst>
+                                          <p:attrName>style.visibility</p:attrName>
+                                        </p:attrNameLst>
+                                      </p:cBhvr>
+                                      <p:to>
+                                        <p:strVal val="visible"/>
+                                      </p:to>
+                                    </p:set>
+                                  </p:childTnLst>
+                                </p:cTn>
+                              </p:par>
+                              <p:par>
+                                <p:cTn id="23" presetID="1" presetClass="entr" presetSubtype="0" fill="hold" nodeType="withEffect">
+                                  <p:stCondLst>
+                                    <p:cond delay="0"/>
+                                  </p:stCondLst>
+                                  <p:childTnLst>
+                                    <p:set>
+                                      <p:cBhvr>
+                                        <p:cTn id="24" dur="1" fill="hold">
+                                          <p:stCondLst>
+                                            <p:cond delay="0"/>
+                                          </p:stCondLst>
+                                        </p:cTn>
+                                        <p:tgtEl>
+                                          <p:spTgt spid="12"/>
+                                        </p:tgtEl>
+                                        <p:attrNameLst>
+                                          <p:attrName>style.visibility</p:attrName>
+                                        </p:attrNameLst>
+                                      </p:cBhvr>
+                                      <p:to>
+                                        <p:strVal val="visible"/>
+                                      </p:to>
+                                    </p:set>
+                                  </p:childTnLst>
+                                </p:cTn>
+                              </p:par>
+                              <p:par>
+                                <p:cTn id="25" presetID="1" presetClass="entr" presetSubtype="0" fill="hold" nodeType="withEffect">
+                                  <p:stCondLst>
+                                    <p:cond delay="0"/>
+                                  </p:stCondLst>
+                                  <p:childTnLst>
+                                    <p:set>
+                                      <p:cBhvr>
+                                        <p:cTn id="26" dur="1" fill="hold">
+                                          <p:stCondLst>
+                                            <p:cond delay="0"/>
+                                          </p:stCondLst>
+                                        </p:cTn>
+                                        <p:tgtEl>
+                                          <p:spTgt spid="4"/>
+                                        </p:tgtEl>
+                                        <p:attrNameLst>
+                                          <p:attrName>style.visibility</p:attrName>
+                                        </p:attrNameLst>
+                                      </p:cBhvr>
+                                      <p:to>
+                                        <p:strVal val="visible"/>
+                                      </p:to>
+                                    </p:set>
+                                  </p:childTnLst>
+                                </p:cTn>
+                              </p:par>
+                            </p:childTnLst>
+                          </p:cTn>
+                        </p:par>
+                      </p:childTnLst>
+                    </p:cTn>
+                  </p:par>
+                  <p:par>
+                    <p:cTn id="27" fill="hold">
+                      <p:stCondLst>
+                        <p:cond delay="indefinite"/>
+                      </p:stCondLst>
+                      <p:childTnLst>
+                        <p:par>
+                          <p:cTn id="28" fill="hold">
+                            <p:stCondLst>
+                              <p:cond delay="0"/>
+                            </p:stCondLst>
+                            <p:childTnLst>
+                              <p:par>
+                                <p:cTn id="29" presetID="1" presetClass="entr" presetSubtype="0" fill="hold" nodeType="clickEffect">
+                                  <p:stCondLst>
+                                    <p:cond delay="0"/>
+                                  </p:stCondLst>
+                                  <p:childTnLst>
+                                    <p:set>
+                                      <p:cBhvr>
+                                        <p:cTn id="30" dur="1" fill="hold">
+                                          <p:stCondLst>
+                                            <p:cond delay="0"/>
+                                          </p:stCondLst>
+                                        </p:cTn>
+                                        <p:tgtEl>
+                                          <p:spTgt spid="3">
+                                            <p:txEl>
+                                              <p:pRg st="4" end="4"/>
+                                            </p:txEl>
+                                          </p:spTgt>
+                                        </p:tgtEl>
+                                        <p:attrNameLst>
+                                          <p:attrName>style.visibility</p:attrName>
+                                        </p:attrNameLst>
+                                      </p:cBhvr>
+                                      <p:to>
+                                        <p:strVal val="visible"/>
+                                      </p:to>
+                                    </p:set>
+                                  </p:childTnLst>
+                                </p:cTn>
+                              </p:par>
+                              <p:par>
+                                <p:cTn id="31" presetID="1" presetClass="entr" presetSubtype="0" fill="hold" nodeType="withEffect">
+                                  <p:stCondLst>
+                                    <p:cond delay="0"/>
+                                  </p:stCondLst>
+                                  <p:childTnLst>
+                                    <p:set>
+                                      <p:cBhvr>
+                                        <p:cTn id="32" dur="1" fill="hold">
+                                          <p:stCondLst>
+                                            <p:cond delay="0"/>
+                                          </p:stCondLst>
+                                        </p:cTn>
+                                        <p:tgtEl>
+                                          <p:spTgt spid="29"/>
+                                        </p:tgtEl>
+                                        <p:attrNameLst>
+                                          <p:attrName>style.visibility</p:attrName>
+                                        </p:attrNameLst>
+                                      </p:cBhvr>
+                                      <p:to>
+                                        <p:strVal val="visible"/>
+                                      </p:to>
+                                    </p:set>
+                                  </p:childTnLst>
+                                </p:cTn>
+                              </p:par>
+                            </p:childTnLst>
+                          </p:cTn>
+                        </p:par>
+                      </p:childTnLst>
+                    </p:cTn>
+                  </p:par>
+                </p:childTnLst>
+              </p:cTn>
+              <p:prevCondLst>
+                <p:cond evt="onPrev" delay="0">
+                  <p:tgtEl>
+                    <p:sldTgt/>
+                  </p:tgtEl>
+                </p:cond>
+              </p:prevCondLst>
+              <p:nextCondLst>
+                <p:cond evt="onNext" delay="0">
+                  <p:tgtEl>
+                    <p:sldTgt/>
+                  </p:tgtEl>
+                </p:cond>
+              </p:nextCondLst>
+            </p:seq>
+          </p:childTnLst>
+        </p:cTn>
+      </p:par>
+    </p:tnLst>
+  </p:timing>
+</p:sld>
+</file>
+
+<file path=ppt/slides/slide48.xml><?xml version="1.0" encoding="utf-8"?>
 <p:sld xmlns:a="http://schemas.openxmlformats.org/drawingml/2006/main" xmlns:r="http://schemas.openxmlformats.org/officeDocument/2006/relationships" xmlns:p="http://schemas.openxmlformats.org/presentationml/2006/main">
   <p:cSld>
     <p:spTree>
@@ -30057,7 +32077,7 @@
 </p:sld>
 </file>
 
-<file path=ppt/slides/slide46.xml><?xml version="1.0" encoding="utf-8"?>
+<file path=ppt/slides/slide49.xml><?xml version="1.0" encoding="utf-8"?>
 <p:sld xmlns:a="http://schemas.openxmlformats.org/drawingml/2006/main" xmlns:r="http://schemas.openxmlformats.org/officeDocument/2006/relationships" xmlns:p="http://schemas.openxmlformats.org/presentationml/2006/main">
   <p:cSld>
     <p:spTree>
@@ -31003,7 +33023,236 @@
 </p:sld>
 </file>
 
-<file path=ppt/slides/slide47.xml><?xml version="1.0" encoding="utf-8"?>
+<file path=ppt/slides/slide5.xml><?xml version="1.0" encoding="utf-8"?>
+<p:sld xmlns:a="http://schemas.openxmlformats.org/drawingml/2006/main" xmlns:r="http://schemas.openxmlformats.org/officeDocument/2006/relationships" xmlns:p="http://schemas.openxmlformats.org/presentationml/2006/main">
+  <p:cSld>
+    <p:spTree>
+      <p:nvGrpSpPr>
+        <p:cNvPr id="1" name="">
+          <a:extLst>
+            <a:ext uri="{FF2B5EF4-FFF2-40B4-BE49-F238E27FC236}">
+              <a16:creationId xmlns:a16="http://schemas.microsoft.com/office/drawing/2014/main" id="{406946AE-3FA9-D028-C406-7B176A162D2F}"/>
+            </a:ext>
+          </a:extLst>
+        </p:cNvPr>
+        <p:cNvGrpSpPr/>
+        <p:nvPr/>
+      </p:nvGrpSpPr>
+      <p:grpSpPr>
+        <a:xfrm>
+          <a:off x="0" y="0"/>
+          <a:ext cx="0" cy="0"/>
+          <a:chOff x="0" y="0"/>
+          <a:chExt cx="0" cy="0"/>
+        </a:xfrm>
+      </p:grpSpPr>
+      <p:sp>
+        <p:nvSpPr>
+          <p:cNvPr id="2" name="Title 1">
+            <a:extLst>
+              <a:ext uri="{FF2B5EF4-FFF2-40B4-BE49-F238E27FC236}">
+                <a16:creationId xmlns:a16="http://schemas.microsoft.com/office/drawing/2014/main" id="{7D6D7C5B-C01D-D9B5-3F6A-28351D7ABA68}"/>
+              </a:ext>
+            </a:extLst>
+          </p:cNvPr>
+          <p:cNvSpPr>
+            <a:spLocks noGrp="1"/>
+          </p:cNvSpPr>
+          <p:nvPr>
+            <p:ph type="title"/>
+          </p:nvPr>
+        </p:nvSpPr>
+        <p:spPr/>
+        <p:txBody>
+          <a:bodyPr/>
+          <a:lstStyle/>
+          <a:p>
+            <a:pPr marL="0" lvl="0" indent="0">
+              <a:buNone/>
+            </a:pPr>
+            <a:r>
+              <a:rPr lang="en-US" dirty="0"/>
+              <a:t>Review</a:t>
+            </a:r>
+            <a:endParaRPr dirty="0"/>
+          </a:p>
+        </p:txBody>
+      </p:sp>
+      <p:sp>
+        <p:nvSpPr>
+          <p:cNvPr id="3" name="Content Placeholder 2">
+            <a:extLst>
+              <a:ext uri="{FF2B5EF4-FFF2-40B4-BE49-F238E27FC236}">
+                <a16:creationId xmlns:a16="http://schemas.microsoft.com/office/drawing/2014/main" id="{73DAA63C-A541-B897-2BC2-906D1D5A5C85}"/>
+              </a:ext>
+            </a:extLst>
+          </p:cNvPr>
+          <p:cNvSpPr>
+            <a:spLocks noGrp="1"/>
+          </p:cNvSpPr>
+          <p:nvPr>
+            <p:ph idx="1"/>
+          </p:nvPr>
+        </p:nvSpPr>
+        <p:spPr>
+          <a:xfrm>
+            <a:off x="457200" y="1184563"/>
+            <a:ext cx="8229600" cy="3790603"/>
+          </a:xfrm>
+        </p:spPr>
+        <p:txBody>
+          <a:bodyPr>
+            <a:normAutofit fontScale="85000" lnSpcReduction="10000"/>
+          </a:bodyPr>
+          <a:lstStyle/>
+          <a:p>
+            <a:pPr marL="0" lvl="0" indent="0">
+              <a:buNone/>
+            </a:pPr>
+            <a:r>
+              <a:rPr lang="en-US" dirty="0"/>
+              <a:t>How do we perform </a:t>
+            </a:r>
+            <a:r>
+              <a:rPr lang="en-US" b="1" dirty="0"/>
+              <a:t>model building </a:t>
+            </a:r>
+            <a:r>
+              <a:rPr lang="en-US" dirty="0"/>
+              <a:t>as data scientists?  </a:t>
+            </a:r>
+          </a:p>
+          <a:p>
+            <a:pPr marL="457200" lvl="0" indent="-457200">
+              <a:buFont typeface="+mj-lt"/>
+              <a:buAutoNum type="arabicPeriod"/>
+            </a:pPr>
+            <a:r>
+              <a:rPr lang="en-US" dirty="0"/>
+              <a:t>Perform an </a:t>
+            </a:r>
+            <a:r>
+              <a:rPr lang="en-US" b="1" dirty="0"/>
+              <a:t>initial exploration of the data </a:t>
+            </a:r>
+            <a:r>
+              <a:rPr lang="en-US" dirty="0"/>
+              <a:t>to find interesting and important relationships  </a:t>
+            </a:r>
+          </a:p>
+          <a:p>
+            <a:pPr marL="457200" lvl="0" indent="-457200">
+              <a:buFont typeface="+mj-lt"/>
+              <a:buAutoNum type="arabicPeriod"/>
+            </a:pPr>
+            <a:r>
+              <a:rPr lang="en-US" b="1" dirty="0"/>
+              <a:t>Scale data</a:t>
+            </a:r>
+          </a:p>
+          <a:p>
+            <a:pPr marL="457200" lvl="0" indent="-457200">
+              <a:buFont typeface="+mj-lt"/>
+              <a:buAutoNum type="arabicPeriod"/>
+            </a:pPr>
+            <a:r>
+              <a:rPr lang="en-US" b="1" dirty="0"/>
+              <a:t>Select independent variables</a:t>
+            </a:r>
+            <a:r>
+              <a:rPr lang="en-US" dirty="0"/>
+              <a:t>, including interaction and nonlinear terms</a:t>
+            </a:r>
+          </a:p>
+          <a:p>
+            <a:pPr marL="457200" lvl="0" indent="-457200">
+              <a:buFont typeface="+mj-lt"/>
+              <a:buAutoNum type="arabicPeriod"/>
+            </a:pPr>
+            <a:r>
+              <a:rPr lang="en-US" b="1" dirty="0"/>
+              <a:t>Fit model  </a:t>
+            </a:r>
+          </a:p>
+          <a:p>
+            <a:pPr marL="457200" lvl="0" indent="-457200">
+              <a:buFont typeface="+mj-lt"/>
+              <a:buAutoNum type="arabicPeriod"/>
+            </a:pPr>
+            <a:r>
+              <a:rPr lang="en-US" b="1" dirty="0"/>
+              <a:t>Evaluate model </a:t>
+            </a:r>
+            <a:r>
+              <a:rPr lang="en-US" dirty="0"/>
+              <a:t>fit and significance, parameter significance and residuals</a:t>
+            </a:r>
+          </a:p>
+          <a:p>
+            <a:pPr marL="457200" lvl="0" indent="-457200">
+              <a:buFont typeface="+mj-lt"/>
+              <a:buAutoNum type="arabicPeriod"/>
+            </a:pPr>
+            <a:r>
+              <a:rPr lang="en-US" dirty="0"/>
+              <a:t>If required, </a:t>
+            </a:r>
+            <a:r>
+              <a:rPr lang="en-US" b="1" dirty="0"/>
+              <a:t>update choice of independent variables</a:t>
+            </a:r>
+            <a:r>
+              <a:rPr lang="en-US" dirty="0"/>
+              <a:t>, e.g. add or remove variables, interaction terms, nonlinear terms and jump to step 4</a:t>
+            </a:r>
+          </a:p>
+          <a:p>
+            <a:pPr marL="457200" lvl="0" indent="-457200">
+              <a:buFont typeface="+mj-lt"/>
+              <a:buAutoNum type="arabicPeriod"/>
+            </a:pPr>
+            <a:r>
+              <a:rPr lang="en-US" b="1" dirty="0"/>
+              <a:t>Perform inference </a:t>
+            </a:r>
+            <a:r>
+              <a:rPr lang="en-US" dirty="0"/>
+              <a:t>with the model to develop understanding of data relationships</a:t>
+            </a:r>
+          </a:p>
+          <a:p>
+            <a:pPr marL="457200" lvl="0" indent="-457200">
+              <a:buFont typeface="+mj-lt"/>
+              <a:buAutoNum type="arabicPeriod"/>
+            </a:pPr>
+            <a:endParaRPr lang="en-US" dirty="0"/>
+          </a:p>
+          <a:p>
+            <a:pPr marL="457200" lvl="0" indent="-457200">
+              <a:buFont typeface="+mj-lt"/>
+              <a:buAutoNum type="arabicPeriod"/>
+            </a:pPr>
+            <a:endParaRPr lang="en-US" dirty="0"/>
+          </a:p>
+          <a:p>
+            <a:endParaRPr dirty="0"/>
+          </a:p>
+        </p:txBody>
+      </p:sp>
+    </p:spTree>
+    <p:extLst>
+      <p:ext uri="{BB962C8B-B14F-4D97-AF65-F5344CB8AC3E}">
+        <p14:creationId xmlns:p14="http://schemas.microsoft.com/office/powerpoint/2010/main" val="2517148499"/>
+      </p:ext>
+    </p:extLst>
+  </p:cSld>
+  <p:clrMapOvr>
+    <a:masterClrMapping/>
+  </p:clrMapOvr>
+</p:sld>
+</file>
+
+<file path=ppt/slides/slide50.xml><?xml version="1.0" encoding="utf-8"?>
 <p:sld xmlns:a="http://schemas.openxmlformats.org/drawingml/2006/main" xmlns:r="http://schemas.openxmlformats.org/officeDocument/2006/relationships" xmlns:p="http://schemas.openxmlformats.org/presentationml/2006/main">
   <p:cSld>
     <p:spTree>
@@ -31213,7 +33462,7 @@
 </p:sld>
 </file>
 
-<file path=ppt/slides/slide48.xml><?xml version="1.0" encoding="utf-8"?>
+<file path=ppt/slides/slide51.xml><?xml version="1.0" encoding="utf-8"?>
 <p:sld xmlns:a="http://schemas.openxmlformats.org/drawingml/2006/main" xmlns:r="http://schemas.openxmlformats.org/officeDocument/2006/relationships" xmlns:p="http://schemas.openxmlformats.org/presentationml/2006/main">
   <p:cSld>
     <p:spTree>
@@ -31456,7 +33705,7 @@
 </p:sld>
 </file>
 
-<file path=ppt/slides/slide49.xml><?xml version="1.0" encoding="utf-8"?>
+<file path=ppt/slides/slide52.xml><?xml version="1.0" encoding="utf-8"?>
 <p:sld xmlns:a="http://schemas.openxmlformats.org/drawingml/2006/main" xmlns:r="http://schemas.openxmlformats.org/officeDocument/2006/relationships" xmlns:p="http://schemas.openxmlformats.org/presentationml/2006/main">
   <p:cSld>
     <p:spTree>
@@ -31640,386 +33889,7 @@
 </p:sld>
 </file>
 
-<file path=ppt/slides/slide5.xml><?xml version="1.0" encoding="utf-8"?>
-<p:sld xmlns:a="http://schemas.openxmlformats.org/drawingml/2006/main" xmlns:r="http://schemas.openxmlformats.org/officeDocument/2006/relationships" xmlns:p="http://schemas.openxmlformats.org/presentationml/2006/main">
-  <p:cSld>
-    <p:spTree>
-      <p:nvGrpSpPr>
-        <p:cNvPr id="1" name="">
-          <a:extLst>
-            <a:ext uri="{FF2B5EF4-FFF2-40B4-BE49-F238E27FC236}">
-              <a16:creationId xmlns:a16="http://schemas.microsoft.com/office/drawing/2014/main" id="{406946AE-3FA9-D028-C406-7B176A162D2F}"/>
-            </a:ext>
-          </a:extLst>
-        </p:cNvPr>
-        <p:cNvGrpSpPr/>
-        <p:nvPr/>
-      </p:nvGrpSpPr>
-      <p:grpSpPr>
-        <a:xfrm>
-          <a:off x="0" y="0"/>
-          <a:ext cx="0" cy="0"/>
-          <a:chOff x="0" y="0"/>
-          <a:chExt cx="0" cy="0"/>
-        </a:xfrm>
-      </p:grpSpPr>
-      <p:sp>
-        <p:nvSpPr>
-          <p:cNvPr id="2" name="Title 1">
-            <a:extLst>
-              <a:ext uri="{FF2B5EF4-FFF2-40B4-BE49-F238E27FC236}">
-                <a16:creationId xmlns:a16="http://schemas.microsoft.com/office/drawing/2014/main" id="{7D6D7C5B-C01D-D9B5-3F6A-28351D7ABA68}"/>
-              </a:ext>
-            </a:extLst>
-          </p:cNvPr>
-          <p:cNvSpPr>
-            <a:spLocks noGrp="1"/>
-          </p:cNvSpPr>
-          <p:nvPr>
-            <p:ph type="title"/>
-          </p:nvPr>
-        </p:nvSpPr>
-        <p:spPr/>
-        <p:txBody>
-          <a:bodyPr/>
-          <a:lstStyle/>
-          <a:p>
-            <a:pPr marL="0" lvl="0" indent="0">
-              <a:buNone/>
-            </a:pPr>
-            <a:r>
-              <a:rPr lang="en-US" dirty="0"/>
-              <a:t>Review</a:t>
-            </a:r>
-            <a:endParaRPr dirty="0"/>
-          </a:p>
-        </p:txBody>
-      </p:sp>
-      <p:sp>
-        <p:nvSpPr>
-          <p:cNvPr id="3" name="Content Placeholder 2">
-            <a:extLst>
-              <a:ext uri="{FF2B5EF4-FFF2-40B4-BE49-F238E27FC236}">
-                <a16:creationId xmlns:a16="http://schemas.microsoft.com/office/drawing/2014/main" id="{73DAA63C-A541-B897-2BC2-906D1D5A5C85}"/>
-              </a:ext>
-            </a:extLst>
-          </p:cNvPr>
-          <p:cNvSpPr>
-            <a:spLocks noGrp="1"/>
-          </p:cNvSpPr>
-          <p:nvPr>
-            <p:ph idx="1"/>
-          </p:nvPr>
-        </p:nvSpPr>
-        <p:spPr>
-          <a:xfrm>
-            <a:off x="457200" y="1184563"/>
-            <a:ext cx="8229600" cy="3790603"/>
-          </a:xfrm>
-        </p:spPr>
-        <p:txBody>
-          <a:bodyPr>
-            <a:normAutofit fontScale="85000" lnSpcReduction="10000"/>
-          </a:bodyPr>
-          <a:lstStyle/>
-          <a:p>
-            <a:pPr marL="0" lvl="0" indent="0">
-              <a:buNone/>
-            </a:pPr>
-            <a:r>
-              <a:rPr lang="en-US" dirty="0"/>
-              <a:t>How do we perform </a:t>
-            </a:r>
-            <a:r>
-              <a:rPr lang="en-US" b="1" dirty="0"/>
-              <a:t>model building </a:t>
-            </a:r>
-            <a:r>
-              <a:rPr lang="en-US" dirty="0"/>
-              <a:t>as data scientists?  </a:t>
-            </a:r>
-          </a:p>
-          <a:p>
-            <a:pPr marL="457200" lvl="0" indent="-457200">
-              <a:buFont typeface="+mj-lt"/>
-              <a:buAutoNum type="arabicPeriod"/>
-            </a:pPr>
-            <a:r>
-              <a:rPr lang="en-US" dirty="0"/>
-              <a:t>Perform an </a:t>
-            </a:r>
-            <a:r>
-              <a:rPr lang="en-US" b="1" dirty="0"/>
-              <a:t>initial exploration of the data </a:t>
-            </a:r>
-            <a:r>
-              <a:rPr lang="en-US" dirty="0"/>
-              <a:t>to find interesting and important relationships  </a:t>
-            </a:r>
-          </a:p>
-          <a:p>
-            <a:pPr marL="457200" lvl="0" indent="-457200">
-              <a:buFont typeface="+mj-lt"/>
-              <a:buAutoNum type="arabicPeriod"/>
-            </a:pPr>
-            <a:r>
-              <a:rPr lang="en-US" b="1" dirty="0"/>
-              <a:t>Scale data</a:t>
-            </a:r>
-          </a:p>
-          <a:p>
-            <a:pPr marL="457200" lvl="0" indent="-457200">
-              <a:buFont typeface="+mj-lt"/>
-              <a:buAutoNum type="arabicPeriod"/>
-            </a:pPr>
-            <a:r>
-              <a:rPr lang="en-US" b="1" dirty="0"/>
-              <a:t>Select independent variables</a:t>
-            </a:r>
-            <a:r>
-              <a:rPr lang="en-US" dirty="0"/>
-              <a:t>, including interaction and nonlinear terms</a:t>
-            </a:r>
-          </a:p>
-          <a:p>
-            <a:pPr marL="457200" lvl="0" indent="-457200">
-              <a:buFont typeface="+mj-lt"/>
-              <a:buAutoNum type="arabicPeriod"/>
-            </a:pPr>
-            <a:r>
-              <a:rPr lang="en-US" b="1" dirty="0"/>
-              <a:t>Fit model  </a:t>
-            </a:r>
-          </a:p>
-          <a:p>
-            <a:pPr marL="457200" lvl="0" indent="-457200">
-              <a:buFont typeface="+mj-lt"/>
-              <a:buAutoNum type="arabicPeriod"/>
-            </a:pPr>
-            <a:r>
-              <a:rPr lang="en-US" b="1" dirty="0"/>
-              <a:t>Evaluate model </a:t>
-            </a:r>
-            <a:r>
-              <a:rPr lang="en-US" dirty="0"/>
-              <a:t>fit and significance, parameter significance and residuals</a:t>
-            </a:r>
-          </a:p>
-          <a:p>
-            <a:pPr marL="457200" lvl="0" indent="-457200">
-              <a:buFont typeface="+mj-lt"/>
-              <a:buAutoNum type="arabicPeriod"/>
-            </a:pPr>
-            <a:r>
-              <a:rPr lang="en-US" dirty="0"/>
-              <a:t>If required, </a:t>
-            </a:r>
-            <a:r>
-              <a:rPr lang="en-US" b="1" dirty="0"/>
-              <a:t>update choice of independent variables</a:t>
-            </a:r>
-            <a:r>
-              <a:rPr lang="en-US" dirty="0"/>
-              <a:t>, e.g. add or remove variables, interaction terms, nonlinear terms and jump to step 4</a:t>
-            </a:r>
-          </a:p>
-          <a:p>
-            <a:pPr marL="457200" lvl="0" indent="-457200">
-              <a:buFont typeface="+mj-lt"/>
-              <a:buAutoNum type="arabicPeriod"/>
-            </a:pPr>
-            <a:r>
-              <a:rPr lang="en-US" b="1" dirty="0"/>
-              <a:t>Perform inference </a:t>
-            </a:r>
-            <a:r>
-              <a:rPr lang="en-US" dirty="0"/>
-              <a:t>with the model to develop understanding of data relationships</a:t>
-            </a:r>
-          </a:p>
-          <a:p>
-            <a:pPr marL="457200" lvl="0" indent="-457200">
-              <a:buFont typeface="+mj-lt"/>
-              <a:buAutoNum type="arabicPeriod"/>
-            </a:pPr>
-            <a:endParaRPr lang="en-US" dirty="0"/>
-          </a:p>
-          <a:p>
-            <a:pPr marL="457200" lvl="0" indent="-457200">
-              <a:buFont typeface="+mj-lt"/>
-              <a:buAutoNum type="arabicPeriod"/>
-            </a:pPr>
-            <a:endParaRPr lang="en-US" dirty="0"/>
-          </a:p>
-          <a:p>
-            <a:endParaRPr dirty="0"/>
-          </a:p>
-        </p:txBody>
-      </p:sp>
-    </p:spTree>
-    <p:extLst>
-      <p:ext uri="{BB962C8B-B14F-4D97-AF65-F5344CB8AC3E}">
-        <p14:creationId xmlns:p14="http://schemas.microsoft.com/office/powerpoint/2010/main" val="2517148499"/>
-      </p:ext>
-    </p:extLst>
-  </p:cSld>
-  <p:clrMapOvr>
-    <a:masterClrMapping/>
-  </p:clrMapOvr>
-</p:sld>
-</file>
-
-<file path=ppt/slides/slide50.xml><?xml version="1.0" encoding="utf-8"?>
-<p:sld xmlns:a="http://schemas.openxmlformats.org/drawingml/2006/main" xmlns:r="http://schemas.openxmlformats.org/officeDocument/2006/relationships" xmlns:p="http://schemas.openxmlformats.org/presentationml/2006/main">
-  <p:cSld>
-    <p:spTree>
-      <p:nvGrpSpPr>
-        <p:cNvPr id="1" name="">
-          <a:extLst>
-            <a:ext uri="{FF2B5EF4-FFF2-40B4-BE49-F238E27FC236}">
-              <a16:creationId xmlns:a16="http://schemas.microsoft.com/office/drawing/2014/main" id="{59F5B36B-E408-3765-BAAC-98F508014166}"/>
-            </a:ext>
-          </a:extLst>
-        </p:cNvPr>
-        <p:cNvGrpSpPr/>
-        <p:nvPr/>
-      </p:nvGrpSpPr>
-      <p:grpSpPr>
-        <a:xfrm>
-          <a:off x="0" y="0"/>
-          <a:ext cx="0" cy="0"/>
-          <a:chOff x="0" y="0"/>
-          <a:chExt cx="0" cy="0"/>
-        </a:xfrm>
-      </p:grpSpPr>
-      <p:sp>
-        <p:nvSpPr>
-          <p:cNvPr id="9" name="Title 1">
-            <a:extLst>
-              <a:ext uri="{FF2B5EF4-FFF2-40B4-BE49-F238E27FC236}">
-                <a16:creationId xmlns:a16="http://schemas.microsoft.com/office/drawing/2014/main" id="{40FCFA1E-6A7C-9EFF-D6C0-AEF85A645384}"/>
-              </a:ext>
-            </a:extLst>
-          </p:cNvPr>
-          <p:cNvSpPr>
-            <a:spLocks noGrp="1"/>
-          </p:cNvSpPr>
-          <p:nvPr>
-            <p:ph type="title"/>
-          </p:nvPr>
-        </p:nvSpPr>
-        <p:spPr>
-          <a:xfrm>
-            <a:off x="457201" y="204787"/>
-            <a:ext cx="8433261" cy="497638"/>
-          </a:xfrm>
-        </p:spPr>
-        <p:txBody>
-          <a:bodyPr>
-            <a:noAutofit/>
-          </a:bodyPr>
-          <a:lstStyle/>
-          <a:p>
-            <a:pPr marL="0" lvl="0" indent="0" algn="ctr">
-              <a:buNone/>
-            </a:pPr>
-            <a:r>
-              <a:rPr lang="en-US" sz="3200" dirty="0"/>
-              <a:t>Example: </a:t>
-            </a:r>
-            <a:r>
-              <a:rPr sz="3200" dirty="0"/>
-              <a:t>Elastic Net Regularization</a:t>
-            </a:r>
-          </a:p>
-        </p:txBody>
-      </p:sp>
-      <p:sp>
-        <p:nvSpPr>
-          <p:cNvPr id="11" name="Text Placeholder 3">
-            <a:extLst>
-              <a:ext uri="{FF2B5EF4-FFF2-40B4-BE49-F238E27FC236}">
-                <a16:creationId xmlns:a16="http://schemas.microsoft.com/office/drawing/2014/main" id="{268A547B-B015-0B56-FB88-06F164C8C08A}"/>
-              </a:ext>
-            </a:extLst>
-          </p:cNvPr>
-          <p:cNvSpPr>
-            <a:spLocks noGrp="1"/>
-          </p:cNvSpPr>
-          <p:nvPr>
-            <p:ph type="body" sz="half" idx="2"/>
-          </p:nvPr>
-        </p:nvSpPr>
-        <p:spPr>
-          <a:xfrm>
-            <a:off x="448888" y="819584"/>
-            <a:ext cx="8528857" cy="560330"/>
-          </a:xfrm>
-        </p:spPr>
-        <p:txBody>
-          <a:bodyPr>
-            <a:normAutofit/>
-          </a:bodyPr>
-          <a:lstStyle/>
-          <a:p>
-            <a:pPr marL="0" lvl="0" indent="0">
-              <a:buNone/>
-            </a:pPr>
-            <a:r>
-              <a:rPr lang="en-US" sz="2000" dirty="0"/>
-              <a:t>Residuals of OLS model show significant outliers </a:t>
-            </a:r>
-          </a:p>
-          <a:p>
-            <a:pPr lvl="0"/>
-            <a:endParaRPr lang="en-US" sz="2000" dirty="0"/>
-          </a:p>
-        </p:txBody>
-      </p:sp>
-      <p:pic>
-        <p:nvPicPr>
-          <p:cNvPr id="13" name="Picture 12">
-            <a:extLst>
-              <a:ext uri="{FF2B5EF4-FFF2-40B4-BE49-F238E27FC236}">
-                <a16:creationId xmlns:a16="http://schemas.microsoft.com/office/drawing/2014/main" id="{A4AD7976-E48B-6393-24CF-616C312B0B94}"/>
-              </a:ext>
-            </a:extLst>
-          </p:cNvPr>
-          <p:cNvPicPr>
-            <a:picLocks noChangeAspect="1"/>
-          </p:cNvPicPr>
-          <p:nvPr/>
-        </p:nvPicPr>
-        <p:blipFill>
-          <a:blip r:embed="rId2"/>
-          <a:stretch>
-            <a:fillRect/>
-          </a:stretch>
-        </p:blipFill>
-        <p:spPr>
-          <a:xfrm>
-            <a:off x="494607" y="1722624"/>
-            <a:ext cx="7951124" cy="2878201"/>
-          </a:xfrm>
-          <a:prstGeom prst="rect">
-            <a:avLst/>
-          </a:prstGeom>
-        </p:spPr>
-      </p:pic>
-    </p:spTree>
-    <p:extLst>
-      <p:ext uri="{BB962C8B-B14F-4D97-AF65-F5344CB8AC3E}">
-        <p14:creationId xmlns:p14="http://schemas.microsoft.com/office/powerpoint/2010/main" val="1463190761"/>
-      </p:ext>
-    </p:extLst>
-  </p:cSld>
-  <p:clrMapOvr>
-    <a:masterClrMapping/>
-  </p:clrMapOvr>
-</p:sld>
-</file>
-
-<file path=ppt/slides/slide51.xml><?xml version="1.0" encoding="utf-8"?>
+<file path=ppt/slides/slide53.xml><?xml version="1.0" encoding="utf-8"?>
 <p:sld xmlns:a="http://schemas.openxmlformats.org/drawingml/2006/main" xmlns:r="http://schemas.openxmlformats.org/officeDocument/2006/relationships" xmlns:p="http://schemas.openxmlformats.org/presentationml/2006/main">
   <p:cSld>
     <p:spTree>
@@ -32791,7 +34661,157 @@
 </p:sld>
 </file>
 
-<file path=ppt/slides/slide52.xml><?xml version="1.0" encoding="utf-8"?>
+<file path=ppt/slides/slide54.xml><?xml version="1.0" encoding="utf-8"?>
+<p:sld xmlns:a="http://schemas.openxmlformats.org/drawingml/2006/main" xmlns:r="http://schemas.openxmlformats.org/officeDocument/2006/relationships" xmlns:p="http://schemas.openxmlformats.org/presentationml/2006/main">
+  <p:cSld>
+    <p:spTree>
+      <p:nvGrpSpPr>
+        <p:cNvPr id="1" name="">
+          <a:extLst>
+            <a:ext uri="{FF2B5EF4-FFF2-40B4-BE49-F238E27FC236}">
+              <a16:creationId xmlns:a16="http://schemas.microsoft.com/office/drawing/2014/main" id="{59F5B36B-E408-3765-BAAC-98F508014166}"/>
+            </a:ext>
+          </a:extLst>
+        </p:cNvPr>
+        <p:cNvGrpSpPr/>
+        <p:nvPr/>
+      </p:nvGrpSpPr>
+      <p:grpSpPr>
+        <a:xfrm>
+          <a:off x="0" y="0"/>
+          <a:ext cx="0" cy="0"/>
+          <a:chOff x="0" y="0"/>
+          <a:chExt cx="0" cy="0"/>
+        </a:xfrm>
+      </p:grpSpPr>
+      <p:sp>
+        <p:nvSpPr>
+          <p:cNvPr id="9" name="Title 1">
+            <a:extLst>
+              <a:ext uri="{FF2B5EF4-FFF2-40B4-BE49-F238E27FC236}">
+                <a16:creationId xmlns:a16="http://schemas.microsoft.com/office/drawing/2014/main" id="{40FCFA1E-6A7C-9EFF-D6C0-AEF85A645384}"/>
+              </a:ext>
+            </a:extLst>
+          </p:cNvPr>
+          <p:cNvSpPr>
+            <a:spLocks noGrp="1"/>
+          </p:cNvSpPr>
+          <p:nvPr>
+            <p:ph type="title"/>
+          </p:nvPr>
+        </p:nvSpPr>
+        <p:spPr>
+          <a:xfrm>
+            <a:off x="457201" y="204787"/>
+            <a:ext cx="8433261" cy="497638"/>
+          </a:xfrm>
+        </p:spPr>
+        <p:txBody>
+          <a:bodyPr>
+            <a:noAutofit/>
+          </a:bodyPr>
+          <a:lstStyle/>
+          <a:p>
+            <a:pPr marL="0" lvl="0" indent="0" algn="ctr">
+              <a:buNone/>
+            </a:pPr>
+            <a:r>
+              <a:rPr lang="en-US" sz="3200" dirty="0"/>
+              <a:t>Example: </a:t>
+            </a:r>
+            <a:r>
+              <a:rPr sz="3200" dirty="0"/>
+              <a:t>Elastic Net Regularization</a:t>
+            </a:r>
+          </a:p>
+        </p:txBody>
+      </p:sp>
+      <p:sp>
+        <p:nvSpPr>
+          <p:cNvPr id="11" name="Text Placeholder 3">
+            <a:extLst>
+              <a:ext uri="{FF2B5EF4-FFF2-40B4-BE49-F238E27FC236}">
+                <a16:creationId xmlns:a16="http://schemas.microsoft.com/office/drawing/2014/main" id="{268A547B-B015-0B56-FB88-06F164C8C08A}"/>
+              </a:ext>
+            </a:extLst>
+          </p:cNvPr>
+          <p:cNvSpPr>
+            <a:spLocks noGrp="1"/>
+          </p:cNvSpPr>
+          <p:nvPr>
+            <p:ph type="body" sz="half" idx="2"/>
+          </p:nvPr>
+        </p:nvSpPr>
+        <p:spPr>
+          <a:xfrm>
+            <a:off x="448888" y="819584"/>
+            <a:ext cx="8528857" cy="560330"/>
+          </a:xfrm>
+        </p:spPr>
+        <p:txBody>
+          <a:bodyPr>
+            <a:normAutofit/>
+          </a:bodyPr>
+          <a:lstStyle/>
+          <a:p>
+            <a:pPr marL="0" lvl="0" indent="0">
+              <a:buNone/>
+            </a:pPr>
+            <a:r>
+              <a:rPr lang="en-US" sz="2000" dirty="0"/>
+              <a:t>Residuals of OLS model show significant outliers </a:t>
+            </a:r>
+          </a:p>
+          <a:p>
+            <a:pPr lvl="0"/>
+            <a:endParaRPr lang="en-US" sz="2000" dirty="0"/>
+          </a:p>
+        </p:txBody>
+      </p:sp>
+      <p:pic>
+        <p:nvPicPr>
+          <p:cNvPr id="13" name="Picture 12">
+            <a:extLst>
+              <a:ext uri="{FF2B5EF4-FFF2-40B4-BE49-F238E27FC236}">
+                <a16:creationId xmlns:a16="http://schemas.microsoft.com/office/drawing/2014/main" id="{A4AD7976-E48B-6393-24CF-616C312B0B94}"/>
+              </a:ext>
+            </a:extLst>
+          </p:cNvPr>
+          <p:cNvPicPr>
+            <a:picLocks noChangeAspect="1"/>
+          </p:cNvPicPr>
+          <p:nvPr/>
+        </p:nvPicPr>
+        <p:blipFill>
+          <a:blip r:embed="rId2"/>
+          <a:stretch>
+            <a:fillRect/>
+          </a:stretch>
+        </p:blipFill>
+        <p:spPr>
+          <a:xfrm>
+            <a:off x="494607" y="1722624"/>
+            <a:ext cx="7951124" cy="2878201"/>
+          </a:xfrm>
+          <a:prstGeom prst="rect">
+            <a:avLst/>
+          </a:prstGeom>
+        </p:spPr>
+      </p:pic>
+    </p:spTree>
+    <p:extLst>
+      <p:ext uri="{BB962C8B-B14F-4D97-AF65-F5344CB8AC3E}">
+        <p14:creationId xmlns:p14="http://schemas.microsoft.com/office/powerpoint/2010/main" val="1463190761"/>
+      </p:ext>
+    </p:extLst>
+  </p:cSld>
+  <p:clrMapOvr>
+    <a:masterClrMapping/>
+  </p:clrMapOvr>
+</p:sld>
+</file>
+
+<file path=ppt/slides/slide55.xml><?xml version="1.0" encoding="utf-8"?>
 <p:sld xmlns:a="http://schemas.openxmlformats.org/drawingml/2006/main" xmlns:r="http://schemas.openxmlformats.org/officeDocument/2006/relationships" xmlns:p="http://schemas.openxmlformats.org/presentationml/2006/main">
   <p:cSld>
     <p:spTree>
@@ -32949,7 +34969,7 @@
 </p:sld>
 </file>
 
-<file path=ppt/slides/slide53.xml><?xml version="1.0" encoding="utf-8"?>
+<file path=ppt/slides/slide56.xml><?xml version="1.0" encoding="utf-8"?>
 <p:sld xmlns:a="http://schemas.openxmlformats.org/drawingml/2006/main" xmlns:r="http://schemas.openxmlformats.org/officeDocument/2006/relationships" xmlns:p="http://schemas.openxmlformats.org/presentationml/2006/main">
   <p:cSld>
     <p:spTree>

</xml_diff>

<commit_message>
corrected notation for the regularized least squares formulation
</commit_message>
<xml_diff>
--- a/LectureSlides/10a_ModelsInHighDimensions.pptx
+++ b/LectureSlides/10a_ModelsInHighDimensions.pptx
@@ -263,7 +263,7 @@
           <a:p>
             <a:fld id="{BE0C07B0-B271-4EE5-BA4D-B7A9BA86B818}" type="datetimeFigureOut">
               <a:rPr lang="en-US" smtClean="0"/>
-              <a:t>10/8/2025</a:t>
+              <a:t>10/9/2025</a:t>
             </a:fld>
             <a:endParaRPr lang="en-US"/>
           </a:p>
@@ -709,7 +709,7 @@
           <a:p>
             <a:fld id="{241EB5C9-1307-BA42-ABA2-0BC069CD8E7F}" type="datetimeFigureOut">
               <a:rPr lang="en-US" smtClean="0"/>
-              <a:t>10/8/2025</a:t>
+              <a:t>10/9/2025</a:t>
             </a:fld>
             <a:endParaRPr lang="en-US"/>
           </a:p>
@@ -877,7 +877,7 @@
           <a:p>
             <a:fld id="{241EB5C9-1307-BA42-ABA2-0BC069CD8E7F}" type="datetimeFigureOut">
               <a:rPr lang="en-US" smtClean="0"/>
-              <a:t>10/8/2025</a:t>
+              <a:t>10/9/2025</a:t>
             </a:fld>
             <a:endParaRPr lang="en-US"/>
           </a:p>
@@ -1055,7 +1055,7 @@
           <a:p>
             <a:fld id="{241EB5C9-1307-BA42-ABA2-0BC069CD8E7F}" type="datetimeFigureOut">
               <a:rPr lang="en-US" smtClean="0"/>
-              <a:t>10/8/2025</a:t>
+              <a:t>10/9/2025</a:t>
             </a:fld>
             <a:endParaRPr lang="en-US"/>
           </a:p>
@@ -1373,7 +1373,7 @@
           <a:p>
             <a:fld id="{241EB5C9-1307-BA42-ABA2-0BC069CD8E7F}" type="datetimeFigureOut">
               <a:rPr lang="en-US" smtClean="0"/>
-              <a:t>10/8/2025</a:t>
+              <a:t>10/9/2025</a:t>
             </a:fld>
             <a:endParaRPr lang="en-US"/>
           </a:p>
@@ -1618,7 +1618,7 @@
           <a:p>
             <a:fld id="{241EB5C9-1307-BA42-ABA2-0BC069CD8E7F}" type="datetimeFigureOut">
               <a:rPr lang="en-US" smtClean="0"/>
-              <a:t>10/8/2025</a:t>
+              <a:t>10/9/2025</a:t>
             </a:fld>
             <a:endParaRPr lang="en-US"/>
           </a:p>
@@ -1903,7 +1903,7 @@
           <a:p>
             <a:fld id="{241EB5C9-1307-BA42-ABA2-0BC069CD8E7F}" type="datetimeFigureOut">
               <a:rPr lang="en-US" smtClean="0"/>
-              <a:t>10/8/2025</a:t>
+              <a:t>10/9/2025</a:t>
             </a:fld>
             <a:endParaRPr lang="en-US"/>
           </a:p>
@@ -2322,7 +2322,7 @@
           <a:p>
             <a:fld id="{241EB5C9-1307-BA42-ABA2-0BC069CD8E7F}" type="datetimeFigureOut">
               <a:rPr lang="en-US" smtClean="0"/>
-              <a:t>10/8/2025</a:t>
+              <a:t>10/9/2025</a:t>
             </a:fld>
             <a:endParaRPr lang="en-US"/>
           </a:p>
@@ -2439,7 +2439,7 @@
           <a:p>
             <a:fld id="{241EB5C9-1307-BA42-ABA2-0BC069CD8E7F}" type="datetimeFigureOut">
               <a:rPr lang="en-US" smtClean="0"/>
-              <a:t>10/8/2025</a:t>
+              <a:t>10/9/2025</a:t>
             </a:fld>
             <a:endParaRPr lang="en-US"/>
           </a:p>
@@ -2534,7 +2534,7 @@
           <a:p>
             <a:fld id="{241EB5C9-1307-BA42-ABA2-0BC069CD8E7F}" type="datetimeFigureOut">
               <a:rPr lang="en-US" smtClean="0"/>
-              <a:t>10/8/2025</a:t>
+              <a:t>10/9/2025</a:t>
             </a:fld>
             <a:endParaRPr lang="en-US"/>
           </a:p>
@@ -2809,7 +2809,7 @@
           <a:p>
             <a:fld id="{241EB5C9-1307-BA42-ABA2-0BC069CD8E7F}" type="datetimeFigureOut">
               <a:rPr lang="en-US" smtClean="0"/>
-              <a:t>10/8/2025</a:t>
+              <a:t>10/9/2025</a:t>
             </a:fld>
             <a:endParaRPr lang="en-US"/>
           </a:p>
@@ -3061,7 +3061,7 @@
           <a:p>
             <a:fld id="{241EB5C9-1307-BA42-ABA2-0BC069CD8E7F}" type="datetimeFigureOut">
               <a:rPr lang="en-US" smtClean="0"/>
-              <a:t>10/8/2025</a:t>
+              <a:t>10/9/2025</a:t>
             </a:fld>
             <a:endParaRPr lang="en-US"/>
           </a:p>
@@ -3272,7 +3272,7 @@
           <a:p>
             <a:fld id="{241EB5C9-1307-BA42-ABA2-0BC069CD8E7F}" type="datetimeFigureOut">
               <a:rPr lang="en-US" smtClean="0"/>
-              <a:t>10/8/2025</a:t>
+              <a:t>10/9/2025</a:t>
             </a:fld>
             <a:endParaRPr lang="en-US"/>
           </a:p>
@@ -15212,8 +15212,8 @@
           </a:p>
         </p:txBody>
       </p:sp>
-      <mc:AlternateContent xmlns:mc="http://schemas.openxmlformats.org/markup-compatibility/2006" xmlns:a14="http://schemas.microsoft.com/office/drawing/2010/main">
-        <mc:Choice Requires="a14">
+      <mc:AlternateContent xmlns:mc="http://schemas.openxmlformats.org/markup-compatibility/2006">
+        <mc:Choice xmlns:a14="http://schemas.microsoft.com/office/drawing/2010/main" Requires="a14">
           <p:sp>
             <p:nvSpPr>
               <p:cNvPr id="3" name="Content Placeholder 2"/>
@@ -15286,7 +15286,13 @@
                                 <a:rPr lang="en-US" b="0" i="1" smtClean="0">
                                   <a:latin typeface="Cambria Math" panose="02040503050406030204" pitchFamily="18" charset="0"/>
                                 </a:rPr>
-                                <m:t>𝐴𝑥</m:t>
+                                <m:t>𝐴</m:t>
+                              </m:r>
+                              <m:r>
+                                <a:rPr lang="en-US" b="0" i="1" smtClean="0">
+                                  <a:latin typeface="Cambria Math" panose="02040503050406030204" pitchFamily="18" charset="0"/>
+                                </a:rPr>
+                                <m:t>𝑏</m:t>
                               </m:r>
                               <m:r>
                                 <a:rPr lang="en-US" b="0" i="1" smtClean="0">
@@ -15298,7 +15304,7 @@
                                 <a:rPr lang="en-US" b="0" i="1" smtClean="0">
                                   <a:latin typeface="Cambria Math" panose="02040503050406030204" pitchFamily="18" charset="0"/>
                                 </a:rPr>
-                                <m:t>𝑏</m:t>
+                                <m:t>𝑦</m:t>
                               </m:r>
                             </m:e>
                           </m:d>
@@ -15947,7 +15953,7 @@
             </p:txBody>
           </p:sp>
         </mc:Choice>
-        <mc:Fallback xmlns="">
+        <mc:Fallback>
           <p:sp>
             <p:nvSpPr>
               <p:cNvPr id="3" name="Content Placeholder 2"/>
@@ -15990,325 +15996,6 @@
   <p:clrMapOvr>
     <a:masterClrMapping/>
   </p:clrMapOvr>
-  <p:timing>
-    <p:tnLst>
-      <p:par>
-        <p:cTn id="1" dur="indefinite" restart="never" nodeType="tmRoot">
-          <p:childTnLst>
-            <p:seq concurrent="1" nextAc="seek">
-              <p:cTn id="2" dur="indefinite" nodeType="mainSeq">
-                <p:childTnLst>
-                  <p:par>
-                    <p:cTn id="3" fill="hold">
-                      <p:stCondLst>
-                        <p:cond delay="indefinite"/>
-                      </p:stCondLst>
-                      <p:childTnLst>
-                        <p:par>
-                          <p:cTn id="4" fill="hold">
-                            <p:stCondLst>
-                              <p:cond delay="0"/>
-                            </p:stCondLst>
-                            <p:childTnLst>
-                              <p:par>
-                                <p:cTn id="5" presetID="1" presetClass="entr" presetSubtype="0" fill="hold" nodeType="clickEffect">
-                                  <p:stCondLst>
-                                    <p:cond delay="0"/>
-                                  </p:stCondLst>
-                                  <p:childTnLst>
-                                    <p:set>
-                                      <p:cBhvr>
-                                        <p:cTn id="6" dur="1" fill="hold">
-                                          <p:stCondLst>
-                                            <p:cond delay="0"/>
-                                          </p:stCondLst>
-                                        </p:cTn>
-                                        <p:tgtEl>
-                                          <p:spTgt spid="3">
-                                            <p:txEl>
-                                              <p:pRg st="2" end="2"/>
-                                            </p:txEl>
-                                          </p:spTgt>
-                                        </p:tgtEl>
-                                        <p:attrNameLst>
-                                          <p:attrName>style.visibility</p:attrName>
-                                        </p:attrNameLst>
-                                      </p:cBhvr>
-                                      <p:to>
-                                        <p:strVal val="visible"/>
-                                      </p:to>
-                                    </p:set>
-                                  </p:childTnLst>
-                                </p:cTn>
-                              </p:par>
-                              <p:par>
-                                <p:cTn id="7" presetID="1" presetClass="entr" presetSubtype="0" fill="hold" nodeType="withEffect">
-                                  <p:stCondLst>
-                                    <p:cond delay="0"/>
-                                  </p:stCondLst>
-                                  <p:childTnLst>
-                                    <p:set>
-                                      <p:cBhvr>
-                                        <p:cTn id="8" dur="1" fill="hold">
-                                          <p:stCondLst>
-                                            <p:cond delay="0"/>
-                                          </p:stCondLst>
-                                        </p:cTn>
-                                        <p:tgtEl>
-                                          <p:spTgt spid="3">
-                                            <p:txEl>
-                                              <p:pRg st="3" end="3"/>
-                                            </p:txEl>
-                                          </p:spTgt>
-                                        </p:tgtEl>
-                                        <p:attrNameLst>
-                                          <p:attrName>style.visibility</p:attrName>
-                                        </p:attrNameLst>
-                                      </p:cBhvr>
-                                      <p:to>
-                                        <p:strVal val="visible"/>
-                                      </p:to>
-                                    </p:set>
-                                  </p:childTnLst>
-                                </p:cTn>
-                              </p:par>
-                            </p:childTnLst>
-                          </p:cTn>
-                        </p:par>
-                      </p:childTnLst>
-                    </p:cTn>
-                  </p:par>
-                  <p:par>
-                    <p:cTn id="9" fill="hold">
-                      <p:stCondLst>
-                        <p:cond delay="indefinite"/>
-                      </p:stCondLst>
-                      <p:childTnLst>
-                        <p:par>
-                          <p:cTn id="10" fill="hold">
-                            <p:stCondLst>
-                              <p:cond delay="0"/>
-                            </p:stCondLst>
-                            <p:childTnLst>
-                              <p:par>
-                                <p:cTn id="11" presetID="1" presetClass="entr" presetSubtype="0" fill="hold" nodeType="clickEffect">
-                                  <p:stCondLst>
-                                    <p:cond delay="0"/>
-                                  </p:stCondLst>
-                                  <p:childTnLst>
-                                    <p:set>
-                                      <p:cBhvr>
-                                        <p:cTn id="12" dur="1" fill="hold">
-                                          <p:stCondLst>
-                                            <p:cond delay="0"/>
-                                          </p:stCondLst>
-                                        </p:cTn>
-                                        <p:tgtEl>
-                                          <p:spTgt spid="3">
-                                            <p:txEl>
-                                              <p:pRg st="4" end="4"/>
-                                            </p:txEl>
-                                          </p:spTgt>
-                                        </p:tgtEl>
-                                        <p:attrNameLst>
-                                          <p:attrName>style.visibility</p:attrName>
-                                        </p:attrNameLst>
-                                      </p:cBhvr>
-                                      <p:to>
-                                        <p:strVal val="visible"/>
-                                      </p:to>
-                                    </p:set>
-                                  </p:childTnLst>
-                                </p:cTn>
-                              </p:par>
-                              <p:par>
-                                <p:cTn id="13" presetID="1" presetClass="entr" presetSubtype="0" fill="hold" nodeType="withEffect">
-                                  <p:stCondLst>
-                                    <p:cond delay="0"/>
-                                  </p:stCondLst>
-                                  <p:childTnLst>
-                                    <p:set>
-                                      <p:cBhvr>
-                                        <p:cTn id="14" dur="1" fill="hold">
-                                          <p:stCondLst>
-                                            <p:cond delay="0"/>
-                                          </p:stCondLst>
-                                        </p:cTn>
-                                        <p:tgtEl>
-                                          <p:spTgt spid="3">
-                                            <p:txEl>
-                                              <p:pRg st="5" end="5"/>
-                                            </p:txEl>
-                                          </p:spTgt>
-                                        </p:tgtEl>
-                                        <p:attrNameLst>
-                                          <p:attrName>style.visibility</p:attrName>
-                                        </p:attrNameLst>
-                                      </p:cBhvr>
-                                      <p:to>
-                                        <p:strVal val="visible"/>
-                                      </p:to>
-                                    </p:set>
-                                  </p:childTnLst>
-                                </p:cTn>
-                              </p:par>
-                            </p:childTnLst>
-                          </p:cTn>
-                        </p:par>
-                      </p:childTnLst>
-                    </p:cTn>
-                  </p:par>
-                  <p:par>
-                    <p:cTn id="15" fill="hold">
-                      <p:stCondLst>
-                        <p:cond delay="indefinite"/>
-                      </p:stCondLst>
-                      <p:childTnLst>
-                        <p:par>
-                          <p:cTn id="16" fill="hold">
-                            <p:stCondLst>
-                              <p:cond delay="0"/>
-                            </p:stCondLst>
-                            <p:childTnLst>
-                              <p:par>
-                                <p:cTn id="17" presetID="1" presetClass="entr" presetSubtype="0" fill="hold" nodeType="clickEffect">
-                                  <p:stCondLst>
-                                    <p:cond delay="0"/>
-                                  </p:stCondLst>
-                                  <p:childTnLst>
-                                    <p:set>
-                                      <p:cBhvr>
-                                        <p:cTn id="18" dur="1" fill="hold">
-                                          <p:stCondLst>
-                                            <p:cond delay="0"/>
-                                          </p:stCondLst>
-                                        </p:cTn>
-                                        <p:tgtEl>
-                                          <p:spTgt spid="3">
-                                            <p:txEl>
-                                              <p:pRg st="6" end="6"/>
-                                            </p:txEl>
-                                          </p:spTgt>
-                                        </p:tgtEl>
-                                        <p:attrNameLst>
-                                          <p:attrName>style.visibility</p:attrName>
-                                        </p:attrNameLst>
-                                      </p:cBhvr>
-                                      <p:to>
-                                        <p:strVal val="visible"/>
-                                      </p:to>
-                                    </p:set>
-                                  </p:childTnLst>
-                                </p:cTn>
-                              </p:par>
-                            </p:childTnLst>
-                          </p:cTn>
-                        </p:par>
-                      </p:childTnLst>
-                    </p:cTn>
-                  </p:par>
-                  <p:par>
-                    <p:cTn id="19" fill="hold">
-                      <p:stCondLst>
-                        <p:cond delay="indefinite"/>
-                      </p:stCondLst>
-                      <p:childTnLst>
-                        <p:par>
-                          <p:cTn id="20" fill="hold">
-                            <p:stCondLst>
-                              <p:cond delay="0"/>
-                            </p:stCondLst>
-                            <p:childTnLst>
-                              <p:par>
-                                <p:cTn id="21" presetID="1" presetClass="entr" presetSubtype="0" fill="hold" nodeType="clickEffect">
-                                  <p:stCondLst>
-                                    <p:cond delay="0"/>
-                                  </p:stCondLst>
-                                  <p:childTnLst>
-                                    <p:set>
-                                      <p:cBhvr>
-                                        <p:cTn id="22" dur="1" fill="hold">
-                                          <p:stCondLst>
-                                            <p:cond delay="0"/>
-                                          </p:stCondLst>
-                                        </p:cTn>
-                                        <p:tgtEl>
-                                          <p:spTgt spid="3">
-                                            <p:txEl>
-                                              <p:pRg st="7" end="7"/>
-                                            </p:txEl>
-                                          </p:spTgt>
-                                        </p:tgtEl>
-                                        <p:attrNameLst>
-                                          <p:attrName>style.visibility</p:attrName>
-                                        </p:attrNameLst>
-                                      </p:cBhvr>
-                                      <p:to>
-                                        <p:strVal val="visible"/>
-                                      </p:to>
-                                    </p:set>
-                                  </p:childTnLst>
-                                </p:cTn>
-                              </p:par>
-                              <p:par>
-                                <p:cTn id="23" presetID="1" presetClass="entr" presetSubtype="0" fill="hold" nodeType="withEffect">
-                                  <p:stCondLst>
-                                    <p:cond delay="0"/>
-                                  </p:stCondLst>
-                                  <p:childTnLst>
-                                    <p:set>
-                                      <p:cBhvr>
-                                        <p:cTn id="24" dur="1" fill="hold">
-                                          <p:stCondLst>
-                                            <p:cond delay="0"/>
-                                          </p:stCondLst>
-                                        </p:cTn>
-                                        <p:tgtEl>
-                                          <p:spTgt spid="3">
-                                            <p:txEl>
-                                              <p:pRg st="8" end="8"/>
-                                            </p:txEl>
-                                          </p:spTgt>
-                                        </p:tgtEl>
-                                        <p:attrNameLst>
-                                          <p:attrName>style.visibility</p:attrName>
-                                        </p:attrNameLst>
-                                      </p:cBhvr>
-                                      <p:to>
-                                        <p:strVal val="visible"/>
-                                      </p:to>
-                                    </p:set>
-                                  </p:childTnLst>
-                                </p:cTn>
-                              </p:par>
-                            </p:childTnLst>
-                          </p:cTn>
-                        </p:par>
-                      </p:childTnLst>
-                    </p:cTn>
-                  </p:par>
-                </p:childTnLst>
-              </p:cTn>
-              <p:prevCondLst>
-                <p:cond evt="onPrev" delay="0">
-                  <p:tgtEl>
-                    <p:sldTgt/>
-                  </p:tgtEl>
-                </p:cond>
-              </p:prevCondLst>
-              <p:nextCondLst>
-                <p:cond evt="onNext" delay="0">
-                  <p:tgtEl>
-                    <p:sldTgt/>
-                  </p:tgtEl>
-                </p:cond>
-              </p:nextCondLst>
-            </p:seq>
-          </p:childTnLst>
-        </p:cTn>
-      </p:par>
-    </p:tnLst>
-  </p:timing>
 </p:sld>
 </file>
 
@@ -21654,8 +21341,8 @@
           </a:p>
         </p:txBody>
       </p:sp>
-      <mc:AlternateContent xmlns:mc="http://schemas.openxmlformats.org/markup-compatibility/2006" xmlns:a14="http://schemas.microsoft.com/office/drawing/2010/main">
-        <mc:Choice Requires="a14">
+      <mc:AlternateContent xmlns:mc="http://schemas.openxmlformats.org/markup-compatibility/2006">
+        <mc:Choice xmlns:a14="http://schemas.microsoft.com/office/drawing/2010/main" Requires="a14">
           <p:sp>
             <p:nvSpPr>
               <p:cNvPr id="3" name="Content Placeholder 2"/>
@@ -21682,11 +21369,11 @@
                   <a:buNone/>
                 </a:pPr>
                 <a:r>
-                  <a:rPr b="1" dirty="0"/>
+                  <a:rPr lang="en-US" b="1" dirty="0"/>
                   <a:t>L2 regularization </a:t>
                 </a:r>
                 <a:r>
-                  <a:rPr dirty="0"/>
+                  <a:rPr lang="en-US" dirty="0"/>
                   <a:t>constrains the Euclidean norm of the parameter vector, </a:t>
                 </a:r>
                 <a14:m>
@@ -21695,14 +21382,14 @@
                       <m:accPr>
                         <m:chr m:val="⃗"/>
                         <m:ctrlPr>
-                          <a:rPr i="1">
+                          <a:rPr lang="ar-AE" i="1">
                             <a:latin typeface="Cambria Math" panose="02040503050406030204" pitchFamily="18" charset="0"/>
                           </a:rPr>
                         </m:ctrlPr>
                       </m:accPr>
                       <m:e>
                         <m:r>
-                          <a:rPr>
+                          <a:rPr lang="ar-AE">
                             <a:latin typeface="Cambria Math" panose="02040503050406030204" pitchFamily="18" charset="0"/>
                           </a:rPr>
                           <m:t>𝑏</m:t>
@@ -21711,20 +21398,75 @@
                     </m:acc>
                   </m:oMath>
                 </a14:m>
-                <a:endParaRPr dirty="0"/>
+                <a:endParaRPr lang="ar-AE" dirty="0"/>
               </a:p>
               <a:p>
                 <a:pPr lvl="0"/>
                 <a:r>
-                  <a:rPr dirty="0"/>
-                  <a:t>Recall</a:t>
+                  <a:rPr lang="en-US" dirty="0"/>
+                  <a:t>Recall the standard form of the OLS equations:</a:t>
+                </a:r>
+              </a:p>
+              <a:p>
+                <a:pPr marL="0" lvl="0" indent="0">
+                  <a:buNone/>
+                </a:pPr>
+                <a14:m>
+                  <m:oMathPara xmlns:m="http://schemas.openxmlformats.org/officeDocument/2006/math">
+                    <m:oMathParaPr>
+                      <m:jc m:val="center"/>
+                    </m:oMathParaPr>
+                    <m:oMath xmlns:m="http://schemas.openxmlformats.org/officeDocument/2006/math">
+                      <m:r>
+                        <m:rPr>
+                          <m:sty m:val="p"/>
+                        </m:rPr>
+                        <a:rPr lang="en-US" b="0" i="0" smtClean="0">
+                          <a:latin typeface="Cambria Math" panose="02040503050406030204" pitchFamily="18" charset="0"/>
+                        </a:rPr>
+                        <m:t>y</m:t>
+                      </m:r>
+                      <m:r>
+                        <a:rPr lang="en-US">
+                          <a:latin typeface="Cambria Math" panose="02040503050406030204" pitchFamily="18" charset="0"/>
+                        </a:rPr>
+                        <m:t>=</m:t>
+                      </m:r>
+                      <m:r>
+                        <a:rPr lang="en-US">
+                          <a:latin typeface="Cambria Math" panose="02040503050406030204" pitchFamily="18" charset="0"/>
+                        </a:rPr>
+                        <m:t>𝐴𝑏</m:t>
+                      </m:r>
+                      <m:r>
+                        <a:rPr lang="en-US">
+                          <a:latin typeface="Cambria Math" panose="02040503050406030204" pitchFamily="18" charset="0"/>
+                        </a:rPr>
+                        <m:t>+</m:t>
+                      </m:r>
+                      <m:r>
+                        <a:rPr lang="en-US">
+                          <a:latin typeface="Cambria Math" panose="02040503050406030204" pitchFamily="18" charset="0"/>
+                        </a:rPr>
+                        <m:t>𝜖</m:t>
+                      </m:r>
+                    </m:oMath>
+                  </m:oMathPara>
+                </a14:m>
+                <a:endParaRPr lang="en-US" dirty="0"/>
+              </a:p>
+              <a:p>
+                <a:pPr lvl="0"/>
+                <a:r>
+                  <a:rPr lang="en-US" dirty="0"/>
+                  <a:t>The </a:t>
+                </a:r>
+                <a:r>
+                  <a:rPr lang="en-US" b="1" dirty="0"/>
+                  <a:t>normal equations provide a solution</a:t>
                 </a:r>
                 <a:r>
                   <a:rPr lang="en-US" dirty="0"/>
-                  <a:t> the standard form of the OLS equations</a:t>
-                </a:r>
-                <a:r>
-                  <a:rPr dirty="0"/>
                   <a:t>:</a:t>
                 </a:r>
               </a:p>
@@ -21739,73 +21481,13 @@
                     </m:oMathParaPr>
                     <m:oMath xmlns:m="http://schemas.openxmlformats.org/officeDocument/2006/math">
                       <m:r>
-                        <a:rPr>
-                          <a:latin typeface="Cambria Math" panose="02040503050406030204" pitchFamily="18" charset="0"/>
-                        </a:rPr>
-                        <m:t>𝑥</m:t>
-                      </m:r>
-                      <m:r>
-                        <a:rPr>
-                          <a:latin typeface="Cambria Math" panose="02040503050406030204" pitchFamily="18" charset="0"/>
-                        </a:rPr>
-                        <m:t>=</m:t>
-                      </m:r>
-                      <m:r>
-                        <a:rPr>
-                          <a:latin typeface="Cambria Math" panose="02040503050406030204" pitchFamily="18" charset="0"/>
-                        </a:rPr>
-                        <m:t>𝐴𝑏</m:t>
-                      </m:r>
-                      <m:r>
-                        <a:rPr>
-                          <a:latin typeface="Cambria Math" panose="02040503050406030204" pitchFamily="18" charset="0"/>
-                        </a:rPr>
-                        <m:t>+</m:t>
-                      </m:r>
-                      <m:r>
-                        <a:rPr>
-                          <a:latin typeface="Cambria Math" panose="02040503050406030204" pitchFamily="18" charset="0"/>
-                        </a:rPr>
-                        <m:t>𝜖</m:t>
-                      </m:r>
-                    </m:oMath>
-                  </m:oMathPara>
-                </a14:m>
-                <a:endParaRPr dirty="0"/>
-              </a:p>
-              <a:p>
-                <a:pPr lvl="0"/>
-                <a:r>
-                  <a:rPr dirty="0"/>
-                  <a:t>The </a:t>
-                </a:r>
-                <a:r>
-                  <a:rPr b="1" dirty="0"/>
-                  <a:t>normal equations provide a solution</a:t>
-                </a:r>
-                <a:r>
-                  <a:rPr dirty="0"/>
-                  <a:t>:</a:t>
-                </a:r>
-              </a:p>
-              <a:p>
-                <a:pPr marL="0" lvl="0" indent="0">
-                  <a:buNone/>
-                </a:pPr>
-                <a14:m>
-                  <m:oMathPara xmlns:m="http://schemas.openxmlformats.org/officeDocument/2006/math">
-                    <m:oMathParaPr>
-                      <m:jc m:val="center"/>
-                    </m:oMathParaPr>
-                    <m:oMath xmlns:m="http://schemas.openxmlformats.org/officeDocument/2006/math">
-                      <m:r>
-                        <a:rPr>
+                        <a:rPr lang="en-US">
                           <a:latin typeface="Cambria Math" panose="02040503050406030204" pitchFamily="18" charset="0"/>
                         </a:rPr>
                         <m:t>𝑏</m:t>
                       </m:r>
                       <m:r>
-                        <a:rPr>
+                        <a:rPr lang="en-US">
                           <a:latin typeface="Cambria Math" panose="02040503050406030204" pitchFamily="18" charset="0"/>
                         </a:rPr>
                         <m:t>=</m:t>
@@ -21813,7 +21495,7 @@
                       <m:sSup>
                         <m:sSupPr>
                           <m:ctrlPr>
-                            <a:rPr i="1">
+                            <a:rPr lang="ar-AE" i="1">
                               <a:latin typeface="Cambria Math" panose="02040503050406030204" pitchFamily="18" charset="0"/>
                             </a:rPr>
                           </m:ctrlPr>
@@ -21822,7 +21504,7 @@
                           <m:d>
                             <m:dPr>
                               <m:ctrlPr>
-                                <a:rPr i="1">
+                                <a:rPr lang="ar-AE" i="1">
                                   <a:latin typeface="Cambria Math" panose="02040503050406030204" pitchFamily="18" charset="0"/>
                                 </a:rPr>
                               </m:ctrlPr>
@@ -21831,14 +21513,14 @@
                               <m:sSup>
                                 <m:sSupPr>
                                   <m:ctrlPr>
-                                    <a:rPr i="1">
+                                    <a:rPr lang="ar-AE" i="1">
                                       <a:latin typeface="Cambria Math" panose="02040503050406030204" pitchFamily="18" charset="0"/>
                                     </a:rPr>
                                   </m:ctrlPr>
                                 </m:sSupPr>
                                 <m:e>
                                   <m:r>
-                                    <a:rPr>
+                                    <a:rPr lang="ar-AE">
                                       <a:latin typeface="Cambria Math" panose="02040503050406030204" pitchFamily="18" charset="0"/>
                                     </a:rPr>
                                     <m:t>𝐴</m:t>
@@ -21846,7 +21528,7 @@
                                 </m:e>
                                 <m:sup>
                                   <m:r>
-                                    <a:rPr>
+                                    <a:rPr lang="ar-AE">
                                       <a:latin typeface="Cambria Math" panose="02040503050406030204" pitchFamily="18" charset="0"/>
                                     </a:rPr>
                                     <m:t>𝑇</m:t>
@@ -21854,7 +21536,7 @@
                                 </m:sup>
                               </m:sSup>
                               <m:r>
-                                <a:rPr>
+                                <a:rPr lang="ar-AE">
                                   <a:latin typeface="Cambria Math" panose="02040503050406030204" pitchFamily="18" charset="0"/>
                                 </a:rPr>
                                 <m:t>𝐴</m:t>
@@ -21864,13 +21546,13 @@
                         </m:e>
                         <m:sup>
                           <m:r>
-                            <a:rPr>
+                            <a:rPr lang="ar-AE">
                               <a:latin typeface="Cambria Math" panose="02040503050406030204" pitchFamily="18" charset="0"/>
                             </a:rPr>
                             <m:t>−</m:t>
                           </m:r>
                           <m:r>
-                            <a:rPr>
+                            <a:rPr lang="ar-AE">
                               <a:latin typeface="Cambria Math" panose="02040503050406030204" pitchFamily="18" charset="0"/>
                             </a:rPr>
                             <m:t>1</m:t>
@@ -21880,14 +21562,14 @@
                       <m:sSup>
                         <m:sSupPr>
                           <m:ctrlPr>
-                            <a:rPr i="1">
+                            <a:rPr lang="ar-AE" i="1">
                               <a:latin typeface="Cambria Math" panose="02040503050406030204" pitchFamily="18" charset="0"/>
                             </a:rPr>
                           </m:ctrlPr>
                         </m:sSupPr>
                         <m:e>
                           <m:r>
-                            <a:rPr>
+                            <a:rPr lang="ar-AE">
                               <a:latin typeface="Cambria Math" panose="02040503050406030204" pitchFamily="18" charset="0"/>
                             </a:rPr>
                             <m:t>𝐴</m:t>
@@ -21895,7 +21577,7 @@
                         </m:e>
                         <m:sup>
                           <m:r>
-                            <a:rPr>
+                            <a:rPr lang="ar-AE">
                               <a:latin typeface="Cambria Math" panose="02040503050406030204" pitchFamily="18" charset="0"/>
                             </a:rPr>
                             <m:t>𝑇</m:t>
@@ -21903,7 +21585,7 @@
                         </m:sup>
                       </m:sSup>
                       <m:r>
-                        <a:rPr>
+                        <a:rPr lang="ar-AE">
                           <a:latin typeface="Cambria Math" panose="02040503050406030204" pitchFamily="18" charset="0"/>
                         </a:rPr>
                         <m:t>𝑥</m:t>
@@ -21911,12 +21593,12 @@
                     </m:oMath>
                   </m:oMathPara>
                 </a14:m>
-                <a:endParaRPr dirty="0"/>
+                <a:endParaRPr lang="ar-AE" dirty="0"/>
               </a:p>
               <a:p>
                 <a:pPr lvl="0"/>
                 <a:r>
-                  <a:rPr dirty="0"/>
+                  <a:rPr lang="en-US" dirty="0"/>
                   <a:t>This solution requires finding the inverse of the covariance matrix, </a:t>
                 </a:r>
                 <a14:m>
@@ -21924,7 +21606,7 @@
                     <m:sSup>
                       <m:sSupPr>
                         <m:ctrlPr>
-                          <a:rPr i="1">
+                          <a:rPr lang="ar-AE" i="1">
                             <a:latin typeface="Cambria Math" panose="02040503050406030204" pitchFamily="18" charset="0"/>
                           </a:rPr>
                         </m:ctrlPr>
@@ -21933,7 +21615,7 @@
                         <m:d>
                           <m:dPr>
                             <m:ctrlPr>
-                              <a:rPr i="1">
+                              <a:rPr lang="ar-AE" i="1">
                                 <a:latin typeface="Cambria Math" panose="02040503050406030204" pitchFamily="18" charset="0"/>
                               </a:rPr>
                             </m:ctrlPr>
@@ -21942,14 +21624,14 @@
                             <m:sSup>
                               <m:sSupPr>
                                 <m:ctrlPr>
-                                  <a:rPr i="1">
+                                  <a:rPr lang="ar-AE" i="1">
                                     <a:latin typeface="Cambria Math" panose="02040503050406030204" pitchFamily="18" charset="0"/>
                                   </a:rPr>
                                 </m:ctrlPr>
                               </m:sSupPr>
                               <m:e>
                                 <m:r>
-                                  <a:rPr>
+                                  <a:rPr lang="ar-AE">
                                     <a:latin typeface="Cambria Math" panose="02040503050406030204" pitchFamily="18" charset="0"/>
                                   </a:rPr>
                                   <m:t>𝐴</m:t>
@@ -21957,7 +21639,7 @@
                               </m:e>
                               <m:sup>
                                 <m:r>
-                                  <a:rPr>
+                                  <a:rPr lang="ar-AE">
                                     <a:latin typeface="Cambria Math" panose="02040503050406030204" pitchFamily="18" charset="0"/>
                                   </a:rPr>
                                   <m:t>𝑇</m:t>
@@ -21965,7 +21647,7 @@
                               </m:sup>
                             </m:sSup>
                             <m:r>
-                              <a:rPr>
+                              <a:rPr lang="ar-AE">
                                 <a:latin typeface="Cambria Math" panose="02040503050406030204" pitchFamily="18" charset="0"/>
                               </a:rPr>
                               <m:t>𝐴</m:t>
@@ -21975,13 +21657,13 @@
                       </m:e>
                       <m:sup>
                         <m:r>
-                          <a:rPr>
+                          <a:rPr lang="ar-AE">
                             <a:latin typeface="Cambria Math" panose="02040503050406030204" pitchFamily="18" charset="0"/>
                           </a:rPr>
                           <m:t>−</m:t>
                         </m:r>
                         <m:r>
-                          <a:rPr>
+                          <a:rPr lang="ar-AE">
                             <a:latin typeface="Cambria Math" panose="02040503050406030204" pitchFamily="18" charset="0"/>
                           </a:rPr>
                           <m:t>1</m:t>
@@ -21990,43 +21672,27 @@
                     </m:sSup>
                   </m:oMath>
                 </a14:m>
-                <a:endParaRPr dirty="0"/>
+                <a:endParaRPr lang="ar-AE" dirty="0"/>
               </a:p>
               <a:p>
                 <a:pPr lvl="1"/>
                 <a:r>
-                  <a:rPr dirty="0"/>
-                  <a:t>But this inverse </a:t>
-                </a:r>
-                <a:r>
                   <a:rPr lang="en-US" dirty="0"/>
-                  <a:t>is</a:t>
-                </a:r>
-                <a:r>
-                  <a:rPr dirty="0"/>
-                  <a:t> unstable </a:t>
-                </a:r>
-                <a:r>
-                  <a:rPr lang="en-US" dirty="0"/>
-                  <a:t>if</a:t>
-                </a:r>
-                <a:r>
-                  <a:rPr dirty="0"/>
-                  <a:t> </a:t>
+                  <a:t>But this inverse is unstable if </a:t>
                 </a:r>
                 <a14:m>
                   <m:oMath xmlns:m="http://schemas.openxmlformats.org/officeDocument/2006/math">
                     <m:sSub>
                       <m:sSubPr>
                         <m:ctrlPr>
-                          <a:rPr i="1">
+                          <a:rPr lang="ar-AE" i="1">
                             <a:latin typeface="Cambria Math" panose="02040503050406030204" pitchFamily="18" charset="0"/>
                           </a:rPr>
                         </m:ctrlPr>
                       </m:sSubPr>
                       <m:e>
                         <m:r>
-                          <a:rPr>
+                          <a:rPr lang="ar-AE">
                             <a:latin typeface="Cambria Math" panose="02040503050406030204" pitchFamily="18" charset="0"/>
                           </a:rPr>
                           <m:t>𝜆</m:t>
@@ -22034,7 +21700,7 @@
                       </m:e>
                       <m:sub>
                         <m:r>
-                          <a:rPr>
+                          <a:rPr lang="ar-AE">
                             <a:latin typeface="Cambria Math" panose="02040503050406030204" pitchFamily="18" charset="0"/>
                           </a:rPr>
                           <m:t>𝑝</m:t>
@@ -22042,36 +21708,37 @@
                       </m:sub>
                     </m:sSub>
                     <m:r>
-                      <a:rPr>
+                      <a:rPr lang="ar-AE">
                         <a:latin typeface="Cambria Math" panose="02040503050406030204" pitchFamily="18" charset="0"/>
                       </a:rPr>
                       <m:t>≈</m:t>
                     </m:r>
                     <m:r>
-                      <a:rPr>
+                      <a:rPr lang="ar-AE">
                         <a:latin typeface="Cambria Math" panose="02040503050406030204" pitchFamily="18" charset="0"/>
                       </a:rPr>
                       <m:t>0</m:t>
                     </m:r>
                   </m:oMath>
                 </a14:m>
-                <a:endParaRPr dirty="0"/>
+                <a:endParaRPr lang="ar-AE" dirty="0"/>
               </a:p>
               <a:p>
                 <a:pPr lvl="1"/>
                 <a:r>
-                  <a:rPr dirty="0"/>
+                  <a:rPr lang="en-US" dirty="0"/>
                   <a:t>In mathematical terminology we say the problem is </a:t>
                 </a:r>
                 <a:r>
-                  <a:rPr b="1" dirty="0"/>
+                  <a:rPr lang="en-US" b="1" dirty="0"/>
                   <a:t>ill-posed</a:t>
                 </a:r>
+                <a:endParaRPr b="1" dirty="0"/>
               </a:p>
             </p:txBody>
           </p:sp>
         </mc:Choice>
-        <mc:Fallback xmlns="">
+        <mc:Fallback>
           <p:sp>
             <p:nvSpPr>
               <p:cNvPr id="3" name="Content Placeholder 2"/>
@@ -22114,307 +21781,6 @@
   <p:clrMapOvr>
     <a:masterClrMapping/>
   </p:clrMapOvr>
-  <p:timing>
-    <p:tnLst>
-      <p:par>
-        <p:cTn id="1" dur="indefinite" restart="never" nodeType="tmRoot">
-          <p:childTnLst>
-            <p:seq concurrent="1" nextAc="seek">
-              <p:cTn id="2" dur="indefinite" nodeType="mainSeq">
-                <p:childTnLst>
-                  <p:par>
-                    <p:cTn id="3" fill="hold">
-                      <p:stCondLst>
-                        <p:cond delay="indefinite"/>
-                      </p:stCondLst>
-                      <p:childTnLst>
-                        <p:par>
-                          <p:cTn id="4" fill="hold">
-                            <p:stCondLst>
-                              <p:cond delay="0"/>
-                            </p:stCondLst>
-                            <p:childTnLst>
-                              <p:par>
-                                <p:cTn id="5" presetID="1" presetClass="entr" presetSubtype="0" fill="hold" nodeType="clickEffect">
-                                  <p:stCondLst>
-                                    <p:cond delay="0"/>
-                                  </p:stCondLst>
-                                  <p:childTnLst>
-                                    <p:set>
-                                      <p:cBhvr>
-                                        <p:cTn id="6" dur="1" fill="hold">
-                                          <p:stCondLst>
-                                            <p:cond delay="0"/>
-                                          </p:stCondLst>
-                                        </p:cTn>
-                                        <p:tgtEl>
-                                          <p:spTgt spid="3">
-                                            <p:txEl>
-                                              <p:pRg st="1" end="1"/>
-                                            </p:txEl>
-                                          </p:spTgt>
-                                        </p:tgtEl>
-                                        <p:attrNameLst>
-                                          <p:attrName>style.visibility</p:attrName>
-                                        </p:attrNameLst>
-                                      </p:cBhvr>
-                                      <p:to>
-                                        <p:strVal val="visible"/>
-                                      </p:to>
-                                    </p:set>
-                                  </p:childTnLst>
-                                </p:cTn>
-                              </p:par>
-                              <p:par>
-                                <p:cTn id="7" presetID="1" presetClass="entr" presetSubtype="0" fill="hold" nodeType="withEffect">
-                                  <p:stCondLst>
-                                    <p:cond delay="0"/>
-                                  </p:stCondLst>
-                                  <p:childTnLst>
-                                    <p:set>
-                                      <p:cBhvr>
-                                        <p:cTn id="8" dur="1" fill="hold">
-                                          <p:stCondLst>
-                                            <p:cond delay="0"/>
-                                          </p:stCondLst>
-                                        </p:cTn>
-                                        <p:tgtEl>
-                                          <p:spTgt spid="3">
-                                            <p:txEl>
-                                              <p:pRg st="2" end="2"/>
-                                            </p:txEl>
-                                          </p:spTgt>
-                                        </p:tgtEl>
-                                        <p:attrNameLst>
-                                          <p:attrName>style.visibility</p:attrName>
-                                        </p:attrNameLst>
-                                      </p:cBhvr>
-                                      <p:to>
-                                        <p:strVal val="visible"/>
-                                      </p:to>
-                                    </p:set>
-                                  </p:childTnLst>
-                                </p:cTn>
-                              </p:par>
-                            </p:childTnLst>
-                          </p:cTn>
-                        </p:par>
-                      </p:childTnLst>
-                    </p:cTn>
-                  </p:par>
-                  <p:par>
-                    <p:cTn id="9" fill="hold">
-                      <p:stCondLst>
-                        <p:cond delay="indefinite"/>
-                      </p:stCondLst>
-                      <p:childTnLst>
-                        <p:par>
-                          <p:cTn id="10" fill="hold">
-                            <p:stCondLst>
-                              <p:cond delay="0"/>
-                            </p:stCondLst>
-                            <p:childTnLst>
-                              <p:par>
-                                <p:cTn id="11" presetID="1" presetClass="entr" presetSubtype="0" fill="hold" nodeType="clickEffect">
-                                  <p:stCondLst>
-                                    <p:cond delay="0"/>
-                                  </p:stCondLst>
-                                  <p:childTnLst>
-                                    <p:set>
-                                      <p:cBhvr>
-                                        <p:cTn id="12" dur="1" fill="hold">
-                                          <p:stCondLst>
-                                            <p:cond delay="0"/>
-                                          </p:stCondLst>
-                                        </p:cTn>
-                                        <p:tgtEl>
-                                          <p:spTgt spid="3">
-                                            <p:txEl>
-                                              <p:pRg st="3" end="3"/>
-                                            </p:txEl>
-                                          </p:spTgt>
-                                        </p:tgtEl>
-                                        <p:attrNameLst>
-                                          <p:attrName>style.visibility</p:attrName>
-                                        </p:attrNameLst>
-                                      </p:cBhvr>
-                                      <p:to>
-                                        <p:strVal val="visible"/>
-                                      </p:to>
-                                    </p:set>
-                                  </p:childTnLst>
-                                </p:cTn>
-                              </p:par>
-                              <p:par>
-                                <p:cTn id="13" presetID="1" presetClass="entr" presetSubtype="0" fill="hold" nodeType="withEffect">
-                                  <p:stCondLst>
-                                    <p:cond delay="0"/>
-                                  </p:stCondLst>
-                                  <p:childTnLst>
-                                    <p:set>
-                                      <p:cBhvr>
-                                        <p:cTn id="14" dur="1" fill="hold">
-                                          <p:stCondLst>
-                                            <p:cond delay="0"/>
-                                          </p:stCondLst>
-                                        </p:cTn>
-                                        <p:tgtEl>
-                                          <p:spTgt spid="3">
-                                            <p:txEl>
-                                              <p:pRg st="4" end="4"/>
-                                            </p:txEl>
-                                          </p:spTgt>
-                                        </p:tgtEl>
-                                        <p:attrNameLst>
-                                          <p:attrName>style.visibility</p:attrName>
-                                        </p:attrNameLst>
-                                      </p:cBhvr>
-                                      <p:to>
-                                        <p:strVal val="visible"/>
-                                      </p:to>
-                                    </p:set>
-                                  </p:childTnLst>
-                                </p:cTn>
-                              </p:par>
-                            </p:childTnLst>
-                          </p:cTn>
-                        </p:par>
-                      </p:childTnLst>
-                    </p:cTn>
-                  </p:par>
-                  <p:par>
-                    <p:cTn id="15" fill="hold">
-                      <p:stCondLst>
-                        <p:cond delay="indefinite"/>
-                      </p:stCondLst>
-                      <p:childTnLst>
-                        <p:par>
-                          <p:cTn id="16" fill="hold">
-                            <p:stCondLst>
-                              <p:cond delay="0"/>
-                            </p:stCondLst>
-                            <p:childTnLst>
-                              <p:par>
-                                <p:cTn id="17" presetID="1" presetClass="entr" presetSubtype="0" fill="hold" nodeType="clickEffect">
-                                  <p:stCondLst>
-                                    <p:cond delay="0"/>
-                                  </p:stCondLst>
-                                  <p:childTnLst>
-                                    <p:set>
-                                      <p:cBhvr>
-                                        <p:cTn id="18" dur="1" fill="hold">
-                                          <p:stCondLst>
-                                            <p:cond delay="0"/>
-                                          </p:stCondLst>
-                                        </p:cTn>
-                                        <p:tgtEl>
-                                          <p:spTgt spid="3">
-                                            <p:txEl>
-                                              <p:pRg st="5" end="5"/>
-                                            </p:txEl>
-                                          </p:spTgt>
-                                        </p:tgtEl>
-                                        <p:attrNameLst>
-                                          <p:attrName>style.visibility</p:attrName>
-                                        </p:attrNameLst>
-                                      </p:cBhvr>
-                                      <p:to>
-                                        <p:strVal val="visible"/>
-                                      </p:to>
-                                    </p:set>
-                                  </p:childTnLst>
-                                </p:cTn>
-                              </p:par>
-                              <p:par>
-                                <p:cTn id="19" presetID="1" presetClass="entr" presetSubtype="0" fill="hold" nodeType="withEffect">
-                                  <p:stCondLst>
-                                    <p:cond delay="0"/>
-                                  </p:stCondLst>
-                                  <p:childTnLst>
-                                    <p:set>
-                                      <p:cBhvr>
-                                        <p:cTn id="20" dur="1" fill="hold">
-                                          <p:stCondLst>
-                                            <p:cond delay="0"/>
-                                          </p:stCondLst>
-                                        </p:cTn>
-                                        <p:tgtEl>
-                                          <p:spTgt spid="3">
-                                            <p:txEl>
-                                              <p:pRg st="6" end="6"/>
-                                            </p:txEl>
-                                          </p:spTgt>
-                                        </p:tgtEl>
-                                        <p:attrNameLst>
-                                          <p:attrName>style.visibility</p:attrName>
-                                        </p:attrNameLst>
-                                      </p:cBhvr>
-                                      <p:to>
-                                        <p:strVal val="visible"/>
-                                      </p:to>
-                                    </p:set>
-                                  </p:childTnLst>
-                                </p:cTn>
-                              </p:par>
-                              <p:par>
-                                <p:cTn id="21" presetID="1" presetClass="entr" presetSubtype="0" fill="hold" nodeType="withEffect">
-                                  <p:stCondLst>
-                                    <p:cond delay="0"/>
-                                  </p:stCondLst>
-                                  <p:childTnLst>
-                                    <p:set>
-                                      <p:cBhvr>
-                                        <p:cTn id="22" dur="1" fill="hold">
-                                          <p:stCondLst>
-                                            <p:cond delay="0"/>
-                                          </p:stCondLst>
-                                        </p:cTn>
-                                        <p:tgtEl>
-                                          <p:spTgt spid="3">
-                                            <p:txEl>
-                                              <p:pRg st="7" end="7"/>
-                                            </p:txEl>
-                                          </p:spTgt>
-                                        </p:tgtEl>
-                                        <p:attrNameLst>
-                                          <p:attrName>style.visibility</p:attrName>
-                                        </p:attrNameLst>
-                                      </p:cBhvr>
-                                      <p:to>
-                                        <p:strVal val="visible"/>
-                                      </p:to>
-                                    </p:set>
-                                  </p:childTnLst>
-                                </p:cTn>
-                              </p:par>
-                            </p:childTnLst>
-                          </p:cTn>
-                        </p:par>
-                      </p:childTnLst>
-                    </p:cTn>
-                  </p:par>
-                </p:childTnLst>
-              </p:cTn>
-              <p:prevCondLst>
-                <p:cond evt="onPrev" delay="0">
-                  <p:tgtEl>
-                    <p:sldTgt/>
-                  </p:tgtEl>
-                </p:cond>
-              </p:prevCondLst>
-              <p:nextCondLst>
-                <p:cond evt="onNext" delay="0">
-                  <p:tgtEl>
-                    <p:sldTgt/>
-                  </p:tgtEl>
-                </p:cond>
-              </p:nextCondLst>
-            </p:seq>
-          </p:childTnLst>
-        </p:cTn>
-      </p:par>
-    </p:tnLst>
-  </p:timing>
 </p:sld>
 </file>
 
@@ -22460,8 +21826,8 @@
           </a:p>
         </p:txBody>
       </p:sp>
-      <mc:AlternateContent xmlns:mc="http://schemas.openxmlformats.org/markup-compatibility/2006" xmlns:a14="http://schemas.microsoft.com/office/drawing/2010/main">
-        <mc:Choice Requires="a14">
+      <mc:AlternateContent xmlns:mc="http://schemas.openxmlformats.org/markup-compatibility/2006">
+        <mc:Choice xmlns:a14="http://schemas.microsoft.com/office/drawing/2010/main" Requires="a14">
           <p:sp>
             <p:nvSpPr>
               <p:cNvPr id="3" name="Content Placeholder 2"/>
@@ -22625,7 +21991,13 @@
                                     <a:rPr lang="en-US" i="1">
                                       <a:latin typeface="Cambria Math" panose="02040503050406030204" pitchFamily="18" charset="0"/>
                                     </a:rPr>
-                                    <m:t>𝐴𝑥</m:t>
+                                    <m:t>𝐴</m:t>
+                                  </m:r>
+                                  <m:r>
+                                    <a:rPr lang="en-US" b="0" i="1" smtClean="0">
+                                      <a:latin typeface="Cambria Math" panose="02040503050406030204" pitchFamily="18" charset="0"/>
+                                    </a:rPr>
+                                    <m:t>𝑏</m:t>
                                   </m:r>
                                   <m:r>
                                     <a:rPr lang="en-US" i="1">
@@ -22634,10 +22006,10 @@
                                     <m:t>−</m:t>
                                   </m:r>
                                   <m:r>
-                                    <a:rPr lang="en-US" i="1">
+                                    <a:rPr lang="en-US" b="0" i="1" smtClean="0">
                                       <a:latin typeface="Cambria Math" panose="02040503050406030204" pitchFamily="18" charset="0"/>
                                     </a:rPr>
-                                    <m:t>𝑏</m:t>
+                                    <m:t>𝑦</m:t>
                                   </m:r>
                                 </m:e>
                               </m:d>
@@ -23342,7 +22714,7 @@
             </p:txBody>
           </p:sp>
         </mc:Choice>
-        <mc:Fallback xmlns="">
+        <mc:Fallback>
           <p:sp>
             <p:nvSpPr>
               <p:cNvPr id="3" name="Content Placeholder 2"/>
@@ -29216,8 +28588,8 @@
           </a:p>
         </p:txBody>
       </p:sp>
-      <mc:AlternateContent xmlns:mc="http://schemas.openxmlformats.org/markup-compatibility/2006" xmlns:a14="http://schemas.microsoft.com/office/drawing/2010/main">
-        <mc:Choice Requires="a14">
+      <mc:AlternateContent xmlns:mc="http://schemas.openxmlformats.org/markup-compatibility/2006">
+        <mc:Choice xmlns:a14="http://schemas.microsoft.com/office/drawing/2010/main" Requires="a14">
           <p:sp>
             <p:nvSpPr>
               <p:cNvPr id="3" name="Content Placeholder 2"/>
@@ -29343,7 +28715,13 @@
                                     <a:rPr lang="en-US" i="1">
                                       <a:latin typeface="Cambria Math" panose="02040503050406030204" pitchFamily="18" charset="0"/>
                                     </a:rPr>
-                                    <m:t>𝐴𝑥</m:t>
+                                    <m:t>𝐴</m:t>
+                                  </m:r>
+                                  <m:r>
+                                    <a:rPr lang="en-US" b="0" i="1" smtClean="0">
+                                      <a:latin typeface="Cambria Math" panose="02040503050406030204" pitchFamily="18" charset="0"/>
+                                    </a:rPr>
+                                    <m:t>𝑏</m:t>
                                   </m:r>
                                   <m:r>
                                     <a:rPr lang="en-US" i="1">
@@ -29352,10 +28730,10 @@
                                     <m:t>−</m:t>
                                   </m:r>
                                   <m:r>
-                                    <a:rPr lang="en-US" i="1">
+                                    <a:rPr lang="en-US" b="0" i="1" smtClean="0">
                                       <a:latin typeface="Cambria Math" panose="02040503050406030204" pitchFamily="18" charset="0"/>
                                     </a:rPr>
-                                    <m:t>𝑏</m:t>
+                                    <m:t>𝑦</m:t>
                                   </m:r>
                                 </m:e>
                               </m:d>
@@ -29872,7 +29250,7 @@
             </p:txBody>
           </p:sp>
         </mc:Choice>
-        <mc:Fallback xmlns="">
+        <mc:Fallback>
           <p:sp>
             <p:nvSpPr>
               <p:cNvPr id="3" name="Content Placeholder 2"/>
@@ -29915,276 +29293,6 @@
   <p:clrMapOvr>
     <a:masterClrMapping/>
   </p:clrMapOvr>
-  <p:timing>
-    <p:tnLst>
-      <p:par>
-        <p:cTn id="1" dur="indefinite" restart="never" nodeType="tmRoot">
-          <p:childTnLst>
-            <p:seq concurrent="1" nextAc="seek">
-              <p:cTn id="2" dur="indefinite" nodeType="mainSeq">
-                <p:childTnLst>
-                  <p:par>
-                    <p:cTn id="3" fill="hold">
-                      <p:stCondLst>
-                        <p:cond delay="indefinite"/>
-                      </p:stCondLst>
-                      <p:childTnLst>
-                        <p:par>
-                          <p:cTn id="4" fill="hold">
-                            <p:stCondLst>
-                              <p:cond delay="0"/>
-                            </p:stCondLst>
-                            <p:childTnLst>
-                              <p:par>
-                                <p:cTn id="5" presetID="1" presetClass="entr" presetSubtype="0" fill="hold" nodeType="clickEffect">
-                                  <p:stCondLst>
-                                    <p:cond delay="0"/>
-                                  </p:stCondLst>
-                                  <p:childTnLst>
-                                    <p:set>
-                                      <p:cBhvr>
-                                        <p:cTn id="6" dur="1" fill="hold">
-                                          <p:stCondLst>
-                                            <p:cond delay="0"/>
-                                          </p:stCondLst>
-                                        </p:cTn>
-                                        <p:tgtEl>
-                                          <p:spTgt spid="3">
-                                            <p:txEl>
-                                              <p:pRg st="1" end="1"/>
-                                            </p:txEl>
-                                          </p:spTgt>
-                                        </p:tgtEl>
-                                        <p:attrNameLst>
-                                          <p:attrName>style.visibility</p:attrName>
-                                        </p:attrNameLst>
-                                      </p:cBhvr>
-                                      <p:to>
-                                        <p:strVal val="visible"/>
-                                      </p:to>
-                                    </p:set>
-                                  </p:childTnLst>
-                                </p:cTn>
-                              </p:par>
-                              <p:par>
-                                <p:cTn id="7" presetID="1" presetClass="entr" presetSubtype="0" fill="hold" nodeType="withEffect">
-                                  <p:stCondLst>
-                                    <p:cond delay="0"/>
-                                  </p:stCondLst>
-                                  <p:childTnLst>
-                                    <p:set>
-                                      <p:cBhvr>
-                                        <p:cTn id="8" dur="1" fill="hold">
-                                          <p:stCondLst>
-                                            <p:cond delay="0"/>
-                                          </p:stCondLst>
-                                        </p:cTn>
-                                        <p:tgtEl>
-                                          <p:spTgt spid="3">
-                                            <p:txEl>
-                                              <p:pRg st="2" end="2"/>
-                                            </p:txEl>
-                                          </p:spTgt>
-                                        </p:tgtEl>
-                                        <p:attrNameLst>
-                                          <p:attrName>style.visibility</p:attrName>
-                                        </p:attrNameLst>
-                                      </p:cBhvr>
-                                      <p:to>
-                                        <p:strVal val="visible"/>
-                                      </p:to>
-                                    </p:set>
-                                  </p:childTnLst>
-                                </p:cTn>
-                              </p:par>
-                            </p:childTnLst>
-                          </p:cTn>
-                        </p:par>
-                      </p:childTnLst>
-                    </p:cTn>
-                  </p:par>
-                  <p:par>
-                    <p:cTn id="9" fill="hold">
-                      <p:stCondLst>
-                        <p:cond delay="indefinite"/>
-                      </p:stCondLst>
-                      <p:childTnLst>
-                        <p:par>
-                          <p:cTn id="10" fill="hold">
-                            <p:stCondLst>
-                              <p:cond delay="0"/>
-                            </p:stCondLst>
-                            <p:childTnLst>
-                              <p:par>
-                                <p:cTn id="11" presetID="1" presetClass="entr" presetSubtype="0" fill="hold" nodeType="clickEffect">
-                                  <p:stCondLst>
-                                    <p:cond delay="0"/>
-                                  </p:stCondLst>
-                                  <p:childTnLst>
-                                    <p:set>
-                                      <p:cBhvr>
-                                        <p:cTn id="12" dur="1" fill="hold">
-                                          <p:stCondLst>
-                                            <p:cond delay="0"/>
-                                          </p:stCondLst>
-                                        </p:cTn>
-                                        <p:tgtEl>
-                                          <p:spTgt spid="3">
-                                            <p:txEl>
-                                              <p:pRg st="3" end="3"/>
-                                            </p:txEl>
-                                          </p:spTgt>
-                                        </p:tgtEl>
-                                        <p:attrNameLst>
-                                          <p:attrName>style.visibility</p:attrName>
-                                        </p:attrNameLst>
-                                      </p:cBhvr>
-                                      <p:to>
-                                        <p:strVal val="visible"/>
-                                      </p:to>
-                                    </p:set>
-                                  </p:childTnLst>
-                                </p:cTn>
-                              </p:par>
-                            </p:childTnLst>
-                          </p:cTn>
-                        </p:par>
-                      </p:childTnLst>
-                    </p:cTn>
-                  </p:par>
-                  <p:par>
-                    <p:cTn id="13" fill="hold">
-                      <p:stCondLst>
-                        <p:cond delay="indefinite"/>
-                      </p:stCondLst>
-                      <p:childTnLst>
-                        <p:par>
-                          <p:cTn id="14" fill="hold">
-                            <p:stCondLst>
-                              <p:cond delay="0"/>
-                            </p:stCondLst>
-                            <p:childTnLst>
-                              <p:par>
-                                <p:cTn id="15" presetID="1" presetClass="entr" presetSubtype="0" fill="hold" nodeType="clickEffect">
-                                  <p:stCondLst>
-                                    <p:cond delay="0"/>
-                                  </p:stCondLst>
-                                  <p:childTnLst>
-                                    <p:set>
-                                      <p:cBhvr>
-                                        <p:cTn id="16" dur="1" fill="hold">
-                                          <p:stCondLst>
-                                            <p:cond delay="0"/>
-                                          </p:stCondLst>
-                                        </p:cTn>
-                                        <p:tgtEl>
-                                          <p:spTgt spid="3">
-                                            <p:txEl>
-                                              <p:pRg st="4" end="4"/>
-                                            </p:txEl>
-                                          </p:spTgt>
-                                        </p:tgtEl>
-                                        <p:attrNameLst>
-                                          <p:attrName>style.visibility</p:attrName>
-                                        </p:attrNameLst>
-                                      </p:cBhvr>
-                                      <p:to>
-                                        <p:strVal val="visible"/>
-                                      </p:to>
-                                    </p:set>
-                                  </p:childTnLst>
-                                </p:cTn>
-                              </p:par>
-                              <p:par>
-                                <p:cTn id="17" presetID="1" presetClass="entr" presetSubtype="0" fill="hold" nodeType="withEffect">
-                                  <p:stCondLst>
-                                    <p:cond delay="0"/>
-                                  </p:stCondLst>
-                                  <p:childTnLst>
-                                    <p:set>
-                                      <p:cBhvr>
-                                        <p:cTn id="18" dur="1" fill="hold">
-                                          <p:stCondLst>
-                                            <p:cond delay="0"/>
-                                          </p:stCondLst>
-                                        </p:cTn>
-                                        <p:tgtEl>
-                                          <p:spTgt spid="3">
-                                            <p:txEl>
-                                              <p:pRg st="5" end="5"/>
-                                            </p:txEl>
-                                          </p:spTgt>
-                                        </p:tgtEl>
-                                        <p:attrNameLst>
-                                          <p:attrName>style.visibility</p:attrName>
-                                        </p:attrNameLst>
-                                      </p:cBhvr>
-                                      <p:to>
-                                        <p:strVal val="visible"/>
-                                      </p:to>
-                                    </p:set>
-                                  </p:childTnLst>
-                                </p:cTn>
-                              </p:par>
-                              <p:par>
-                                <p:cTn id="19" presetID="1" presetClass="entr" presetSubtype="0" fill="hold" nodeType="withEffect">
-                                  <p:stCondLst>
-                                    <p:cond delay="0"/>
-                                  </p:stCondLst>
-                                  <p:childTnLst>
-                                    <p:set>
-                                      <p:cBhvr>
-                                        <p:cTn id="20" dur="1" fill="hold">
-                                          <p:stCondLst>
-                                            <p:cond delay="0"/>
-                                          </p:stCondLst>
-                                        </p:cTn>
-                                        <p:tgtEl>
-                                          <p:spTgt spid="3">
-                                            <p:txEl>
-                                              <p:pRg st="6" end="6"/>
-                                            </p:txEl>
-                                          </p:spTgt>
-                                        </p:tgtEl>
-                                        <p:attrNameLst>
-                                          <p:attrName>style.visibility</p:attrName>
-                                        </p:attrNameLst>
-                                      </p:cBhvr>
-                                      <p:to>
-                                        <p:strVal val="visible"/>
-                                      </p:to>
-                                    </p:set>
-                                  </p:childTnLst>
-                                </p:cTn>
-                              </p:par>
-                            </p:childTnLst>
-                          </p:cTn>
-                        </p:par>
-                      </p:childTnLst>
-                    </p:cTn>
-                  </p:par>
-                </p:childTnLst>
-              </p:cTn>
-              <p:prevCondLst>
-                <p:cond evt="onPrev" delay="0">
-                  <p:tgtEl>
-                    <p:sldTgt/>
-                  </p:tgtEl>
-                </p:cond>
-              </p:prevCondLst>
-              <p:nextCondLst>
-                <p:cond evt="onNext" delay="0">
-                  <p:tgtEl>
-                    <p:sldTgt/>
-                  </p:tgtEl>
-                </p:cond>
-              </p:nextCondLst>
-            </p:seq>
-          </p:childTnLst>
-        </p:cTn>
-      </p:par>
-    </p:tnLst>
-  </p:timing>
 </p:sld>
 </file>
 
@@ -32123,8 +31231,8 @@
           </a:p>
         </p:txBody>
       </p:sp>
-      <mc:AlternateContent xmlns:mc="http://schemas.openxmlformats.org/markup-compatibility/2006" xmlns:a14="http://schemas.microsoft.com/office/drawing/2010/main">
-        <mc:Choice Requires="a14">
+      <mc:AlternateContent xmlns:mc="http://schemas.openxmlformats.org/markup-compatibility/2006">
+        <mc:Choice xmlns:a14="http://schemas.microsoft.com/office/drawing/2010/main" Requires="a14">
           <p:sp>
             <p:nvSpPr>
               <p:cNvPr id="3" name="Content Placeholder 2"/>
@@ -32358,7 +31466,13 @@
                                     <a:rPr lang="en-US" b="0" i="1" smtClean="0">
                                       <a:latin typeface="Cambria Math" panose="02040503050406030204" pitchFamily="18" charset="0"/>
                                     </a:rPr>
-                                    <m:t>𝐴𝑥</m:t>
+                                    <m:t>𝐴</m:t>
+                                  </m:r>
+                                  <m:r>
+                                    <a:rPr lang="en-US" b="0" i="1" smtClean="0">
+                                      <a:latin typeface="Cambria Math" panose="02040503050406030204" pitchFamily="18" charset="0"/>
+                                    </a:rPr>
+                                    <m:t>𝑏</m:t>
                                   </m:r>
                                   <m:r>
                                     <a:rPr lang="en-US" b="0" i="1" smtClean="0">
@@ -32370,7 +31484,7 @@
                                     <a:rPr lang="en-US" b="0" i="1" smtClean="0">
                                       <a:latin typeface="Cambria Math" panose="02040503050406030204" pitchFamily="18" charset="0"/>
                                     </a:rPr>
-                                    <m:t>𝑏</m:t>
+                                    <m:t>𝑦</m:t>
                                   </m:r>
                                 </m:e>
                               </m:d>
@@ -32583,7 +31697,7 @@
             </p:txBody>
           </p:sp>
         </mc:Choice>
-        <mc:Fallback xmlns="">
+        <mc:Fallback>
           <p:sp>
             <p:nvSpPr>
               <p:cNvPr id="3" name="Content Placeholder 2"/>
@@ -32626,400 +31740,6 @@
   <p:clrMapOvr>
     <a:masterClrMapping/>
   </p:clrMapOvr>
-  <p:timing>
-    <p:tnLst>
-      <p:par>
-        <p:cTn id="1" dur="indefinite" restart="never" nodeType="tmRoot">
-          <p:childTnLst>
-            <p:seq concurrent="1" nextAc="seek">
-              <p:cTn id="2" dur="indefinite" nodeType="mainSeq">
-                <p:childTnLst>
-                  <p:par>
-                    <p:cTn id="3" fill="hold">
-                      <p:stCondLst>
-                        <p:cond delay="indefinite"/>
-                      </p:stCondLst>
-                      <p:childTnLst>
-                        <p:par>
-                          <p:cTn id="4" fill="hold">
-                            <p:stCondLst>
-                              <p:cond delay="0"/>
-                            </p:stCondLst>
-                            <p:childTnLst>
-                              <p:par>
-                                <p:cTn id="5" presetID="1" presetClass="entr" presetSubtype="0" fill="hold" nodeType="clickEffect">
-                                  <p:stCondLst>
-                                    <p:cond delay="0"/>
-                                  </p:stCondLst>
-                                  <p:childTnLst>
-                                    <p:set>
-                                      <p:cBhvr>
-                                        <p:cTn id="6" dur="1" fill="hold">
-                                          <p:stCondLst>
-                                            <p:cond delay="0"/>
-                                          </p:stCondLst>
-                                        </p:cTn>
-                                        <p:tgtEl>
-                                          <p:spTgt spid="3">
-                                            <p:txEl>
-                                              <p:pRg st="1" end="1"/>
-                                            </p:txEl>
-                                          </p:spTgt>
-                                        </p:tgtEl>
-                                        <p:attrNameLst>
-                                          <p:attrName>style.visibility</p:attrName>
-                                        </p:attrNameLst>
-                                      </p:cBhvr>
-                                      <p:to>
-                                        <p:strVal val="visible"/>
-                                      </p:to>
-                                    </p:set>
-                                  </p:childTnLst>
-                                </p:cTn>
-                              </p:par>
-                              <p:par>
-                                <p:cTn id="7" presetID="1" presetClass="entr" presetSubtype="0" fill="hold" nodeType="withEffect">
-                                  <p:stCondLst>
-                                    <p:cond delay="0"/>
-                                  </p:stCondLst>
-                                  <p:childTnLst>
-                                    <p:set>
-                                      <p:cBhvr>
-                                        <p:cTn id="8" dur="1" fill="hold">
-                                          <p:stCondLst>
-                                            <p:cond delay="0"/>
-                                          </p:stCondLst>
-                                        </p:cTn>
-                                        <p:tgtEl>
-                                          <p:spTgt spid="3">
-                                            <p:txEl>
-                                              <p:pRg st="2" end="2"/>
-                                            </p:txEl>
-                                          </p:spTgt>
-                                        </p:tgtEl>
-                                        <p:attrNameLst>
-                                          <p:attrName>style.visibility</p:attrName>
-                                        </p:attrNameLst>
-                                      </p:cBhvr>
-                                      <p:to>
-                                        <p:strVal val="visible"/>
-                                      </p:to>
-                                    </p:set>
-                                  </p:childTnLst>
-                                </p:cTn>
-                              </p:par>
-                              <p:par>
-                                <p:cTn id="9" presetID="1" presetClass="entr" presetSubtype="0" fill="hold" nodeType="withEffect">
-                                  <p:stCondLst>
-                                    <p:cond delay="0"/>
-                                  </p:stCondLst>
-                                  <p:childTnLst>
-                                    <p:set>
-                                      <p:cBhvr>
-                                        <p:cTn id="10" dur="1" fill="hold">
-                                          <p:stCondLst>
-                                            <p:cond delay="0"/>
-                                          </p:stCondLst>
-                                        </p:cTn>
-                                        <p:tgtEl>
-                                          <p:spTgt spid="3">
-                                            <p:txEl>
-                                              <p:pRg st="3" end="3"/>
-                                            </p:txEl>
-                                          </p:spTgt>
-                                        </p:tgtEl>
-                                        <p:attrNameLst>
-                                          <p:attrName>style.visibility</p:attrName>
-                                        </p:attrNameLst>
-                                      </p:cBhvr>
-                                      <p:to>
-                                        <p:strVal val="visible"/>
-                                      </p:to>
-                                    </p:set>
-                                  </p:childTnLst>
-                                </p:cTn>
-                              </p:par>
-                            </p:childTnLst>
-                          </p:cTn>
-                        </p:par>
-                      </p:childTnLst>
-                    </p:cTn>
-                  </p:par>
-                  <p:par>
-                    <p:cTn id="11" fill="hold">
-                      <p:stCondLst>
-                        <p:cond delay="indefinite"/>
-                      </p:stCondLst>
-                      <p:childTnLst>
-                        <p:par>
-                          <p:cTn id="12" fill="hold">
-                            <p:stCondLst>
-                              <p:cond delay="0"/>
-                            </p:stCondLst>
-                            <p:childTnLst>
-                              <p:par>
-                                <p:cTn id="13" presetID="1" presetClass="entr" presetSubtype="0" fill="hold" nodeType="clickEffect">
-                                  <p:stCondLst>
-                                    <p:cond delay="0"/>
-                                  </p:stCondLst>
-                                  <p:childTnLst>
-                                    <p:set>
-                                      <p:cBhvr>
-                                        <p:cTn id="14" dur="1" fill="hold">
-                                          <p:stCondLst>
-                                            <p:cond delay="0"/>
-                                          </p:stCondLst>
-                                        </p:cTn>
-                                        <p:tgtEl>
-                                          <p:spTgt spid="3">
-                                            <p:txEl>
-                                              <p:pRg st="4" end="4"/>
-                                            </p:txEl>
-                                          </p:spTgt>
-                                        </p:tgtEl>
-                                        <p:attrNameLst>
-                                          <p:attrName>style.visibility</p:attrName>
-                                        </p:attrNameLst>
-                                      </p:cBhvr>
-                                      <p:to>
-                                        <p:strVal val="visible"/>
-                                      </p:to>
-                                    </p:set>
-                                  </p:childTnLst>
-                                </p:cTn>
-                              </p:par>
-                              <p:par>
-                                <p:cTn id="15" presetID="1" presetClass="entr" presetSubtype="0" fill="hold" nodeType="withEffect">
-                                  <p:stCondLst>
-                                    <p:cond delay="0"/>
-                                  </p:stCondLst>
-                                  <p:childTnLst>
-                                    <p:set>
-                                      <p:cBhvr>
-                                        <p:cTn id="16" dur="1" fill="hold">
-                                          <p:stCondLst>
-                                            <p:cond delay="0"/>
-                                          </p:stCondLst>
-                                        </p:cTn>
-                                        <p:tgtEl>
-                                          <p:spTgt spid="3">
-                                            <p:txEl>
-                                              <p:pRg st="5" end="5"/>
-                                            </p:txEl>
-                                          </p:spTgt>
-                                        </p:tgtEl>
-                                        <p:attrNameLst>
-                                          <p:attrName>style.visibility</p:attrName>
-                                        </p:attrNameLst>
-                                      </p:cBhvr>
-                                      <p:to>
-                                        <p:strVal val="visible"/>
-                                      </p:to>
-                                    </p:set>
-                                  </p:childTnLst>
-                                </p:cTn>
-                              </p:par>
-                              <p:par>
-                                <p:cTn id="17" presetID="1" presetClass="entr" presetSubtype="0" fill="hold" nodeType="withEffect">
-                                  <p:stCondLst>
-                                    <p:cond delay="0"/>
-                                  </p:stCondLst>
-                                  <p:childTnLst>
-                                    <p:set>
-                                      <p:cBhvr>
-                                        <p:cTn id="18" dur="1" fill="hold">
-                                          <p:stCondLst>
-                                            <p:cond delay="0"/>
-                                          </p:stCondLst>
-                                        </p:cTn>
-                                        <p:tgtEl>
-                                          <p:spTgt spid="3">
-                                            <p:txEl>
-                                              <p:pRg st="6" end="6"/>
-                                            </p:txEl>
-                                          </p:spTgt>
-                                        </p:tgtEl>
-                                        <p:attrNameLst>
-                                          <p:attrName>style.visibility</p:attrName>
-                                        </p:attrNameLst>
-                                      </p:cBhvr>
-                                      <p:to>
-                                        <p:strVal val="visible"/>
-                                      </p:to>
-                                    </p:set>
-                                  </p:childTnLst>
-                                </p:cTn>
-                              </p:par>
-                            </p:childTnLst>
-                          </p:cTn>
-                        </p:par>
-                      </p:childTnLst>
-                    </p:cTn>
-                  </p:par>
-                  <p:par>
-                    <p:cTn id="19" fill="hold">
-                      <p:stCondLst>
-                        <p:cond delay="indefinite"/>
-                      </p:stCondLst>
-                      <p:childTnLst>
-                        <p:par>
-                          <p:cTn id="20" fill="hold">
-                            <p:stCondLst>
-                              <p:cond delay="0"/>
-                            </p:stCondLst>
-                            <p:childTnLst>
-                              <p:par>
-                                <p:cTn id="21" presetID="1" presetClass="entr" presetSubtype="0" fill="hold" nodeType="clickEffect">
-                                  <p:stCondLst>
-                                    <p:cond delay="0"/>
-                                  </p:stCondLst>
-                                  <p:childTnLst>
-                                    <p:set>
-                                      <p:cBhvr>
-                                        <p:cTn id="22" dur="1" fill="hold">
-                                          <p:stCondLst>
-                                            <p:cond delay="0"/>
-                                          </p:stCondLst>
-                                        </p:cTn>
-                                        <p:tgtEl>
-                                          <p:spTgt spid="3">
-                                            <p:txEl>
-                                              <p:pRg st="7" end="7"/>
-                                            </p:txEl>
-                                          </p:spTgt>
-                                        </p:tgtEl>
-                                        <p:attrNameLst>
-                                          <p:attrName>style.visibility</p:attrName>
-                                        </p:attrNameLst>
-                                      </p:cBhvr>
-                                      <p:to>
-                                        <p:strVal val="visible"/>
-                                      </p:to>
-                                    </p:set>
-                                  </p:childTnLst>
-                                </p:cTn>
-                              </p:par>
-                              <p:par>
-                                <p:cTn id="23" presetID="1" presetClass="entr" presetSubtype="0" fill="hold" nodeType="withEffect">
-                                  <p:stCondLst>
-                                    <p:cond delay="0"/>
-                                  </p:stCondLst>
-                                  <p:childTnLst>
-                                    <p:set>
-                                      <p:cBhvr>
-                                        <p:cTn id="24" dur="1" fill="hold">
-                                          <p:stCondLst>
-                                            <p:cond delay="0"/>
-                                          </p:stCondLst>
-                                        </p:cTn>
-                                        <p:tgtEl>
-                                          <p:spTgt spid="3">
-                                            <p:txEl>
-                                              <p:pRg st="8" end="8"/>
-                                            </p:txEl>
-                                          </p:spTgt>
-                                        </p:tgtEl>
-                                        <p:attrNameLst>
-                                          <p:attrName>style.visibility</p:attrName>
-                                        </p:attrNameLst>
-                                      </p:cBhvr>
-                                      <p:to>
-                                        <p:strVal val="visible"/>
-                                      </p:to>
-                                    </p:set>
-                                  </p:childTnLst>
-                                </p:cTn>
-                              </p:par>
-                              <p:par>
-                                <p:cTn id="25" presetID="1" presetClass="entr" presetSubtype="0" fill="hold" nodeType="withEffect">
-                                  <p:stCondLst>
-                                    <p:cond delay="0"/>
-                                  </p:stCondLst>
-                                  <p:childTnLst>
-                                    <p:set>
-                                      <p:cBhvr>
-                                        <p:cTn id="26" dur="1" fill="hold">
-                                          <p:stCondLst>
-                                            <p:cond delay="0"/>
-                                          </p:stCondLst>
-                                        </p:cTn>
-                                        <p:tgtEl>
-                                          <p:spTgt spid="3">
-                                            <p:txEl>
-                                              <p:pRg st="9" end="9"/>
-                                            </p:txEl>
-                                          </p:spTgt>
-                                        </p:tgtEl>
-                                        <p:attrNameLst>
-                                          <p:attrName>style.visibility</p:attrName>
-                                        </p:attrNameLst>
-                                      </p:cBhvr>
-                                      <p:to>
-                                        <p:strVal val="visible"/>
-                                      </p:to>
-                                    </p:set>
-                                  </p:childTnLst>
-                                </p:cTn>
-                              </p:par>
-                              <p:par>
-                                <p:cTn id="27" presetID="1" presetClass="entr" presetSubtype="0" fill="hold" nodeType="withEffect">
-                                  <p:stCondLst>
-                                    <p:cond delay="0"/>
-                                  </p:stCondLst>
-                                  <p:childTnLst>
-                                    <p:set>
-                                      <p:cBhvr>
-                                        <p:cTn id="28" dur="1" fill="hold">
-                                          <p:stCondLst>
-                                            <p:cond delay="0"/>
-                                          </p:stCondLst>
-                                        </p:cTn>
-                                        <p:tgtEl>
-                                          <p:spTgt spid="3">
-                                            <p:txEl>
-                                              <p:pRg st="10" end="10"/>
-                                            </p:txEl>
-                                          </p:spTgt>
-                                        </p:tgtEl>
-                                        <p:attrNameLst>
-                                          <p:attrName>style.visibility</p:attrName>
-                                        </p:attrNameLst>
-                                      </p:cBhvr>
-                                      <p:to>
-                                        <p:strVal val="visible"/>
-                                      </p:to>
-                                    </p:set>
-                                  </p:childTnLst>
-                                </p:cTn>
-                              </p:par>
-                            </p:childTnLst>
-                          </p:cTn>
-                        </p:par>
-                      </p:childTnLst>
-                    </p:cTn>
-                  </p:par>
-                </p:childTnLst>
-              </p:cTn>
-              <p:prevCondLst>
-                <p:cond evt="onPrev" delay="0">
-                  <p:tgtEl>
-                    <p:sldTgt/>
-                  </p:tgtEl>
-                </p:cond>
-              </p:prevCondLst>
-              <p:nextCondLst>
-                <p:cond evt="onNext" delay="0">
-                  <p:tgtEl>
-                    <p:sldTgt/>
-                  </p:tgtEl>
-                </p:cond>
-              </p:nextCondLst>
-            </p:seq>
-          </p:childTnLst>
-        </p:cTn>
-      </p:par>
-    </p:tnLst>
-  </p:timing>
 </p:sld>
 </file>
 

</xml_diff>